<commit_message>
Updated linear model example slides
</commit_message>
<xml_diff>
--- a/LectureSlides/08_IntroductionToLinearModels.pptx
+++ b/LectureSlides/08_IntroductionToLinearModels.pptx
@@ -5,7 +5,7 @@
     <p:sldMasterId id="2147483648" r:id="rId1"/>
   </p:sldMasterIdLst>
   <p:notesMasterIdLst>
-    <p:notesMasterId r:id="rId56"/>
+    <p:notesMasterId r:id="rId58"/>
   </p:notesMasterIdLst>
   <p:sldIdLst>
     <p:sldId id="338" r:id="rId2"/>
@@ -59,9 +59,11 @@
     <p:sldId id="376" r:id="rId50"/>
     <p:sldId id="377" r:id="rId51"/>
     <p:sldId id="312" r:id="rId52"/>
-    <p:sldId id="319" r:id="rId53"/>
-    <p:sldId id="335" r:id="rId54"/>
-    <p:sldId id="336" r:id="rId55"/>
+    <p:sldId id="378" r:id="rId53"/>
+    <p:sldId id="379" r:id="rId54"/>
+    <p:sldId id="319" r:id="rId55"/>
+    <p:sldId id="335" r:id="rId56"/>
+    <p:sldId id="336" r:id="rId57"/>
   </p:sldIdLst>
   <p:sldSz cx="9144000" cy="5143500" type="screen16x9"/>
   <p:notesSz cx="6858000" cy="9144000"/>
@@ -261,7 +263,7 @@
           <a:p>
             <a:fld id="{19E36D9D-5B1A-4F71-A845-003503DCA96F}" type="datetimeFigureOut">
               <a:rPr lang="en-US" smtClean="0"/>
-              <a:t>9/22/2024</a:t>
+              <a:t>9/23/2024</a:t>
             </a:fld>
             <a:endParaRPr lang="en-US"/>
           </a:p>
@@ -791,7 +793,7 @@
           <a:p>
             <a:fld id="{241EB5C9-1307-BA42-ABA2-0BC069CD8E7F}" type="datetimeFigureOut">
               <a:rPr lang="en-US" smtClean="0"/>
-              <a:t>9/22/2024</a:t>
+              <a:t>9/23/2024</a:t>
             </a:fld>
             <a:endParaRPr lang="en-US"/>
           </a:p>
@@ -959,7 +961,7 @@
           <a:p>
             <a:fld id="{241EB5C9-1307-BA42-ABA2-0BC069CD8E7F}" type="datetimeFigureOut">
               <a:rPr lang="en-US" smtClean="0"/>
-              <a:t>9/22/2024</a:t>
+              <a:t>9/23/2024</a:t>
             </a:fld>
             <a:endParaRPr lang="en-US"/>
           </a:p>
@@ -1137,7 +1139,7 @@
           <a:p>
             <a:fld id="{241EB5C9-1307-BA42-ABA2-0BC069CD8E7F}" type="datetimeFigureOut">
               <a:rPr lang="en-US" smtClean="0"/>
-              <a:t>9/22/2024</a:t>
+              <a:t>9/23/2024</a:t>
             </a:fld>
             <a:endParaRPr lang="en-US"/>
           </a:p>
@@ -1305,7 +1307,7 @@
           <a:p>
             <a:fld id="{241EB5C9-1307-BA42-ABA2-0BC069CD8E7F}" type="datetimeFigureOut">
               <a:rPr lang="en-US" smtClean="0"/>
-              <a:t>9/22/2024</a:t>
+              <a:t>9/23/2024</a:t>
             </a:fld>
             <a:endParaRPr lang="en-US"/>
           </a:p>
@@ -1550,7 +1552,7 @@
           <a:p>
             <a:fld id="{241EB5C9-1307-BA42-ABA2-0BC069CD8E7F}" type="datetimeFigureOut">
               <a:rPr lang="en-US" smtClean="0"/>
-              <a:t>9/22/2024</a:t>
+              <a:t>9/23/2024</a:t>
             </a:fld>
             <a:endParaRPr lang="en-US"/>
           </a:p>
@@ -1835,7 +1837,7 @@
           <a:p>
             <a:fld id="{241EB5C9-1307-BA42-ABA2-0BC069CD8E7F}" type="datetimeFigureOut">
               <a:rPr lang="en-US" smtClean="0"/>
-              <a:t>9/22/2024</a:t>
+              <a:t>9/23/2024</a:t>
             </a:fld>
             <a:endParaRPr lang="en-US"/>
           </a:p>
@@ -2254,7 +2256,7 @@
           <a:p>
             <a:fld id="{241EB5C9-1307-BA42-ABA2-0BC069CD8E7F}" type="datetimeFigureOut">
               <a:rPr lang="en-US" smtClean="0"/>
-              <a:t>9/22/2024</a:t>
+              <a:t>9/23/2024</a:t>
             </a:fld>
             <a:endParaRPr lang="en-US"/>
           </a:p>
@@ -2371,7 +2373,7 @@
           <a:p>
             <a:fld id="{241EB5C9-1307-BA42-ABA2-0BC069CD8E7F}" type="datetimeFigureOut">
               <a:rPr lang="en-US" smtClean="0"/>
-              <a:t>9/22/2024</a:t>
+              <a:t>9/23/2024</a:t>
             </a:fld>
             <a:endParaRPr lang="en-US"/>
           </a:p>
@@ -2466,7 +2468,7 @@
           <a:p>
             <a:fld id="{241EB5C9-1307-BA42-ABA2-0BC069CD8E7F}" type="datetimeFigureOut">
               <a:rPr lang="en-US" smtClean="0"/>
-              <a:t>9/22/2024</a:t>
+              <a:t>9/23/2024</a:t>
             </a:fld>
             <a:endParaRPr lang="en-US"/>
           </a:p>
@@ -2741,7 +2743,7 @@
           <a:p>
             <a:fld id="{241EB5C9-1307-BA42-ABA2-0BC069CD8E7F}" type="datetimeFigureOut">
               <a:rPr lang="en-US" smtClean="0"/>
-              <a:t>9/22/2024</a:t>
+              <a:t>9/23/2024</a:t>
             </a:fld>
             <a:endParaRPr lang="en-US"/>
           </a:p>
@@ -2993,7 +2995,7 @@
           <a:p>
             <a:fld id="{241EB5C9-1307-BA42-ABA2-0BC069CD8E7F}" type="datetimeFigureOut">
               <a:rPr lang="en-US" smtClean="0"/>
-              <a:t>9/22/2024</a:t>
+              <a:t>9/23/2024</a:t>
             </a:fld>
             <a:endParaRPr lang="en-US"/>
           </a:p>
@@ -3204,7 +3206,7 @@
           <a:p>
             <a:fld id="{241EB5C9-1307-BA42-ABA2-0BC069CD8E7F}" type="datetimeFigureOut">
               <a:rPr lang="en-US" smtClean="0"/>
-              <a:t>9/22/2024</a:t>
+              <a:t>9/23/2024</a:t>
             </a:fld>
             <a:endParaRPr lang="en-US"/>
           </a:p>
@@ -5762,8 +5764,8 @@
           </a:p>
         </p:txBody>
       </p:sp>
-      <mc:AlternateContent xmlns:mc="http://schemas.openxmlformats.org/markup-compatibility/2006">
-        <mc:Choice xmlns:a14="http://schemas.microsoft.com/office/drawing/2010/main" Requires="a14">
+      <mc:AlternateContent xmlns:mc="http://schemas.openxmlformats.org/markup-compatibility/2006" xmlns:a14="http://schemas.microsoft.com/office/drawing/2010/main">
+        <mc:Choice Requires="a14">
           <p:sp>
             <p:nvSpPr>
               <p:cNvPr id="3" name="Content Placeholder 2"/>
@@ -6451,7 +6453,7 @@
             </p:txBody>
           </p:sp>
         </mc:Choice>
-        <mc:Fallback>
+        <mc:Fallback xmlns="">
           <p:sp>
             <p:nvSpPr>
               <p:cNvPr id="3" name="Content Placeholder 2"/>
@@ -9677,8 +9679,8 @@
           </a:p>
         </p:txBody>
       </p:sp>
-      <mc:AlternateContent xmlns:mc="http://schemas.openxmlformats.org/markup-compatibility/2006">
-        <mc:Choice xmlns:a14="http://schemas.microsoft.com/office/drawing/2010/main" Requires="a14">
+      <mc:AlternateContent xmlns:mc="http://schemas.openxmlformats.org/markup-compatibility/2006" xmlns:a14="http://schemas.microsoft.com/office/drawing/2010/main">
+        <mc:Choice Requires="a14">
           <p:sp>
             <p:nvSpPr>
               <p:cNvPr id="3" name="Content Placeholder 2"/>
@@ -9969,7 +9971,7 @@
             </p:txBody>
           </p:sp>
         </mc:Choice>
-        <mc:Fallback>
+        <mc:Fallback xmlns="">
           <p:sp>
             <p:nvSpPr>
               <p:cNvPr id="3" name="Content Placeholder 2"/>
@@ -10065,7 +10067,7 @@
         <p:spPr/>
         <p:txBody>
           <a:bodyPr>
-            <a:normAutofit fontScale="55000" lnSpcReduction="20000"/>
+            <a:normAutofit fontScale="70000" lnSpcReduction="20000"/>
           </a:bodyPr>
           <a:lstStyle/>
           <a:p>
@@ -10073,74 +10075,78 @@
               <a:buNone/>
             </a:pPr>
             <a:r>
+              <a:rPr dirty="0"/>
               <a:t>Plan going forward:</a:t>
             </a:r>
           </a:p>
           <a:p>
             <a:pPr lvl="0"/>
             <a:r>
+              <a:rPr dirty="0"/>
               <a:t>Week 8, Oct 24: Introduction to Linear Models</a:t>
             </a:r>
-            <a:br/>
-            <a:endParaRPr/>
           </a:p>
           <a:p>
             <a:pPr lvl="0"/>
             <a:r>
+              <a:rPr dirty="0"/>
               <a:t>Week 9, Oct 31: Linear Models Part 2 - Categorical data and nonlinear response models</a:t>
             </a:r>
-            <a:br/>
-            <a:endParaRPr/>
           </a:p>
           <a:p>
             <a:pPr lvl="0"/>
             <a:r>
+              <a:rPr dirty="0"/>
               <a:t>Week 10, Nov 7: Linear Models Part 3 - Regularization and sparse models</a:t>
             </a:r>
-            <a:br/>
-            <a:endParaRPr/>
           </a:p>
           <a:p>
             <a:pPr lvl="0"/>
             <a:r>
+              <a:rPr dirty="0"/>
               <a:t>Week 11, Nov14: Time Series Models</a:t>
             </a:r>
-            <a:br/>
-            <a:endParaRPr/>
           </a:p>
           <a:p>
             <a:pPr lvl="0"/>
             <a:r>
+              <a:rPr dirty="0"/>
               <a:t>Nov 18: Project proposal due</a:t>
             </a:r>
           </a:p>
           <a:p>
             <a:pPr lvl="0"/>
             <a:r>
+              <a:rPr dirty="0"/>
               <a:t>Week12, Nov 23: Bayes MCMC methods</a:t>
             </a:r>
-            <a:br/>
-            <a:endParaRPr/>
           </a:p>
           <a:p>
             <a:pPr lvl="0"/>
             <a:r>
-              <a:t>Week 13, Nov 28: Hierarchical Bayesian models</a:t>
-            </a:r>
-            <a:br/>
-            <a:endParaRPr/>
+              <a:rPr dirty="0"/>
+              <a:t>Week 13, Nov 28: Hierarchical </a:t>
+            </a:r>
+            <a:r>
+              <a:t>Bayesian models</a:t>
+            </a:r>
+            <a:endParaRPr dirty="0"/>
           </a:p>
           <a:p>
             <a:pPr lvl="0"/>
             <a:r>
+              <a:rPr dirty="0"/>
               <a:t>Week 14, Dec 5: - More on time series? - No assignment</a:t>
             </a:r>
-            <a:br/>
-            <a:endParaRPr/>
+            <a:br>
+              <a:rPr dirty="0"/>
+            </a:br>
+            <a:endParaRPr dirty="0"/>
           </a:p>
           <a:p>
             <a:pPr lvl="0"/>
             <a:r>
+              <a:rPr dirty="0"/>
               <a:t>Dec 21: Submit Graduate Independent Projects</a:t>
             </a:r>
           </a:p>
@@ -10149,12 +10155,18 @@
               <a:buNone/>
             </a:pPr>
             <a:r>
+              <a:rPr dirty="0"/>
               <a:t>Let me know if you have suggestions to update this schedule</a:t>
             </a:r>
           </a:p>
         </p:txBody>
       </p:sp>
     </p:spTree>
+    <p:extLst>
+      <p:ext uri="{BB962C8B-B14F-4D97-AF65-F5344CB8AC3E}">
+        <p14:creationId xmlns:p14="http://schemas.microsoft.com/office/powerpoint/2010/main" val="97211278"/>
+      </p:ext>
+    </p:extLst>
   </p:cSld>
   <p:clrMapOvr>
     <a:masterClrMapping/>
@@ -10203,8 +10215,8 @@
           </a:p>
         </p:txBody>
       </p:sp>
-      <mc:AlternateContent xmlns:mc="http://schemas.openxmlformats.org/markup-compatibility/2006">
-        <mc:Choice xmlns:a14="http://schemas.microsoft.com/office/drawing/2010/main" Requires="a14">
+      <mc:AlternateContent xmlns:mc="http://schemas.openxmlformats.org/markup-compatibility/2006" xmlns:a14="http://schemas.microsoft.com/office/drawing/2010/main">
+        <mc:Choice Requires="a14">
           <p:sp>
             <p:nvSpPr>
               <p:cNvPr id="3" name="Content Placeholder 2"/>
@@ -10706,7 +10718,7 @@
             </p:txBody>
           </p:sp>
         </mc:Choice>
-        <mc:Fallback>
+        <mc:Fallback xmlns="">
           <p:sp>
             <p:nvSpPr>
               <p:cNvPr id="3" name="Content Placeholder 2"/>
@@ -10789,8 +10801,8 @@
           </a:p>
         </p:txBody>
       </p:sp>
-      <mc:AlternateContent xmlns:mc="http://schemas.openxmlformats.org/markup-compatibility/2006">
-        <mc:Choice xmlns:a14="http://schemas.microsoft.com/office/drawing/2010/main" Requires="a14">
+      <mc:AlternateContent xmlns:mc="http://schemas.openxmlformats.org/markup-compatibility/2006" xmlns:a14="http://schemas.microsoft.com/office/drawing/2010/main">
+        <mc:Choice Requires="a14">
           <p:sp>
             <p:nvSpPr>
               <p:cNvPr id="3" name="Content Placeholder 2"/>
@@ -11140,7 +11152,7 @@
             </p:txBody>
           </p:sp>
         </mc:Choice>
-        <mc:Fallback>
+        <mc:Fallback xmlns="">
           <p:sp>
             <p:nvSpPr>
               <p:cNvPr id="3" name="Content Placeholder 2"/>
@@ -11223,8 +11235,8 @@
           </a:p>
         </p:txBody>
       </p:sp>
-      <mc:AlternateContent xmlns:mc="http://schemas.openxmlformats.org/markup-compatibility/2006">
-        <mc:Choice xmlns:a14="http://schemas.microsoft.com/office/drawing/2010/main" Requires="a14">
+      <mc:AlternateContent xmlns:mc="http://schemas.openxmlformats.org/markup-compatibility/2006" xmlns:a14="http://schemas.microsoft.com/office/drawing/2010/main">
+        <mc:Choice Requires="a14">
           <p:sp>
             <p:nvSpPr>
               <p:cNvPr id="3" name="Content Placeholder 2"/>
@@ -12489,7 +12501,7 @@
             </p:txBody>
           </p:sp>
         </mc:Choice>
-        <mc:Fallback>
+        <mc:Fallback xmlns="">
           <p:sp>
             <p:nvSpPr>
               <p:cNvPr id="3" name="Content Placeholder 2"/>
@@ -14579,8 +14591,8 @@
           </a:p>
         </p:txBody>
       </p:sp>
-      <mc:AlternateContent xmlns:mc="http://schemas.openxmlformats.org/markup-compatibility/2006">
-        <mc:Choice xmlns:a14="http://schemas.microsoft.com/office/drawing/2010/main" Requires="a14">
+      <mc:AlternateContent xmlns:mc="http://schemas.openxmlformats.org/markup-compatibility/2006" xmlns:a14="http://schemas.microsoft.com/office/drawing/2010/main">
+        <mc:Choice Requires="a14">
           <p:sp>
             <p:nvSpPr>
               <p:cNvPr id="3" name="Content Placeholder 2"/>
@@ -15086,7 +15098,7 @@
             </p:txBody>
           </p:sp>
         </mc:Choice>
-        <mc:Fallback>
+        <mc:Fallback xmlns="">
           <p:sp>
             <p:nvSpPr>
               <p:cNvPr id="3" name="Content Placeholder 2"/>
@@ -15353,7 +15365,11 @@
               <a:p>
                 <a:r>
                   <a:rPr lang="en-US" sz="2000" dirty="0"/>
-                  <a:t>Plot the regression line against the centered data</a:t>
+                  <a:t>Plot the regression line against the </a:t>
+                </a:r>
+                <a:r>
+                  <a:rPr lang="en-US" sz="2000" b="1" dirty="0"/>
+                  <a:t>centered data</a:t>
                 </a:r>
               </a:p>
               <a:p>
@@ -15847,8 +15863,8 @@
           </a:p>
         </p:txBody>
       </p:sp>
-      <mc:AlternateContent xmlns:mc="http://schemas.openxmlformats.org/markup-compatibility/2006">
-        <mc:Choice xmlns:a14="http://schemas.microsoft.com/office/drawing/2010/main" Requires="a14">
+      <mc:AlternateContent xmlns:mc="http://schemas.openxmlformats.org/markup-compatibility/2006" xmlns:a14="http://schemas.microsoft.com/office/drawing/2010/main">
+        <mc:Choice Requires="a14">
           <p:sp>
             <p:nvSpPr>
               <p:cNvPr id="3" name="Content Placeholder 2"/>
@@ -16226,7 +16242,7 @@
             </p:txBody>
           </p:sp>
         </mc:Choice>
-        <mc:Fallback>
+        <mc:Fallback xmlns="">
           <p:sp>
             <p:nvSpPr>
               <p:cNvPr id="3" name="Content Placeholder 2"/>
@@ -16477,8 +16493,8 @@
           </a:p>
         </p:txBody>
       </p:sp>
-      <mc:AlternateContent xmlns:mc="http://schemas.openxmlformats.org/markup-compatibility/2006">
-        <mc:Choice xmlns:a14="http://schemas.microsoft.com/office/drawing/2010/main" Requires="a14">
+      <mc:AlternateContent xmlns:mc="http://schemas.openxmlformats.org/markup-compatibility/2006" xmlns:a14="http://schemas.microsoft.com/office/drawing/2010/main">
+        <mc:Choice Requires="a14">
           <p:sp>
             <p:nvSpPr>
               <p:cNvPr id="4" name="Text Placeholder 3"/>
@@ -16618,7 +16634,7 @@
             </p:txBody>
           </p:sp>
         </mc:Choice>
-        <mc:Fallback>
+        <mc:Fallback xmlns="">
           <p:sp>
             <p:nvSpPr>
               <p:cNvPr id="4" name="Text Placeholder 3"/>
@@ -16735,8 +16751,8 @@
           </a:p>
         </p:txBody>
       </p:sp>
-      <mc:AlternateContent xmlns:mc="http://schemas.openxmlformats.org/markup-compatibility/2006">
-        <mc:Choice xmlns:a14="http://schemas.microsoft.com/office/drawing/2010/main" Requires="a14">
+      <mc:AlternateContent xmlns:mc="http://schemas.openxmlformats.org/markup-compatibility/2006" xmlns:a14="http://schemas.microsoft.com/office/drawing/2010/main">
+        <mc:Choice Requires="a14">
           <p:sp>
             <p:nvSpPr>
               <p:cNvPr id="3" name="Content Placeholder 2"/>
@@ -17508,7 +17524,7 @@
             </p:txBody>
           </p:sp>
         </mc:Choice>
-        <mc:Fallback>
+        <mc:Fallback xmlns="">
           <p:sp>
             <p:nvSpPr>
               <p:cNvPr id="3" name="Content Placeholder 2"/>
@@ -18265,8 +18281,8 @@
           </a:p>
         </p:txBody>
       </p:sp>
-      <mc:AlternateContent xmlns:mc="http://schemas.openxmlformats.org/markup-compatibility/2006">
-        <mc:Choice xmlns:a14="http://schemas.microsoft.com/office/drawing/2010/main" Requires="a14">
+      <mc:AlternateContent xmlns:mc="http://schemas.openxmlformats.org/markup-compatibility/2006" xmlns:a14="http://schemas.microsoft.com/office/drawing/2010/main">
+        <mc:Choice Requires="a14">
           <p:sp>
             <p:nvSpPr>
               <p:cNvPr id="3" name="Content Placeholder 2"/>
@@ -18809,7 +18825,7 @@
             </p:txBody>
           </p:sp>
         </mc:Choice>
-        <mc:Fallback>
+        <mc:Fallback xmlns="">
           <p:sp>
             <p:nvSpPr>
               <p:cNvPr id="3" name="Content Placeholder 2"/>
@@ -18896,8 +18912,8 @@
           </a:p>
         </p:txBody>
       </p:sp>
-      <mc:AlternateContent xmlns:mc="http://schemas.openxmlformats.org/markup-compatibility/2006">
-        <mc:Choice xmlns:a14="http://schemas.microsoft.com/office/drawing/2010/main" Requires="a14">
+      <mc:AlternateContent xmlns:mc="http://schemas.openxmlformats.org/markup-compatibility/2006" xmlns:a14="http://schemas.microsoft.com/office/drawing/2010/main">
+        <mc:Choice Requires="a14">
           <p:sp>
             <p:nvSpPr>
               <p:cNvPr id="3" name="Content Placeholder 2"/>
@@ -19373,7 +19389,7 @@
             </p:txBody>
           </p:sp>
         </mc:Choice>
-        <mc:Fallback>
+        <mc:Fallback xmlns="">
           <p:sp>
             <p:nvSpPr>
               <p:cNvPr id="3" name="Content Placeholder 2"/>
@@ -19460,8 +19476,8 @@
           </a:p>
         </p:txBody>
       </p:sp>
-      <mc:AlternateContent xmlns:mc="http://schemas.openxmlformats.org/markup-compatibility/2006">
-        <mc:Choice xmlns:a14="http://schemas.microsoft.com/office/drawing/2010/main" Requires="a14">
+      <mc:AlternateContent xmlns:mc="http://schemas.openxmlformats.org/markup-compatibility/2006" xmlns:a14="http://schemas.microsoft.com/office/drawing/2010/main">
+        <mc:Choice Requires="a14">
           <p:sp>
             <p:nvSpPr>
               <p:cNvPr id="3" name="Content Placeholder 2"/>
@@ -19883,7 +19899,7 @@
             </p:txBody>
           </p:sp>
         </mc:Choice>
-        <mc:Fallback>
+        <mc:Fallback xmlns="">
           <p:sp>
             <p:nvSpPr>
               <p:cNvPr id="3" name="Content Placeholder 2"/>
@@ -19976,8 +19992,8 @@
           </a:p>
         </p:txBody>
       </p:sp>
-      <mc:AlternateContent xmlns:mc="http://schemas.openxmlformats.org/markup-compatibility/2006">
-        <mc:Choice xmlns:a14="http://schemas.microsoft.com/office/drawing/2010/main" Requires="a14">
+      <mc:AlternateContent xmlns:mc="http://schemas.openxmlformats.org/markup-compatibility/2006" xmlns:a14="http://schemas.microsoft.com/office/drawing/2010/main">
+        <mc:Choice Requires="a14">
           <p:sp>
             <p:nvSpPr>
               <p:cNvPr id="3" name="Content Placeholder 2"/>
@@ -20505,7 +20521,7 @@
             </p:txBody>
           </p:sp>
         </mc:Choice>
-        <mc:Fallback>
+        <mc:Fallback xmlns="">
           <p:sp>
             <p:nvSpPr>
               <p:cNvPr id="3" name="Content Placeholder 2"/>
@@ -20588,8 +20604,8 @@
           </a:p>
         </p:txBody>
       </p:sp>
-      <mc:AlternateContent xmlns:mc="http://schemas.openxmlformats.org/markup-compatibility/2006">
-        <mc:Choice xmlns:a14="http://schemas.microsoft.com/office/drawing/2010/main" Requires="a14">
+      <mc:AlternateContent xmlns:mc="http://schemas.openxmlformats.org/markup-compatibility/2006" xmlns:a14="http://schemas.microsoft.com/office/drawing/2010/main">
+        <mc:Choice Requires="a14">
           <p:sp>
             <p:nvSpPr>
               <p:cNvPr id="5" name="Content Placeholder 4">
@@ -20951,7 +20967,7 @@
             </p:txBody>
           </p:sp>
         </mc:Choice>
-        <mc:Fallback>
+        <mc:Fallback xmlns="">
           <p:sp>
             <p:nvSpPr>
               <p:cNvPr id="5" name="Content Placeholder 4">
@@ -20995,36 +21011,6 @@
           </p:sp>
         </mc:Fallback>
       </mc:AlternateContent>
-      <p:pic>
-        <p:nvPicPr>
-          <p:cNvPr id="7" name="Picture 6">
-            <a:extLst>
-              <a:ext uri="{FF2B5EF4-FFF2-40B4-BE49-F238E27FC236}">
-                <a16:creationId xmlns:a16="http://schemas.microsoft.com/office/drawing/2014/main" id="{C3DB2461-AE74-FAEC-9CC5-1247CBF0BC91}"/>
-              </a:ext>
-            </a:extLst>
-          </p:cNvPr>
-          <p:cNvPicPr>
-            <a:picLocks noChangeAspect="1"/>
-          </p:cNvPicPr>
-          <p:nvPr/>
-        </p:nvPicPr>
-        <p:blipFill>
-          <a:blip r:embed="rId3"/>
-          <a:stretch>
-            <a:fillRect/>
-          </a:stretch>
-        </p:blipFill>
-        <p:spPr>
-          <a:xfrm>
-            <a:off x="67056" y="900415"/>
-            <a:ext cx="4025351" cy="4137167"/>
-          </a:xfrm>
-          <a:prstGeom prst="rect">
-            <a:avLst/>
-          </a:prstGeom>
-        </p:spPr>
-      </p:pic>
       <p:cxnSp>
         <p:nvCxnSpPr>
           <p:cNvPr id="9" name="Straight Arrow Connector 8">
@@ -21129,8 +21115,8 @@
         </p:nvCxnSpPr>
         <p:spPr>
           <a:xfrm flipH="1" flipV="1">
-            <a:off x="3527368" y="1713346"/>
-            <a:ext cx="1044632" cy="1869439"/>
+            <a:off x="3413760" y="1678432"/>
+            <a:ext cx="1195647" cy="1904353"/>
           </a:xfrm>
           <a:prstGeom prst="straightConnector1">
             <a:avLst/>
@@ -21201,6 +21187,36 @@
           </a:fontRef>
         </p:style>
       </p:cxnSp>
+      <p:pic>
+        <p:nvPicPr>
+          <p:cNvPr id="4" name="Picture 3">
+            <a:extLst>
+              <a:ext uri="{FF2B5EF4-FFF2-40B4-BE49-F238E27FC236}">
+                <a16:creationId xmlns:a16="http://schemas.microsoft.com/office/drawing/2014/main" id="{67EFA3B7-E1FE-0D6D-2EA5-B1385CF65A3D}"/>
+              </a:ext>
+            </a:extLst>
+          </p:cNvPr>
+          <p:cNvPicPr>
+            <a:picLocks noChangeAspect="1"/>
+          </p:cNvPicPr>
+          <p:nvPr/>
+        </p:nvPicPr>
+        <p:blipFill>
+          <a:blip r:embed="rId3"/>
+          <a:stretch>
+            <a:fillRect/>
+          </a:stretch>
+        </p:blipFill>
+        <p:spPr>
+          <a:xfrm>
+            <a:off x="55608" y="977234"/>
+            <a:ext cx="3358152" cy="4119021"/>
+          </a:xfrm>
+          <a:prstGeom prst="rect">
+            <a:avLst/>
+          </a:prstGeom>
+        </p:spPr>
+      </p:pic>
     </p:spTree>
   </p:cSld>
   <p:clrMapOvr>
@@ -21385,6 +21401,36 @@
           <a:chExt cx="0" cy="0"/>
         </a:xfrm>
       </p:grpSpPr>
+      <p:pic>
+        <p:nvPicPr>
+          <p:cNvPr id="8" name="Picture 7">
+            <a:extLst>
+              <a:ext uri="{FF2B5EF4-FFF2-40B4-BE49-F238E27FC236}">
+                <a16:creationId xmlns:a16="http://schemas.microsoft.com/office/drawing/2014/main" id="{FE4E8FD6-A22C-F0AE-85B6-E772191B5F07}"/>
+              </a:ext>
+            </a:extLst>
+          </p:cNvPr>
+          <p:cNvPicPr>
+            <a:picLocks noChangeAspect="1"/>
+          </p:cNvPicPr>
+          <p:nvPr/>
+        </p:nvPicPr>
+        <p:blipFill>
+          <a:blip r:embed="rId2"/>
+          <a:stretch>
+            <a:fillRect/>
+          </a:stretch>
+        </p:blipFill>
+        <p:spPr>
+          <a:xfrm>
+            <a:off x="1414" y="900919"/>
+            <a:ext cx="3396089" cy="4165553"/>
+          </a:xfrm>
+          <a:prstGeom prst="rect">
+            <a:avLst/>
+          </a:prstGeom>
+        </p:spPr>
+      </p:pic>
       <p:sp>
         <p:nvSpPr>
           <p:cNvPr id="2" name="Title 1"/>
@@ -21494,36 +21540,6 @@
           </a:p>
         </p:txBody>
       </p:sp>
-      <p:pic>
-        <p:nvPicPr>
-          <p:cNvPr id="7" name="Picture 6">
-            <a:extLst>
-              <a:ext uri="{FF2B5EF4-FFF2-40B4-BE49-F238E27FC236}">
-                <a16:creationId xmlns:a16="http://schemas.microsoft.com/office/drawing/2014/main" id="{C3DB2461-AE74-FAEC-9CC5-1247CBF0BC91}"/>
-              </a:ext>
-            </a:extLst>
-          </p:cNvPr>
-          <p:cNvPicPr>
-            <a:picLocks noChangeAspect="1"/>
-          </p:cNvPicPr>
-          <p:nvPr/>
-        </p:nvPicPr>
-        <p:blipFill>
-          <a:blip r:embed="rId2"/>
-          <a:stretch>
-            <a:fillRect/>
-          </a:stretch>
-        </p:blipFill>
-        <p:spPr>
-          <a:xfrm>
-            <a:off x="67056" y="900415"/>
-            <a:ext cx="4025351" cy="4137167"/>
-          </a:xfrm>
-          <a:prstGeom prst="rect">
-            <a:avLst/>
-          </a:prstGeom>
-        </p:spPr>
-      </p:pic>
       <p:cxnSp>
         <p:nvCxnSpPr>
           <p:cNvPr id="9" name="Straight Arrow Connector 8">
@@ -21540,8 +21556,8 @@
         </p:nvCxnSpPr>
         <p:spPr>
           <a:xfrm flipH="1">
-            <a:off x="1741516" y="1533698"/>
-            <a:ext cx="2801389" cy="1702032"/>
+            <a:off x="971296" y="1533698"/>
+            <a:ext cx="3571609" cy="1811078"/>
           </a:xfrm>
           <a:prstGeom prst="straightConnector1">
             <a:avLst/>
@@ -21584,8 +21600,8 @@
         </p:nvCxnSpPr>
         <p:spPr>
           <a:xfrm flipH="1">
-            <a:off x="2115589" y="1878676"/>
-            <a:ext cx="2427316" cy="1396539"/>
+            <a:off x="1321909" y="1878676"/>
+            <a:ext cx="3220996" cy="1526379"/>
           </a:xfrm>
           <a:prstGeom prst="straightConnector1">
             <a:avLst/>
@@ -21628,8 +21644,8 @@
         </p:nvCxnSpPr>
         <p:spPr>
           <a:xfrm flipH="1">
-            <a:off x="2709949" y="2531225"/>
-            <a:ext cx="1832956" cy="771041"/>
+            <a:off x="2031261" y="2571750"/>
+            <a:ext cx="2609827" cy="775656"/>
           </a:xfrm>
           <a:prstGeom prst="straightConnector1">
             <a:avLst/>
@@ -21672,8 +21688,8 @@
         </p:nvCxnSpPr>
         <p:spPr>
           <a:xfrm flipH="1">
-            <a:off x="3607724" y="3255473"/>
-            <a:ext cx="964276" cy="46793"/>
+            <a:off x="3039872" y="3255473"/>
+            <a:ext cx="1532128" cy="129839"/>
           </a:xfrm>
           <a:prstGeom prst="straightConnector1">
             <a:avLst/>
@@ -21730,6 +21746,36 @@
           <a:chExt cx="0" cy="0"/>
         </a:xfrm>
       </p:grpSpPr>
+      <p:pic>
+        <p:nvPicPr>
+          <p:cNvPr id="4" name="Picture 3">
+            <a:extLst>
+              <a:ext uri="{FF2B5EF4-FFF2-40B4-BE49-F238E27FC236}">
+                <a16:creationId xmlns:a16="http://schemas.microsoft.com/office/drawing/2014/main" id="{D108A662-EDB2-64D1-C0FD-FCFBE89BDA9E}"/>
+              </a:ext>
+            </a:extLst>
+          </p:cNvPr>
+          <p:cNvPicPr>
+            <a:picLocks noChangeAspect="1"/>
+          </p:cNvPicPr>
+          <p:nvPr/>
+        </p:nvPicPr>
+        <p:blipFill>
+          <a:blip r:embed="rId2"/>
+          <a:stretch>
+            <a:fillRect/>
+          </a:stretch>
+        </p:blipFill>
+        <p:spPr>
+          <a:xfrm>
+            <a:off x="174752" y="900920"/>
+            <a:ext cx="3398257" cy="4168212"/>
+          </a:xfrm>
+          <a:prstGeom prst="rect">
+            <a:avLst/>
+          </a:prstGeom>
+        </p:spPr>
+      </p:pic>
       <p:sp>
         <p:nvSpPr>
           <p:cNvPr id="2" name="Title 1"/>
@@ -21754,8 +21800,8 @@
           </a:p>
         </p:txBody>
       </p:sp>
-      <mc:AlternateContent xmlns:mc="http://schemas.openxmlformats.org/markup-compatibility/2006">
-        <mc:Choice xmlns:a14="http://schemas.microsoft.com/office/drawing/2010/main" Requires="a14">
+      <mc:AlternateContent xmlns:mc="http://schemas.openxmlformats.org/markup-compatibility/2006" xmlns:a14="http://schemas.microsoft.com/office/drawing/2010/main">
+        <mc:Choice Requires="a14">
           <p:sp>
             <p:nvSpPr>
               <p:cNvPr id="5" name="Content Placeholder 4">
@@ -21796,7 +21842,7 @@
                 <a:pPr lvl="0"/>
                 <a:r>
                   <a:rPr lang="en-US" sz="2000" b="1" dirty="0">
-                    <a:hlinkClick r:id="rId2"/>
+                    <a:hlinkClick r:id="rId3"/>
                   </a:rPr>
                   <a:t>Omnibus</a:t>
                 </a:r>
@@ -21854,14 +21900,14 @@
                   <a:t> indicates serial correlation </a:t>
                 </a:r>
                 <a:endParaRPr lang="en-US" sz="2000" b="1" dirty="0">
-                  <a:hlinkClick r:id="rId3"/>
+                  <a:hlinkClick r:id="rId4"/>
                 </a:endParaRPr>
               </a:p>
               <a:p>
                 <a:pPr lvl="0"/>
                 <a:r>
                   <a:rPr lang="en-US" sz="2000" b="1" dirty="0">
-                    <a:hlinkClick r:id="rId3"/>
+                    <a:hlinkClick r:id="rId4"/>
                   </a:rPr>
                   <a:t>Jarque-Bera</a:t>
                 </a:r>
@@ -21891,7 +21937,7 @@
             </p:txBody>
           </p:sp>
         </mc:Choice>
-        <mc:Fallback>
+        <mc:Fallback xmlns="">
           <p:sp>
             <p:nvSpPr>
               <p:cNvPr id="5" name="Content Placeholder 4">
@@ -21914,7 +21960,7 @@
                 <a:ext cx="4823968" cy="4049283"/>
               </a:xfrm>
               <a:blipFill>
-                <a:blip r:embed="rId4"/>
+                <a:blip r:embed="rId5"/>
                 <a:stretch>
                   <a:fillRect l="-1263" t="-1657" r="-1894"/>
                 </a:stretch>
@@ -21935,36 +21981,6 @@
           </p:sp>
         </mc:Fallback>
       </mc:AlternateContent>
-      <p:pic>
-        <p:nvPicPr>
-          <p:cNvPr id="7" name="Picture 6">
-            <a:extLst>
-              <a:ext uri="{FF2B5EF4-FFF2-40B4-BE49-F238E27FC236}">
-                <a16:creationId xmlns:a16="http://schemas.microsoft.com/office/drawing/2014/main" id="{C3DB2461-AE74-FAEC-9CC5-1247CBF0BC91}"/>
-              </a:ext>
-            </a:extLst>
-          </p:cNvPr>
-          <p:cNvPicPr>
-            <a:picLocks noChangeAspect="1"/>
-          </p:cNvPicPr>
-          <p:nvPr/>
-        </p:nvPicPr>
-        <p:blipFill>
-          <a:blip r:embed="rId5"/>
-          <a:stretch>
-            <a:fillRect/>
-          </a:stretch>
-        </p:blipFill>
-        <p:spPr>
-          <a:xfrm>
-            <a:off x="67056" y="900415"/>
-            <a:ext cx="4025351" cy="4137167"/>
-          </a:xfrm>
-          <a:prstGeom prst="rect">
-            <a:avLst/>
-          </a:prstGeom>
-        </p:spPr>
-      </p:pic>
       <p:cxnSp>
         <p:nvCxnSpPr>
           <p:cNvPr id="9" name="Straight Arrow Connector 8">
@@ -22195,8 +22211,8 @@
           </a:p>
         </p:txBody>
       </p:sp>
-      <mc:AlternateContent xmlns:mc="http://schemas.openxmlformats.org/markup-compatibility/2006">
-        <mc:Choice xmlns:a14="http://schemas.microsoft.com/office/drawing/2010/main" Requires="a14">
+      <mc:AlternateContent xmlns:mc="http://schemas.openxmlformats.org/markup-compatibility/2006" xmlns:a14="http://schemas.microsoft.com/office/drawing/2010/main">
+        <mc:Choice Requires="a14">
           <p:sp>
             <p:nvSpPr>
               <p:cNvPr id="3" name="Content Placeholder 2"/>
@@ -22927,7 +22943,7 @@
             </p:txBody>
           </p:sp>
         </mc:Choice>
-        <mc:Fallback>
+        <mc:Fallback xmlns="">
           <p:sp>
             <p:nvSpPr>
               <p:cNvPr id="3" name="Content Placeholder 2"/>
@@ -24230,8 +24246,8 @@
           </a:p>
         </p:txBody>
       </p:sp>
-      <mc:AlternateContent xmlns:mc="http://schemas.openxmlformats.org/markup-compatibility/2006">
-        <mc:Choice xmlns:a14="http://schemas.microsoft.com/office/drawing/2010/main" Requires="a14">
+      <mc:AlternateContent xmlns:mc="http://schemas.openxmlformats.org/markup-compatibility/2006" xmlns:a14="http://schemas.microsoft.com/office/drawing/2010/main">
+        <mc:Choice Requires="a14">
           <p:sp>
             <p:nvSpPr>
               <p:cNvPr id="4" name="Text Placeholder 3"/>
@@ -24330,7 +24346,7 @@
             </p:txBody>
           </p:sp>
         </mc:Choice>
-        <mc:Fallback>
+        <mc:Fallback xmlns="">
           <p:sp>
             <p:nvSpPr>
               <p:cNvPr id="4" name="Text Placeholder 3"/>
@@ -24758,8 +24774,8 @@
           </a:p>
         </p:txBody>
       </p:sp>
-      <mc:AlternateContent xmlns:mc="http://schemas.openxmlformats.org/markup-compatibility/2006">
-        <mc:Choice xmlns:a14="http://schemas.microsoft.com/office/drawing/2010/main" Requires="a14">
+      <mc:AlternateContent xmlns:mc="http://schemas.openxmlformats.org/markup-compatibility/2006" xmlns:a14="http://schemas.microsoft.com/office/drawing/2010/main">
+        <mc:Choice Requires="a14">
           <p:sp>
             <p:nvSpPr>
               <p:cNvPr id="4" name="Text Placeholder 3"/>
@@ -25061,7 +25077,7 @@
             </p:txBody>
           </p:sp>
         </mc:Choice>
-        <mc:Fallback>
+        <mc:Fallback xmlns="">
           <p:sp>
             <p:nvSpPr>
               <p:cNvPr id="4" name="Text Placeholder 3"/>
@@ -25651,6 +25667,36 @@
           <a:chExt cx="0" cy="0"/>
         </a:xfrm>
       </p:grpSpPr>
+      <p:pic>
+        <p:nvPicPr>
+          <p:cNvPr id="23" name="Picture 22">
+            <a:extLst>
+              <a:ext uri="{FF2B5EF4-FFF2-40B4-BE49-F238E27FC236}">
+                <a16:creationId xmlns:a16="http://schemas.microsoft.com/office/drawing/2014/main" id="{3A7659DD-B7B3-4E93-72BA-601FE4F944CC}"/>
+              </a:ext>
+            </a:extLst>
+          </p:cNvPr>
+          <p:cNvPicPr>
+            <a:picLocks noChangeAspect="1"/>
+          </p:cNvPicPr>
+          <p:nvPr/>
+        </p:nvPicPr>
+        <p:blipFill>
+          <a:blip r:embed="rId2"/>
+          <a:stretch>
+            <a:fillRect/>
+          </a:stretch>
+        </p:blipFill>
+        <p:spPr>
+          <a:xfrm>
+            <a:off x="457200" y="2148214"/>
+            <a:ext cx="4012254" cy="2624525"/>
+          </a:xfrm>
+          <a:prstGeom prst="rect">
+            <a:avLst/>
+          </a:prstGeom>
+        </p:spPr>
+      </p:pic>
       <p:sp>
         <p:nvSpPr>
           <p:cNvPr id="2" name="Title 1"/>
@@ -25661,84 +25707,717 @@
             <p:ph type="title"/>
           </p:nvPr>
         </p:nvSpPr>
-        <p:spPr/>
+        <p:spPr>
+          <a:xfrm>
+            <a:off x="457200" y="205979"/>
+            <a:ext cx="8229600" cy="505221"/>
+          </a:xfrm>
+        </p:spPr>
         <p:txBody>
-          <a:bodyPr/>
+          <a:bodyPr>
+            <a:normAutofit fontScale="90000"/>
+          </a:bodyPr>
           <a:lstStyle/>
           <a:p>
             <a:pPr marL="0" lvl="0" indent="0">
               <a:buNone/>
             </a:pPr>
             <a:r>
+              <a:rPr dirty="0"/>
               <a:t>Example of Multi-Feature Linear Model</a:t>
+            </a:r>
+          </a:p>
+        </p:txBody>
+      </p:sp>
+      <mc:AlternateContent xmlns:mc="http://schemas.openxmlformats.org/markup-compatibility/2006">
+        <mc:Choice xmlns:a14="http://schemas.microsoft.com/office/drawing/2010/main" Requires="a14">
+          <p:sp>
+            <p:nvSpPr>
+              <p:cNvPr id="5" name="Content Placeholder 4">
+                <a:extLst>
+                  <a:ext uri="{FF2B5EF4-FFF2-40B4-BE49-F238E27FC236}">
+                    <a16:creationId xmlns:a16="http://schemas.microsoft.com/office/drawing/2014/main" id="{761390C8-7670-FE67-994F-6AF9C386AFC8}"/>
+                  </a:ext>
+                </a:extLst>
+              </p:cNvPr>
+              <p:cNvSpPr>
+                <a:spLocks noGrp="1"/>
+              </p:cNvSpPr>
+              <p:nvPr>
+                <p:ph idx="1"/>
+              </p:nvPr>
+            </p:nvSpPr>
+            <p:spPr>
+              <a:xfrm>
+                <a:off x="409711" y="712582"/>
+                <a:ext cx="8229600" cy="1388506"/>
+              </a:xfrm>
+            </p:spPr>
+            <p:txBody>
+              <a:bodyPr>
+                <a:normAutofit fontScale="92500" lnSpcReduction="10000"/>
+              </a:bodyPr>
+              <a:lstStyle/>
+              <a:p>
+                <a:pPr marL="0" indent="0">
+                  <a:buNone/>
+                </a:pPr>
+                <a:r>
+                  <a:rPr lang="en-US" sz="2000" dirty="0"/>
+                  <a:t>Compare to single feature model, more complex multi-feature model exhibits</a:t>
+                </a:r>
+              </a:p>
+              <a:p>
+                <a:r>
+                  <a:rPr lang="en-US" sz="2000" dirty="0"/>
+                  <a:t>Increase in </a:t>
+                </a:r>
+                <a14:m>
+                  <m:oMath xmlns:m="http://schemas.openxmlformats.org/officeDocument/2006/math">
+                    <m:sSup>
+                      <m:sSupPr>
+                        <m:ctrlPr>
+                          <a:rPr lang="en-US" sz="2000" i="1" smtClean="0">
+                            <a:latin typeface="Cambria Math" panose="02040503050406030204" pitchFamily="18" charset="0"/>
+                          </a:rPr>
+                        </m:ctrlPr>
+                      </m:sSupPr>
+                      <m:e>
+                        <m:r>
+                          <a:rPr lang="en-US" sz="2000" b="0" i="1" smtClean="0">
+                            <a:latin typeface="Cambria Math" panose="02040503050406030204" pitchFamily="18" charset="0"/>
+                          </a:rPr>
+                          <m:t>𝑅</m:t>
+                        </m:r>
+                      </m:e>
+                      <m:sup>
+                        <m:r>
+                          <a:rPr lang="en-US" sz="2000" b="0" i="1" smtClean="0">
+                            <a:latin typeface="Cambria Math" panose="02040503050406030204" pitchFamily="18" charset="0"/>
+                          </a:rPr>
+                          <m:t>2</m:t>
+                        </m:r>
+                      </m:sup>
+                    </m:sSup>
+                  </m:oMath>
+                </a14:m>
+                <a:r>
+                  <a:rPr lang="en-US" sz="2000" dirty="0"/>
+                  <a:t> and </a:t>
+                </a:r>
+                <a14:m>
+                  <m:oMath xmlns:m="http://schemas.openxmlformats.org/officeDocument/2006/math">
+                    <m:sSubSup>
+                      <m:sSubSupPr>
+                        <m:ctrlPr>
+                          <a:rPr lang="en-US" sz="2000" i="1" smtClean="0">
+                            <a:latin typeface="Cambria Math" panose="02040503050406030204" pitchFamily="18" charset="0"/>
+                          </a:rPr>
+                        </m:ctrlPr>
+                      </m:sSubSupPr>
+                      <m:e>
+                        <m:r>
+                          <a:rPr lang="en-US" sz="2000" b="0" i="1" smtClean="0">
+                            <a:latin typeface="Cambria Math" panose="02040503050406030204" pitchFamily="18" charset="0"/>
+                          </a:rPr>
+                          <m:t>𝑅</m:t>
+                        </m:r>
+                      </m:e>
+                      <m:sub>
+                        <m:r>
+                          <a:rPr lang="en-US" sz="2000" b="0" i="1" smtClean="0">
+                            <a:latin typeface="Cambria Math" panose="02040503050406030204" pitchFamily="18" charset="0"/>
+                          </a:rPr>
+                          <m:t>𝑎𝑑𝑗</m:t>
+                        </m:r>
+                      </m:sub>
+                      <m:sup>
+                        <m:r>
+                          <a:rPr lang="en-US" sz="2000" b="0" i="1" smtClean="0">
+                            <a:latin typeface="Cambria Math" panose="02040503050406030204" pitchFamily="18" charset="0"/>
+                          </a:rPr>
+                          <m:t>2</m:t>
+                        </m:r>
+                      </m:sup>
+                    </m:sSubSup>
+                  </m:oMath>
+                </a14:m>
+                <a:endParaRPr lang="en-US" sz="2000" dirty="0"/>
+              </a:p>
+              <a:p>
+                <a:r>
+                  <a:rPr lang="en-US" sz="2000" dirty="0"/>
+                  <a:t>Increase in F-statistic </a:t>
+                </a:r>
+              </a:p>
+              <a:p>
+                <a:r>
+                  <a:rPr lang="en-US" sz="2000" dirty="0"/>
+                  <a:t>Increase in Log-Likelihood </a:t>
+                </a:r>
+              </a:p>
+            </p:txBody>
+          </p:sp>
+        </mc:Choice>
+        <mc:Fallback>
+          <p:sp>
+            <p:nvSpPr>
+              <p:cNvPr id="5" name="Content Placeholder 4">
+                <a:extLst>
+                  <a:ext uri="{FF2B5EF4-FFF2-40B4-BE49-F238E27FC236}">
+                    <a16:creationId xmlns:a16="http://schemas.microsoft.com/office/drawing/2014/main" id="{761390C8-7670-FE67-994F-6AF9C386AFC8}"/>
+                  </a:ext>
+                </a:extLst>
+              </p:cNvPr>
+              <p:cNvSpPr>
+                <a:spLocks noGrp="1" noRot="1" noChangeAspect="1" noMove="1" noResize="1" noEditPoints="1" noAdjustHandles="1" noChangeArrowheads="1" noChangeShapeType="1" noTextEdit="1"/>
+              </p:cNvSpPr>
+              <p:nvPr>
+                <p:ph idx="1"/>
+              </p:nvPr>
+            </p:nvSpPr>
+            <p:spPr>
+              <a:xfrm>
+                <a:off x="409711" y="712582"/>
+                <a:ext cx="8229600" cy="1388506"/>
+              </a:xfrm>
+              <a:blipFill>
+                <a:blip r:embed="rId3"/>
+                <a:stretch>
+                  <a:fillRect l="-667" t="-4386" b="-5702"/>
+                </a:stretch>
+              </a:blipFill>
+            </p:spPr>
+            <p:txBody>
+              <a:bodyPr/>
+              <a:lstStyle/>
+              <a:p>
+                <a:r>
+                  <a:rPr lang="en-US">
+                    <a:noFill/>
+                  </a:rPr>
+                  <a:t> </a:t>
+                </a:r>
+              </a:p>
+            </p:txBody>
+          </p:sp>
+        </mc:Fallback>
+      </mc:AlternateContent>
+      <p:pic>
+        <p:nvPicPr>
+          <p:cNvPr id="13" name="Picture 12">
+            <a:extLst>
+              <a:ext uri="{FF2B5EF4-FFF2-40B4-BE49-F238E27FC236}">
+                <a16:creationId xmlns:a16="http://schemas.microsoft.com/office/drawing/2014/main" id="{BB266AC6-FE14-CA7F-356F-26A3463988BA}"/>
+              </a:ext>
+            </a:extLst>
+          </p:cNvPr>
+          <p:cNvPicPr>
+            <a:picLocks noChangeAspect="1"/>
+          </p:cNvPicPr>
+          <p:nvPr/>
+        </p:nvPicPr>
+        <p:blipFill>
+          <a:blip r:embed="rId4"/>
+          <a:stretch>
+            <a:fillRect/>
+          </a:stretch>
+        </p:blipFill>
+        <p:spPr>
+          <a:xfrm>
+            <a:off x="4867674" y="2147003"/>
+            <a:ext cx="4166598" cy="2617070"/>
+          </a:xfrm>
+          <a:prstGeom prst="rect">
+            <a:avLst/>
+          </a:prstGeom>
+        </p:spPr>
+      </p:pic>
+      <p:sp>
+        <p:nvSpPr>
+          <p:cNvPr id="14" name="Content Placeholder 4">
+            <a:extLst>
+              <a:ext uri="{FF2B5EF4-FFF2-40B4-BE49-F238E27FC236}">
+                <a16:creationId xmlns:a16="http://schemas.microsoft.com/office/drawing/2014/main" id="{0E8B641A-0276-F0B0-AC04-ED544F7F33AF}"/>
+              </a:ext>
+            </a:extLst>
+          </p:cNvPr>
+          <p:cNvSpPr txBox="1">
+            <a:spLocks/>
+          </p:cNvSpPr>
+          <p:nvPr/>
+        </p:nvSpPr>
+        <p:spPr>
+          <a:xfrm>
+            <a:off x="495808" y="4764073"/>
+            <a:ext cx="3844544" cy="350247"/>
+          </a:xfrm>
+          <a:prstGeom prst="rect">
+            <a:avLst/>
+          </a:prstGeom>
+        </p:spPr>
+        <p:txBody>
+          <a:bodyPr vert="horz" lIns="91440" tIns="45720" rIns="91440" bIns="45720" rtlCol="0">
+            <a:normAutofit fontScale="92500" lnSpcReduction="20000"/>
+          </a:bodyPr>
+          <a:lstStyle>
+            <a:lvl1pPr marL="342900" indent="-342900" algn="l" defTabSz="342900" rtl="0" eaLnBrk="1" latinLnBrk="0" hangingPunct="1">
+              <a:spcBef>
+                <a:spcPct val="20000"/>
+              </a:spcBef>
+              <a:buFont typeface="Arial"/>
+              <a:buChar char="•"/>
+              <a:defRPr sz="2400" kern="1200">
+                <a:solidFill>
+                  <a:schemeClr val="tx1"/>
+                </a:solidFill>
+                <a:latin typeface="+mn-lt"/>
+                <a:ea typeface="+mn-ea"/>
+                <a:cs typeface="+mn-cs"/>
+              </a:defRPr>
+            </a:lvl1pPr>
+            <a:lvl2pPr marL="685800" indent="-342900" algn="l" defTabSz="342900" rtl="0" eaLnBrk="1" latinLnBrk="0" hangingPunct="1">
+              <a:spcBef>
+                <a:spcPct val="20000"/>
+              </a:spcBef>
+              <a:buFont typeface="Arial"/>
+              <a:buChar char="–"/>
+              <a:defRPr sz="2100" kern="1200">
+                <a:solidFill>
+                  <a:schemeClr val="tx1"/>
+                </a:solidFill>
+                <a:latin typeface="+mn-lt"/>
+                <a:ea typeface="+mn-ea"/>
+                <a:cs typeface="+mn-cs"/>
+              </a:defRPr>
+            </a:lvl2pPr>
+            <a:lvl3pPr marL="1028700" indent="-342900" algn="l" defTabSz="342900" rtl="0" eaLnBrk="1" latinLnBrk="0" hangingPunct="1">
+              <a:spcBef>
+                <a:spcPct val="20000"/>
+              </a:spcBef>
+              <a:buFont typeface="Arial"/>
+              <a:buChar char="•"/>
+              <a:defRPr sz="1800" kern="1200">
+                <a:solidFill>
+                  <a:schemeClr val="tx1"/>
+                </a:solidFill>
+                <a:latin typeface="+mn-lt"/>
+                <a:ea typeface="+mn-ea"/>
+                <a:cs typeface="+mn-cs"/>
+              </a:defRPr>
+            </a:lvl3pPr>
+            <a:lvl4pPr marL="1371600" indent="-342900" algn="l" defTabSz="342900" rtl="0" eaLnBrk="1" latinLnBrk="0" hangingPunct="1">
+              <a:spcBef>
+                <a:spcPct val="20000"/>
+              </a:spcBef>
+              <a:buFont typeface="Arial"/>
+              <a:buChar char="–"/>
+              <a:defRPr sz="1500" kern="1200">
+                <a:solidFill>
+                  <a:schemeClr val="tx1"/>
+                </a:solidFill>
+                <a:latin typeface="+mn-lt"/>
+                <a:ea typeface="+mn-ea"/>
+                <a:cs typeface="+mn-cs"/>
+              </a:defRPr>
+            </a:lvl4pPr>
+            <a:lvl5pPr marL="1714500" indent="-342900" algn="l" defTabSz="342900" rtl="0" eaLnBrk="1" latinLnBrk="0" hangingPunct="1">
+              <a:spcBef>
+                <a:spcPct val="20000"/>
+              </a:spcBef>
+              <a:buFont typeface="Arial"/>
+              <a:buChar char="»"/>
+              <a:defRPr sz="1500" kern="1200">
+                <a:solidFill>
+                  <a:schemeClr val="tx1"/>
+                </a:solidFill>
+                <a:latin typeface="+mn-lt"/>
+                <a:ea typeface="+mn-ea"/>
+                <a:cs typeface="+mn-cs"/>
+              </a:defRPr>
+            </a:lvl5pPr>
+            <a:lvl6pPr marL="2057400" indent="-342900" algn="l" defTabSz="342900" rtl="0" eaLnBrk="1" latinLnBrk="0" hangingPunct="1">
+              <a:spcBef>
+                <a:spcPct val="20000"/>
+              </a:spcBef>
+              <a:buFont typeface="Arial"/>
+              <a:buChar char="•"/>
+              <a:defRPr sz="1500" kern="1200">
+                <a:solidFill>
+                  <a:schemeClr val="tx1"/>
+                </a:solidFill>
+                <a:latin typeface="+mn-lt"/>
+                <a:ea typeface="+mn-ea"/>
+                <a:cs typeface="+mn-cs"/>
+              </a:defRPr>
+            </a:lvl6pPr>
+            <a:lvl7pPr marL="2400300" indent="-342900" algn="l" defTabSz="342900" rtl="0" eaLnBrk="1" latinLnBrk="0" hangingPunct="1">
+              <a:spcBef>
+                <a:spcPct val="20000"/>
+              </a:spcBef>
+              <a:buFont typeface="Arial"/>
+              <a:buChar char="•"/>
+              <a:defRPr sz="1500" kern="1200">
+                <a:solidFill>
+                  <a:schemeClr val="tx1"/>
+                </a:solidFill>
+                <a:latin typeface="+mn-lt"/>
+                <a:ea typeface="+mn-ea"/>
+                <a:cs typeface="+mn-cs"/>
+              </a:defRPr>
+            </a:lvl7pPr>
+            <a:lvl8pPr marL="2743200" indent="-342900" algn="l" defTabSz="342900" rtl="0" eaLnBrk="1" latinLnBrk="0" hangingPunct="1">
+              <a:spcBef>
+                <a:spcPct val="20000"/>
+              </a:spcBef>
+              <a:buFont typeface="Arial"/>
+              <a:buChar char="•"/>
+              <a:defRPr sz="1500" kern="1200">
+                <a:solidFill>
+                  <a:schemeClr val="tx1"/>
+                </a:solidFill>
+                <a:latin typeface="+mn-lt"/>
+                <a:ea typeface="+mn-ea"/>
+                <a:cs typeface="+mn-cs"/>
+              </a:defRPr>
+            </a:lvl8pPr>
+            <a:lvl9pPr marL="3086100" indent="-342900" algn="l" defTabSz="342900" rtl="0" eaLnBrk="1" latinLnBrk="0" hangingPunct="1">
+              <a:spcBef>
+                <a:spcPct val="20000"/>
+              </a:spcBef>
+              <a:buFont typeface="Arial"/>
+              <a:buChar char="•"/>
+              <a:defRPr sz="1500" kern="1200">
+                <a:solidFill>
+                  <a:schemeClr val="tx1"/>
+                </a:solidFill>
+                <a:latin typeface="+mn-lt"/>
+                <a:ea typeface="+mn-ea"/>
+                <a:cs typeface="+mn-cs"/>
+              </a:defRPr>
+            </a:lvl9pPr>
+          </a:lstStyle>
+          <a:p>
+            <a:pPr marL="0" indent="0" algn="ctr">
+              <a:buNone/>
+            </a:pPr>
+            <a:r>
+              <a:rPr lang="en-US" sz="2000" dirty="0"/>
+              <a:t>Single feature model</a:t>
             </a:r>
           </a:p>
         </p:txBody>
       </p:sp>
       <p:sp>
         <p:nvSpPr>
-          <p:cNvPr id="3" name="Content Placeholder 2"/>
-          <p:cNvSpPr>
-            <a:spLocks noGrp="1"/>
+          <p:cNvPr id="15" name="Content Placeholder 4">
+            <a:extLst>
+              <a:ext uri="{FF2B5EF4-FFF2-40B4-BE49-F238E27FC236}">
+                <a16:creationId xmlns:a16="http://schemas.microsoft.com/office/drawing/2014/main" id="{5DB8B96A-6AD7-C553-565E-9FB5BF433D75}"/>
+              </a:ext>
+            </a:extLst>
+          </p:cNvPr>
+          <p:cNvSpPr txBox="1">
+            <a:spLocks/>
           </p:cNvSpPr>
-          <p:nvPr>
-            <p:ph idx="1"/>
-          </p:nvPr>
+          <p:nvPr/>
         </p:nvSpPr>
-        <p:spPr/>
+        <p:spPr>
+          <a:xfrm>
+            <a:off x="4867674" y="4764072"/>
+            <a:ext cx="3844544" cy="350247"/>
+          </a:xfrm>
+          <a:prstGeom prst="rect">
+            <a:avLst/>
+          </a:prstGeom>
+        </p:spPr>
         <p:txBody>
-          <a:bodyPr>
-            <a:normAutofit fontScale="25000" lnSpcReduction="20000"/>
+          <a:bodyPr vert="horz" lIns="91440" tIns="45720" rIns="91440" bIns="45720" rtlCol="0">
+            <a:normAutofit fontScale="92500" lnSpcReduction="20000"/>
           </a:bodyPr>
-          <a:lstStyle/>
-          <a:p>
-            <a:pPr marL="0" lvl="0" indent="0">
+          <a:lstStyle>
+            <a:lvl1pPr marL="342900" indent="-342900" algn="l" defTabSz="342900" rtl="0" eaLnBrk="1" latinLnBrk="0" hangingPunct="1">
+              <a:spcBef>
+                <a:spcPct val="20000"/>
+              </a:spcBef>
+              <a:buFont typeface="Arial"/>
+              <a:buChar char="•"/>
+              <a:defRPr sz="2400" kern="1200">
+                <a:solidFill>
+                  <a:schemeClr val="tx1"/>
+                </a:solidFill>
+                <a:latin typeface="+mn-lt"/>
+                <a:ea typeface="+mn-ea"/>
+                <a:cs typeface="+mn-cs"/>
+              </a:defRPr>
+            </a:lvl1pPr>
+            <a:lvl2pPr marL="685800" indent="-342900" algn="l" defTabSz="342900" rtl="0" eaLnBrk="1" latinLnBrk="0" hangingPunct="1">
+              <a:spcBef>
+                <a:spcPct val="20000"/>
+              </a:spcBef>
+              <a:buFont typeface="Arial"/>
+              <a:buChar char="–"/>
+              <a:defRPr sz="2100" kern="1200">
+                <a:solidFill>
+                  <a:schemeClr val="tx1"/>
+                </a:solidFill>
+                <a:latin typeface="+mn-lt"/>
+                <a:ea typeface="+mn-ea"/>
+                <a:cs typeface="+mn-cs"/>
+              </a:defRPr>
+            </a:lvl2pPr>
+            <a:lvl3pPr marL="1028700" indent="-342900" algn="l" defTabSz="342900" rtl="0" eaLnBrk="1" latinLnBrk="0" hangingPunct="1">
+              <a:spcBef>
+                <a:spcPct val="20000"/>
+              </a:spcBef>
+              <a:buFont typeface="Arial"/>
+              <a:buChar char="•"/>
+              <a:defRPr sz="1800" kern="1200">
+                <a:solidFill>
+                  <a:schemeClr val="tx1"/>
+                </a:solidFill>
+                <a:latin typeface="+mn-lt"/>
+                <a:ea typeface="+mn-ea"/>
+                <a:cs typeface="+mn-cs"/>
+              </a:defRPr>
+            </a:lvl3pPr>
+            <a:lvl4pPr marL="1371600" indent="-342900" algn="l" defTabSz="342900" rtl="0" eaLnBrk="1" latinLnBrk="0" hangingPunct="1">
+              <a:spcBef>
+                <a:spcPct val="20000"/>
+              </a:spcBef>
+              <a:buFont typeface="Arial"/>
+              <a:buChar char="–"/>
+              <a:defRPr sz="1500" kern="1200">
+                <a:solidFill>
+                  <a:schemeClr val="tx1"/>
+                </a:solidFill>
+                <a:latin typeface="+mn-lt"/>
+                <a:ea typeface="+mn-ea"/>
+                <a:cs typeface="+mn-cs"/>
+              </a:defRPr>
+            </a:lvl4pPr>
+            <a:lvl5pPr marL="1714500" indent="-342900" algn="l" defTabSz="342900" rtl="0" eaLnBrk="1" latinLnBrk="0" hangingPunct="1">
+              <a:spcBef>
+                <a:spcPct val="20000"/>
+              </a:spcBef>
+              <a:buFont typeface="Arial"/>
+              <a:buChar char="»"/>
+              <a:defRPr sz="1500" kern="1200">
+                <a:solidFill>
+                  <a:schemeClr val="tx1"/>
+                </a:solidFill>
+                <a:latin typeface="+mn-lt"/>
+                <a:ea typeface="+mn-ea"/>
+                <a:cs typeface="+mn-cs"/>
+              </a:defRPr>
+            </a:lvl5pPr>
+            <a:lvl6pPr marL="2057400" indent="-342900" algn="l" defTabSz="342900" rtl="0" eaLnBrk="1" latinLnBrk="0" hangingPunct="1">
+              <a:spcBef>
+                <a:spcPct val="20000"/>
+              </a:spcBef>
+              <a:buFont typeface="Arial"/>
+              <a:buChar char="•"/>
+              <a:defRPr sz="1500" kern="1200">
+                <a:solidFill>
+                  <a:schemeClr val="tx1"/>
+                </a:solidFill>
+                <a:latin typeface="+mn-lt"/>
+                <a:ea typeface="+mn-ea"/>
+                <a:cs typeface="+mn-cs"/>
+              </a:defRPr>
+            </a:lvl6pPr>
+            <a:lvl7pPr marL="2400300" indent="-342900" algn="l" defTabSz="342900" rtl="0" eaLnBrk="1" latinLnBrk="0" hangingPunct="1">
+              <a:spcBef>
+                <a:spcPct val="20000"/>
+              </a:spcBef>
+              <a:buFont typeface="Arial"/>
+              <a:buChar char="•"/>
+              <a:defRPr sz="1500" kern="1200">
+                <a:solidFill>
+                  <a:schemeClr val="tx1"/>
+                </a:solidFill>
+                <a:latin typeface="+mn-lt"/>
+                <a:ea typeface="+mn-ea"/>
+                <a:cs typeface="+mn-cs"/>
+              </a:defRPr>
+            </a:lvl7pPr>
+            <a:lvl8pPr marL="2743200" indent="-342900" algn="l" defTabSz="342900" rtl="0" eaLnBrk="1" latinLnBrk="0" hangingPunct="1">
+              <a:spcBef>
+                <a:spcPct val="20000"/>
+              </a:spcBef>
+              <a:buFont typeface="Arial"/>
+              <a:buChar char="•"/>
+              <a:defRPr sz="1500" kern="1200">
+                <a:solidFill>
+                  <a:schemeClr val="tx1"/>
+                </a:solidFill>
+                <a:latin typeface="+mn-lt"/>
+                <a:ea typeface="+mn-ea"/>
+                <a:cs typeface="+mn-cs"/>
+              </a:defRPr>
+            </a:lvl8pPr>
+            <a:lvl9pPr marL="3086100" indent="-342900" algn="l" defTabSz="342900" rtl="0" eaLnBrk="1" latinLnBrk="0" hangingPunct="1">
+              <a:spcBef>
+                <a:spcPct val="20000"/>
+              </a:spcBef>
+              <a:buFont typeface="Arial"/>
+              <a:buChar char="•"/>
+              <a:defRPr sz="1500" kern="1200">
+                <a:solidFill>
+                  <a:schemeClr val="tx1"/>
+                </a:solidFill>
+                <a:latin typeface="+mn-lt"/>
+                <a:ea typeface="+mn-ea"/>
+                <a:cs typeface="+mn-cs"/>
+              </a:defRPr>
+            </a:lvl9pPr>
+          </a:lstStyle>
+          <a:p>
+            <a:pPr marL="0" indent="0" algn="ctr">
               <a:buNone/>
             </a:pPr>
             <a:r>
-              <a:t>The model summary is:</a:t>
-            </a:r>
-          </a:p>
-          <a:p>
-            <a:pPr lvl="0" indent="0">
-              <a:buNone/>
-            </a:pPr>
-            <a:r>
-              <a:rPr>
-                <a:latin typeface="Courier"/>
-              </a:rPr>
-              <a:t>## &lt;class 'statsmodels.iolib.summary.Summary'&gt;
-## """
-##                             OLS Regression Results                            
-## ==============================================================================
-## Dep. Variable:                      y   R-squared:                       0.106
-## Model:                            OLS   Adj. R-squared:                  0.087
-## Method:                 Least Squares   F-statistic:                     5.684
-## Date:                Thu, 15 Aug 2024   Prob (F-statistic):             0.0211
-## Time:                        19:31:43   Log-Likelihood:                -191.24
-## No. Observations:                  50   AIC:                             386.5
-## Df Residuals:                      48   BIC:                             390.3
-## Df Model:                           1                                         
-## Covariance Type:            nonrobust                                         
-## ==============================================================================
-##                  coef    std err          t      P&gt;|t|      [0.025      0.975]
-## ------------------------------------------------------------------------------
-## Intercept     10.2555      1.600      6.408      0.000       7.038      13.473
-## x              1.2955      0.543      2.384      0.021       0.203       2.388
-## ==============================================================================
-## Omnibus:                        0.893   Durbin-Watson:                   1.502
-## Prob(Omnibus):                  0.640   Jarque-Bera (JB):                0.269
-## Skew:                          -0.037   Prob(JB):                        0.874
-## Kurtosis:                       3.352   Cond. No.                         2.95
-## ==============================================================================
-## 
-## Notes:
-## [1] Standard Errors assume that the covariance matrix of the errors is correctly specified.
-## """</a:t>
+              <a:rPr lang="en-US" sz="2000" dirty="0"/>
+              <a:t>Multi-feature model</a:t>
             </a:r>
           </a:p>
         </p:txBody>
       </p:sp>
+      <p:cxnSp>
+        <p:nvCxnSpPr>
+          <p:cNvPr id="17" name="Straight Arrow Connector 16">
+            <a:extLst>
+              <a:ext uri="{FF2B5EF4-FFF2-40B4-BE49-F238E27FC236}">
+                <a16:creationId xmlns:a16="http://schemas.microsoft.com/office/drawing/2014/main" id="{A32F9052-08C7-DB33-4207-E662F546D110}"/>
+              </a:ext>
+            </a:extLst>
+          </p:cNvPr>
+          <p:cNvCxnSpPr>
+            <a:cxnSpLocks/>
+          </p:cNvCxnSpPr>
+          <p:nvPr/>
+        </p:nvCxnSpPr>
+        <p:spPr>
+          <a:xfrm>
+            <a:off x="4478528" y="2442464"/>
+            <a:ext cx="3833081" cy="0"/>
+          </a:xfrm>
+          <a:prstGeom prst="straightConnector1">
+            <a:avLst/>
+          </a:prstGeom>
+          <a:ln>
+            <a:solidFill>
+              <a:schemeClr val="tx1"/>
+            </a:solidFill>
+            <a:headEnd type="triangle"/>
+            <a:tailEnd type="triangle"/>
+          </a:ln>
+        </p:spPr>
+        <p:style>
+          <a:lnRef idx="2">
+            <a:schemeClr val="accent1"/>
+          </a:lnRef>
+          <a:fillRef idx="0">
+            <a:schemeClr val="accent1"/>
+          </a:fillRef>
+          <a:effectRef idx="1">
+            <a:schemeClr val="accent1"/>
+          </a:effectRef>
+          <a:fontRef idx="minor">
+            <a:schemeClr val="tx1"/>
+          </a:fontRef>
+        </p:style>
+      </p:cxnSp>
+      <p:cxnSp>
+        <p:nvCxnSpPr>
+          <p:cNvPr id="19" name="Straight Arrow Connector 18">
+            <a:extLst>
+              <a:ext uri="{FF2B5EF4-FFF2-40B4-BE49-F238E27FC236}">
+                <a16:creationId xmlns:a16="http://schemas.microsoft.com/office/drawing/2014/main" id="{A232335A-BDC5-95FD-F2BF-806B73135BF4}"/>
+              </a:ext>
+            </a:extLst>
+          </p:cNvPr>
+          <p:cNvCxnSpPr>
+            <a:cxnSpLocks/>
+          </p:cNvCxnSpPr>
+          <p:nvPr/>
+        </p:nvCxnSpPr>
+        <p:spPr>
+          <a:xfrm>
+            <a:off x="4478528" y="2648170"/>
+            <a:ext cx="3833081" cy="0"/>
+          </a:xfrm>
+          <a:prstGeom prst="straightConnector1">
+            <a:avLst/>
+          </a:prstGeom>
+          <a:ln>
+            <a:solidFill>
+              <a:schemeClr val="tx1"/>
+            </a:solidFill>
+            <a:headEnd type="triangle"/>
+            <a:tailEnd type="triangle"/>
+          </a:ln>
+        </p:spPr>
+        <p:style>
+          <a:lnRef idx="2">
+            <a:schemeClr val="accent1"/>
+          </a:lnRef>
+          <a:fillRef idx="0">
+            <a:schemeClr val="accent1"/>
+          </a:fillRef>
+          <a:effectRef idx="1">
+            <a:schemeClr val="accent1"/>
+          </a:effectRef>
+          <a:fontRef idx="minor">
+            <a:schemeClr val="tx1"/>
+          </a:fontRef>
+        </p:style>
+      </p:cxnSp>
+      <p:cxnSp>
+        <p:nvCxnSpPr>
+          <p:cNvPr id="20" name="Straight Arrow Connector 19">
+            <a:extLst>
+              <a:ext uri="{FF2B5EF4-FFF2-40B4-BE49-F238E27FC236}">
+                <a16:creationId xmlns:a16="http://schemas.microsoft.com/office/drawing/2014/main" id="{CA42F2BC-E141-C799-A95E-8D9471EE0C25}"/>
+              </a:ext>
+            </a:extLst>
+          </p:cNvPr>
+          <p:cNvCxnSpPr>
+            <a:cxnSpLocks/>
+          </p:cNvCxnSpPr>
+          <p:nvPr/>
+        </p:nvCxnSpPr>
+        <p:spPr>
+          <a:xfrm>
+            <a:off x="4478528" y="2882579"/>
+            <a:ext cx="3755172" cy="0"/>
+          </a:xfrm>
+          <a:prstGeom prst="straightConnector1">
+            <a:avLst/>
+          </a:prstGeom>
+          <a:ln>
+            <a:solidFill>
+              <a:schemeClr val="tx1"/>
+            </a:solidFill>
+            <a:headEnd type="triangle"/>
+            <a:tailEnd type="triangle"/>
+          </a:ln>
+        </p:spPr>
+        <p:style>
+          <a:lnRef idx="2">
+            <a:schemeClr val="accent1"/>
+          </a:lnRef>
+          <a:fillRef idx="0">
+            <a:schemeClr val="accent1"/>
+          </a:fillRef>
+          <a:effectRef idx="1">
+            <a:schemeClr val="accent1"/>
+          </a:effectRef>
+          <a:fontRef idx="minor">
+            <a:schemeClr val="tx1"/>
+          </a:fontRef>
+        </p:style>
+      </p:cxnSp>
     </p:spTree>
   </p:cSld>
   <p:clrMapOvr>
@@ -25774,23 +26453,37 @@
             <p:ph type="title"/>
           </p:nvPr>
         </p:nvSpPr>
-        <p:spPr/>
+        <p:spPr>
+          <a:xfrm>
+            <a:off x="457200" y="205979"/>
+            <a:ext cx="8229600" cy="505221"/>
+          </a:xfrm>
+        </p:spPr>
         <p:txBody>
-          <a:bodyPr/>
+          <a:bodyPr>
+            <a:normAutofit fontScale="90000"/>
+          </a:bodyPr>
           <a:lstStyle/>
           <a:p>
             <a:pPr marL="0" lvl="0" indent="0">
               <a:buNone/>
             </a:pPr>
             <a:r>
-              <a:t>Linear Model Assumptions</a:t>
+              <a:rPr dirty="0"/>
+              <a:t>Example of Multi-Feature Linear Model</a:t>
             </a:r>
           </a:p>
         </p:txBody>
       </p:sp>
       <p:sp>
         <p:nvSpPr>
-          <p:cNvPr id="3" name="Content Placeholder 2"/>
+          <p:cNvPr id="5" name="Content Placeholder 4">
+            <a:extLst>
+              <a:ext uri="{FF2B5EF4-FFF2-40B4-BE49-F238E27FC236}">
+                <a16:creationId xmlns:a16="http://schemas.microsoft.com/office/drawing/2014/main" id="{761390C8-7670-FE67-994F-6AF9C386AFC8}"/>
+              </a:ext>
+            </a:extLst>
+          </p:cNvPr>
           <p:cNvSpPr>
             <a:spLocks noGrp="1"/>
           </p:cNvSpPr>
@@ -25798,113 +26491,517 @@
             <p:ph idx="1"/>
           </p:nvPr>
         </p:nvSpPr>
-        <p:spPr/>
+        <p:spPr>
+          <a:xfrm>
+            <a:off x="409711" y="712582"/>
+            <a:ext cx="8229600" cy="1388506"/>
+          </a:xfrm>
+        </p:spPr>
         <p:txBody>
           <a:bodyPr>
-            <a:normAutofit fontScale="62500" lnSpcReduction="20000"/>
+            <a:normAutofit lnSpcReduction="10000"/>
           </a:bodyPr>
           <a:lstStyle/>
           <a:p>
-            <a:pPr marL="0" lvl="0" indent="0">
+            <a:pPr marL="0" indent="0">
               <a:buNone/>
             </a:pPr>
             <a:r>
-              <a:t>There are a number of assumptions in linear models that you overlook at your peril!</a:t>
-            </a:r>
-          </a:p>
-          <a:p>
-            <a:pPr lvl="0"/>
-            <a:r>
-              <a:t>The feature or predictor variables should be </a:t>
-            </a:r>
-            <a:r>
-              <a:rPr b="1"/>
-              <a:t>independent</a:t>
-            </a:r>
-            <a:r>
-              <a:t> of one another</a:t>
-            </a:r>
-          </a:p>
-          <a:p>
-            <a:pPr lvl="1"/>
-            <a:r>
-              <a:t>This is rarely true in practice</a:t>
-            </a:r>
-            <a:br/>
-            <a:endParaRPr/>
-          </a:p>
-          <a:p>
-            <a:pPr lvl="1"/>
-            <a:r>
-              <a:rPr b="1"/>
-              <a:t>Multi-colinearity</a:t>
-            </a:r>
-            <a:r>
-              <a:t> between features makes the model </a:t>
-            </a:r>
-            <a:r>
-              <a:rPr b="1"/>
-              <a:t>under-determined</a:t>
-            </a:r>
-          </a:p>
-          <a:p>
-            <a:pPr lvl="0"/>
-            <a:r>
-              <a:t>We assume that numeric features or predictors have zero mean and about the same scale</a:t>
-            </a:r>
-          </a:p>
-          <a:p>
-            <a:pPr lvl="1"/>
-            <a:r>
-              <a:t>We do not want to bias the estimation of regression coefficients with predictors that do not have a 0 mean</a:t>
-            </a:r>
-            <a:br/>
-            <a:endParaRPr/>
-          </a:p>
-          <a:p>
-            <a:pPr lvl="1"/>
-            <a:r>
-              <a:t>We do not want to have predictors with a large numeric range dominate training</a:t>
-            </a:r>
-            <a:br/>
-            <a:endParaRPr/>
-          </a:p>
-          <a:p>
-            <a:pPr lvl="1"/>
-            <a:r>
-              <a:t>Example: income is in the range of 10s or 100s of thousands and age is in the range of 10s, but apriori income is no more important than age as a predictor</a:t>
-            </a:r>
-          </a:p>
-          <a:p>
-            <a:pPr lvl="0"/>
-            <a:r>
-              <a:t>Values of each predictor or feature should be iid</a:t>
-            </a:r>
-          </a:p>
-          <a:p>
-            <a:pPr lvl="1"/>
-            <a:r>
-              <a:t>If variance changes with sample, the optimal value of the coefficient could not be constant</a:t>
-            </a:r>
-            <a:br/>
-            <a:endParaRPr/>
-          </a:p>
-          <a:p>
-            <a:pPr lvl="1"/>
-            <a:r>
-              <a:t>If there </a:t>
-            </a:r>
-            <a:r>
-              <a:rPr b="1"/>
-              <a:t>serial correlation</a:t>
-            </a:r>
-            <a:r>
-              <a:t> in the predictor values, the iid assumption is violated - but can account for this such as in time series models</a:t>
+              <a:rPr lang="en-US" sz="2000" dirty="0"/>
+              <a:t>All parameters of both models are significant</a:t>
+            </a:r>
+          </a:p>
+          <a:p>
+            <a:r>
+              <a:rPr lang="en-US" sz="2000" dirty="0"/>
+              <a:t>Standard errors are less than an order of magnitude compared to the coefficients for the multi-feature model </a:t>
+            </a:r>
+          </a:p>
+          <a:p>
+            <a:r>
+              <a:rPr lang="en-US" sz="2000" dirty="0"/>
+              <a:t>The sensitivity of </a:t>
+            </a:r>
+            <a:r>
+              <a:rPr lang="en-US" sz="2000" i="1" dirty="0"/>
+              <a:t>y</a:t>
+            </a:r>
+            <a:r>
+              <a:rPr lang="en-US" sz="2000" dirty="0"/>
+              <a:t> to </a:t>
+            </a:r>
+            <a:r>
+              <a:rPr lang="en-US" sz="2000" i="1" dirty="0"/>
+              <a:t>x</a:t>
+            </a:r>
+            <a:r>
+              <a:rPr lang="en-US" sz="2000" dirty="0"/>
+              <a:t> is similar, with a small second order effect</a:t>
             </a:r>
           </a:p>
         </p:txBody>
       </p:sp>
+      <p:pic>
+        <p:nvPicPr>
+          <p:cNvPr id="13" name="Picture 12">
+            <a:extLst>
+              <a:ext uri="{FF2B5EF4-FFF2-40B4-BE49-F238E27FC236}">
+                <a16:creationId xmlns:a16="http://schemas.microsoft.com/office/drawing/2014/main" id="{BB266AC6-FE14-CA7F-356F-26A3463988BA}"/>
+              </a:ext>
+            </a:extLst>
+          </p:cNvPr>
+          <p:cNvPicPr>
+            <a:picLocks noChangeAspect="1"/>
+          </p:cNvPicPr>
+          <p:nvPr/>
+        </p:nvPicPr>
+        <p:blipFill>
+          <a:blip r:embed="rId2"/>
+          <a:stretch>
+            <a:fillRect/>
+          </a:stretch>
+        </p:blipFill>
+        <p:spPr>
+          <a:xfrm>
+            <a:off x="4867674" y="2147003"/>
+            <a:ext cx="4166598" cy="2617070"/>
+          </a:xfrm>
+          <a:prstGeom prst="rect">
+            <a:avLst/>
+          </a:prstGeom>
+        </p:spPr>
+      </p:pic>
+      <p:sp>
+        <p:nvSpPr>
+          <p:cNvPr id="14" name="Content Placeholder 4">
+            <a:extLst>
+              <a:ext uri="{FF2B5EF4-FFF2-40B4-BE49-F238E27FC236}">
+                <a16:creationId xmlns:a16="http://schemas.microsoft.com/office/drawing/2014/main" id="{0E8B641A-0276-F0B0-AC04-ED544F7F33AF}"/>
+              </a:ext>
+            </a:extLst>
+          </p:cNvPr>
+          <p:cNvSpPr txBox="1">
+            <a:spLocks/>
+          </p:cNvSpPr>
+          <p:nvPr/>
+        </p:nvSpPr>
+        <p:spPr>
+          <a:xfrm>
+            <a:off x="495808" y="4764073"/>
+            <a:ext cx="3844544" cy="350247"/>
+          </a:xfrm>
+          <a:prstGeom prst="rect">
+            <a:avLst/>
+          </a:prstGeom>
+        </p:spPr>
+        <p:txBody>
+          <a:bodyPr vert="horz" lIns="91440" tIns="45720" rIns="91440" bIns="45720" rtlCol="0">
+            <a:normAutofit fontScale="92500" lnSpcReduction="20000"/>
+          </a:bodyPr>
+          <a:lstStyle>
+            <a:lvl1pPr marL="342900" indent="-342900" algn="l" defTabSz="342900" rtl="0" eaLnBrk="1" latinLnBrk="0" hangingPunct="1">
+              <a:spcBef>
+                <a:spcPct val="20000"/>
+              </a:spcBef>
+              <a:buFont typeface="Arial"/>
+              <a:buChar char="•"/>
+              <a:defRPr sz="2400" kern="1200">
+                <a:solidFill>
+                  <a:schemeClr val="tx1"/>
+                </a:solidFill>
+                <a:latin typeface="+mn-lt"/>
+                <a:ea typeface="+mn-ea"/>
+                <a:cs typeface="+mn-cs"/>
+              </a:defRPr>
+            </a:lvl1pPr>
+            <a:lvl2pPr marL="685800" indent="-342900" algn="l" defTabSz="342900" rtl="0" eaLnBrk="1" latinLnBrk="0" hangingPunct="1">
+              <a:spcBef>
+                <a:spcPct val="20000"/>
+              </a:spcBef>
+              <a:buFont typeface="Arial"/>
+              <a:buChar char="–"/>
+              <a:defRPr sz="2100" kern="1200">
+                <a:solidFill>
+                  <a:schemeClr val="tx1"/>
+                </a:solidFill>
+                <a:latin typeface="+mn-lt"/>
+                <a:ea typeface="+mn-ea"/>
+                <a:cs typeface="+mn-cs"/>
+              </a:defRPr>
+            </a:lvl2pPr>
+            <a:lvl3pPr marL="1028700" indent="-342900" algn="l" defTabSz="342900" rtl="0" eaLnBrk="1" latinLnBrk="0" hangingPunct="1">
+              <a:spcBef>
+                <a:spcPct val="20000"/>
+              </a:spcBef>
+              <a:buFont typeface="Arial"/>
+              <a:buChar char="•"/>
+              <a:defRPr sz="1800" kern="1200">
+                <a:solidFill>
+                  <a:schemeClr val="tx1"/>
+                </a:solidFill>
+                <a:latin typeface="+mn-lt"/>
+                <a:ea typeface="+mn-ea"/>
+                <a:cs typeface="+mn-cs"/>
+              </a:defRPr>
+            </a:lvl3pPr>
+            <a:lvl4pPr marL="1371600" indent="-342900" algn="l" defTabSz="342900" rtl="0" eaLnBrk="1" latinLnBrk="0" hangingPunct="1">
+              <a:spcBef>
+                <a:spcPct val="20000"/>
+              </a:spcBef>
+              <a:buFont typeface="Arial"/>
+              <a:buChar char="–"/>
+              <a:defRPr sz="1500" kern="1200">
+                <a:solidFill>
+                  <a:schemeClr val="tx1"/>
+                </a:solidFill>
+                <a:latin typeface="+mn-lt"/>
+                <a:ea typeface="+mn-ea"/>
+                <a:cs typeface="+mn-cs"/>
+              </a:defRPr>
+            </a:lvl4pPr>
+            <a:lvl5pPr marL="1714500" indent="-342900" algn="l" defTabSz="342900" rtl="0" eaLnBrk="1" latinLnBrk="0" hangingPunct="1">
+              <a:spcBef>
+                <a:spcPct val="20000"/>
+              </a:spcBef>
+              <a:buFont typeface="Arial"/>
+              <a:buChar char="»"/>
+              <a:defRPr sz="1500" kern="1200">
+                <a:solidFill>
+                  <a:schemeClr val="tx1"/>
+                </a:solidFill>
+                <a:latin typeface="+mn-lt"/>
+                <a:ea typeface="+mn-ea"/>
+                <a:cs typeface="+mn-cs"/>
+              </a:defRPr>
+            </a:lvl5pPr>
+            <a:lvl6pPr marL="2057400" indent="-342900" algn="l" defTabSz="342900" rtl="0" eaLnBrk="1" latinLnBrk="0" hangingPunct="1">
+              <a:spcBef>
+                <a:spcPct val="20000"/>
+              </a:spcBef>
+              <a:buFont typeface="Arial"/>
+              <a:buChar char="•"/>
+              <a:defRPr sz="1500" kern="1200">
+                <a:solidFill>
+                  <a:schemeClr val="tx1"/>
+                </a:solidFill>
+                <a:latin typeface="+mn-lt"/>
+                <a:ea typeface="+mn-ea"/>
+                <a:cs typeface="+mn-cs"/>
+              </a:defRPr>
+            </a:lvl6pPr>
+            <a:lvl7pPr marL="2400300" indent="-342900" algn="l" defTabSz="342900" rtl="0" eaLnBrk="1" latinLnBrk="0" hangingPunct="1">
+              <a:spcBef>
+                <a:spcPct val="20000"/>
+              </a:spcBef>
+              <a:buFont typeface="Arial"/>
+              <a:buChar char="•"/>
+              <a:defRPr sz="1500" kern="1200">
+                <a:solidFill>
+                  <a:schemeClr val="tx1"/>
+                </a:solidFill>
+                <a:latin typeface="+mn-lt"/>
+                <a:ea typeface="+mn-ea"/>
+                <a:cs typeface="+mn-cs"/>
+              </a:defRPr>
+            </a:lvl7pPr>
+            <a:lvl8pPr marL="2743200" indent="-342900" algn="l" defTabSz="342900" rtl="0" eaLnBrk="1" latinLnBrk="0" hangingPunct="1">
+              <a:spcBef>
+                <a:spcPct val="20000"/>
+              </a:spcBef>
+              <a:buFont typeface="Arial"/>
+              <a:buChar char="•"/>
+              <a:defRPr sz="1500" kern="1200">
+                <a:solidFill>
+                  <a:schemeClr val="tx1"/>
+                </a:solidFill>
+                <a:latin typeface="+mn-lt"/>
+                <a:ea typeface="+mn-ea"/>
+                <a:cs typeface="+mn-cs"/>
+              </a:defRPr>
+            </a:lvl8pPr>
+            <a:lvl9pPr marL="3086100" indent="-342900" algn="l" defTabSz="342900" rtl="0" eaLnBrk="1" latinLnBrk="0" hangingPunct="1">
+              <a:spcBef>
+                <a:spcPct val="20000"/>
+              </a:spcBef>
+              <a:buFont typeface="Arial"/>
+              <a:buChar char="•"/>
+              <a:defRPr sz="1500" kern="1200">
+                <a:solidFill>
+                  <a:schemeClr val="tx1"/>
+                </a:solidFill>
+                <a:latin typeface="+mn-lt"/>
+                <a:ea typeface="+mn-ea"/>
+                <a:cs typeface="+mn-cs"/>
+              </a:defRPr>
+            </a:lvl9pPr>
+          </a:lstStyle>
+          <a:p>
+            <a:pPr marL="0" indent="0" algn="ctr">
+              <a:buNone/>
+            </a:pPr>
+            <a:r>
+              <a:rPr lang="en-US" sz="2000" dirty="0"/>
+              <a:t>Single feature model</a:t>
+            </a:r>
+          </a:p>
+        </p:txBody>
+      </p:sp>
+      <p:sp>
+        <p:nvSpPr>
+          <p:cNvPr id="15" name="Content Placeholder 4">
+            <a:extLst>
+              <a:ext uri="{FF2B5EF4-FFF2-40B4-BE49-F238E27FC236}">
+                <a16:creationId xmlns:a16="http://schemas.microsoft.com/office/drawing/2014/main" id="{5DB8B96A-6AD7-C553-565E-9FB5BF433D75}"/>
+              </a:ext>
+            </a:extLst>
+          </p:cNvPr>
+          <p:cNvSpPr txBox="1">
+            <a:spLocks/>
+          </p:cNvSpPr>
+          <p:nvPr/>
+        </p:nvSpPr>
+        <p:spPr>
+          <a:xfrm>
+            <a:off x="4867674" y="4764072"/>
+            <a:ext cx="3844544" cy="350247"/>
+          </a:xfrm>
+          <a:prstGeom prst="rect">
+            <a:avLst/>
+          </a:prstGeom>
+        </p:spPr>
+        <p:txBody>
+          <a:bodyPr vert="horz" lIns="91440" tIns="45720" rIns="91440" bIns="45720" rtlCol="0">
+            <a:normAutofit fontScale="92500" lnSpcReduction="20000"/>
+          </a:bodyPr>
+          <a:lstStyle>
+            <a:lvl1pPr marL="342900" indent="-342900" algn="l" defTabSz="342900" rtl="0" eaLnBrk="1" latinLnBrk="0" hangingPunct="1">
+              <a:spcBef>
+                <a:spcPct val="20000"/>
+              </a:spcBef>
+              <a:buFont typeface="Arial"/>
+              <a:buChar char="•"/>
+              <a:defRPr sz="2400" kern="1200">
+                <a:solidFill>
+                  <a:schemeClr val="tx1"/>
+                </a:solidFill>
+                <a:latin typeface="+mn-lt"/>
+                <a:ea typeface="+mn-ea"/>
+                <a:cs typeface="+mn-cs"/>
+              </a:defRPr>
+            </a:lvl1pPr>
+            <a:lvl2pPr marL="685800" indent="-342900" algn="l" defTabSz="342900" rtl="0" eaLnBrk="1" latinLnBrk="0" hangingPunct="1">
+              <a:spcBef>
+                <a:spcPct val="20000"/>
+              </a:spcBef>
+              <a:buFont typeface="Arial"/>
+              <a:buChar char="–"/>
+              <a:defRPr sz="2100" kern="1200">
+                <a:solidFill>
+                  <a:schemeClr val="tx1"/>
+                </a:solidFill>
+                <a:latin typeface="+mn-lt"/>
+                <a:ea typeface="+mn-ea"/>
+                <a:cs typeface="+mn-cs"/>
+              </a:defRPr>
+            </a:lvl2pPr>
+            <a:lvl3pPr marL="1028700" indent="-342900" algn="l" defTabSz="342900" rtl="0" eaLnBrk="1" latinLnBrk="0" hangingPunct="1">
+              <a:spcBef>
+                <a:spcPct val="20000"/>
+              </a:spcBef>
+              <a:buFont typeface="Arial"/>
+              <a:buChar char="•"/>
+              <a:defRPr sz="1800" kern="1200">
+                <a:solidFill>
+                  <a:schemeClr val="tx1"/>
+                </a:solidFill>
+                <a:latin typeface="+mn-lt"/>
+                <a:ea typeface="+mn-ea"/>
+                <a:cs typeface="+mn-cs"/>
+              </a:defRPr>
+            </a:lvl3pPr>
+            <a:lvl4pPr marL="1371600" indent="-342900" algn="l" defTabSz="342900" rtl="0" eaLnBrk="1" latinLnBrk="0" hangingPunct="1">
+              <a:spcBef>
+                <a:spcPct val="20000"/>
+              </a:spcBef>
+              <a:buFont typeface="Arial"/>
+              <a:buChar char="–"/>
+              <a:defRPr sz="1500" kern="1200">
+                <a:solidFill>
+                  <a:schemeClr val="tx1"/>
+                </a:solidFill>
+                <a:latin typeface="+mn-lt"/>
+                <a:ea typeface="+mn-ea"/>
+                <a:cs typeface="+mn-cs"/>
+              </a:defRPr>
+            </a:lvl4pPr>
+            <a:lvl5pPr marL="1714500" indent="-342900" algn="l" defTabSz="342900" rtl="0" eaLnBrk="1" latinLnBrk="0" hangingPunct="1">
+              <a:spcBef>
+                <a:spcPct val="20000"/>
+              </a:spcBef>
+              <a:buFont typeface="Arial"/>
+              <a:buChar char="»"/>
+              <a:defRPr sz="1500" kern="1200">
+                <a:solidFill>
+                  <a:schemeClr val="tx1"/>
+                </a:solidFill>
+                <a:latin typeface="+mn-lt"/>
+                <a:ea typeface="+mn-ea"/>
+                <a:cs typeface="+mn-cs"/>
+              </a:defRPr>
+            </a:lvl5pPr>
+            <a:lvl6pPr marL="2057400" indent="-342900" algn="l" defTabSz="342900" rtl="0" eaLnBrk="1" latinLnBrk="0" hangingPunct="1">
+              <a:spcBef>
+                <a:spcPct val="20000"/>
+              </a:spcBef>
+              <a:buFont typeface="Arial"/>
+              <a:buChar char="•"/>
+              <a:defRPr sz="1500" kern="1200">
+                <a:solidFill>
+                  <a:schemeClr val="tx1"/>
+                </a:solidFill>
+                <a:latin typeface="+mn-lt"/>
+                <a:ea typeface="+mn-ea"/>
+                <a:cs typeface="+mn-cs"/>
+              </a:defRPr>
+            </a:lvl6pPr>
+            <a:lvl7pPr marL="2400300" indent="-342900" algn="l" defTabSz="342900" rtl="0" eaLnBrk="1" latinLnBrk="0" hangingPunct="1">
+              <a:spcBef>
+                <a:spcPct val="20000"/>
+              </a:spcBef>
+              <a:buFont typeface="Arial"/>
+              <a:buChar char="•"/>
+              <a:defRPr sz="1500" kern="1200">
+                <a:solidFill>
+                  <a:schemeClr val="tx1"/>
+                </a:solidFill>
+                <a:latin typeface="+mn-lt"/>
+                <a:ea typeface="+mn-ea"/>
+                <a:cs typeface="+mn-cs"/>
+              </a:defRPr>
+            </a:lvl7pPr>
+            <a:lvl8pPr marL="2743200" indent="-342900" algn="l" defTabSz="342900" rtl="0" eaLnBrk="1" latinLnBrk="0" hangingPunct="1">
+              <a:spcBef>
+                <a:spcPct val="20000"/>
+              </a:spcBef>
+              <a:buFont typeface="Arial"/>
+              <a:buChar char="•"/>
+              <a:defRPr sz="1500" kern="1200">
+                <a:solidFill>
+                  <a:schemeClr val="tx1"/>
+                </a:solidFill>
+                <a:latin typeface="+mn-lt"/>
+                <a:ea typeface="+mn-ea"/>
+                <a:cs typeface="+mn-cs"/>
+              </a:defRPr>
+            </a:lvl8pPr>
+            <a:lvl9pPr marL="3086100" indent="-342900" algn="l" defTabSz="342900" rtl="0" eaLnBrk="1" latinLnBrk="0" hangingPunct="1">
+              <a:spcBef>
+                <a:spcPct val="20000"/>
+              </a:spcBef>
+              <a:buFont typeface="Arial"/>
+              <a:buChar char="•"/>
+              <a:defRPr sz="1500" kern="1200">
+                <a:solidFill>
+                  <a:schemeClr val="tx1"/>
+                </a:solidFill>
+                <a:latin typeface="+mn-lt"/>
+                <a:ea typeface="+mn-ea"/>
+                <a:cs typeface="+mn-cs"/>
+              </a:defRPr>
+            </a:lvl9pPr>
+          </a:lstStyle>
+          <a:p>
+            <a:pPr marL="0" indent="0" algn="ctr">
+              <a:buNone/>
+            </a:pPr>
+            <a:r>
+              <a:rPr lang="en-US" sz="2000" dirty="0"/>
+              <a:t>Multi-feature model</a:t>
+            </a:r>
+          </a:p>
+        </p:txBody>
+      </p:sp>
+      <p:cxnSp>
+        <p:nvCxnSpPr>
+          <p:cNvPr id="20" name="Straight Arrow Connector 19">
+            <a:extLst>
+              <a:ext uri="{FF2B5EF4-FFF2-40B4-BE49-F238E27FC236}">
+                <a16:creationId xmlns:a16="http://schemas.microsoft.com/office/drawing/2014/main" id="{CA42F2BC-E141-C799-A95E-8D9471EE0C25}"/>
+              </a:ext>
+            </a:extLst>
+          </p:cNvPr>
+          <p:cNvCxnSpPr>
+            <a:cxnSpLocks/>
+          </p:cNvCxnSpPr>
+          <p:nvPr/>
+        </p:nvCxnSpPr>
+        <p:spPr>
+          <a:xfrm>
+            <a:off x="4511332" y="3903591"/>
+            <a:ext cx="388704" cy="0"/>
+          </a:xfrm>
+          <a:prstGeom prst="straightConnector1">
+            <a:avLst/>
+          </a:prstGeom>
+          <a:ln>
+            <a:solidFill>
+              <a:schemeClr val="tx1"/>
+            </a:solidFill>
+            <a:headEnd type="triangle"/>
+            <a:tailEnd type="triangle"/>
+          </a:ln>
+        </p:spPr>
+        <p:style>
+          <a:lnRef idx="2">
+            <a:schemeClr val="accent1"/>
+          </a:lnRef>
+          <a:fillRef idx="0">
+            <a:schemeClr val="accent1"/>
+          </a:fillRef>
+          <a:effectRef idx="1">
+            <a:schemeClr val="accent1"/>
+          </a:effectRef>
+          <a:fontRef idx="minor">
+            <a:schemeClr val="tx1"/>
+          </a:fontRef>
+        </p:style>
+      </p:cxnSp>
+      <p:pic>
+        <p:nvPicPr>
+          <p:cNvPr id="8" name="Picture 7">
+            <a:extLst>
+              <a:ext uri="{FF2B5EF4-FFF2-40B4-BE49-F238E27FC236}">
+                <a16:creationId xmlns:a16="http://schemas.microsoft.com/office/drawing/2014/main" id="{C5E14DF5-1F8F-F807-B7F2-984768F4CB03}"/>
+              </a:ext>
+            </a:extLst>
+          </p:cNvPr>
+          <p:cNvPicPr>
+            <a:picLocks noChangeAspect="1"/>
+          </p:cNvPicPr>
+          <p:nvPr/>
+        </p:nvPicPr>
+        <p:blipFill>
+          <a:blip r:embed="rId3"/>
+          <a:stretch>
+            <a:fillRect/>
+          </a:stretch>
+        </p:blipFill>
+        <p:spPr>
+          <a:xfrm>
+            <a:off x="457200" y="2148214"/>
+            <a:ext cx="4012254" cy="2624525"/>
+          </a:xfrm>
+          <a:prstGeom prst="rect">
+            <a:avLst/>
+          </a:prstGeom>
+        </p:spPr>
+      </p:pic>
     </p:spTree>
+    <p:extLst>
+      <p:ext uri="{BB962C8B-B14F-4D97-AF65-F5344CB8AC3E}">
+        <p14:creationId xmlns:p14="http://schemas.microsoft.com/office/powerpoint/2010/main" val="2566613682"/>
+      </p:ext>
+    </p:extLst>
   </p:cSld>
   <p:clrMapOvr>
     <a:masterClrMapping/>
@@ -25939,6 +27036,880 @@
             <p:ph type="title"/>
           </p:nvPr>
         </p:nvSpPr>
+        <p:spPr>
+          <a:xfrm>
+            <a:off x="457200" y="205979"/>
+            <a:ext cx="8229600" cy="505221"/>
+          </a:xfrm>
+        </p:spPr>
+        <p:txBody>
+          <a:bodyPr>
+            <a:normAutofit fontScale="90000"/>
+          </a:bodyPr>
+          <a:lstStyle/>
+          <a:p>
+            <a:pPr marL="0" lvl="0" indent="0">
+              <a:buNone/>
+            </a:pPr>
+            <a:r>
+              <a:rPr dirty="0"/>
+              <a:t>Example of Multi-Feature Linear Model</a:t>
+            </a:r>
+          </a:p>
+        </p:txBody>
+      </p:sp>
+      <p:sp>
+        <p:nvSpPr>
+          <p:cNvPr id="5" name="Content Placeholder 4">
+            <a:extLst>
+              <a:ext uri="{FF2B5EF4-FFF2-40B4-BE49-F238E27FC236}">
+                <a16:creationId xmlns:a16="http://schemas.microsoft.com/office/drawing/2014/main" id="{761390C8-7670-FE67-994F-6AF9C386AFC8}"/>
+              </a:ext>
+            </a:extLst>
+          </p:cNvPr>
+          <p:cNvSpPr>
+            <a:spLocks noGrp="1"/>
+          </p:cNvSpPr>
+          <p:nvPr>
+            <p:ph idx="1"/>
+          </p:nvPr>
+        </p:nvSpPr>
+        <p:spPr>
+          <a:xfrm>
+            <a:off x="409711" y="712582"/>
+            <a:ext cx="8562070" cy="1388506"/>
+          </a:xfrm>
+        </p:spPr>
+        <p:txBody>
+          <a:bodyPr>
+            <a:normAutofit fontScale="85000" lnSpcReduction="10000"/>
+          </a:bodyPr>
+          <a:lstStyle/>
+          <a:p>
+            <a:pPr marL="0" indent="0">
+              <a:buNone/>
+            </a:pPr>
+            <a:r>
+              <a:rPr lang="en-US" sz="2000" dirty="0"/>
+              <a:t>Compare to single feature model, more complex multi-feature model exhibits</a:t>
+            </a:r>
+          </a:p>
+          <a:p>
+            <a:r>
+              <a:rPr lang="en-US" sz="2000" dirty="0"/>
+              <a:t>Decreased Durban-Watson statistic indicates increased serial correlation of residuals</a:t>
+            </a:r>
+          </a:p>
+          <a:p>
+            <a:r>
+              <a:rPr lang="en-US" sz="2000" dirty="0"/>
+              <a:t>Increased Jarque-Bara statistic indicates reduced skewness of residuals</a:t>
+            </a:r>
+          </a:p>
+          <a:p>
+            <a:r>
+              <a:rPr lang="en-US" sz="2000" dirty="0"/>
+              <a:t>More complex model has increased condition number</a:t>
+            </a:r>
+          </a:p>
+        </p:txBody>
+      </p:sp>
+      <p:pic>
+        <p:nvPicPr>
+          <p:cNvPr id="13" name="Picture 12">
+            <a:extLst>
+              <a:ext uri="{FF2B5EF4-FFF2-40B4-BE49-F238E27FC236}">
+                <a16:creationId xmlns:a16="http://schemas.microsoft.com/office/drawing/2014/main" id="{BB266AC6-FE14-CA7F-356F-26A3463988BA}"/>
+              </a:ext>
+            </a:extLst>
+          </p:cNvPr>
+          <p:cNvPicPr>
+            <a:picLocks noChangeAspect="1"/>
+          </p:cNvPicPr>
+          <p:nvPr/>
+        </p:nvPicPr>
+        <p:blipFill>
+          <a:blip r:embed="rId2"/>
+          <a:stretch>
+            <a:fillRect/>
+          </a:stretch>
+        </p:blipFill>
+        <p:spPr>
+          <a:xfrm>
+            <a:off x="4867674" y="2147003"/>
+            <a:ext cx="4166598" cy="2617070"/>
+          </a:xfrm>
+          <a:prstGeom prst="rect">
+            <a:avLst/>
+          </a:prstGeom>
+        </p:spPr>
+      </p:pic>
+      <p:sp>
+        <p:nvSpPr>
+          <p:cNvPr id="14" name="Content Placeholder 4">
+            <a:extLst>
+              <a:ext uri="{FF2B5EF4-FFF2-40B4-BE49-F238E27FC236}">
+                <a16:creationId xmlns:a16="http://schemas.microsoft.com/office/drawing/2014/main" id="{0E8B641A-0276-F0B0-AC04-ED544F7F33AF}"/>
+              </a:ext>
+            </a:extLst>
+          </p:cNvPr>
+          <p:cNvSpPr txBox="1">
+            <a:spLocks/>
+          </p:cNvSpPr>
+          <p:nvPr/>
+        </p:nvSpPr>
+        <p:spPr>
+          <a:xfrm>
+            <a:off x="495808" y="4764073"/>
+            <a:ext cx="3844544" cy="350247"/>
+          </a:xfrm>
+          <a:prstGeom prst="rect">
+            <a:avLst/>
+          </a:prstGeom>
+        </p:spPr>
+        <p:txBody>
+          <a:bodyPr vert="horz" lIns="91440" tIns="45720" rIns="91440" bIns="45720" rtlCol="0">
+            <a:normAutofit fontScale="92500" lnSpcReduction="20000"/>
+          </a:bodyPr>
+          <a:lstStyle>
+            <a:lvl1pPr marL="342900" indent="-342900" algn="l" defTabSz="342900" rtl="0" eaLnBrk="1" latinLnBrk="0" hangingPunct="1">
+              <a:spcBef>
+                <a:spcPct val="20000"/>
+              </a:spcBef>
+              <a:buFont typeface="Arial"/>
+              <a:buChar char="•"/>
+              <a:defRPr sz="2400" kern="1200">
+                <a:solidFill>
+                  <a:schemeClr val="tx1"/>
+                </a:solidFill>
+                <a:latin typeface="+mn-lt"/>
+                <a:ea typeface="+mn-ea"/>
+                <a:cs typeface="+mn-cs"/>
+              </a:defRPr>
+            </a:lvl1pPr>
+            <a:lvl2pPr marL="685800" indent="-342900" algn="l" defTabSz="342900" rtl="0" eaLnBrk="1" latinLnBrk="0" hangingPunct="1">
+              <a:spcBef>
+                <a:spcPct val="20000"/>
+              </a:spcBef>
+              <a:buFont typeface="Arial"/>
+              <a:buChar char="–"/>
+              <a:defRPr sz="2100" kern="1200">
+                <a:solidFill>
+                  <a:schemeClr val="tx1"/>
+                </a:solidFill>
+                <a:latin typeface="+mn-lt"/>
+                <a:ea typeface="+mn-ea"/>
+                <a:cs typeface="+mn-cs"/>
+              </a:defRPr>
+            </a:lvl2pPr>
+            <a:lvl3pPr marL="1028700" indent="-342900" algn="l" defTabSz="342900" rtl="0" eaLnBrk="1" latinLnBrk="0" hangingPunct="1">
+              <a:spcBef>
+                <a:spcPct val="20000"/>
+              </a:spcBef>
+              <a:buFont typeface="Arial"/>
+              <a:buChar char="•"/>
+              <a:defRPr sz="1800" kern="1200">
+                <a:solidFill>
+                  <a:schemeClr val="tx1"/>
+                </a:solidFill>
+                <a:latin typeface="+mn-lt"/>
+                <a:ea typeface="+mn-ea"/>
+                <a:cs typeface="+mn-cs"/>
+              </a:defRPr>
+            </a:lvl3pPr>
+            <a:lvl4pPr marL="1371600" indent="-342900" algn="l" defTabSz="342900" rtl="0" eaLnBrk="1" latinLnBrk="0" hangingPunct="1">
+              <a:spcBef>
+                <a:spcPct val="20000"/>
+              </a:spcBef>
+              <a:buFont typeface="Arial"/>
+              <a:buChar char="–"/>
+              <a:defRPr sz="1500" kern="1200">
+                <a:solidFill>
+                  <a:schemeClr val="tx1"/>
+                </a:solidFill>
+                <a:latin typeface="+mn-lt"/>
+                <a:ea typeface="+mn-ea"/>
+                <a:cs typeface="+mn-cs"/>
+              </a:defRPr>
+            </a:lvl4pPr>
+            <a:lvl5pPr marL="1714500" indent="-342900" algn="l" defTabSz="342900" rtl="0" eaLnBrk="1" latinLnBrk="0" hangingPunct="1">
+              <a:spcBef>
+                <a:spcPct val="20000"/>
+              </a:spcBef>
+              <a:buFont typeface="Arial"/>
+              <a:buChar char="»"/>
+              <a:defRPr sz="1500" kern="1200">
+                <a:solidFill>
+                  <a:schemeClr val="tx1"/>
+                </a:solidFill>
+                <a:latin typeface="+mn-lt"/>
+                <a:ea typeface="+mn-ea"/>
+                <a:cs typeface="+mn-cs"/>
+              </a:defRPr>
+            </a:lvl5pPr>
+            <a:lvl6pPr marL="2057400" indent="-342900" algn="l" defTabSz="342900" rtl="0" eaLnBrk="1" latinLnBrk="0" hangingPunct="1">
+              <a:spcBef>
+                <a:spcPct val="20000"/>
+              </a:spcBef>
+              <a:buFont typeface="Arial"/>
+              <a:buChar char="•"/>
+              <a:defRPr sz="1500" kern="1200">
+                <a:solidFill>
+                  <a:schemeClr val="tx1"/>
+                </a:solidFill>
+                <a:latin typeface="+mn-lt"/>
+                <a:ea typeface="+mn-ea"/>
+                <a:cs typeface="+mn-cs"/>
+              </a:defRPr>
+            </a:lvl6pPr>
+            <a:lvl7pPr marL="2400300" indent="-342900" algn="l" defTabSz="342900" rtl="0" eaLnBrk="1" latinLnBrk="0" hangingPunct="1">
+              <a:spcBef>
+                <a:spcPct val="20000"/>
+              </a:spcBef>
+              <a:buFont typeface="Arial"/>
+              <a:buChar char="•"/>
+              <a:defRPr sz="1500" kern="1200">
+                <a:solidFill>
+                  <a:schemeClr val="tx1"/>
+                </a:solidFill>
+                <a:latin typeface="+mn-lt"/>
+                <a:ea typeface="+mn-ea"/>
+                <a:cs typeface="+mn-cs"/>
+              </a:defRPr>
+            </a:lvl7pPr>
+            <a:lvl8pPr marL="2743200" indent="-342900" algn="l" defTabSz="342900" rtl="0" eaLnBrk="1" latinLnBrk="0" hangingPunct="1">
+              <a:spcBef>
+                <a:spcPct val="20000"/>
+              </a:spcBef>
+              <a:buFont typeface="Arial"/>
+              <a:buChar char="•"/>
+              <a:defRPr sz="1500" kern="1200">
+                <a:solidFill>
+                  <a:schemeClr val="tx1"/>
+                </a:solidFill>
+                <a:latin typeface="+mn-lt"/>
+                <a:ea typeface="+mn-ea"/>
+                <a:cs typeface="+mn-cs"/>
+              </a:defRPr>
+            </a:lvl8pPr>
+            <a:lvl9pPr marL="3086100" indent="-342900" algn="l" defTabSz="342900" rtl="0" eaLnBrk="1" latinLnBrk="0" hangingPunct="1">
+              <a:spcBef>
+                <a:spcPct val="20000"/>
+              </a:spcBef>
+              <a:buFont typeface="Arial"/>
+              <a:buChar char="•"/>
+              <a:defRPr sz="1500" kern="1200">
+                <a:solidFill>
+                  <a:schemeClr val="tx1"/>
+                </a:solidFill>
+                <a:latin typeface="+mn-lt"/>
+                <a:ea typeface="+mn-ea"/>
+                <a:cs typeface="+mn-cs"/>
+              </a:defRPr>
+            </a:lvl9pPr>
+          </a:lstStyle>
+          <a:p>
+            <a:pPr marL="0" indent="0" algn="ctr">
+              <a:buNone/>
+            </a:pPr>
+            <a:r>
+              <a:rPr lang="en-US" sz="2000" dirty="0"/>
+              <a:t>Single feature model</a:t>
+            </a:r>
+          </a:p>
+        </p:txBody>
+      </p:sp>
+      <p:sp>
+        <p:nvSpPr>
+          <p:cNvPr id="15" name="Content Placeholder 4">
+            <a:extLst>
+              <a:ext uri="{FF2B5EF4-FFF2-40B4-BE49-F238E27FC236}">
+                <a16:creationId xmlns:a16="http://schemas.microsoft.com/office/drawing/2014/main" id="{5DB8B96A-6AD7-C553-565E-9FB5BF433D75}"/>
+              </a:ext>
+            </a:extLst>
+          </p:cNvPr>
+          <p:cNvSpPr txBox="1">
+            <a:spLocks/>
+          </p:cNvSpPr>
+          <p:nvPr/>
+        </p:nvSpPr>
+        <p:spPr>
+          <a:xfrm>
+            <a:off x="4867674" y="4764072"/>
+            <a:ext cx="3844544" cy="350247"/>
+          </a:xfrm>
+          <a:prstGeom prst="rect">
+            <a:avLst/>
+          </a:prstGeom>
+        </p:spPr>
+        <p:txBody>
+          <a:bodyPr vert="horz" lIns="91440" tIns="45720" rIns="91440" bIns="45720" rtlCol="0">
+            <a:normAutofit fontScale="92500" lnSpcReduction="20000"/>
+          </a:bodyPr>
+          <a:lstStyle>
+            <a:lvl1pPr marL="342900" indent="-342900" algn="l" defTabSz="342900" rtl="0" eaLnBrk="1" latinLnBrk="0" hangingPunct="1">
+              <a:spcBef>
+                <a:spcPct val="20000"/>
+              </a:spcBef>
+              <a:buFont typeface="Arial"/>
+              <a:buChar char="•"/>
+              <a:defRPr sz="2400" kern="1200">
+                <a:solidFill>
+                  <a:schemeClr val="tx1"/>
+                </a:solidFill>
+                <a:latin typeface="+mn-lt"/>
+                <a:ea typeface="+mn-ea"/>
+                <a:cs typeface="+mn-cs"/>
+              </a:defRPr>
+            </a:lvl1pPr>
+            <a:lvl2pPr marL="685800" indent="-342900" algn="l" defTabSz="342900" rtl="0" eaLnBrk="1" latinLnBrk="0" hangingPunct="1">
+              <a:spcBef>
+                <a:spcPct val="20000"/>
+              </a:spcBef>
+              <a:buFont typeface="Arial"/>
+              <a:buChar char="–"/>
+              <a:defRPr sz="2100" kern="1200">
+                <a:solidFill>
+                  <a:schemeClr val="tx1"/>
+                </a:solidFill>
+                <a:latin typeface="+mn-lt"/>
+                <a:ea typeface="+mn-ea"/>
+                <a:cs typeface="+mn-cs"/>
+              </a:defRPr>
+            </a:lvl2pPr>
+            <a:lvl3pPr marL="1028700" indent="-342900" algn="l" defTabSz="342900" rtl="0" eaLnBrk="1" latinLnBrk="0" hangingPunct="1">
+              <a:spcBef>
+                <a:spcPct val="20000"/>
+              </a:spcBef>
+              <a:buFont typeface="Arial"/>
+              <a:buChar char="•"/>
+              <a:defRPr sz="1800" kern="1200">
+                <a:solidFill>
+                  <a:schemeClr val="tx1"/>
+                </a:solidFill>
+                <a:latin typeface="+mn-lt"/>
+                <a:ea typeface="+mn-ea"/>
+                <a:cs typeface="+mn-cs"/>
+              </a:defRPr>
+            </a:lvl3pPr>
+            <a:lvl4pPr marL="1371600" indent="-342900" algn="l" defTabSz="342900" rtl="0" eaLnBrk="1" latinLnBrk="0" hangingPunct="1">
+              <a:spcBef>
+                <a:spcPct val="20000"/>
+              </a:spcBef>
+              <a:buFont typeface="Arial"/>
+              <a:buChar char="–"/>
+              <a:defRPr sz="1500" kern="1200">
+                <a:solidFill>
+                  <a:schemeClr val="tx1"/>
+                </a:solidFill>
+                <a:latin typeface="+mn-lt"/>
+                <a:ea typeface="+mn-ea"/>
+                <a:cs typeface="+mn-cs"/>
+              </a:defRPr>
+            </a:lvl4pPr>
+            <a:lvl5pPr marL="1714500" indent="-342900" algn="l" defTabSz="342900" rtl="0" eaLnBrk="1" latinLnBrk="0" hangingPunct="1">
+              <a:spcBef>
+                <a:spcPct val="20000"/>
+              </a:spcBef>
+              <a:buFont typeface="Arial"/>
+              <a:buChar char="»"/>
+              <a:defRPr sz="1500" kern="1200">
+                <a:solidFill>
+                  <a:schemeClr val="tx1"/>
+                </a:solidFill>
+                <a:latin typeface="+mn-lt"/>
+                <a:ea typeface="+mn-ea"/>
+                <a:cs typeface="+mn-cs"/>
+              </a:defRPr>
+            </a:lvl5pPr>
+            <a:lvl6pPr marL="2057400" indent="-342900" algn="l" defTabSz="342900" rtl="0" eaLnBrk="1" latinLnBrk="0" hangingPunct="1">
+              <a:spcBef>
+                <a:spcPct val="20000"/>
+              </a:spcBef>
+              <a:buFont typeface="Arial"/>
+              <a:buChar char="•"/>
+              <a:defRPr sz="1500" kern="1200">
+                <a:solidFill>
+                  <a:schemeClr val="tx1"/>
+                </a:solidFill>
+                <a:latin typeface="+mn-lt"/>
+                <a:ea typeface="+mn-ea"/>
+                <a:cs typeface="+mn-cs"/>
+              </a:defRPr>
+            </a:lvl6pPr>
+            <a:lvl7pPr marL="2400300" indent="-342900" algn="l" defTabSz="342900" rtl="0" eaLnBrk="1" latinLnBrk="0" hangingPunct="1">
+              <a:spcBef>
+                <a:spcPct val="20000"/>
+              </a:spcBef>
+              <a:buFont typeface="Arial"/>
+              <a:buChar char="•"/>
+              <a:defRPr sz="1500" kern="1200">
+                <a:solidFill>
+                  <a:schemeClr val="tx1"/>
+                </a:solidFill>
+                <a:latin typeface="+mn-lt"/>
+                <a:ea typeface="+mn-ea"/>
+                <a:cs typeface="+mn-cs"/>
+              </a:defRPr>
+            </a:lvl7pPr>
+            <a:lvl8pPr marL="2743200" indent="-342900" algn="l" defTabSz="342900" rtl="0" eaLnBrk="1" latinLnBrk="0" hangingPunct="1">
+              <a:spcBef>
+                <a:spcPct val="20000"/>
+              </a:spcBef>
+              <a:buFont typeface="Arial"/>
+              <a:buChar char="•"/>
+              <a:defRPr sz="1500" kern="1200">
+                <a:solidFill>
+                  <a:schemeClr val="tx1"/>
+                </a:solidFill>
+                <a:latin typeface="+mn-lt"/>
+                <a:ea typeface="+mn-ea"/>
+                <a:cs typeface="+mn-cs"/>
+              </a:defRPr>
+            </a:lvl8pPr>
+            <a:lvl9pPr marL="3086100" indent="-342900" algn="l" defTabSz="342900" rtl="0" eaLnBrk="1" latinLnBrk="0" hangingPunct="1">
+              <a:spcBef>
+                <a:spcPct val="20000"/>
+              </a:spcBef>
+              <a:buFont typeface="Arial"/>
+              <a:buChar char="•"/>
+              <a:defRPr sz="1500" kern="1200">
+                <a:solidFill>
+                  <a:schemeClr val="tx1"/>
+                </a:solidFill>
+                <a:latin typeface="+mn-lt"/>
+                <a:ea typeface="+mn-ea"/>
+                <a:cs typeface="+mn-cs"/>
+              </a:defRPr>
+            </a:lvl9pPr>
+          </a:lstStyle>
+          <a:p>
+            <a:pPr marL="0" indent="0" algn="ctr">
+              <a:buNone/>
+            </a:pPr>
+            <a:r>
+              <a:rPr lang="en-US" sz="2000" dirty="0"/>
+              <a:t>Multi-feature model</a:t>
+            </a:r>
+          </a:p>
+        </p:txBody>
+      </p:sp>
+      <p:cxnSp>
+        <p:nvCxnSpPr>
+          <p:cNvPr id="17" name="Straight Arrow Connector 16">
+            <a:extLst>
+              <a:ext uri="{FF2B5EF4-FFF2-40B4-BE49-F238E27FC236}">
+                <a16:creationId xmlns:a16="http://schemas.microsoft.com/office/drawing/2014/main" id="{A32F9052-08C7-DB33-4207-E662F546D110}"/>
+              </a:ext>
+            </a:extLst>
+          </p:cNvPr>
+          <p:cNvCxnSpPr>
+            <a:cxnSpLocks/>
+          </p:cNvCxnSpPr>
+          <p:nvPr/>
+        </p:nvCxnSpPr>
+        <p:spPr>
+          <a:xfrm>
+            <a:off x="4478528" y="4197456"/>
+            <a:ext cx="3833081" cy="0"/>
+          </a:xfrm>
+          <a:prstGeom prst="straightConnector1">
+            <a:avLst/>
+          </a:prstGeom>
+          <a:ln>
+            <a:solidFill>
+              <a:schemeClr val="tx1"/>
+            </a:solidFill>
+            <a:headEnd type="triangle"/>
+            <a:tailEnd type="triangle"/>
+          </a:ln>
+        </p:spPr>
+        <p:style>
+          <a:lnRef idx="2">
+            <a:schemeClr val="accent1"/>
+          </a:lnRef>
+          <a:fillRef idx="0">
+            <a:schemeClr val="accent1"/>
+          </a:fillRef>
+          <a:effectRef idx="1">
+            <a:schemeClr val="accent1"/>
+          </a:effectRef>
+          <a:fontRef idx="minor">
+            <a:schemeClr val="tx1"/>
+          </a:fontRef>
+        </p:style>
+      </p:cxnSp>
+      <p:cxnSp>
+        <p:nvCxnSpPr>
+          <p:cNvPr id="19" name="Straight Arrow Connector 18">
+            <a:extLst>
+              <a:ext uri="{FF2B5EF4-FFF2-40B4-BE49-F238E27FC236}">
+                <a16:creationId xmlns:a16="http://schemas.microsoft.com/office/drawing/2014/main" id="{A232335A-BDC5-95FD-F2BF-806B73135BF4}"/>
+              </a:ext>
+            </a:extLst>
+          </p:cNvPr>
+          <p:cNvCxnSpPr>
+            <a:cxnSpLocks/>
+          </p:cNvCxnSpPr>
+          <p:nvPr/>
+        </p:nvCxnSpPr>
+        <p:spPr>
+          <a:xfrm>
+            <a:off x="4478528" y="4345756"/>
+            <a:ext cx="3833081" cy="0"/>
+          </a:xfrm>
+          <a:prstGeom prst="straightConnector1">
+            <a:avLst/>
+          </a:prstGeom>
+          <a:ln>
+            <a:solidFill>
+              <a:schemeClr val="tx1"/>
+            </a:solidFill>
+            <a:headEnd type="triangle"/>
+            <a:tailEnd type="triangle"/>
+          </a:ln>
+        </p:spPr>
+        <p:style>
+          <a:lnRef idx="2">
+            <a:schemeClr val="accent1"/>
+          </a:lnRef>
+          <a:fillRef idx="0">
+            <a:schemeClr val="accent1"/>
+          </a:fillRef>
+          <a:effectRef idx="1">
+            <a:schemeClr val="accent1"/>
+          </a:effectRef>
+          <a:fontRef idx="minor">
+            <a:schemeClr val="tx1"/>
+          </a:fontRef>
+        </p:style>
+      </p:cxnSp>
+      <p:cxnSp>
+        <p:nvCxnSpPr>
+          <p:cNvPr id="20" name="Straight Arrow Connector 19">
+            <a:extLst>
+              <a:ext uri="{FF2B5EF4-FFF2-40B4-BE49-F238E27FC236}">
+                <a16:creationId xmlns:a16="http://schemas.microsoft.com/office/drawing/2014/main" id="{CA42F2BC-E141-C799-A95E-8D9471EE0C25}"/>
+              </a:ext>
+            </a:extLst>
+          </p:cNvPr>
+          <p:cNvCxnSpPr>
+            <a:cxnSpLocks/>
+          </p:cNvCxnSpPr>
+          <p:nvPr/>
+        </p:nvCxnSpPr>
+        <p:spPr>
+          <a:xfrm>
+            <a:off x="4478528" y="4580165"/>
+            <a:ext cx="3935592" cy="0"/>
+          </a:xfrm>
+          <a:prstGeom prst="straightConnector1">
+            <a:avLst/>
+          </a:prstGeom>
+          <a:ln>
+            <a:solidFill>
+              <a:schemeClr val="tx1"/>
+            </a:solidFill>
+            <a:headEnd type="triangle"/>
+            <a:tailEnd type="triangle"/>
+          </a:ln>
+        </p:spPr>
+        <p:style>
+          <a:lnRef idx="2">
+            <a:schemeClr val="accent1"/>
+          </a:lnRef>
+          <a:fillRef idx="0">
+            <a:schemeClr val="accent1"/>
+          </a:fillRef>
+          <a:effectRef idx="1">
+            <a:schemeClr val="accent1"/>
+          </a:effectRef>
+          <a:fontRef idx="minor">
+            <a:schemeClr val="tx1"/>
+          </a:fontRef>
+        </p:style>
+      </p:cxnSp>
+      <p:pic>
+        <p:nvPicPr>
+          <p:cNvPr id="4" name="Picture 3">
+            <a:extLst>
+              <a:ext uri="{FF2B5EF4-FFF2-40B4-BE49-F238E27FC236}">
+                <a16:creationId xmlns:a16="http://schemas.microsoft.com/office/drawing/2014/main" id="{5A33167D-773A-5E9F-DC9F-3C81B791674F}"/>
+              </a:ext>
+            </a:extLst>
+          </p:cNvPr>
+          <p:cNvPicPr>
+            <a:picLocks noChangeAspect="1"/>
+          </p:cNvPicPr>
+          <p:nvPr/>
+        </p:nvPicPr>
+        <p:blipFill>
+          <a:blip r:embed="rId3"/>
+          <a:stretch>
+            <a:fillRect/>
+          </a:stretch>
+        </p:blipFill>
+        <p:spPr>
+          <a:xfrm>
+            <a:off x="457200" y="2148214"/>
+            <a:ext cx="4012254" cy="2624525"/>
+          </a:xfrm>
+          <a:prstGeom prst="rect">
+            <a:avLst/>
+          </a:prstGeom>
+        </p:spPr>
+      </p:pic>
+    </p:spTree>
+    <p:extLst>
+      <p:ext uri="{BB962C8B-B14F-4D97-AF65-F5344CB8AC3E}">
+        <p14:creationId xmlns:p14="http://schemas.microsoft.com/office/powerpoint/2010/main" val="1047003336"/>
+      </p:ext>
+    </p:extLst>
+  </p:cSld>
+  <p:clrMapOvr>
+    <a:masterClrMapping/>
+  </p:clrMapOvr>
+</p:sld>
+</file>
+
+<file path=ppt/slides/slide54.xml><?xml version="1.0" encoding="utf-8"?>
+<p:sld xmlns:a="http://schemas.openxmlformats.org/drawingml/2006/main" xmlns:r="http://schemas.openxmlformats.org/officeDocument/2006/relationships" xmlns:p="http://schemas.openxmlformats.org/presentationml/2006/main">
+  <p:cSld>
+    <p:spTree>
+      <p:nvGrpSpPr>
+        <p:cNvPr id="1" name=""/>
+        <p:cNvGrpSpPr/>
+        <p:nvPr/>
+      </p:nvGrpSpPr>
+      <p:grpSpPr>
+        <a:xfrm>
+          <a:off x="0" y="0"/>
+          <a:ext cx="0" cy="0"/>
+          <a:chOff x="0" y="0"/>
+          <a:chExt cx="0" cy="0"/>
+        </a:xfrm>
+      </p:grpSpPr>
+      <p:sp>
+        <p:nvSpPr>
+          <p:cNvPr id="2" name="Title 1"/>
+          <p:cNvSpPr>
+            <a:spLocks noGrp="1"/>
+          </p:cNvSpPr>
+          <p:nvPr>
+            <p:ph type="title"/>
+          </p:nvPr>
+        </p:nvSpPr>
+        <p:spPr/>
+        <p:txBody>
+          <a:bodyPr/>
+          <a:lstStyle/>
+          <a:p>
+            <a:pPr marL="0" lvl="0" indent="0">
+              <a:buNone/>
+            </a:pPr>
+            <a:r>
+              <a:t>Linear Model Assumptions</a:t>
+            </a:r>
+          </a:p>
+        </p:txBody>
+      </p:sp>
+      <p:sp>
+        <p:nvSpPr>
+          <p:cNvPr id="3" name="Content Placeholder 2"/>
+          <p:cNvSpPr>
+            <a:spLocks noGrp="1"/>
+          </p:cNvSpPr>
+          <p:nvPr>
+            <p:ph idx="1"/>
+          </p:nvPr>
+        </p:nvSpPr>
+        <p:spPr/>
+        <p:txBody>
+          <a:bodyPr>
+            <a:normAutofit fontScale="62500" lnSpcReduction="20000"/>
+          </a:bodyPr>
+          <a:lstStyle/>
+          <a:p>
+            <a:pPr marL="0" lvl="0" indent="0">
+              <a:buNone/>
+            </a:pPr>
+            <a:r>
+              <a:rPr dirty="0"/>
+              <a:t>There are a number of assumptions in linear models that you overlook at your peril!</a:t>
+            </a:r>
+          </a:p>
+          <a:p>
+            <a:pPr lvl="0"/>
+            <a:r>
+              <a:rPr dirty="0"/>
+              <a:t>The feature or predictor variables should be </a:t>
+            </a:r>
+            <a:r>
+              <a:rPr b="1" dirty="0"/>
+              <a:t>independent</a:t>
+            </a:r>
+            <a:r>
+              <a:rPr dirty="0"/>
+              <a:t> of one another</a:t>
+            </a:r>
+          </a:p>
+          <a:p>
+            <a:pPr lvl="1"/>
+            <a:r>
+              <a:rPr dirty="0"/>
+              <a:t>This is rarely true in practice</a:t>
+            </a:r>
+            <a:br>
+              <a:rPr dirty="0"/>
+            </a:br>
+            <a:endParaRPr dirty="0"/>
+          </a:p>
+          <a:p>
+            <a:pPr lvl="1"/>
+            <a:r>
+              <a:rPr b="1" dirty="0"/>
+              <a:t>Multi-</a:t>
+            </a:r>
+            <a:r>
+              <a:rPr b="1" dirty="0" err="1"/>
+              <a:t>colinearity</a:t>
+            </a:r>
+            <a:r>
+              <a:rPr dirty="0"/>
+              <a:t> between features makes the model </a:t>
+            </a:r>
+            <a:r>
+              <a:rPr b="1" dirty="0"/>
+              <a:t>under-determined</a:t>
+            </a:r>
+          </a:p>
+          <a:p>
+            <a:pPr lvl="0"/>
+            <a:r>
+              <a:rPr dirty="0"/>
+              <a:t>We assume that numeric features or predictors have zero mean and about the same scale</a:t>
+            </a:r>
+          </a:p>
+          <a:p>
+            <a:pPr lvl="1"/>
+            <a:r>
+              <a:rPr dirty="0"/>
+              <a:t>We do not want to bias the estimation of regression coefficients with predictors that do not have a 0 mean</a:t>
+            </a:r>
+            <a:br>
+              <a:rPr dirty="0"/>
+            </a:br>
+            <a:endParaRPr dirty="0"/>
+          </a:p>
+          <a:p>
+            <a:pPr lvl="1"/>
+            <a:r>
+              <a:rPr dirty="0"/>
+              <a:t>We do not want to have predictors with a large numeric range dominate training</a:t>
+            </a:r>
+            <a:br>
+              <a:rPr dirty="0"/>
+            </a:br>
+            <a:endParaRPr dirty="0"/>
+          </a:p>
+          <a:p>
+            <a:pPr lvl="1"/>
+            <a:r>
+              <a:rPr dirty="0"/>
+              <a:t>Example: income is in the range of 10s or 100s of thousands and age is in the range of 10s, but </a:t>
+            </a:r>
+            <a:r>
+              <a:rPr dirty="0" err="1"/>
+              <a:t>apriori</a:t>
+            </a:r>
+            <a:r>
+              <a:rPr dirty="0"/>
+              <a:t> income is no more important than age as a predictor</a:t>
+            </a:r>
+          </a:p>
+          <a:p>
+            <a:pPr lvl="0"/>
+            <a:r>
+              <a:rPr dirty="0"/>
+              <a:t>Values of each predictor or feature should be </a:t>
+            </a:r>
+            <a:r>
+              <a:rPr dirty="0" err="1"/>
+              <a:t>iid</a:t>
+            </a:r>
+            <a:endParaRPr dirty="0"/>
+          </a:p>
+          <a:p>
+            <a:pPr lvl="1"/>
+            <a:r>
+              <a:rPr dirty="0"/>
+              <a:t>If variance changes with sample, the optimal value of the coefficient could not be constant</a:t>
+            </a:r>
+            <a:br>
+              <a:rPr dirty="0"/>
+            </a:br>
+            <a:endParaRPr dirty="0"/>
+          </a:p>
+          <a:p>
+            <a:pPr lvl="1"/>
+            <a:r>
+              <a:rPr dirty="0"/>
+              <a:t>If there </a:t>
+            </a:r>
+            <a:r>
+              <a:rPr b="1" dirty="0"/>
+              <a:t>serial correlation</a:t>
+            </a:r>
+            <a:r>
+              <a:rPr dirty="0"/>
+              <a:t> in the predictor values, the </a:t>
+            </a:r>
+            <a:r>
+              <a:rPr dirty="0" err="1"/>
+              <a:t>iid</a:t>
+            </a:r>
+            <a:r>
+              <a:rPr dirty="0"/>
+              <a:t> assumption is violated - but can account for this such as in time series models</a:t>
+            </a:r>
+          </a:p>
+        </p:txBody>
+      </p:sp>
+    </p:spTree>
+  </p:cSld>
+  <p:clrMapOvr>
+    <a:masterClrMapping/>
+  </p:clrMapOvr>
+</p:sld>
+</file>
+
+<file path=ppt/slides/slide55.xml><?xml version="1.0" encoding="utf-8"?>
+<p:sld xmlns:a="http://schemas.openxmlformats.org/drawingml/2006/main" xmlns:r="http://schemas.openxmlformats.org/officeDocument/2006/relationships" xmlns:p="http://schemas.openxmlformats.org/presentationml/2006/main">
+  <p:cSld>
+    <p:spTree>
+      <p:nvGrpSpPr>
+        <p:cNvPr id="1" name=""/>
+        <p:cNvGrpSpPr/>
+        <p:nvPr/>
+      </p:nvGrpSpPr>
+      <p:grpSpPr>
+        <a:xfrm>
+          <a:off x="0" y="0"/>
+          <a:ext cx="0" cy="0"/>
+          <a:chOff x="0" y="0"/>
+          <a:chExt cx="0" cy="0"/>
+        </a:xfrm>
+      </p:grpSpPr>
+      <p:sp>
+        <p:nvSpPr>
+          <p:cNvPr id="2" name="Title 1"/>
+          <p:cNvSpPr>
+            <a:spLocks noGrp="1"/>
+          </p:cNvSpPr>
+          <p:nvPr>
+            <p:ph type="title"/>
+          </p:nvPr>
+        </p:nvSpPr>
         <p:spPr/>
         <p:txBody>
           <a:bodyPr/>
@@ -26044,7 +28015,7 @@
 </p:sld>
 </file>
 
-<file path=ppt/slides/slide54.xml><?xml version="1.0" encoding="utf-8"?>
+<file path=ppt/slides/slide56.xml><?xml version="1.0" encoding="utf-8"?>
 <p:sld xmlns:a="http://schemas.openxmlformats.org/drawingml/2006/main" xmlns:r="http://schemas.openxmlformats.org/officeDocument/2006/relationships" xmlns:p="http://schemas.openxmlformats.org/presentationml/2006/main">
   <p:cSld>
     <p:spTree>

</xml_diff>

<commit_message>
Improved examples in slide deck
</commit_message>
<xml_diff>
--- a/LectureSlides/08_IntroductionToLinearModels.pptx
+++ b/LectureSlides/08_IntroductionToLinearModels.pptx
@@ -9,16 +9,16 @@
   </p:notesMasterIdLst>
   <p:sldIdLst>
     <p:sldId id="338" r:id="rId2"/>
-    <p:sldId id="339" r:id="rId3"/>
-    <p:sldId id="340" r:id="rId4"/>
-    <p:sldId id="341" r:id="rId5"/>
-    <p:sldId id="342" r:id="rId6"/>
-    <p:sldId id="343" r:id="rId7"/>
-    <p:sldId id="344" r:id="rId8"/>
-    <p:sldId id="345" r:id="rId9"/>
-    <p:sldId id="346" r:id="rId10"/>
-    <p:sldId id="347" r:id="rId11"/>
-    <p:sldId id="348" r:id="rId12"/>
+    <p:sldId id="340" r:id="rId3"/>
+    <p:sldId id="341" r:id="rId4"/>
+    <p:sldId id="342" r:id="rId5"/>
+    <p:sldId id="343" r:id="rId6"/>
+    <p:sldId id="344" r:id="rId7"/>
+    <p:sldId id="345" r:id="rId8"/>
+    <p:sldId id="346" r:id="rId9"/>
+    <p:sldId id="347" r:id="rId10"/>
+    <p:sldId id="348" r:id="rId11"/>
+    <p:sldId id="380" r:id="rId12"/>
     <p:sldId id="349" r:id="rId13"/>
     <p:sldId id="350" r:id="rId14"/>
     <p:sldId id="351" r:id="rId15"/>
@@ -61,8 +61,8 @@
     <p:sldId id="312" r:id="rId52"/>
     <p:sldId id="378" r:id="rId53"/>
     <p:sldId id="379" r:id="rId54"/>
-    <p:sldId id="319" r:id="rId55"/>
-    <p:sldId id="335" r:id="rId56"/>
+    <p:sldId id="335" r:id="rId55"/>
+    <p:sldId id="319" r:id="rId56"/>
     <p:sldId id="336" r:id="rId57"/>
   </p:sldIdLst>
   <p:sldSz cx="9144000" cy="5143500" type="screen16x9"/>
@@ -3810,394 +3810,8 @@
           </a:p>
         </p:txBody>
       </p:sp>
-      <mc:AlternateContent xmlns:mc="http://schemas.openxmlformats.org/markup-compatibility/2006" xmlns:a14="http://schemas.microsoft.com/office/drawing/2010/main">
-        <mc:Choice Requires="a14">
-          <p:sp>
-            <p:nvSpPr>
-              <p:cNvPr id="3" name="Content Placeholder 2"/>
-              <p:cNvSpPr>
-                <a:spLocks noGrp="1"/>
-              </p:cNvSpPr>
-              <p:nvPr>
-                <p:ph idx="1"/>
-              </p:nvPr>
-            </p:nvSpPr>
-            <p:spPr>
-              <a:xfrm>
-                <a:off x="457200" y="1200150"/>
-                <a:ext cx="8229600" cy="3583177"/>
-              </a:xfrm>
-            </p:spPr>
-            <p:txBody>
-              <a:bodyPr>
-                <a:normAutofit/>
-              </a:bodyPr>
-              <a:lstStyle/>
-              <a:p>
-                <a:pPr marL="0" lvl="0" indent="0">
-                  <a:buNone/>
-                </a:pPr>
-                <a:r>
-                  <a:rPr dirty="0"/>
-                  <a:t>The general formulation of a linear model can be written:</a:t>
-                </a:r>
-              </a:p>
-              <a:p>
-                <a:pPr marL="0" lvl="0" indent="0">
-                  <a:buNone/>
-                </a:pPr>
-                <a14:m>
-                  <m:oMathPara xmlns:m="http://schemas.openxmlformats.org/officeDocument/2006/math">
-                    <m:oMathParaPr>
-                      <m:jc m:val="center"/>
-                    </m:oMathParaPr>
-                    <m:oMath xmlns:m="http://schemas.openxmlformats.org/officeDocument/2006/math">
-                      <m:acc>
-                        <m:accPr>
-                          <m:chr m:val="⃗"/>
-                          <m:ctrlPr>
-                            <a:rPr i="1">
-                              <a:latin typeface="Cambria Math" panose="02040503050406030204" pitchFamily="18" charset="0"/>
-                            </a:rPr>
-                          </m:ctrlPr>
-                        </m:accPr>
-                        <m:e>
-                          <m:r>
-                            <a:rPr>
-                              <a:latin typeface="Cambria Math" panose="02040503050406030204" pitchFamily="18" charset="0"/>
-                            </a:rPr>
-                            <m:t>𝑦</m:t>
-                          </m:r>
-                        </m:e>
-                      </m:acc>
-                      <m:r>
-                        <a:rPr>
-                          <a:latin typeface="Cambria Math" panose="02040503050406030204" pitchFamily="18" charset="0"/>
-                        </a:rPr>
-                        <m:t>=</m:t>
-                      </m:r>
-                      <m:r>
-                        <a:rPr>
-                          <a:latin typeface="Cambria Math" panose="02040503050406030204" pitchFamily="18" charset="0"/>
-                        </a:rPr>
-                        <m:t>𝐴</m:t>
-                      </m:r>
-                      <m:acc>
-                        <m:accPr>
-                          <m:chr m:val="⃗"/>
-                          <m:ctrlPr>
-                            <a:rPr i="1">
-                              <a:latin typeface="Cambria Math" panose="02040503050406030204" pitchFamily="18" charset="0"/>
-                            </a:rPr>
-                          </m:ctrlPr>
-                        </m:accPr>
-                        <m:e>
-                          <m:r>
-                            <a:rPr>
-                              <a:latin typeface="Cambria Math" panose="02040503050406030204" pitchFamily="18" charset="0"/>
-                            </a:rPr>
-                            <m:t>𝑏</m:t>
-                          </m:r>
-                        </m:e>
-                      </m:acc>
-                      <m:r>
-                        <a:rPr>
-                          <a:latin typeface="Cambria Math" panose="02040503050406030204" pitchFamily="18" charset="0"/>
-                        </a:rPr>
-                        <m:t>+</m:t>
-                      </m:r>
-                      <m:acc>
-                        <m:accPr>
-                          <m:chr m:val="⃗"/>
-                          <m:ctrlPr>
-                            <a:rPr i="1">
-                              <a:latin typeface="Cambria Math" panose="02040503050406030204" pitchFamily="18" charset="0"/>
-                            </a:rPr>
-                          </m:ctrlPr>
-                        </m:accPr>
-                        <m:e>
-                          <m:r>
-                            <a:rPr>
-                              <a:latin typeface="Cambria Math" panose="02040503050406030204" pitchFamily="18" charset="0"/>
-                            </a:rPr>
-                            <m:t>𝜖</m:t>
-                          </m:r>
-                        </m:e>
-                      </m:acc>
-                    </m:oMath>
-                  </m:oMathPara>
-                </a14:m>
-                <a:endParaRPr dirty="0"/>
-              </a:p>
-              <a:p>
-                <a:pPr lvl="0"/>
-                <a14:m>
-                  <m:oMath xmlns:m="http://schemas.openxmlformats.org/officeDocument/2006/math">
-                    <m:acc>
-                      <m:accPr>
-                        <m:chr m:val="⃗"/>
-                        <m:ctrlPr>
-                          <a:rPr i="1">
-                            <a:latin typeface="Cambria Math" panose="02040503050406030204" pitchFamily="18" charset="0"/>
-                          </a:rPr>
-                        </m:ctrlPr>
-                      </m:accPr>
-                      <m:e>
-                        <m:r>
-                          <a:rPr>
-                            <a:latin typeface="Cambria Math" panose="02040503050406030204" pitchFamily="18" charset="0"/>
-                          </a:rPr>
-                          <m:t>𝑦</m:t>
-                        </m:r>
-                      </m:e>
-                    </m:acc>
-                  </m:oMath>
-                </a14:m>
-                <a:r>
-                  <a:rPr dirty="0"/>
-                  <a:t> is the </a:t>
-                </a:r>
-                <a:r>
-                  <a:rPr b="1" dirty="0"/>
-                  <a:t>vector</a:t>
-                </a:r>
-                <a:r>
-                  <a:rPr dirty="0"/>
-                  <a:t> of </a:t>
-                </a:r>
-                <a14:m>
-                  <m:oMath xmlns:m="http://schemas.openxmlformats.org/officeDocument/2006/math">
-                    <m:r>
-                      <a:rPr>
-                        <a:latin typeface="Cambria Math" panose="02040503050406030204" pitchFamily="18" charset="0"/>
-                      </a:rPr>
-                      <m:t>𝑛</m:t>
-                    </m:r>
-                  </m:oMath>
-                </a14:m>
-                <a:r>
-                  <a:rPr dirty="0"/>
-                  <a:t> </a:t>
-                </a:r>
-                <a:r>
-                  <a:rPr b="1" dirty="0"/>
-                  <a:t>dependent variables </a:t>
-                </a:r>
-                <a:r>
-                  <a:rPr dirty="0"/>
-                  <a:t>or labels we seek to predict</a:t>
-                </a:r>
-              </a:p>
-              <a:p>
-                <a:pPr lvl="0"/>
-                <a14:m>
-                  <m:oMath xmlns:m="http://schemas.openxmlformats.org/officeDocument/2006/math">
-                    <m:r>
-                      <a:rPr>
-                        <a:latin typeface="Cambria Math" panose="02040503050406030204" pitchFamily="18" charset="0"/>
-                      </a:rPr>
-                      <m:t>𝐴</m:t>
-                    </m:r>
-                  </m:oMath>
-                </a14:m>
-                <a:r>
-                  <a:rPr dirty="0"/>
-                  <a:t> is the </a:t>
-                </a:r>
-                <a14:m>
-                  <m:oMath xmlns:m="http://schemas.openxmlformats.org/officeDocument/2006/math">
-                    <m:r>
-                      <a:rPr>
-                        <a:latin typeface="Cambria Math" panose="02040503050406030204" pitchFamily="18" charset="0"/>
-                      </a:rPr>
-                      <m:t>𝑛</m:t>
-                    </m:r>
-                  </m:oMath>
-                </a14:m>
-                <a:r>
-                  <a:rPr dirty="0"/>
-                  <a:t> x </a:t>
-                </a:r>
-                <a14:m>
-                  <m:oMath xmlns:m="http://schemas.openxmlformats.org/officeDocument/2006/math">
-                    <m:r>
-                      <a:rPr>
-                        <a:latin typeface="Cambria Math" panose="02040503050406030204" pitchFamily="18" charset="0"/>
-                      </a:rPr>
-                      <m:t>𝑝</m:t>
-                    </m:r>
-                  </m:oMath>
-                </a14:m>
-                <a:r>
-                  <a:rPr dirty="0"/>
-                  <a:t> </a:t>
-                </a:r>
-                <a:r>
-                  <a:rPr b="1" dirty="0"/>
-                  <a:t>model matrix</a:t>
-                </a:r>
-                <a:r>
-                  <a:rPr dirty="0"/>
-                  <a:t> or </a:t>
-                </a:r>
-                <a:r>
-                  <a:rPr b="1" dirty="0"/>
-                  <a:t>design matrix</a:t>
-                </a:r>
-              </a:p>
-              <a:p>
-                <a:pPr lvl="1"/>
-                <a:r>
-                  <a:rPr dirty="0"/>
-                  <a:t>Defines the structure of the model</a:t>
-                </a:r>
-              </a:p>
-              <a:p>
-                <a:pPr lvl="1"/>
-                <a14:m>
-                  <m:oMath xmlns:m="http://schemas.openxmlformats.org/officeDocument/2006/math">
-                    <m:r>
-                      <a:rPr>
-                        <a:latin typeface="Cambria Math" panose="02040503050406030204" pitchFamily="18" charset="0"/>
-                      </a:rPr>
-                      <m:t>𝑝</m:t>
-                    </m:r>
-                  </m:oMath>
-                </a14:m>
-                <a:r>
-                  <a:rPr dirty="0"/>
-                  <a:t> columns </a:t>
-                </a:r>
-                <a:r>
-                  <a:rPr lang="en-US" dirty="0"/>
-                  <a:t>of </a:t>
-                </a:r>
-                <a:r>
-                  <a:rPr lang="en-US" b="1" dirty="0"/>
-                  <a:t>independent</a:t>
-                </a:r>
-                <a:r>
-                  <a:rPr b="1" dirty="0"/>
-                  <a:t> variables </a:t>
-                </a:r>
-                <a:r>
-                  <a:rPr dirty="0"/>
-                  <a:t>or features</a:t>
-                </a:r>
-              </a:p>
-              <a:p>
-                <a:pPr lvl="1"/>
-                <a14:m>
-                  <m:oMath xmlns:m="http://schemas.openxmlformats.org/officeDocument/2006/math">
-                    <m:r>
-                      <a:rPr>
-                        <a:latin typeface="Cambria Math" panose="02040503050406030204" pitchFamily="18" charset="0"/>
-                      </a:rPr>
-                      <m:t>𝑛</m:t>
-                    </m:r>
-                  </m:oMath>
-                </a14:m>
-                <a:r>
-                  <a:rPr dirty="0"/>
-                  <a:t> rows of </a:t>
-                </a:r>
-                <a:r>
-                  <a:rPr b="1" dirty="0"/>
-                  <a:t>training cases</a:t>
-                </a:r>
-              </a:p>
-            </p:txBody>
-          </p:sp>
-        </mc:Choice>
-        <mc:Fallback xmlns="">
-          <p:sp>
-            <p:nvSpPr>
-              <p:cNvPr id="3" name="Content Placeholder 2"/>
-              <p:cNvSpPr>
-                <a:spLocks noGrp="1" noRot="1" noChangeAspect="1" noMove="1" noResize="1" noEditPoints="1" noAdjustHandles="1" noChangeArrowheads="1" noChangeShapeType="1" noTextEdit="1"/>
-              </p:cNvSpPr>
-              <p:nvPr>
-                <p:ph idx="1"/>
-              </p:nvPr>
-            </p:nvSpPr>
-            <p:spPr>
-              <a:xfrm>
-                <a:off x="457200" y="1200150"/>
-                <a:ext cx="8229600" cy="3583177"/>
-              </a:xfrm>
-              <a:blipFill>
-                <a:blip r:embed="rId2"/>
-                <a:stretch>
-                  <a:fillRect l="-1111" t="-1361"/>
-                </a:stretch>
-              </a:blipFill>
-            </p:spPr>
-            <p:txBody>
-              <a:bodyPr/>
-              <a:lstStyle/>
-              <a:p>
-                <a:r>
-                  <a:rPr lang="en-US">
-                    <a:noFill/>
-                  </a:rPr>
-                  <a:t> </a:t>
-                </a:r>
-              </a:p>
-            </p:txBody>
-          </p:sp>
-        </mc:Fallback>
-      </mc:AlternateContent>
-    </p:spTree>
-  </p:cSld>
-  <p:clrMapOvr>
-    <a:masterClrMapping/>
-  </p:clrMapOvr>
-</p:sld>
-</file>
-
-<file path=ppt/slides/slide11.xml><?xml version="1.0" encoding="utf-8"?>
-<p:sld xmlns:a="http://schemas.openxmlformats.org/drawingml/2006/main" xmlns:r="http://schemas.openxmlformats.org/officeDocument/2006/relationships" xmlns:p="http://schemas.openxmlformats.org/presentationml/2006/main">
-  <p:cSld>
-    <p:spTree>
-      <p:nvGrpSpPr>
-        <p:cNvPr id="1" name=""/>
-        <p:cNvGrpSpPr/>
-        <p:nvPr/>
-      </p:nvGrpSpPr>
-      <p:grpSpPr>
-        <a:xfrm>
-          <a:off x="0" y="0"/>
-          <a:ext cx="0" cy="0"/>
-          <a:chOff x="0" y="0"/>
-          <a:chExt cx="0" cy="0"/>
-        </a:xfrm>
-      </p:grpSpPr>
-      <p:sp>
-        <p:nvSpPr>
-          <p:cNvPr id="2" name="Title 1"/>
-          <p:cNvSpPr>
-            <a:spLocks noGrp="1"/>
-          </p:cNvSpPr>
-          <p:nvPr>
-            <p:ph type="title"/>
-          </p:nvPr>
-        </p:nvSpPr>
-        <p:spPr/>
-        <p:txBody>
-          <a:bodyPr/>
-          <a:lstStyle/>
-          <a:p>
-            <a:pPr marL="0" lvl="0" indent="0">
-              <a:buNone/>
-            </a:pPr>
-            <a:r>
-              <a:t>Formulating the Linear Model</a:t>
-            </a:r>
-          </a:p>
-        </p:txBody>
-      </p:sp>
-      <mc:AlternateContent xmlns:mc="http://schemas.openxmlformats.org/markup-compatibility/2006" xmlns:a14="http://schemas.microsoft.com/office/drawing/2010/main">
-        <mc:Choice Requires="a14">
+      <mc:AlternateContent xmlns:mc="http://schemas.openxmlformats.org/markup-compatibility/2006">
+        <mc:Choice xmlns:a14="http://schemas.microsoft.com/office/drawing/2010/main" Requires="a14">
           <p:sp>
             <p:nvSpPr>
               <p:cNvPr id="3" name="Content Placeholder 2"/>
@@ -4224,7 +3838,7 @@
                   <a:buNone/>
                 </a:pPr>
                 <a:r>
-                  <a:rPr dirty="0"/>
+                  <a:rPr lang="en-US" dirty="0"/>
                   <a:t>The general formulation of a linear model can be written:</a:t>
                 </a:r>
               </a:p>
@@ -4242,14 +3856,14 @@
                         <m:accPr>
                           <m:chr m:val="⃗"/>
                           <m:ctrlPr>
-                            <a:rPr i="1">
+                            <a:rPr lang="ar-AE" i="1">
                               <a:latin typeface="Cambria Math" panose="02040503050406030204" pitchFamily="18" charset="0"/>
                             </a:rPr>
                           </m:ctrlPr>
                         </m:accPr>
                         <m:e>
                           <m:r>
-                            <a:rPr>
+                            <a:rPr lang="ar-AE">
                               <a:latin typeface="Cambria Math" panose="02040503050406030204" pitchFamily="18" charset="0"/>
                             </a:rPr>
                             <m:t>𝑦</m:t>
@@ -4257,13 +3871,13 @@
                         </m:e>
                       </m:acc>
                       <m:r>
-                        <a:rPr>
+                        <a:rPr lang="ar-AE">
                           <a:latin typeface="Cambria Math" panose="02040503050406030204" pitchFamily="18" charset="0"/>
                         </a:rPr>
                         <m:t>=</m:t>
                       </m:r>
                       <m:r>
-                        <a:rPr>
+                        <a:rPr lang="ar-AE">
                           <a:latin typeface="Cambria Math" panose="02040503050406030204" pitchFamily="18" charset="0"/>
                         </a:rPr>
                         <m:t>𝐴</m:t>
@@ -4272,14 +3886,14 @@
                         <m:accPr>
                           <m:chr m:val="⃗"/>
                           <m:ctrlPr>
-                            <a:rPr i="1">
+                            <a:rPr lang="ar-AE" i="1">
                               <a:latin typeface="Cambria Math" panose="02040503050406030204" pitchFamily="18" charset="0"/>
                             </a:rPr>
                           </m:ctrlPr>
                         </m:accPr>
                         <m:e>
                           <m:r>
-                            <a:rPr>
+                            <a:rPr lang="ar-AE">
                               <a:latin typeface="Cambria Math" panose="02040503050406030204" pitchFamily="18" charset="0"/>
                             </a:rPr>
                             <m:t>𝑏</m:t>
@@ -4287,7 +3901,7 @@
                         </m:e>
                       </m:acc>
                       <m:r>
-                        <a:rPr>
+                        <a:rPr lang="ar-AE">
                           <a:latin typeface="Cambria Math" panose="02040503050406030204" pitchFamily="18" charset="0"/>
                         </a:rPr>
                         <m:t>+</m:t>
@@ -4296,14 +3910,14 @@
                         <m:accPr>
                           <m:chr m:val="⃗"/>
                           <m:ctrlPr>
-                            <a:rPr i="1">
+                            <a:rPr lang="ar-AE" i="1">
                               <a:latin typeface="Cambria Math" panose="02040503050406030204" pitchFamily="18" charset="0"/>
                             </a:rPr>
                           </m:ctrlPr>
                         </m:accPr>
                         <m:e>
                           <m:r>
-                            <a:rPr>
+                            <a:rPr lang="ar-AE">
                               <a:latin typeface="Cambria Math" panose="02040503050406030204" pitchFamily="18" charset="0"/>
                             </a:rPr>
                             <m:t>𝜖</m:t>
@@ -4313,7 +3927,7 @@
                     </m:oMath>
                   </m:oMathPara>
                 </a14:m>
-                <a:endParaRPr dirty="0"/>
+                <a:endParaRPr lang="ar-AE" dirty="0"/>
               </a:p>
               <a:p>
                 <a:pPr lvl="0"/>
@@ -4717,94 +4331,52 @@
                   </m:oMath>
                 </a14:m>
                 <a:r>
+                  <a:rPr lang="ar-AE" dirty="0"/>
+                  <a:t> </a:t>
+                </a:r>
+                <a:r>
                   <a:rPr lang="en-US" dirty="0"/>
-                  <a:t> </a:t>
-                </a:r>
-                <a:r>
-                  <a:rPr dirty="0"/>
-                  <a:t>is the vector representing</a:t>
-                </a:r>
-                <a:r>
-                  <a:rPr lang="en-US" dirty="0"/>
-                  <a:t> the</a:t>
-                </a:r>
-                <a:r>
-                  <a:rPr dirty="0"/>
-                  <a:t> </a:t>
+                  <a:t>is the n vector representing the </a:t>
                 </a:r>
                 <a:r>
                   <a:rPr lang="en-US" b="1" dirty="0"/>
                   <a:t>model residuals</a:t>
                 </a:r>
-                <a:endParaRPr b="1" dirty="0"/>
               </a:p>
               <a:p>
                 <a:pPr lvl="1"/>
                 <a:r>
                   <a:rPr lang="en-US" dirty="0"/>
-                  <a:t>Vector of</a:t>
-                </a:r>
-                <a:r>
-                  <a:rPr dirty="0"/>
-                  <a:t> </a:t>
+                  <a:t>Is </a:t>
+                </a:r>
+                <a:r>
+                  <a:rPr lang="en-US" b="1" dirty="0" err="1"/>
+                  <a:t>iid</a:t>
+                </a:r>
+                <a:r>
+                  <a:rPr lang="en-US" b="1" dirty="0"/>
+                  <a:t> Normally distributed with 0 mean</a:t>
+                </a:r>
+                <a:r>
+                  <a:rPr lang="en-US" dirty="0"/>
+                  <a:t>; </a:t>
                 </a:r>
                 <a14:m>
                   <m:oMath xmlns:m="http://schemas.openxmlformats.org/officeDocument/2006/math">
                     <m:r>
-                      <a:rPr>
-                        <a:latin typeface="Cambria Math" panose="02040503050406030204" pitchFamily="18" charset="0"/>
-                      </a:rPr>
-                      <m:t>𝑛</m:t>
-                    </m:r>
-                  </m:oMath>
-                </a14:m>
-                <a:r>
-                  <a:rPr dirty="0"/>
-                  <a:t> </a:t>
-                </a:r>
-                <a:r>
-                  <a:rPr lang="en-US" b="1" dirty="0"/>
-                  <a:t>prediction errors</a:t>
-                </a:r>
-              </a:p>
-              <a:p>
-                <a:pPr lvl="1"/>
-                <a:r>
-                  <a:rPr dirty="0"/>
-                  <a:t>Is </a:t>
-                </a:r>
-                <a:r>
-                  <a:rPr b="1" dirty="0" err="1"/>
-                  <a:t>iid</a:t>
-                </a:r>
-                <a:r>
-                  <a:rPr b="1" dirty="0"/>
-                  <a:t> Normally distributed</a:t>
-                </a:r>
-                <a:r>
-                  <a:rPr lang="en-US" b="1" dirty="0"/>
-                  <a:t> with 0 mean</a:t>
-                </a:r>
-                <a:r>
-                  <a:rPr dirty="0"/>
-                  <a:t>; </a:t>
-                </a:r>
-                <a14:m>
-                  <m:oMath xmlns:m="http://schemas.openxmlformats.org/officeDocument/2006/math">
-                    <m:r>
-                      <a:rPr>
+                      <a:rPr lang="en-US">
                         <a:latin typeface="Cambria Math" panose="02040503050406030204" pitchFamily="18" charset="0"/>
                       </a:rPr>
                       <m:t>𝜖</m:t>
                     </m:r>
                     <m:r>
-                      <a:rPr>
+                      <a:rPr lang="en-US">
                         <a:latin typeface="Cambria Math" panose="02040503050406030204" pitchFamily="18" charset="0"/>
                       </a:rPr>
                       <m:t>∼</m:t>
                     </m:r>
                     <m:r>
-                      <a:rPr>
+                      <a:rPr lang="en-US">
                         <a:latin typeface="Cambria Math" panose="02040503050406030204" pitchFamily="18" charset="0"/>
                       </a:rPr>
                       <m:t>𝒩</m:t>
@@ -4812,20 +4384,20 @@
                     <m:d>
                       <m:dPr>
                         <m:ctrlPr>
-                          <a:rPr i="1">
+                          <a:rPr lang="ar-AE" i="1">
                             <a:latin typeface="Cambria Math" panose="02040503050406030204" pitchFamily="18" charset="0"/>
                           </a:rPr>
                         </m:ctrlPr>
                       </m:dPr>
                       <m:e>
                         <m:r>
-                          <a:rPr>
+                          <a:rPr lang="ar-AE">
                             <a:latin typeface="Cambria Math" panose="02040503050406030204" pitchFamily="18" charset="0"/>
                           </a:rPr>
                           <m:t>0</m:t>
                         </m:r>
                         <m:r>
-                          <a:rPr>
+                          <a:rPr lang="ar-AE">
                             <a:latin typeface="Cambria Math" panose="02040503050406030204" pitchFamily="18" charset="0"/>
                           </a:rPr>
                           <m:t>,</m:t>
@@ -4833,14 +4405,14 @@
                         <m:sSup>
                           <m:sSupPr>
                             <m:ctrlPr>
-                              <a:rPr i="1">
+                              <a:rPr lang="ar-AE" i="1">
                                 <a:latin typeface="Cambria Math" panose="02040503050406030204" pitchFamily="18" charset="0"/>
                               </a:rPr>
                             </m:ctrlPr>
                           </m:sSupPr>
                           <m:e>
                             <m:r>
-                              <a:rPr>
+                              <a:rPr lang="ar-AE">
                                 <a:latin typeface="Cambria Math" panose="02040503050406030204" pitchFamily="18" charset="0"/>
                               </a:rPr>
                               <m:t>𝜎</m:t>
@@ -4848,7 +4420,7 @@
                           </m:e>
                           <m:sup>
                             <m:r>
-                              <a:rPr>
+                              <a:rPr lang="ar-AE">
                                 <a:latin typeface="Cambria Math" panose="02040503050406030204" pitchFamily="18" charset="0"/>
                               </a:rPr>
                               <m:t>2</m:t>
@@ -4859,12 +4431,48 @@
                     </m:d>
                   </m:oMath>
                 </a14:m>
+                <a:endParaRPr lang="ar-AE" dirty="0"/>
+              </a:p>
+              <a:p>
+                <a:pPr lvl="1"/>
+                <a:r>
+                  <a:rPr lang="en-US" b="1" dirty="0"/>
+                  <a:t>Residuals are only in </a:t>
+                </a:r>
+                <a14:m>
+                  <m:oMath xmlns:m="http://schemas.openxmlformats.org/officeDocument/2006/math">
+                    <m:r>
+                      <a:rPr lang="en-US" b="1" i="1" smtClean="0">
+                        <a:latin typeface="Cambria Math" panose="02040503050406030204" pitchFamily="18" charset="0"/>
+                      </a:rPr>
+                      <m:t>𝒚</m:t>
+                    </m:r>
+                  </m:oMath>
+                </a14:m>
+                <a:r>
+                  <a:rPr lang="en-US" b="1" dirty="0"/>
+                  <a:t> </a:t>
+                </a:r>
+                <a:r>
+                  <a:rPr lang="en-US" dirty="0"/>
+                  <a:t>not </a:t>
+                </a:r>
+                <a14:m>
+                  <m:oMath xmlns:m="http://schemas.openxmlformats.org/officeDocument/2006/math">
+                    <m:r>
+                      <a:rPr lang="en-US" b="0" i="1" smtClean="0">
+                        <a:latin typeface="Cambria Math" panose="02040503050406030204" pitchFamily="18" charset="0"/>
+                      </a:rPr>
+                      <m:t>𝑥</m:t>
+                    </m:r>
+                  </m:oMath>
+                </a14:m>
                 <a:endParaRPr dirty="0"/>
               </a:p>
             </p:txBody>
           </p:sp>
         </mc:Choice>
-        <mc:Fallback xmlns="">
+        <mc:Fallback>
           <p:sp>
             <p:nvSpPr>
               <p:cNvPr id="3" name="Content Placeholder 2"/>
@@ -4903,6 +4511,543 @@
         </mc:Fallback>
       </mc:AlternateContent>
     </p:spTree>
+  </p:cSld>
+  <p:clrMapOvr>
+    <a:masterClrMapping/>
+  </p:clrMapOvr>
+</p:sld>
+</file>
+
+<file path=ppt/slides/slide11.xml><?xml version="1.0" encoding="utf-8"?>
+<p:sld xmlns:a="http://schemas.openxmlformats.org/drawingml/2006/main" xmlns:r="http://schemas.openxmlformats.org/officeDocument/2006/relationships" xmlns:p="http://schemas.openxmlformats.org/presentationml/2006/main">
+  <p:cSld>
+    <p:spTree>
+      <p:nvGrpSpPr>
+        <p:cNvPr id="1" name=""/>
+        <p:cNvGrpSpPr/>
+        <p:nvPr/>
+      </p:nvGrpSpPr>
+      <p:grpSpPr>
+        <a:xfrm>
+          <a:off x="0" y="0"/>
+          <a:ext cx="0" cy="0"/>
+          <a:chOff x="0" y="0"/>
+          <a:chExt cx="0" cy="0"/>
+        </a:xfrm>
+      </p:grpSpPr>
+      <p:sp>
+        <p:nvSpPr>
+          <p:cNvPr id="2" name="Title 1"/>
+          <p:cNvSpPr>
+            <a:spLocks noGrp="1"/>
+          </p:cNvSpPr>
+          <p:nvPr>
+            <p:ph type="title"/>
+          </p:nvPr>
+        </p:nvSpPr>
+        <p:spPr/>
+        <p:txBody>
+          <a:bodyPr/>
+          <a:lstStyle/>
+          <a:p>
+            <a:pPr marL="0" lvl="0" indent="0">
+              <a:buNone/>
+            </a:pPr>
+            <a:r>
+              <a:t>Formulating the Linear Model</a:t>
+            </a:r>
+          </a:p>
+        </p:txBody>
+      </p:sp>
+      <mc:AlternateContent xmlns:mc="http://schemas.openxmlformats.org/markup-compatibility/2006">
+        <mc:Choice xmlns:a14="http://schemas.microsoft.com/office/drawing/2010/main" Requires="a14">
+          <p:sp>
+            <p:nvSpPr>
+              <p:cNvPr id="3" name="Content Placeholder 2"/>
+              <p:cNvSpPr>
+                <a:spLocks noGrp="1"/>
+              </p:cNvSpPr>
+              <p:nvPr>
+                <p:ph idx="1"/>
+              </p:nvPr>
+            </p:nvSpPr>
+            <p:spPr>
+              <a:xfrm>
+                <a:off x="457200" y="1200151"/>
+                <a:ext cx="8229600" cy="921257"/>
+              </a:xfrm>
+            </p:spPr>
+            <p:txBody>
+              <a:bodyPr>
+                <a:normAutofit/>
+              </a:bodyPr>
+              <a:lstStyle/>
+              <a:p>
+                <a:pPr marL="0" lvl="0" indent="0">
+                  <a:buNone/>
+                </a:pPr>
+                <a:r>
+                  <a:rPr lang="en-US" dirty="0"/>
+                  <a:t>The general formulation of a linear model can be written:</a:t>
+                </a:r>
+              </a:p>
+              <a:p>
+                <a:pPr marL="0" lvl="0" indent="0">
+                  <a:buNone/>
+                </a:pPr>
+                <a14:m>
+                  <m:oMathPara xmlns:m="http://schemas.openxmlformats.org/officeDocument/2006/math">
+                    <m:oMathParaPr>
+                      <m:jc m:val="center"/>
+                    </m:oMathParaPr>
+                    <m:oMath xmlns:m="http://schemas.openxmlformats.org/officeDocument/2006/math">
+                      <m:acc>
+                        <m:accPr>
+                          <m:chr m:val="⃗"/>
+                          <m:ctrlPr>
+                            <a:rPr lang="ar-AE" i="1">
+                              <a:latin typeface="Cambria Math" panose="02040503050406030204" pitchFamily="18" charset="0"/>
+                            </a:rPr>
+                          </m:ctrlPr>
+                        </m:accPr>
+                        <m:e>
+                          <m:r>
+                            <a:rPr lang="ar-AE">
+                              <a:latin typeface="Cambria Math" panose="02040503050406030204" pitchFamily="18" charset="0"/>
+                            </a:rPr>
+                            <m:t>𝑦</m:t>
+                          </m:r>
+                        </m:e>
+                      </m:acc>
+                      <m:r>
+                        <a:rPr lang="ar-AE">
+                          <a:latin typeface="Cambria Math" panose="02040503050406030204" pitchFamily="18" charset="0"/>
+                        </a:rPr>
+                        <m:t>=</m:t>
+                      </m:r>
+                      <m:r>
+                        <a:rPr lang="ar-AE">
+                          <a:latin typeface="Cambria Math" panose="02040503050406030204" pitchFamily="18" charset="0"/>
+                        </a:rPr>
+                        <m:t>𝐴</m:t>
+                      </m:r>
+                      <m:acc>
+                        <m:accPr>
+                          <m:chr m:val="⃗"/>
+                          <m:ctrlPr>
+                            <a:rPr lang="ar-AE" i="1">
+                              <a:latin typeface="Cambria Math" panose="02040503050406030204" pitchFamily="18" charset="0"/>
+                            </a:rPr>
+                          </m:ctrlPr>
+                        </m:accPr>
+                        <m:e>
+                          <m:r>
+                            <a:rPr lang="ar-AE">
+                              <a:latin typeface="Cambria Math" panose="02040503050406030204" pitchFamily="18" charset="0"/>
+                            </a:rPr>
+                            <m:t>𝑏</m:t>
+                          </m:r>
+                        </m:e>
+                      </m:acc>
+                      <m:r>
+                        <a:rPr lang="ar-AE">
+                          <a:latin typeface="Cambria Math" panose="02040503050406030204" pitchFamily="18" charset="0"/>
+                        </a:rPr>
+                        <m:t>+</m:t>
+                      </m:r>
+                      <m:acc>
+                        <m:accPr>
+                          <m:chr m:val="⃗"/>
+                          <m:ctrlPr>
+                            <a:rPr lang="ar-AE" i="1">
+                              <a:latin typeface="Cambria Math" panose="02040503050406030204" pitchFamily="18" charset="0"/>
+                            </a:rPr>
+                          </m:ctrlPr>
+                        </m:accPr>
+                        <m:e>
+                          <m:r>
+                            <a:rPr lang="ar-AE">
+                              <a:latin typeface="Cambria Math" panose="02040503050406030204" pitchFamily="18" charset="0"/>
+                            </a:rPr>
+                            <m:t>𝜖</m:t>
+                          </m:r>
+                        </m:e>
+                      </m:acc>
+                    </m:oMath>
+                  </m:oMathPara>
+                </a14:m>
+                <a:endParaRPr lang="ar-AE" dirty="0"/>
+              </a:p>
+            </p:txBody>
+          </p:sp>
+        </mc:Choice>
+        <mc:Fallback>
+          <p:sp>
+            <p:nvSpPr>
+              <p:cNvPr id="3" name="Content Placeholder 2"/>
+              <p:cNvSpPr>
+                <a:spLocks noGrp="1" noRot="1" noChangeAspect="1" noMove="1" noResize="1" noEditPoints="1" noAdjustHandles="1" noChangeArrowheads="1" noChangeShapeType="1" noTextEdit="1"/>
+              </p:cNvSpPr>
+              <p:nvPr>
+                <p:ph idx="1"/>
+              </p:nvPr>
+            </p:nvSpPr>
+            <p:spPr>
+              <a:xfrm>
+                <a:off x="457200" y="1200151"/>
+                <a:ext cx="8229600" cy="921257"/>
+              </a:xfrm>
+              <a:blipFill>
+                <a:blip r:embed="rId2"/>
+                <a:stretch>
+                  <a:fillRect l="-1111" t="-5298"/>
+                </a:stretch>
+              </a:blipFill>
+            </p:spPr>
+            <p:txBody>
+              <a:bodyPr/>
+              <a:lstStyle/>
+              <a:p>
+                <a:r>
+                  <a:rPr lang="en-US">
+                    <a:noFill/>
+                  </a:rPr>
+                  <a:t> </a:t>
+                </a:r>
+              </a:p>
+            </p:txBody>
+          </p:sp>
+        </mc:Fallback>
+      </mc:AlternateContent>
+      <p:pic>
+        <p:nvPicPr>
+          <p:cNvPr id="5" name="Picture 4">
+            <a:extLst>
+              <a:ext uri="{FF2B5EF4-FFF2-40B4-BE49-F238E27FC236}">
+                <a16:creationId xmlns:a16="http://schemas.microsoft.com/office/drawing/2014/main" id="{7172E5B8-265A-8F10-A02C-66087B1710A1}"/>
+              </a:ext>
+            </a:extLst>
+          </p:cNvPr>
+          <p:cNvPicPr>
+            <a:picLocks noChangeAspect="1"/>
+          </p:cNvPicPr>
+          <p:nvPr/>
+        </p:nvPicPr>
+        <p:blipFill>
+          <a:blip r:embed="rId3"/>
+          <a:stretch>
+            <a:fillRect/>
+          </a:stretch>
+        </p:blipFill>
+        <p:spPr>
+          <a:xfrm>
+            <a:off x="3153664" y="2013267"/>
+            <a:ext cx="5990336" cy="2976389"/>
+          </a:xfrm>
+          <a:prstGeom prst="rect">
+            <a:avLst/>
+          </a:prstGeom>
+        </p:spPr>
+      </p:pic>
+      <mc:AlternateContent xmlns:mc="http://schemas.openxmlformats.org/markup-compatibility/2006">
+        <mc:Choice xmlns:a14="http://schemas.microsoft.com/office/drawing/2010/main" Requires="a14">
+          <p:sp>
+            <p:nvSpPr>
+              <p:cNvPr id="6" name="Content Placeholder 2">
+                <a:extLst>
+                  <a:ext uri="{FF2B5EF4-FFF2-40B4-BE49-F238E27FC236}">
+                    <a16:creationId xmlns:a16="http://schemas.microsoft.com/office/drawing/2014/main" id="{C2A90F6B-8E2F-23C7-9124-1ECE7FA21D50}"/>
+                  </a:ext>
+                </a:extLst>
+              </p:cNvPr>
+              <p:cNvSpPr txBox="1">
+                <a:spLocks/>
+              </p:cNvSpPr>
+              <p:nvPr/>
+            </p:nvSpPr>
+            <p:spPr>
+              <a:xfrm>
+                <a:off x="260096" y="2258330"/>
+                <a:ext cx="3015488" cy="2179558"/>
+              </a:xfrm>
+              <a:prstGeom prst="rect">
+                <a:avLst/>
+              </a:prstGeom>
+            </p:spPr>
+            <p:txBody>
+              <a:bodyPr vert="horz" lIns="91440" tIns="45720" rIns="91440" bIns="45720" rtlCol="0">
+                <a:normAutofit/>
+              </a:bodyPr>
+              <a:lstStyle>
+                <a:lvl1pPr marL="342900" indent="-342900" algn="l" defTabSz="342900" rtl="0" eaLnBrk="1" latinLnBrk="0" hangingPunct="1">
+                  <a:spcBef>
+                    <a:spcPct val="20000"/>
+                  </a:spcBef>
+                  <a:buFont typeface="Arial"/>
+                  <a:buChar char="•"/>
+                  <a:defRPr sz="2400" kern="1200">
+                    <a:solidFill>
+                      <a:schemeClr val="tx1"/>
+                    </a:solidFill>
+                    <a:latin typeface="+mn-lt"/>
+                    <a:ea typeface="+mn-ea"/>
+                    <a:cs typeface="+mn-cs"/>
+                  </a:defRPr>
+                </a:lvl1pPr>
+                <a:lvl2pPr marL="685800" indent="-342900" algn="l" defTabSz="342900" rtl="0" eaLnBrk="1" latinLnBrk="0" hangingPunct="1">
+                  <a:spcBef>
+                    <a:spcPct val="20000"/>
+                  </a:spcBef>
+                  <a:buFont typeface="Arial"/>
+                  <a:buChar char="–"/>
+                  <a:defRPr sz="2100" kern="1200">
+                    <a:solidFill>
+                      <a:schemeClr val="tx1"/>
+                    </a:solidFill>
+                    <a:latin typeface="+mn-lt"/>
+                    <a:ea typeface="+mn-ea"/>
+                    <a:cs typeface="+mn-cs"/>
+                  </a:defRPr>
+                </a:lvl2pPr>
+                <a:lvl3pPr marL="1028700" indent="-342900" algn="l" defTabSz="342900" rtl="0" eaLnBrk="1" latinLnBrk="0" hangingPunct="1">
+                  <a:spcBef>
+                    <a:spcPct val="20000"/>
+                  </a:spcBef>
+                  <a:buFont typeface="Arial"/>
+                  <a:buChar char="•"/>
+                  <a:defRPr sz="1800" kern="1200">
+                    <a:solidFill>
+                      <a:schemeClr val="tx1"/>
+                    </a:solidFill>
+                    <a:latin typeface="+mn-lt"/>
+                    <a:ea typeface="+mn-ea"/>
+                    <a:cs typeface="+mn-cs"/>
+                  </a:defRPr>
+                </a:lvl3pPr>
+                <a:lvl4pPr marL="1371600" indent="-342900" algn="l" defTabSz="342900" rtl="0" eaLnBrk="1" latinLnBrk="0" hangingPunct="1">
+                  <a:spcBef>
+                    <a:spcPct val="20000"/>
+                  </a:spcBef>
+                  <a:buFont typeface="Arial"/>
+                  <a:buChar char="–"/>
+                  <a:defRPr sz="1500" kern="1200">
+                    <a:solidFill>
+                      <a:schemeClr val="tx1"/>
+                    </a:solidFill>
+                    <a:latin typeface="+mn-lt"/>
+                    <a:ea typeface="+mn-ea"/>
+                    <a:cs typeface="+mn-cs"/>
+                  </a:defRPr>
+                </a:lvl4pPr>
+                <a:lvl5pPr marL="1714500" indent="-342900" algn="l" defTabSz="342900" rtl="0" eaLnBrk="1" latinLnBrk="0" hangingPunct="1">
+                  <a:spcBef>
+                    <a:spcPct val="20000"/>
+                  </a:spcBef>
+                  <a:buFont typeface="Arial"/>
+                  <a:buChar char="»"/>
+                  <a:defRPr sz="1500" kern="1200">
+                    <a:solidFill>
+                      <a:schemeClr val="tx1"/>
+                    </a:solidFill>
+                    <a:latin typeface="+mn-lt"/>
+                    <a:ea typeface="+mn-ea"/>
+                    <a:cs typeface="+mn-cs"/>
+                  </a:defRPr>
+                </a:lvl5pPr>
+                <a:lvl6pPr marL="2057400" indent="-342900" algn="l" defTabSz="342900" rtl="0" eaLnBrk="1" latinLnBrk="0" hangingPunct="1">
+                  <a:spcBef>
+                    <a:spcPct val="20000"/>
+                  </a:spcBef>
+                  <a:buFont typeface="Arial"/>
+                  <a:buChar char="•"/>
+                  <a:defRPr sz="1500" kern="1200">
+                    <a:solidFill>
+                      <a:schemeClr val="tx1"/>
+                    </a:solidFill>
+                    <a:latin typeface="+mn-lt"/>
+                    <a:ea typeface="+mn-ea"/>
+                    <a:cs typeface="+mn-cs"/>
+                  </a:defRPr>
+                </a:lvl6pPr>
+                <a:lvl7pPr marL="2400300" indent="-342900" algn="l" defTabSz="342900" rtl="0" eaLnBrk="1" latinLnBrk="0" hangingPunct="1">
+                  <a:spcBef>
+                    <a:spcPct val="20000"/>
+                  </a:spcBef>
+                  <a:buFont typeface="Arial"/>
+                  <a:buChar char="•"/>
+                  <a:defRPr sz="1500" kern="1200">
+                    <a:solidFill>
+                      <a:schemeClr val="tx1"/>
+                    </a:solidFill>
+                    <a:latin typeface="+mn-lt"/>
+                    <a:ea typeface="+mn-ea"/>
+                    <a:cs typeface="+mn-cs"/>
+                  </a:defRPr>
+                </a:lvl7pPr>
+                <a:lvl8pPr marL="2743200" indent="-342900" algn="l" defTabSz="342900" rtl="0" eaLnBrk="1" latinLnBrk="0" hangingPunct="1">
+                  <a:spcBef>
+                    <a:spcPct val="20000"/>
+                  </a:spcBef>
+                  <a:buFont typeface="Arial"/>
+                  <a:buChar char="•"/>
+                  <a:defRPr sz="1500" kern="1200">
+                    <a:solidFill>
+                      <a:schemeClr val="tx1"/>
+                    </a:solidFill>
+                    <a:latin typeface="+mn-lt"/>
+                    <a:ea typeface="+mn-ea"/>
+                    <a:cs typeface="+mn-cs"/>
+                  </a:defRPr>
+                </a:lvl8pPr>
+                <a:lvl9pPr marL="3086100" indent="-342900" algn="l" defTabSz="342900" rtl="0" eaLnBrk="1" latinLnBrk="0" hangingPunct="1">
+                  <a:spcBef>
+                    <a:spcPct val="20000"/>
+                  </a:spcBef>
+                  <a:buFont typeface="Arial"/>
+                  <a:buChar char="•"/>
+                  <a:defRPr sz="1500" kern="1200">
+                    <a:solidFill>
+                      <a:schemeClr val="tx1"/>
+                    </a:solidFill>
+                    <a:latin typeface="+mn-lt"/>
+                    <a:ea typeface="+mn-ea"/>
+                    <a:cs typeface="+mn-cs"/>
+                  </a:defRPr>
+                </a:lvl9pPr>
+              </a:lstStyle>
+              <a:p>
+                <a14:m>
+                  <m:oMath xmlns:m="http://schemas.openxmlformats.org/officeDocument/2006/math">
+                    <m:acc>
+                      <m:accPr>
+                        <m:chr m:val="⃗"/>
+                        <m:ctrlPr>
+                          <a:rPr lang="ar-AE" i="1">
+                            <a:latin typeface="Cambria Math" panose="02040503050406030204" pitchFamily="18" charset="0"/>
+                          </a:rPr>
+                        </m:ctrlPr>
+                      </m:accPr>
+                      <m:e>
+                        <m:r>
+                          <a:rPr lang="ar-AE">
+                            <a:latin typeface="Cambria Math" panose="02040503050406030204" pitchFamily="18" charset="0"/>
+                          </a:rPr>
+                          <m:t>𝜖</m:t>
+                        </m:r>
+                      </m:e>
+                    </m:acc>
+                  </m:oMath>
+                </a14:m>
+                <a:r>
+                  <a:rPr lang="ar-AE" dirty="0"/>
+                  <a:t> </a:t>
+                </a:r>
+                <a:r>
+                  <a:rPr lang="en-US" dirty="0"/>
+                  <a:t>is the n vector representing the </a:t>
+                </a:r>
+                <a:r>
+                  <a:rPr lang="en-US" b="1" dirty="0"/>
+                  <a:t>model residuals</a:t>
+                </a:r>
+              </a:p>
+              <a:p>
+                <a:r>
+                  <a:rPr lang="en-US" b="1" dirty="0"/>
+                  <a:t>Errors are </a:t>
+                </a:r>
+                <a:r>
+                  <a:rPr lang="en-US" b="1" dirty="0" err="1"/>
+                  <a:t>iid</a:t>
+                </a:r>
+                <a:r>
+                  <a:rPr lang="en-US" b="1" dirty="0"/>
+                  <a:t> in </a:t>
+                </a:r>
+                <a14:m>
+                  <m:oMath xmlns:m="http://schemas.openxmlformats.org/officeDocument/2006/math">
+                    <m:r>
+                      <a:rPr lang="en-US" b="1" i="1" smtClean="0">
+                        <a:latin typeface="Cambria Math" panose="02040503050406030204" pitchFamily="18" charset="0"/>
+                      </a:rPr>
+                      <m:t>𝒚</m:t>
+                    </m:r>
+                  </m:oMath>
+                </a14:m>
+                <a:r>
+                  <a:rPr lang="en-US" b="1" dirty="0"/>
+                  <a:t> </a:t>
+                </a:r>
+                <a:r>
+                  <a:rPr lang="en-US" dirty="0"/>
+                  <a:t>not </a:t>
+                </a:r>
+                <a14:m>
+                  <m:oMath xmlns:m="http://schemas.openxmlformats.org/officeDocument/2006/math">
+                    <m:r>
+                      <a:rPr lang="en-US" i="1" smtClean="0">
+                        <a:latin typeface="Cambria Math" panose="02040503050406030204" pitchFamily="18" charset="0"/>
+                      </a:rPr>
+                      <m:t>𝑥</m:t>
+                    </m:r>
+                  </m:oMath>
+                </a14:m>
+                <a:endParaRPr lang="en-US" b="1" dirty="0"/>
+              </a:p>
+            </p:txBody>
+          </p:sp>
+        </mc:Choice>
+        <mc:Fallback>
+          <p:sp>
+            <p:nvSpPr>
+              <p:cNvPr id="6" name="Content Placeholder 2">
+                <a:extLst>
+                  <a:ext uri="{FF2B5EF4-FFF2-40B4-BE49-F238E27FC236}">
+                    <a16:creationId xmlns:a16="http://schemas.microsoft.com/office/drawing/2014/main" id="{C2A90F6B-8E2F-23C7-9124-1ECE7FA21D50}"/>
+                  </a:ext>
+                </a:extLst>
+              </p:cNvPr>
+              <p:cNvSpPr txBox="1">
+                <a:spLocks noRot="1" noChangeAspect="1" noMove="1" noResize="1" noEditPoints="1" noAdjustHandles="1" noChangeArrowheads="1" noChangeShapeType="1" noTextEdit="1"/>
+              </p:cNvSpPr>
+              <p:nvPr/>
+            </p:nvSpPr>
+            <p:spPr>
+              <a:xfrm>
+                <a:off x="260096" y="2258330"/>
+                <a:ext cx="3015488" cy="2179558"/>
+              </a:xfrm>
+              <a:prstGeom prst="rect">
+                <a:avLst/>
+              </a:prstGeom>
+              <a:blipFill>
+                <a:blip r:embed="rId4"/>
+                <a:stretch>
+                  <a:fillRect l="-2834" t="-4190"/>
+                </a:stretch>
+              </a:blipFill>
+            </p:spPr>
+            <p:txBody>
+              <a:bodyPr/>
+              <a:lstStyle/>
+              <a:p>
+                <a:r>
+                  <a:rPr lang="en-US">
+                    <a:noFill/>
+                  </a:rPr>
+                  <a:t> </a:t>
+                </a:r>
+              </a:p>
+            </p:txBody>
+          </p:sp>
+        </mc:Fallback>
+      </mc:AlternateContent>
+    </p:spTree>
+    <p:extLst>
+      <p:ext uri="{BB962C8B-B14F-4D97-AF65-F5344CB8AC3E}">
+        <p14:creationId xmlns:p14="http://schemas.microsoft.com/office/powerpoint/2010/main" val="291832387"/>
+      </p:ext>
+    </p:extLst>
   </p:cSld>
   <p:clrMapOvr>
     <a:masterClrMapping/>
@@ -4951,8 +5096,8 @@
           </a:p>
         </p:txBody>
       </p:sp>
-      <mc:AlternateContent xmlns:mc="http://schemas.openxmlformats.org/markup-compatibility/2006" xmlns:a14="http://schemas.microsoft.com/office/drawing/2010/main">
-        <mc:Choice Requires="a14">
+      <mc:AlternateContent xmlns:mc="http://schemas.openxmlformats.org/markup-compatibility/2006">
+        <mc:Choice xmlns:a14="http://schemas.microsoft.com/office/drawing/2010/main" Requires="a14">
           <p:sp>
             <p:nvSpPr>
               <p:cNvPr id="3" name="Content Placeholder 2"/>
@@ -5133,6 +5278,62 @@
                                     </m:r>
                                   </m:sub>
                                 </m:sSub>
+                              </m:e>
+                            </m:mr>
+                          </m:m>
+                        </m:e>
+                      </m:d>
+                      <m:r>
+                        <a:rPr lang="en-US" b="0" i="1" smtClean="0">
+                          <a:latin typeface="Cambria Math" panose="02040503050406030204" pitchFamily="18" charset="0"/>
+                        </a:rPr>
+                        <m:t>=</m:t>
+                      </m:r>
+                      <m:d>
+                        <m:dPr>
+                          <m:begChr m:val="["/>
+                          <m:endChr m:val="]"/>
+                          <m:ctrlPr>
+                            <a:rPr lang="ar-AE" i="1">
+                              <a:latin typeface="Cambria Math" panose="02040503050406030204" pitchFamily="18" charset="0"/>
+                            </a:rPr>
+                          </m:ctrlPr>
+                        </m:dPr>
+                        <m:e>
+                          <m:m>
+                            <m:mPr>
+                              <m:mcs>
+                                <m:mc>
+                                  <m:mcPr>
+                                    <m:count m:val="1"/>
+                                    <m:mcJc m:val="center"/>
+                                  </m:mcPr>
+                                </m:mc>
+                              </m:mcs>
+                              <m:ctrlPr>
+                                <a:rPr lang="ar-AE" i="1">
+                                  <a:latin typeface="Cambria Math" panose="02040503050406030204" pitchFamily="18" charset="0"/>
+                                </a:rPr>
+                              </m:ctrlPr>
+                            </m:mPr>
+                            <m:mr>
+                              <m:e>
+                                <m:r>
+                                  <a:rPr lang="en-US" b="0" i="1" smtClean="0">
+                                    <a:latin typeface="Cambria Math" panose="02040503050406030204" pitchFamily="18" charset="0"/>
+                                  </a:rPr>
+                                  <m:t>𝑖𝑛𝑡𝑒𝑟𝑐𝑒𝑝𝑡</m:t>
+                                </m:r>
+                              </m:e>
+                            </m:mr>
+                            <m:mr>
+                              <m:e>
+                                <m:r>
+                                  <a:rPr lang="en-US" b="0" i="1" smtClean="0">
+                                    <a:latin typeface="Cambria Math" panose="02040503050406030204" pitchFamily="18" charset="0"/>
+                                  </a:rPr>
+                                  <m:t>𝑠𝑙𝑜𝑝𝑒</m:t>
+                                </m:r>
                               </m:e>
                             </m:mr>
                           </m:m>
@@ -5677,7 +5878,7 @@
             </p:txBody>
           </p:sp>
         </mc:Choice>
-        <mc:Fallback xmlns="">
+        <mc:Fallback>
           <p:sp>
             <p:nvSpPr>
               <p:cNvPr id="3" name="Content Placeholder 2"/>
@@ -5764,8 +5965,8 @@
           </a:p>
         </p:txBody>
       </p:sp>
-      <mc:AlternateContent xmlns:mc="http://schemas.openxmlformats.org/markup-compatibility/2006" xmlns:a14="http://schemas.microsoft.com/office/drawing/2010/main">
-        <mc:Choice Requires="a14">
+      <mc:AlternateContent xmlns:mc="http://schemas.openxmlformats.org/markup-compatibility/2006">
+        <mc:Choice xmlns:a14="http://schemas.microsoft.com/office/drawing/2010/main" Requires="a14">
           <p:sp>
             <p:nvSpPr>
               <p:cNvPr id="3" name="Content Placeholder 2"/>
@@ -6290,7 +6491,7 @@
                 </a:r>
                 <a:r>
                   <a:rPr lang="en-US" dirty="0"/>
-                  <a:t>, or else the model would be </a:t>
+                  <a:t>, else the model would be </a:t>
                 </a:r>
                 <a:r>
                   <a:rPr lang="en-US" b="1" dirty="0"/>
@@ -6418,13 +6619,6 @@
                       <m:t>constant</m:t>
                     </m:r>
                     <m:r>
-                      <a:rPr lang="en-US" b="0" i="0" smtClean="0">
-                        <a:latin typeface="Cambria Math" panose="02040503050406030204" pitchFamily="18" charset="0"/>
-                        <a:ea typeface="Cambria Math" panose="02040503050406030204" pitchFamily="18" charset="0"/>
-                      </a:rPr>
-                      <m:t>, </m:t>
-                    </m:r>
-                    <m:r>
                       <a:rPr lang="en-US" b="0" i="1" smtClean="0">
                         <a:latin typeface="Cambria Math" panose="02040503050406030204" pitchFamily="18" charset="0"/>
                         <a:ea typeface="Cambria Math" panose="02040503050406030204" pitchFamily="18" charset="0"/>
@@ -6453,7 +6647,7 @@
             </p:txBody>
           </p:sp>
         </mc:Choice>
-        <mc:Fallback xmlns="">
+        <mc:Fallback>
           <p:sp>
             <p:nvSpPr>
               <p:cNvPr id="3" name="Content Placeholder 2"/>
@@ -6468,7 +6662,7 @@
               <a:blipFill>
                 <a:blip r:embed="rId3"/>
                 <a:stretch>
-                  <a:fillRect l="-1111" t="-1436" r="-889" b="-898"/>
+                  <a:fillRect l="-1111" t="-1436" r="-519" b="-898"/>
                 </a:stretch>
               </a:blipFill>
             </p:spPr>
@@ -6859,8 +7053,8 @@
           </a:p>
         </p:txBody>
       </p:sp>
-      <mc:AlternateContent xmlns:mc="http://schemas.openxmlformats.org/markup-compatibility/2006" xmlns:a14="http://schemas.microsoft.com/office/drawing/2010/main">
-        <mc:Choice Requires="a14">
+      <mc:AlternateContent xmlns:mc="http://schemas.openxmlformats.org/markup-compatibility/2006">
+        <mc:Choice xmlns:a14="http://schemas.microsoft.com/office/drawing/2010/main" Requires="a14">
           <p:sp>
             <p:nvSpPr>
               <p:cNvPr id="3" name="Content Placeholder 2"/>
@@ -6922,18 +7116,6 @@
                       <a:rPr>
                         <a:latin typeface="Cambria Math" panose="02040503050406030204" pitchFamily="18" charset="0"/>
                       </a:rPr>
-                      <m:t>𝑝</m:t>
-                    </m:r>
-                    <m:r>
-                      <a:rPr>
-                        <a:latin typeface="Cambria Math" panose="02040503050406030204" pitchFamily="18" charset="0"/>
-                      </a:rPr>
-                      <m:t>=</m:t>
-                    </m:r>
-                    <m:r>
-                      <a:rPr>
-                        <a:latin typeface="Cambria Math" panose="02040503050406030204" pitchFamily="18" charset="0"/>
-                      </a:rPr>
                       <m:t>2</m:t>
                     </m:r>
                   </m:oMath>
@@ -6946,7 +7128,15 @@
               <a:p>
                 <a:r>
                   <a:rPr dirty="0"/>
-                  <a:t>First column is predictor variable</a:t>
+                  <a:t>First column is </a:t>
+                </a:r>
+                <a:r>
+                  <a:rPr lang="en-US" dirty="0"/>
+                  <a:t>independent or predictor</a:t>
+                </a:r>
+                <a:r>
+                  <a:rPr dirty="0"/>
+                  <a:t> variable</a:t>
                 </a:r>
               </a:p>
               <a:p>
@@ -7253,7 +7443,7 @@
             </p:txBody>
           </p:sp>
         </mc:Choice>
-        <mc:Fallback xmlns="">
+        <mc:Fallback>
           <p:sp>
             <p:nvSpPr>
               <p:cNvPr id="3" name="Content Placeholder 2"/>
@@ -10049,7 +10239,7 @@
               <a:buNone/>
             </a:pPr>
             <a:r>
-              <a:t>Welcome to the Second Half of CSCI E-83!</a:t>
+              <a:t>Review</a:t>
             </a:r>
           </a:p>
         </p:txBody>
@@ -10067,7 +10257,7 @@
         <p:spPr/>
         <p:txBody>
           <a:bodyPr>
-            <a:normAutofit fontScale="70000" lnSpcReduction="20000"/>
+            <a:normAutofit fontScale="55000" lnSpcReduction="20000"/>
           </a:bodyPr>
           <a:lstStyle/>
           <a:p>
@@ -10075,98 +10265,80 @@
               <a:buNone/>
             </a:pPr>
             <a:r>
-              <a:rPr dirty="0"/>
-              <a:t>Plan going forward:</a:t>
+              <a:t>Bayesian analysis is a contrast to frequentist methods</a:t>
             </a:r>
           </a:p>
           <a:p>
             <a:pPr lvl="0"/>
             <a:r>
-              <a:rPr dirty="0"/>
-              <a:t>Week 8, Oct 24: Introduction to Linear Models</a:t>
-            </a:r>
+              <a:t>The objective of Bayesian analysis is to compute a posterior distribution</a:t>
+            </a:r>
+            <a:br/>
+            <a:endParaRPr/>
           </a:p>
           <a:p>
             <a:pPr lvl="0"/>
             <a:r>
-              <a:rPr dirty="0"/>
-              <a:t>Week 9, Oct 31: Linear Models Part 2 - Categorical data and nonlinear response models</a:t>
+              <a:t>Contrast with frequentist statistics; computing a point estimate and confidence interval from a sample</a:t>
             </a:r>
           </a:p>
           <a:p>
             <a:pPr lvl="0"/>
             <a:r>
-              <a:rPr dirty="0"/>
-              <a:t>Week 10, Nov 7: Linear Models Part 3 - Regularization and sparse models</a:t>
-            </a:r>
+              <a:t>Bayesian models allows expressing prior information in the form of a prior distribution</a:t>
+            </a:r>
+            <a:br/>
+            <a:endParaRPr/>
           </a:p>
           <a:p>
             <a:pPr lvl="0"/>
             <a:r>
-              <a:rPr dirty="0"/>
-              <a:t>Week 11, Nov14: Time Series Models</a:t>
+              <a:t>Selection of prior distributions can be performed in a number of ways</a:t>
             </a:r>
           </a:p>
           <a:p>
             <a:pPr lvl="0"/>
             <a:r>
-              <a:rPr dirty="0"/>
-              <a:t>Nov 18: Project proposal due</a:t>
-            </a:r>
+              <a:t>The posterior distribution is said to quantify our current </a:t>
+            </a:r>
+            <a:r>
+              <a:rPr b="1"/>
+              <a:t>belief</a:t>
+            </a:r>
+            <a:br/>
+            <a:endParaRPr/>
           </a:p>
           <a:p>
             <a:pPr lvl="0"/>
             <a:r>
-              <a:rPr dirty="0"/>
-              <a:t>Week12, Nov 23: Bayes MCMC methods</a:t>
-            </a:r>
+              <a:t>We update beliefs based on additional data or evidence</a:t>
+            </a:r>
+            <a:br/>
+            <a:endParaRPr/>
           </a:p>
           <a:p>
             <a:pPr lvl="0"/>
             <a:r>
-              <a:rPr dirty="0"/>
-              <a:t>Week 13, Nov 28: Hierarchical </a:t>
-            </a:r>
-            <a:r>
-              <a:t>Bayesian models</a:t>
-            </a:r>
-            <a:endParaRPr dirty="0"/>
+              <a:t>A critical difference with frequentist models which must be computed from a complete sample</a:t>
+            </a:r>
+            <a:br/>
+            <a:endParaRPr/>
           </a:p>
           <a:p>
             <a:pPr lvl="0"/>
             <a:r>
-              <a:rPr dirty="0"/>
-              <a:t>Week 14, Dec 5: - More on time series? - No assignment</a:t>
-            </a:r>
-            <a:br>
-              <a:rPr dirty="0"/>
-            </a:br>
-            <a:endParaRPr dirty="0"/>
+              <a:t>Inference can be performed on the posterior distribution by finding the maximum a postiori (MAP) value and a credible interval</a:t>
+            </a:r>
           </a:p>
           <a:p>
             <a:pPr lvl="0"/>
             <a:r>
-              <a:rPr dirty="0"/>
-              <a:t>Dec 21: Submit Graduate Independent Projects</a:t>
-            </a:r>
-          </a:p>
-          <a:p>
-            <a:pPr marL="0" lvl="0" indent="0">
-              <a:buNone/>
-            </a:pPr>
-            <a:r>
-              <a:rPr dirty="0"/>
-              <a:t>Let me know if you have suggestions to update this schedule</a:t>
+              <a:t>Predictions are made by simulating from the posterior distribution a</a:t>
             </a:r>
           </a:p>
         </p:txBody>
       </p:sp>
     </p:spTree>
-    <p:extLst>
-      <p:ext uri="{BB962C8B-B14F-4D97-AF65-F5344CB8AC3E}">
-        <p14:creationId xmlns:p14="http://schemas.microsoft.com/office/powerpoint/2010/main" val="97211278"/>
-      </p:ext>
-    </p:extLst>
   </p:cSld>
   <p:clrMapOvr>
     <a:masterClrMapping/>
@@ -11235,8 +11407,8 @@
           </a:p>
         </p:txBody>
       </p:sp>
-      <mc:AlternateContent xmlns:mc="http://schemas.openxmlformats.org/markup-compatibility/2006" xmlns:a14="http://schemas.microsoft.com/office/drawing/2010/main">
-        <mc:Choice Requires="a14">
+      <mc:AlternateContent xmlns:mc="http://schemas.openxmlformats.org/markup-compatibility/2006">
+        <mc:Choice xmlns:a14="http://schemas.microsoft.com/office/drawing/2010/main" Requires="a14">
           <p:sp>
             <p:nvSpPr>
               <p:cNvPr id="3" name="Content Placeholder 2"/>
@@ -11264,7 +11436,15 @@
                 </a:pPr>
                 <a:r>
                   <a:rPr lang="en-US" sz="1600" dirty="0"/>
-                  <a:t>What is the relationship between the normal equations, least squares and maximum likelihood?</a:t>
+                  <a:t>What is the relationship between the normal equations, </a:t>
+                </a:r>
+                <a:r>
+                  <a:rPr lang="en-US" sz="1600" b="1" dirty="0"/>
+                  <a:t>least squares and maximum likelihood</a:t>
+                </a:r>
+                <a:r>
+                  <a:rPr lang="en-US" sz="1600" dirty="0"/>
+                  <a:t>?</a:t>
                 </a:r>
               </a:p>
               <a:p>
@@ -12501,7 +12681,7 @@
             </p:txBody>
           </p:sp>
         </mc:Choice>
-        <mc:Fallback xmlns="">
+        <mc:Fallback>
           <p:sp>
             <p:nvSpPr>
               <p:cNvPr id="3" name="Content Placeholder 2"/>
@@ -14178,8 +14358,8 @@
           </a:p>
         </p:txBody>
       </p:sp>
-      <mc:AlternateContent xmlns:mc="http://schemas.openxmlformats.org/markup-compatibility/2006" xmlns:a14="http://schemas.microsoft.com/office/drawing/2010/main">
-        <mc:Choice Requires="a14">
+      <mc:AlternateContent xmlns:mc="http://schemas.openxmlformats.org/markup-compatibility/2006">
+        <mc:Choice xmlns:a14="http://schemas.microsoft.com/office/drawing/2010/main" Requires="a14">
           <p:sp>
             <p:nvSpPr>
               <p:cNvPr id="3" name="Content Placeholder 2"/>
@@ -14206,30 +14386,30 @@
                   <a:buNone/>
                 </a:pPr>
                 <a:r>
-                  <a:rPr sz="2200" dirty="0"/>
+                  <a:rPr lang="en-US" sz="2200" dirty="0"/>
                   <a:t>How do we specify the model formula with </a:t>
                 </a:r>
                 <a:r>
-                  <a:rPr sz="2200" dirty="0" err="1"/>
+                  <a:rPr lang="en-US" sz="2200" dirty="0" err="1"/>
                   <a:t>statsmodels</a:t>
                 </a:r>
                 <a:r>
-                  <a:rPr sz="2200" dirty="0"/>
+                  <a:rPr lang="en-US" sz="2200" dirty="0"/>
                   <a:t>?</a:t>
                 </a:r>
               </a:p>
               <a:p>
                 <a:pPr lvl="0"/>
                 <a:r>
-                  <a:rPr sz="2200" dirty="0"/>
+                  <a:rPr lang="en-US" sz="2200" dirty="0"/>
                   <a:t>Example; dependent variable (dv) is modeled by two independent variables (var1 and var2) and the </a:t>
                 </a:r>
                 <a:r>
-                  <a:rPr sz="2200" b="1" dirty="0"/>
+                  <a:rPr lang="en-US" sz="2200" b="1" dirty="0"/>
                   <a:t>interaction term</a:t>
                 </a:r>
                 <a:r>
-                  <a:rPr sz="2200" dirty="0"/>
+                  <a:rPr lang="en-US" sz="2200" dirty="0"/>
                   <a:t> with no intercept term:</a:t>
                 </a:r>
               </a:p>
@@ -14244,151 +14424,151 @@
                     </m:oMathParaPr>
                     <m:oMath xmlns:m="http://schemas.openxmlformats.org/officeDocument/2006/math">
                       <m:r>
-                        <a:rPr sz="2000">
+                        <a:rPr lang="en-US" sz="2000">
                           <a:latin typeface="Cambria Math" panose="02040503050406030204" pitchFamily="18" charset="0"/>
                         </a:rPr>
                         <m:t>𝑑𝑣</m:t>
                       </m:r>
                       <m:r>
-                        <a:rPr sz="2000">
+                        <a:rPr lang="en-US" sz="2000">
                           <a:latin typeface="Cambria Math" panose="02040503050406030204" pitchFamily="18" charset="0"/>
                         </a:rPr>
                         <m:t>∼−</m:t>
                       </m:r>
                       <m:r>
-                        <a:rPr sz="2000">
+                        <a:rPr lang="en-US" sz="2000">
                           <a:latin typeface="Cambria Math" panose="02040503050406030204" pitchFamily="18" charset="0"/>
                         </a:rPr>
                         <m:t>1</m:t>
                       </m:r>
                       <m:r>
-                        <a:rPr sz="2000">
+                        <a:rPr lang="en-US" sz="2000">
                           <a:latin typeface="Cambria Math" panose="02040503050406030204" pitchFamily="18" charset="0"/>
                         </a:rPr>
                         <m:t>+</m:t>
                       </m:r>
                       <m:r>
-                        <a:rPr sz="2000">
+                        <a:rPr lang="en-US" sz="2000">
                           <a:latin typeface="Cambria Math" panose="02040503050406030204" pitchFamily="18" charset="0"/>
                         </a:rPr>
                         <m:t>𝑣𝑎𝑟</m:t>
                       </m:r>
                       <m:r>
-                        <a:rPr sz="2000">
+                        <a:rPr lang="en-US" sz="2000">
                           <a:latin typeface="Cambria Math" panose="02040503050406030204" pitchFamily="18" charset="0"/>
                         </a:rPr>
                         <m:t>1</m:t>
                       </m:r>
                       <m:r>
-                        <a:rPr sz="2000">
+                        <a:rPr lang="en-US" sz="2000">
                           <a:latin typeface="Cambria Math" panose="02040503050406030204" pitchFamily="18" charset="0"/>
                         </a:rPr>
                         <m:t>∗</m:t>
                       </m:r>
                       <m:r>
-                        <a:rPr sz="2000">
+                        <a:rPr lang="en-US" sz="2000">
                           <a:latin typeface="Cambria Math" panose="02040503050406030204" pitchFamily="18" charset="0"/>
                         </a:rPr>
                         <m:t>𝑣𝑎𝑟</m:t>
                       </m:r>
                       <m:r>
-                        <a:rPr sz="2000">
+                        <a:rPr lang="en-US" sz="2000">
                           <a:latin typeface="Cambria Math" panose="02040503050406030204" pitchFamily="18" charset="0"/>
                         </a:rPr>
                         <m:t>2</m:t>
                       </m:r>
                       <m:r>
-                        <a:rPr sz="2000">
+                        <a:rPr lang="en-US" sz="2000">
                           <a:latin typeface="Cambria Math" panose="02040503050406030204" pitchFamily="18" charset="0"/>
                         </a:rPr>
                         <m:t>↔</m:t>
                       </m:r>
                       <m:r>
-                        <a:rPr sz="2000">
+                        <a:rPr lang="en-US" sz="2000">
                           <a:latin typeface="Cambria Math" panose="02040503050406030204" pitchFamily="18" charset="0"/>
                         </a:rPr>
                         <m:t>𝑑𝑣</m:t>
                       </m:r>
                       <m:r>
-                        <a:rPr sz="2000">
+                        <a:rPr lang="en-US" sz="2000">
                           <a:latin typeface="Cambria Math" panose="02040503050406030204" pitchFamily="18" charset="0"/>
                         </a:rPr>
                         <m:t>∼−</m:t>
                       </m:r>
                       <m:r>
-                        <a:rPr sz="2000">
+                        <a:rPr lang="en-US" sz="2000">
                           <a:latin typeface="Cambria Math" panose="02040503050406030204" pitchFamily="18" charset="0"/>
                         </a:rPr>
                         <m:t>1</m:t>
                       </m:r>
                       <m:r>
-                        <a:rPr sz="2000">
+                        <a:rPr lang="en-US" sz="2000">
                           <a:latin typeface="Cambria Math" panose="02040503050406030204" pitchFamily="18" charset="0"/>
                         </a:rPr>
                         <m:t>+</m:t>
                       </m:r>
                       <m:r>
-                        <a:rPr sz="2000">
+                        <a:rPr lang="en-US" sz="2000">
                           <a:latin typeface="Cambria Math" panose="02040503050406030204" pitchFamily="18" charset="0"/>
                         </a:rPr>
                         <m:t>𝑣𝑎𝑟</m:t>
                       </m:r>
                       <m:r>
-                        <a:rPr sz="2000">
+                        <a:rPr lang="en-US" sz="2000">
                           <a:latin typeface="Cambria Math" panose="02040503050406030204" pitchFamily="18" charset="0"/>
                         </a:rPr>
                         <m:t>1</m:t>
                       </m:r>
                       <m:r>
-                        <a:rPr sz="2000">
+                        <a:rPr lang="en-US" sz="2000">
                           <a:latin typeface="Cambria Math" panose="02040503050406030204" pitchFamily="18" charset="0"/>
                         </a:rPr>
                         <m:t>+</m:t>
                       </m:r>
                       <m:r>
-                        <a:rPr sz="2000">
+                        <a:rPr lang="en-US" sz="2000">
                           <a:latin typeface="Cambria Math" panose="02040503050406030204" pitchFamily="18" charset="0"/>
                         </a:rPr>
                         <m:t>𝑣𝑎𝑟</m:t>
                       </m:r>
                       <m:r>
-                        <a:rPr sz="2000">
+                        <a:rPr lang="en-US" sz="2000">
                           <a:latin typeface="Cambria Math" panose="02040503050406030204" pitchFamily="18" charset="0"/>
                         </a:rPr>
                         <m:t>2</m:t>
                       </m:r>
                       <m:r>
-                        <a:rPr sz="2000">
+                        <a:rPr lang="en-US" sz="2000">
                           <a:latin typeface="Cambria Math" panose="02040503050406030204" pitchFamily="18" charset="0"/>
                         </a:rPr>
                         <m:t>+</m:t>
                       </m:r>
                       <m:r>
-                        <a:rPr sz="2000">
+                        <a:rPr lang="en-US" sz="2000">
                           <a:latin typeface="Cambria Math" panose="02040503050406030204" pitchFamily="18" charset="0"/>
                         </a:rPr>
                         <m:t>𝑣𝑎𝑟</m:t>
                       </m:r>
                       <m:r>
-                        <a:rPr sz="2000">
+                        <a:rPr lang="en-US" sz="2000">
                           <a:latin typeface="Cambria Math" panose="02040503050406030204" pitchFamily="18" charset="0"/>
                         </a:rPr>
                         <m:t>1</m:t>
                       </m:r>
                       <m:r>
-                        <a:rPr sz="2000">
+                        <a:rPr lang="en-US" sz="2000">
                           <a:latin typeface="Cambria Math" panose="02040503050406030204" pitchFamily="18" charset="0"/>
                         </a:rPr>
                         <m:t>:</m:t>
                       </m:r>
                       <m:r>
-                        <a:rPr sz="2000">
+                        <a:rPr lang="en-US" sz="2000">
                           <a:latin typeface="Cambria Math" panose="02040503050406030204" pitchFamily="18" charset="0"/>
                         </a:rPr>
                         <m:t>𝑣𝑎𝑟</m:t>
                       </m:r>
                       <m:r>
-                        <a:rPr sz="2000">
+                        <a:rPr lang="en-US" sz="2000">
                           <a:latin typeface="Cambria Math" panose="02040503050406030204" pitchFamily="18" charset="0"/>
                         </a:rPr>
                         <m:t>2</m:t>
@@ -14396,12 +14576,41 @@
                     </m:oMath>
                   </m:oMathPara>
                 </a14:m>
-                <a:endParaRPr sz="2000" dirty="0"/>
+                <a:endParaRPr lang="en-US" sz="2000" dirty="0"/>
+              </a:p>
+              <a:p>
+                <a:pPr marL="685800" lvl="2" indent="0">
+                  <a:buNone/>
+                </a:pPr>
+                <a14:m>
+                  <m:oMath xmlns:m="http://schemas.openxmlformats.org/officeDocument/2006/math">
+                    <m:r>
+                      <a:rPr lang="en-US" sz="2000" b="0" i="1" smtClean="0">
+                        <a:latin typeface="Cambria Math" panose="02040503050406030204" pitchFamily="18" charset="0"/>
+                      </a:rPr>
+                      <m:t>−</m:t>
+                    </m:r>
+                    <m:r>
+                      <a:rPr lang="en-US" sz="2000" b="0" i="1" smtClean="0">
+                        <a:latin typeface="Cambria Math" panose="02040503050406030204" pitchFamily="18" charset="0"/>
+                      </a:rPr>
+                      <m:t>1</m:t>
+                    </m:r>
+                  </m:oMath>
+                </a14:m>
+                <a:r>
+                  <a:rPr lang="en-US" sz="2000" dirty="0"/>
+                  <a:t> indicates </a:t>
+                </a:r>
+                <a:r>
+                  <a:rPr lang="en-US" sz="2000" b="1" dirty="0"/>
+                  <a:t>no intercept term </a:t>
+                </a:r>
               </a:p>
               <a:p>
                 <a:pPr lvl="0"/>
                 <a:r>
-                  <a:rPr sz="2200" dirty="0"/>
+                  <a:rPr lang="en-US" sz="2200" dirty="0"/>
                   <a:t>Example; dependent variable (dv) modeled by independent numeric variable (var1) and a categorical variable (var2):</a:t>
                 </a:r>
               </a:p>
@@ -14416,37 +14625,37 @@
                     </m:oMathParaPr>
                     <m:oMath xmlns:m="http://schemas.openxmlformats.org/officeDocument/2006/math">
                       <m:r>
-                        <a:rPr sz="2200">
+                        <a:rPr lang="en-US" sz="2200">
                           <a:latin typeface="Cambria Math" panose="02040503050406030204" pitchFamily="18" charset="0"/>
                         </a:rPr>
                         <m:t>𝑑𝑣</m:t>
                       </m:r>
                       <m:r>
-                        <a:rPr sz="2200">
+                        <a:rPr lang="en-US" sz="2200">
                           <a:latin typeface="Cambria Math" panose="02040503050406030204" pitchFamily="18" charset="0"/>
                         </a:rPr>
                         <m:t>∼</m:t>
                       </m:r>
                       <m:r>
-                        <a:rPr sz="2200">
+                        <a:rPr lang="en-US" sz="2200">
                           <a:latin typeface="Cambria Math" panose="02040503050406030204" pitchFamily="18" charset="0"/>
                         </a:rPr>
                         <m:t>𝑣𝑎𝑟</m:t>
                       </m:r>
                       <m:r>
-                        <a:rPr sz="2200">
+                        <a:rPr lang="en-US" sz="2200">
                           <a:latin typeface="Cambria Math" panose="02040503050406030204" pitchFamily="18" charset="0"/>
                         </a:rPr>
                         <m:t>1</m:t>
                       </m:r>
                       <m:r>
-                        <a:rPr sz="2200">
+                        <a:rPr lang="en-US" sz="2200">
                           <a:latin typeface="Cambria Math" panose="02040503050406030204" pitchFamily="18" charset="0"/>
                         </a:rPr>
                         <m:t>+</m:t>
                       </m:r>
                       <m:r>
-                        <a:rPr sz="2200">
+                        <a:rPr lang="en-US" sz="2200">
                           <a:latin typeface="Cambria Math" panose="02040503050406030204" pitchFamily="18" charset="0"/>
                         </a:rPr>
                         <m:t>𝐶</m:t>
@@ -14454,20 +14663,20 @@
                       <m:d>
                         <m:dPr>
                           <m:ctrlPr>
-                            <a:rPr sz="2200" i="1">
+                            <a:rPr lang="ar-AE" sz="2200" i="1">
                               <a:latin typeface="Cambria Math" panose="02040503050406030204" pitchFamily="18" charset="0"/>
                             </a:rPr>
                           </m:ctrlPr>
                         </m:dPr>
                         <m:e>
                           <m:r>
-                            <a:rPr sz="2200">
+                            <a:rPr lang="ar-AE" sz="2200">
                               <a:latin typeface="Cambria Math" panose="02040503050406030204" pitchFamily="18" charset="0"/>
                             </a:rPr>
                             <m:t>𝑣𝑎𝑟</m:t>
                           </m:r>
                           <m:r>
-                            <a:rPr sz="2200">
+                            <a:rPr lang="ar-AE" sz="2200">
                               <a:latin typeface="Cambria Math" panose="02040503050406030204" pitchFamily="18" charset="0"/>
                             </a:rPr>
                             <m:t>2</m:t>
@@ -14482,7 +14691,7 @@
             </p:txBody>
           </p:sp>
         </mc:Choice>
-        <mc:Fallback xmlns="">
+        <mc:Fallback>
           <p:sp>
             <p:nvSpPr>
               <p:cNvPr id="3" name="Content Placeholder 2"/>
@@ -15196,8 +15405,8 @@
           </a:ln>
         </p:spPr>
       </p:pic>
-      <mc:AlternateContent xmlns:mc="http://schemas.openxmlformats.org/markup-compatibility/2006">
-        <mc:Choice xmlns:a14="http://schemas.microsoft.com/office/drawing/2010/main" Requires="a14">
+      <mc:AlternateContent xmlns:mc="http://schemas.openxmlformats.org/markup-compatibility/2006" xmlns:a14="http://schemas.microsoft.com/office/drawing/2010/main">
+        <mc:Choice Requires="a14">
           <p:sp>
             <p:nvSpPr>
               <p:cNvPr id="5" name="Text Placeholder 3">
@@ -15459,7 +15668,7 @@
             </p:txBody>
           </p:sp>
         </mc:Choice>
-        <mc:Fallback>
+        <mc:Fallback xmlns="">
           <p:sp>
             <p:nvSpPr>
               <p:cNvPr id="5" name="Text Placeholder 3">
@@ -15715,7 +15924,7 @@
               <a:buNone/>
             </a:pPr>
             <a:r>
-              <a:t>Review</a:t>
+              <a:t>Introduction - Why linear models?</a:t>
             </a:r>
           </a:p>
         </p:txBody>
@@ -15733,7 +15942,7 @@
         <p:spPr/>
         <p:txBody>
           <a:bodyPr>
-            <a:normAutofit fontScale="55000" lnSpcReduction="20000"/>
+            <a:normAutofit fontScale="77500" lnSpcReduction="20000"/>
           </a:bodyPr>
           <a:lstStyle/>
           <a:p>
@@ -15741,75 +15950,102 @@
               <a:buNone/>
             </a:pPr>
             <a:r>
-              <a:t>Bayesian analysis is a contrast to frequentist methods</a:t>
+              <a:rPr dirty="0"/>
+              <a:t>Linear models are widely used in statistics and machine learning</a:t>
             </a:r>
           </a:p>
           <a:p>
             <a:pPr lvl="0"/>
             <a:r>
-              <a:t>The objective of Bayesian analysis is to compute a posterior distribution</a:t>
-            </a:r>
-            <a:br/>
-            <a:endParaRPr/>
+              <a:rPr b="1" dirty="0"/>
+              <a:t>Understandable and interpretable</a:t>
+            </a:r>
           </a:p>
           <a:p>
             <a:pPr lvl="0"/>
             <a:r>
-              <a:t>Contrast with frequentist statistics; computing a point estimate and confidence interval from a sample</a:t>
+              <a:rPr b="1" dirty="0"/>
+              <a:t>Generalize well</a:t>
+            </a:r>
+            <a:r>
+              <a:rPr dirty="0"/>
+              <a:t>, if properly fit</a:t>
             </a:r>
           </a:p>
           <a:p>
             <a:pPr lvl="0"/>
             <a:r>
-              <a:t>Bayesian models allows expressing prior information in the form of a prior distribution</a:t>
-            </a:r>
-            <a:br/>
-            <a:endParaRPr/>
+              <a:rPr b="1" dirty="0"/>
+              <a:t>Highly scalable </a:t>
+            </a:r>
+            <a:r>
+              <a:rPr lang="en-US" dirty="0"/>
+              <a:t>and </a:t>
+            </a:r>
+            <a:r>
+              <a:rPr dirty="0"/>
+              <a:t>computationally efficient</a:t>
+            </a:r>
           </a:p>
           <a:p>
             <a:pPr lvl="0"/>
             <a:r>
-              <a:t>Selection of prior distributions can be performed in a number of ways</a:t>
+              <a:rPr dirty="0"/>
+              <a:t>Can approximate fairly complex functions</a:t>
+            </a:r>
+          </a:p>
+          <a:p>
+            <a:pPr lvl="1"/>
+            <a:r>
+              <a:rPr dirty="0"/>
+              <a:t>A basis of understanding complex models</a:t>
             </a:r>
           </a:p>
           <a:p>
             <a:pPr lvl="0"/>
             <a:r>
-              <a:t>The posterior distribution is said to quantify our current </a:t>
-            </a:r>
-            <a:r>
-              <a:rPr b="1"/>
-              <a:t>belief</a:t>
-            </a:r>
-            <a:br/>
-            <a:endParaRPr/>
+              <a:rPr dirty="0"/>
+              <a:t>Many non-linear models are at locally linear at convergence</a:t>
+            </a:r>
+          </a:p>
+          <a:p>
+            <a:pPr lvl="1"/>
+            <a:r>
+              <a:rPr dirty="0"/>
+              <a:t>We can learn a lot about the convergence of DL and RL models from linear approximations</a:t>
+            </a:r>
           </a:p>
           <a:p>
             <a:pPr lvl="0"/>
             <a:r>
-              <a:t>We update beliefs based on additional data or evidence</a:t>
-            </a:r>
-            <a:br/>
-            <a:endParaRPr/>
-          </a:p>
-          <a:p>
-            <a:pPr lvl="0"/>
-            <a:r>
-              <a:t>A critical difference with frequentist models which must be computed from a complete sample</a:t>
-            </a:r>
-            <a:br/>
-            <a:endParaRPr/>
-          </a:p>
-          <a:p>
-            <a:pPr lvl="0"/>
-            <a:r>
-              <a:t>Inference can be performed on the posterior distribution by finding the maximum a postiori (MAP) value and a credible interval</a:t>
-            </a:r>
-          </a:p>
-          <a:p>
-            <a:pPr lvl="0"/>
-            <a:r>
-              <a:t>Predictions are made by simulating from the posterior distribution a</a:t>
+              <a:rPr dirty="0"/>
+              <a:t>In this lesson we take a </a:t>
+            </a:r>
+            <a:r>
+              <a:rPr b="1" dirty="0"/>
+              <a:t>frequentist view</a:t>
+            </a:r>
+            <a:r>
+              <a:rPr dirty="0"/>
+              <a:t> of the linear model</a:t>
+            </a:r>
+          </a:p>
+          <a:p>
+            <a:pPr lvl="1"/>
+            <a:r>
+              <a:rPr lang="en-US" dirty="0"/>
+              <a:t>Frequentist view used </a:t>
+            </a:r>
+            <a:r>
+              <a:rPr lang="en-US" b="1" dirty="0"/>
+              <a:t>maximum likelihood estimation (MLE) </a:t>
+            </a:r>
+          </a:p>
+          <a:p>
+            <a:pPr lvl="1"/>
+            <a:r>
+              <a:rPr dirty="0"/>
+              <a:t>Bayesian view is also widely used</a:t>
             </a:r>
           </a:p>
         </p:txBody>
@@ -15849,7 +16085,12 @@
             <p:ph type="title"/>
           </p:nvPr>
         </p:nvSpPr>
-        <p:spPr/>
+        <p:spPr>
+          <a:xfrm>
+            <a:off x="457200" y="205979"/>
+            <a:ext cx="8229600" cy="667781"/>
+          </a:xfrm>
+        </p:spPr>
         <p:txBody>
           <a:bodyPr/>
           <a:lstStyle/>
@@ -15858,13 +16099,14 @@
               <a:buNone/>
             </a:pPr>
             <a:r>
+              <a:rPr dirty="0"/>
               <a:t>Evaluating Regression Models</a:t>
             </a:r>
           </a:p>
         </p:txBody>
       </p:sp>
-      <mc:AlternateContent xmlns:mc="http://schemas.openxmlformats.org/markup-compatibility/2006" xmlns:a14="http://schemas.microsoft.com/office/drawing/2010/main">
-        <mc:Choice Requires="a14">
+      <mc:AlternateContent xmlns:mc="http://schemas.openxmlformats.org/markup-compatibility/2006">
+        <mc:Choice xmlns:a14="http://schemas.microsoft.com/office/drawing/2010/main" Requires="a14">
           <p:sp>
             <p:nvSpPr>
               <p:cNvPr id="3" name="Content Placeholder 2"/>
@@ -15877,8 +16119,8 @@
             </p:nvSpPr>
             <p:spPr>
               <a:xfrm>
-                <a:off x="457200" y="1200151"/>
-                <a:ext cx="8229600" cy="3737370"/>
+                <a:off x="457200" y="1020064"/>
+                <a:ext cx="8229600" cy="3917457"/>
               </a:xfrm>
             </p:spPr>
             <p:txBody>
@@ -16191,6 +16433,15 @@
                   <a:rPr dirty="0"/>
                   <a:t> predicted values</a:t>
                 </a:r>
+                <a:endParaRPr lang="en-US" dirty="0"/>
+              </a:p>
+              <a:p>
+                <a:pPr lvl="1"/>
+                <a:r>
+                  <a:rPr lang="en-US" dirty="0"/>
+                  <a:t>In other words the residuals are stationary WRT the predicted values</a:t>
+                </a:r>
+                <a:endParaRPr dirty="0"/>
               </a:p>
               <a:p>
                 <a:pPr lvl="0"/>
@@ -16242,7 +16493,7 @@
             </p:txBody>
           </p:sp>
         </mc:Choice>
-        <mc:Fallback xmlns="">
+        <mc:Fallback>
           <p:sp>
             <p:nvSpPr>
               <p:cNvPr id="3" name="Content Placeholder 2"/>
@@ -16255,13 +16506,13 @@
             </p:nvSpPr>
             <p:spPr>
               <a:xfrm>
-                <a:off x="457200" y="1200151"/>
-                <a:ext cx="8229600" cy="3737370"/>
+                <a:off x="457200" y="1020064"/>
+                <a:ext cx="8229600" cy="3917457"/>
               </a:xfrm>
               <a:blipFill>
                 <a:blip r:embed="rId2"/>
                 <a:stretch>
-                  <a:fillRect l="-741" t="-2447" r="-1185"/>
+                  <a:fillRect l="-741" t="-2177" r="-1185"/>
                 </a:stretch>
               </a:blipFill>
             </p:spPr>
@@ -16428,8 +16679,8 @@
         </p:blipFill>
         <p:spPr>
           <a:xfrm>
-            <a:off x="1316846" y="2247392"/>
-            <a:ext cx="6199553" cy="2860949"/>
+            <a:off x="1316846" y="2178304"/>
+            <a:ext cx="6349263" cy="2930037"/>
           </a:xfrm>
           <a:prstGeom prst="rect">
             <a:avLst/>
@@ -18281,8 +18532,8 @@
           </a:p>
         </p:txBody>
       </p:sp>
-      <mc:AlternateContent xmlns:mc="http://schemas.openxmlformats.org/markup-compatibility/2006" xmlns:a14="http://schemas.microsoft.com/office/drawing/2010/main">
-        <mc:Choice Requires="a14">
+      <mc:AlternateContent xmlns:mc="http://schemas.openxmlformats.org/markup-compatibility/2006">
+        <mc:Choice xmlns:a14="http://schemas.microsoft.com/office/drawing/2010/main" Requires="a14">
           <p:sp>
             <p:nvSpPr>
               <p:cNvPr id="3" name="Content Placeholder 2"/>
@@ -18619,7 +18870,15 @@
                 </a:r>
                 <a:r>
                   <a:rPr lang="en-US" dirty="0"/>
-                  <a:t>for a perfect model would behave as follows:</a:t>
+                  <a:t>for a </a:t>
+                </a:r>
+                <a:r>
+                  <a:rPr lang="en-US" b="1" dirty="0"/>
+                  <a:t>perfect model </a:t>
+                </a:r>
+                <a:r>
+                  <a:rPr lang="en-US" dirty="0"/>
+                  <a:t>would behave as follows:</a:t>
                 </a:r>
               </a:p>
               <a:p>
@@ -18716,7 +18975,23 @@
               <a:p>
                 <a:r>
                   <a:rPr lang="en-US" dirty="0"/>
-                  <a:t>A model which does not explain the data at all has:</a:t>
+                  <a:t>A model which </a:t>
+                </a:r>
+                <a:r>
+                  <a:rPr lang="en-US" b="1" dirty="0"/>
+                  <a:t>does not explain the data </a:t>
+                </a:r>
+                <a:r>
+                  <a:rPr lang="en-US" dirty="0"/>
+                  <a:t>or </a:t>
+                </a:r>
+                <a:r>
+                  <a:rPr lang="en-US" b="1" dirty="0"/>
+                  <a:t>null model </a:t>
+                </a:r>
+                <a:r>
+                  <a:rPr lang="en-US" dirty="0"/>
+                  <a:t>has:</a:t>
                 </a:r>
               </a:p>
               <a:p>
@@ -18825,7 +19100,7 @@
             </p:txBody>
           </p:sp>
         </mc:Choice>
-        <mc:Fallback xmlns="">
+        <mc:Fallback>
           <p:sp>
             <p:nvSpPr>
               <p:cNvPr id="3" name="Content Placeholder 2"/>
@@ -21027,8 +21302,8 @@
         </p:nvCxnSpPr>
         <p:spPr>
           <a:xfrm flipH="1" flipV="1">
-            <a:off x="3413760" y="1137920"/>
-            <a:ext cx="1195647" cy="361696"/>
+            <a:off x="3470564" y="1231392"/>
+            <a:ext cx="1138843" cy="268224"/>
           </a:xfrm>
           <a:prstGeom prst="straightConnector1">
             <a:avLst/>
@@ -21071,8 +21346,8 @@
         </p:nvCxnSpPr>
         <p:spPr>
           <a:xfrm flipH="1" flipV="1">
-            <a:off x="3470564" y="1425633"/>
-            <a:ext cx="1138843" cy="482138"/>
+            <a:off x="3470564" y="1499616"/>
+            <a:ext cx="1138843" cy="408155"/>
           </a:xfrm>
           <a:prstGeom prst="straightConnector1">
             <a:avLst/>
@@ -21115,8 +21390,8 @@
         </p:nvCxnSpPr>
         <p:spPr>
           <a:xfrm flipH="1" flipV="1">
-            <a:off x="3413760" y="1678432"/>
-            <a:ext cx="1195647" cy="1904353"/>
+            <a:off x="3470564" y="1731264"/>
+            <a:ext cx="1138843" cy="1851521"/>
           </a:xfrm>
           <a:prstGeom prst="straightConnector1">
             <a:avLst/>
@@ -21276,7 +21551,12 @@
             <p:ph idx="1"/>
           </p:nvPr>
         </p:nvSpPr>
-        <p:spPr/>
+        <p:spPr>
+          <a:xfrm>
+            <a:off x="457200" y="1109472"/>
+            <a:ext cx="8229600" cy="3921760"/>
+          </a:xfrm>
+        </p:spPr>
         <p:txBody>
           <a:bodyPr>
             <a:normAutofit fontScale="85000" lnSpcReduction="20000"/>
@@ -21288,91 +21568,119 @@
             </a:pPr>
             <a:r>
               <a:rPr dirty="0"/>
-              <a:t>Linear models are widely used in statistics and machine learning</a:t>
+              <a:t>Linear models are </a:t>
+            </a:r>
+            <a:r>
+              <a:rPr b="1" dirty="0"/>
+              <a:t>readily interpretable!</a:t>
             </a:r>
           </a:p>
           <a:p>
             <a:pPr lvl="0"/>
             <a:r>
               <a:rPr b="1" dirty="0"/>
-              <a:t>Understandable and interpretable</a:t>
+              <a:t>Human interpretability </a:t>
+            </a:r>
+            <a:r>
+              <a:rPr dirty="0"/>
+              <a:t>is of great importance for models used for critical decisions</a:t>
+            </a:r>
+          </a:p>
+          <a:p>
+            <a:pPr lvl="1"/>
+            <a:r>
+              <a:rPr lang="en-US" dirty="0"/>
+              <a:t>Complex and nonlinear model result in poor human intuition about expected response</a:t>
+            </a:r>
+          </a:p>
+          <a:p>
+            <a:pPr lvl="1"/>
+            <a:r>
+              <a:rPr dirty="0"/>
+              <a:t>Health care</a:t>
+            </a:r>
+          </a:p>
+          <a:p>
+            <a:pPr lvl="1"/>
+            <a:r>
+              <a:rPr dirty="0"/>
+              <a:t>Safe operation of autonomous systems</a:t>
+            </a:r>
+          </a:p>
+          <a:p>
+            <a:pPr lvl="1"/>
+            <a:r>
+              <a:rPr dirty="0"/>
+              <a:t>Social justice for applications with human impact</a:t>
+            </a:r>
+          </a:p>
+          <a:p>
+            <a:pPr lvl="1"/>
+            <a:r>
+              <a:rPr dirty="0"/>
+              <a:t>etc.</a:t>
             </a:r>
           </a:p>
           <a:p>
             <a:pPr lvl="0"/>
             <a:r>
-              <a:rPr b="1" dirty="0"/>
-              <a:t>Generalize well</a:t>
-            </a:r>
+              <a:rPr lang="en-US" dirty="0"/>
+              <a:t>Models </a:t>
+            </a:r>
+            <a:r>
+              <a:rPr lang="en-US" b="1" dirty="0"/>
+              <a:t>generalize</a:t>
+            </a:r>
+            <a:r>
+              <a:rPr lang="en-US" dirty="0"/>
+              <a:t> well</a:t>
+            </a:r>
+            <a:endParaRPr dirty="0"/>
+          </a:p>
+          <a:p>
+            <a:pPr lvl="1"/>
             <a:r>
               <a:rPr dirty="0"/>
-              <a:t>, if properly fit</a:t>
-            </a:r>
-          </a:p>
-          <a:p>
-            <a:pPr lvl="0"/>
-            <a:r>
-              <a:rPr b="1" dirty="0"/>
-              <a:t>Highly scalable </a:t>
+              <a:t>Low chance of </a:t>
+            </a:r>
+            <a:r>
+              <a:rPr i="1" dirty="0"/>
+              <a:t>unexpected output</a:t>
+            </a:r>
+            <a:endParaRPr dirty="0"/>
+          </a:p>
+          <a:p>
+            <a:pPr lvl="1"/>
+            <a:r>
+              <a:rPr dirty="0"/>
+              <a:t>Complex and nonlinear models vulnerable to </a:t>
+            </a:r>
+            <a:r>
+              <a:rPr i="1" dirty="0"/>
+              <a:t>unexpected output</a:t>
+            </a:r>
+            <a:endParaRPr lang="en-US" i="1" dirty="0"/>
+          </a:p>
+          <a:p>
+            <a:r>
+              <a:rPr lang="en-US" b="1" dirty="0"/>
+              <a:t>Model coefficients </a:t>
             </a:r>
             <a:r>
               <a:rPr lang="en-US" dirty="0"/>
-              <a:t>and </a:t>
-            </a:r>
-            <a:r>
-              <a:rPr dirty="0"/>
-              <a:t>computationally efficient</a:t>
-            </a:r>
-          </a:p>
-          <a:p>
-            <a:pPr lvl="0"/>
-            <a:r>
-              <a:rPr dirty="0"/>
-              <a:t>Can approximate fairly complex functions</a:t>
-            </a:r>
-          </a:p>
-          <a:p>
-            <a:pPr lvl="1"/>
-            <a:r>
-              <a:rPr dirty="0"/>
-              <a:t>A basis of understanding complex models</a:t>
-            </a:r>
-          </a:p>
-          <a:p>
-            <a:pPr lvl="0"/>
-            <a:r>
-              <a:rPr dirty="0"/>
-              <a:t>Many non-linear models are at locally linear at convergence</a:t>
-            </a:r>
-          </a:p>
-          <a:p>
-            <a:pPr lvl="1"/>
-            <a:r>
-              <a:rPr dirty="0"/>
-              <a:t>We can learn a lot about the convergence of DL and RL models from linear approximations</a:t>
-            </a:r>
-          </a:p>
-          <a:p>
-            <a:pPr lvl="0"/>
-            <a:r>
-              <a:rPr dirty="0"/>
-              <a:t>In this lesson we take a </a:t>
-            </a:r>
-            <a:r>
-              <a:rPr b="1" dirty="0"/>
-              <a:t>frequentist view</a:t>
-            </a:r>
-            <a:r>
-              <a:rPr dirty="0"/>
-              <a:t> of the linear model</a:t>
-            </a:r>
-          </a:p>
-          <a:p>
-            <a:pPr lvl="1"/>
-            <a:r>
-              <a:rPr dirty="0"/>
-              <a:t>Bayesian view is also widely used</a:t>
-            </a:r>
+              <a:t>provide information on </a:t>
+            </a:r>
+            <a:r>
+              <a:rPr lang="en-US" b="1" dirty="0"/>
+              <a:t>response sensitivities </a:t>
+            </a:r>
+            <a:r>
+              <a:rPr lang="en-US" dirty="0"/>
+              <a:t>to changes in independent variable values</a:t>
+            </a:r>
+          </a:p>
+          <a:p>
+            <a:endParaRPr i="1" dirty="0"/>
           </a:p>
         </p:txBody>
       </p:sp>
@@ -21866,7 +22174,9 @@
               <a:p>
                 <a:pPr lvl="0"/>
                 <a:r>
-                  <a:rPr lang="en-US" sz="2000" b="1" dirty="0"/>
+                  <a:rPr lang="en-US" sz="2000" b="1" dirty="0">
+                    <a:hlinkClick r:id="rId4"/>
+                  </a:rPr>
                   <a:t>Durbin-Watson</a:t>
                 </a:r>
                 <a:r>
@@ -21900,14 +22210,14 @@
                   <a:t> indicates serial correlation </a:t>
                 </a:r>
                 <a:endParaRPr lang="en-US" sz="2000" b="1" dirty="0">
-                  <a:hlinkClick r:id="rId4"/>
+                  <a:hlinkClick r:id="rId5"/>
                 </a:endParaRPr>
               </a:p>
               <a:p>
                 <a:pPr lvl="0"/>
                 <a:r>
                   <a:rPr lang="en-US" sz="2000" b="1" dirty="0">
-                    <a:hlinkClick r:id="rId4"/>
+                    <a:hlinkClick r:id="rId5"/>
                   </a:rPr>
                   <a:t>Jarque-Bera</a:t>
                 </a:r>
@@ -21923,12 +22233,20 @@
                   <a:t>The </a:t>
                 </a:r>
                 <a:r>
-                  <a:rPr lang="en-US" sz="2000" b="1" dirty="0"/>
+                  <a:rPr lang="en-US" sz="2000" b="1" dirty="0">
+                    <a:hlinkClick r:id="rId6"/>
+                  </a:rPr>
                   <a:t>Condition number</a:t>
                 </a:r>
                 <a:r>
+                  <a:rPr lang="en-US" sz="2000" dirty="0">
+                    <a:hlinkClick r:id="rId6"/>
+                  </a:rPr>
+                  <a:t> </a:t>
+                </a:r>
+                <a:r>
                   <a:rPr lang="en-US" sz="2000" dirty="0"/>
-                  <a:t> a measure of how well ill-posed the solution of the linear equations are</a:t>
+                  <a:t>a measure of how well ill-posed the solution of the linear equations are</a:t>
                 </a:r>
               </a:p>
               <a:p>
@@ -21960,7 +22278,7 @@
                 <a:ext cx="4823968" cy="4049283"/>
               </a:xfrm>
               <a:blipFill>
-                <a:blip r:embed="rId5"/>
+                <a:blip r:embed="rId7"/>
                 <a:stretch>
                   <a:fillRect l="-1263" t="-1657" r="-1894"/>
                 </a:stretch>
@@ -24386,10 +24704,10 @@
       </mc:AlternateContent>
       <p:pic>
         <p:nvPicPr>
-          <p:cNvPr id="6" name="Picture 5">
+          <p:cNvPr id="5" name="Picture 4">
             <a:extLst>
               <a:ext uri="{FF2B5EF4-FFF2-40B4-BE49-F238E27FC236}">
-                <a16:creationId xmlns:a16="http://schemas.microsoft.com/office/drawing/2014/main" id="{B19A22EF-07E4-69BC-51FF-C0EF5313ED95}"/>
+                <a16:creationId xmlns:a16="http://schemas.microsoft.com/office/drawing/2014/main" id="{EDDFA2D0-A6EE-2F94-EF3A-5428A6E6AAF1}"/>
               </a:ext>
             </a:extLst>
           </p:cNvPr>
@@ -24406,8 +24724,8 @@
         </p:blipFill>
         <p:spPr>
           <a:xfrm>
-            <a:off x="3657600" y="878362"/>
-            <a:ext cx="5486400" cy="4223573"/>
+            <a:off x="3615878" y="877824"/>
+            <a:ext cx="5490363" cy="4212844"/>
           </a:xfrm>
           <a:prstGeom prst="rect">
             <a:avLst/>
@@ -24774,8 +25092,8 @@
           </a:p>
         </p:txBody>
       </p:sp>
-      <mc:AlternateContent xmlns:mc="http://schemas.openxmlformats.org/markup-compatibility/2006" xmlns:a14="http://schemas.microsoft.com/office/drawing/2010/main">
-        <mc:Choice Requires="a14">
+      <mc:AlternateContent xmlns:mc="http://schemas.openxmlformats.org/markup-compatibility/2006">
+        <mc:Choice xmlns:a14="http://schemas.microsoft.com/office/drawing/2010/main" Requires="a14">
           <p:sp>
             <p:nvSpPr>
               <p:cNvPr id="4" name="Text Placeholder 3"/>
@@ -24788,8 +25106,8 @@
             </p:nvSpPr>
             <p:spPr>
               <a:xfrm>
-                <a:off x="457201" y="1076326"/>
-                <a:ext cx="3927764" cy="3518297"/>
+                <a:off x="457200" y="1076326"/>
+                <a:ext cx="4159503" cy="3518297"/>
               </a:xfrm>
             </p:spPr>
             <p:txBody>
@@ -25077,7 +25395,7 @@
             </p:txBody>
           </p:sp>
         </mc:Choice>
-        <mc:Fallback xmlns="">
+        <mc:Fallback>
           <p:sp>
             <p:nvSpPr>
               <p:cNvPr id="4" name="Text Placeholder 3"/>
@@ -25090,13 +25408,13 @@
             </p:nvSpPr>
             <p:spPr>
               <a:xfrm>
-                <a:off x="457201" y="1076326"/>
-                <a:ext cx="3927764" cy="3518297"/>
+                <a:off x="457200" y="1076326"/>
+                <a:ext cx="4159503" cy="3518297"/>
               </a:xfrm>
               <a:blipFill>
                 <a:blip r:embed="rId2"/>
                 <a:stretch>
-                  <a:fillRect l="-1553" t="-1040" r="-2484"/>
+                  <a:fillRect l="-1466" t="-1040"/>
                 </a:stretch>
               </a:blipFill>
             </p:spPr>
@@ -25117,10 +25435,10 @@
       </mc:AlternateContent>
       <p:pic>
         <p:nvPicPr>
-          <p:cNvPr id="5" name="Picture 4">
+          <p:cNvPr id="6" name="Picture 5">
             <a:extLst>
               <a:ext uri="{FF2B5EF4-FFF2-40B4-BE49-F238E27FC236}">
-                <a16:creationId xmlns:a16="http://schemas.microsoft.com/office/drawing/2014/main" id="{3E6951E3-14C7-5DEA-E2D1-5E182127BF78}"/>
+                <a16:creationId xmlns:a16="http://schemas.microsoft.com/office/drawing/2014/main" id="{589053DC-4D4E-F70D-67CF-6F103E4563FA}"/>
               </a:ext>
             </a:extLst>
           </p:cNvPr>
@@ -25137,8 +25455,8 @@
         </p:blipFill>
         <p:spPr>
           <a:xfrm>
-            <a:off x="4759036" y="859682"/>
-            <a:ext cx="4266128" cy="4254722"/>
+            <a:off x="4795270" y="788416"/>
+            <a:ext cx="4266322" cy="4253484"/>
           </a:xfrm>
           <a:prstGeom prst="rect">
             <a:avLst/>
@@ -25344,7 +25662,7 @@
               <a:buNone/>
             </a:pPr>
             <a:r>
-              <a:t>Introduction - Why linear models?</a:t>
+              <a:t>Why Linear Models</a:t>
             </a:r>
           </a:p>
         </p:txBody>
@@ -25361,13 +25679,13 @@
         </p:nvSpPr>
         <p:spPr>
           <a:xfrm>
-            <a:off x="457200" y="1109472"/>
-            <a:ext cx="8229600" cy="3921760"/>
+            <a:off x="457200" y="1200150"/>
+            <a:ext cx="8229600" cy="3798570"/>
           </a:xfrm>
         </p:spPr>
         <p:txBody>
           <a:bodyPr>
-            <a:normAutofit fontScale="85000" lnSpcReduction="20000"/>
+            <a:normAutofit fontScale="92500" lnSpcReduction="20000"/>
           </a:bodyPr>
           <a:lstStyle/>
           <a:p>
@@ -25376,119 +25694,102 @@
             </a:pPr>
             <a:r>
               <a:rPr dirty="0"/>
-              <a:t>Linear models are </a:t>
+              <a:t>What are the alternatives?</a:t>
+            </a:r>
+          </a:p>
+          <a:p>
+            <a:pPr lvl="0"/>
+            <a:r>
+              <a:rPr dirty="0"/>
+              <a:t>Linear models are saleable and interpretable</a:t>
+            </a:r>
+          </a:p>
+          <a:p>
+            <a:pPr lvl="1"/>
+            <a:r>
+              <a:rPr dirty="0"/>
+              <a:t>Idea if </a:t>
             </a:r>
             <a:r>
               <a:rPr b="1" dirty="0"/>
-              <a:t>readily interpretable!</a:t>
+              <a:t>goal is inference and exploration</a:t>
+            </a:r>
+            <a:endParaRPr dirty="0"/>
+          </a:p>
+          <a:p>
+            <a:pPr lvl="1"/>
+            <a:r>
+              <a:rPr dirty="0"/>
+              <a:t>Can </a:t>
+            </a:r>
+            <a:r>
+              <a:rPr b="1" dirty="0"/>
+              <a:t>identify data problems</a:t>
+            </a:r>
+            <a:r>
+              <a:rPr dirty="0"/>
+              <a:t> more easily</a:t>
+            </a:r>
+          </a:p>
+          <a:p>
+            <a:pPr lvl="1"/>
+            <a:r>
+              <a:rPr dirty="0"/>
+              <a:t>May have lower prediction accuracy on some problems</a:t>
             </a:r>
           </a:p>
           <a:p>
             <a:pPr lvl="0"/>
             <a:r>
+              <a:rPr dirty="0"/>
+              <a:t>AdaBoost algorithms are go-to models for prediction on </a:t>
+            </a:r>
+            <a:r>
               <a:rPr b="1" dirty="0"/>
-              <a:t>Human interpretability </a:t>
-            </a:r>
+              <a:t>tabular data</a:t>
+            </a:r>
+          </a:p>
+          <a:p>
+            <a:pPr lvl="1"/>
             <a:r>
               <a:rPr dirty="0"/>
-              <a:t>is of great importance for models used for critical decisions</a:t>
-            </a:r>
+              <a:t>Known to give superior predictions, </a:t>
+            </a:r>
+            <a:r>
+              <a:rPr b="1" dirty="0"/>
+              <a:t>but clean data matter more!</a:t>
+            </a:r>
+            <a:endParaRPr dirty="0"/>
           </a:p>
           <a:p>
             <a:pPr lvl="1"/>
             <a:r>
+              <a:rPr dirty="0"/>
+              <a:t>Interpretability is nearly impossible</a:t>
+            </a:r>
+          </a:p>
+          <a:p>
+            <a:pPr lvl="1"/>
+            <a:r>
+              <a:rPr dirty="0"/>
+              <a:t>Limits inference and exploration opportunities</a:t>
+            </a:r>
+            <a:endParaRPr lang="en-US" dirty="0"/>
+          </a:p>
+          <a:p>
+            <a:r>
               <a:rPr lang="en-US" dirty="0"/>
-              <a:t>Complex and nonlinear model result in poor human intuition about expected response</a:t>
-            </a:r>
-          </a:p>
-          <a:p>
-            <a:pPr lvl="1"/>
-            <a:r>
-              <a:rPr dirty="0"/>
-              <a:t>Health care</a:t>
-            </a:r>
-          </a:p>
-          <a:p>
-            <a:pPr lvl="1"/>
-            <a:r>
-              <a:rPr dirty="0"/>
-              <a:t>Safe operation of autonomous systems</a:t>
-            </a:r>
-          </a:p>
-          <a:p>
-            <a:pPr lvl="1"/>
-            <a:r>
-              <a:rPr dirty="0"/>
-              <a:t>Social justice for applications with human impact</a:t>
-            </a:r>
-          </a:p>
-          <a:p>
-            <a:pPr lvl="1"/>
-            <a:r>
-              <a:rPr dirty="0"/>
-              <a:t>etc.</a:t>
-            </a:r>
-          </a:p>
-          <a:p>
-            <a:pPr lvl="0"/>
+              <a:t>Neural network models give superior performance for </a:t>
+            </a:r>
+            <a:r>
+              <a:rPr lang="en-US" b="1" dirty="0"/>
+              <a:t>unstructured data</a:t>
+            </a:r>
             <a:r>
               <a:rPr lang="en-US" dirty="0"/>
-              <a:t>Models </a:t>
-            </a:r>
-            <a:r>
-              <a:rPr lang="en-US" b="1" dirty="0"/>
-              <a:t>generalize</a:t>
-            </a:r>
-            <a:r>
-              <a:rPr lang="en-US" dirty="0"/>
-              <a:t> well</a:t>
-            </a:r>
-            <a:endParaRPr dirty="0"/>
-          </a:p>
-          <a:p>
-            <a:pPr lvl="1"/>
-            <a:r>
-              <a:rPr dirty="0"/>
-              <a:t>Low chance of </a:t>
-            </a:r>
-            <a:r>
-              <a:rPr i="1" dirty="0"/>
-              <a:t>unexpected output</a:t>
-            </a:r>
-            <a:endParaRPr dirty="0"/>
-          </a:p>
-          <a:p>
-            <a:pPr lvl="1"/>
-            <a:r>
-              <a:rPr dirty="0"/>
-              <a:t>Complex and nonlinear models vulnerable to </a:t>
-            </a:r>
-            <a:r>
-              <a:rPr i="1" dirty="0"/>
-              <a:t>unexpected output</a:t>
-            </a:r>
-            <a:endParaRPr lang="en-US" i="1" dirty="0"/>
-          </a:p>
-          <a:p>
-            <a:r>
-              <a:rPr lang="en-US" b="1" dirty="0"/>
-              <a:t>Model coefficients </a:t>
-            </a:r>
-            <a:r>
-              <a:rPr lang="en-US" dirty="0"/>
-              <a:t>provide information on </a:t>
-            </a:r>
-            <a:r>
-              <a:rPr lang="en-US" b="1" dirty="0"/>
-              <a:t>response sensitivities </a:t>
-            </a:r>
-            <a:r>
-              <a:rPr lang="en-US" dirty="0"/>
-              <a:t>to changes in variable values</a:t>
-            </a:r>
-          </a:p>
-          <a:p>
-            <a:endParaRPr i="1" dirty="0"/>
+              <a:t>, but are generally uninterpretable </a:t>
+            </a:r>
+            <a:endParaRPr b="1" dirty="0"/>
           </a:p>
         </p:txBody>
       </p:sp>
@@ -25669,10 +25970,10 @@
       </p:grpSpPr>
       <p:pic>
         <p:nvPicPr>
-          <p:cNvPr id="23" name="Picture 22">
+          <p:cNvPr id="8" name="Picture 7">
             <a:extLst>
               <a:ext uri="{FF2B5EF4-FFF2-40B4-BE49-F238E27FC236}">
-                <a16:creationId xmlns:a16="http://schemas.microsoft.com/office/drawing/2014/main" id="{3A7659DD-B7B3-4E93-72BA-601FE4F944CC}"/>
+                <a16:creationId xmlns:a16="http://schemas.microsoft.com/office/drawing/2014/main" id="{963DE4CE-64DF-5327-5F8E-25906D2409D5}"/>
               </a:ext>
             </a:extLst>
           </p:cNvPr>
@@ -25689,8 +25990,38 @@
         </p:blipFill>
         <p:spPr>
           <a:xfrm>
-            <a:off x="457200" y="2148214"/>
-            <a:ext cx="4012254" cy="2624525"/>
+            <a:off x="4867674" y="2117823"/>
+            <a:ext cx="3876498" cy="2654691"/>
+          </a:xfrm>
+          <a:prstGeom prst="rect">
+            <a:avLst/>
+          </a:prstGeom>
+        </p:spPr>
+      </p:pic>
+      <p:pic>
+        <p:nvPicPr>
+          <p:cNvPr id="4" name="Picture 3">
+            <a:extLst>
+              <a:ext uri="{FF2B5EF4-FFF2-40B4-BE49-F238E27FC236}">
+                <a16:creationId xmlns:a16="http://schemas.microsoft.com/office/drawing/2014/main" id="{435F4C9A-A395-4D0F-C743-E7129AB45980}"/>
+              </a:ext>
+            </a:extLst>
+          </p:cNvPr>
+          <p:cNvPicPr>
+            <a:picLocks noChangeAspect="1"/>
+          </p:cNvPicPr>
+          <p:nvPr/>
+        </p:nvPicPr>
+        <p:blipFill>
+          <a:blip r:embed="rId3"/>
+          <a:stretch>
+            <a:fillRect/>
+          </a:stretch>
+        </p:blipFill>
+        <p:spPr>
+          <a:xfrm>
+            <a:off x="409711" y="2117823"/>
+            <a:ext cx="4049763" cy="2654323"/>
           </a:xfrm>
           <a:prstGeom prst="rect">
             <a:avLst/>
@@ -25729,8 +26060,8 @@
           </a:p>
         </p:txBody>
       </p:sp>
-      <mc:AlternateContent xmlns:mc="http://schemas.openxmlformats.org/markup-compatibility/2006">
-        <mc:Choice xmlns:a14="http://schemas.microsoft.com/office/drawing/2010/main" Requires="a14">
+      <mc:AlternateContent xmlns:mc="http://schemas.openxmlformats.org/markup-compatibility/2006" xmlns:a14="http://schemas.microsoft.com/office/drawing/2010/main">
+        <mc:Choice Requires="a14">
           <p:sp>
             <p:nvSpPr>
               <p:cNvPr id="5" name="Content Placeholder 4">
@@ -25859,7 +26190,7 @@
             </p:txBody>
           </p:sp>
         </mc:Choice>
-        <mc:Fallback>
+        <mc:Fallback xmlns="">
           <p:sp>
             <p:nvSpPr>
               <p:cNvPr id="5" name="Content Placeholder 4">
@@ -25882,7 +26213,7 @@
                 <a:ext cx="8229600" cy="1388506"/>
               </a:xfrm>
               <a:blipFill>
-                <a:blip r:embed="rId3"/>
+                <a:blip r:embed="rId4"/>
                 <a:stretch>
                   <a:fillRect l="-667" t="-4386" b="-5702"/>
                 </a:stretch>
@@ -25903,36 +26234,6 @@
           </p:sp>
         </mc:Fallback>
       </mc:AlternateContent>
-      <p:pic>
-        <p:nvPicPr>
-          <p:cNvPr id="13" name="Picture 12">
-            <a:extLst>
-              <a:ext uri="{FF2B5EF4-FFF2-40B4-BE49-F238E27FC236}">
-                <a16:creationId xmlns:a16="http://schemas.microsoft.com/office/drawing/2014/main" id="{BB266AC6-FE14-CA7F-356F-26A3463988BA}"/>
-              </a:ext>
-            </a:extLst>
-          </p:cNvPr>
-          <p:cNvPicPr>
-            <a:picLocks noChangeAspect="1"/>
-          </p:cNvPicPr>
-          <p:nvPr/>
-        </p:nvPicPr>
-        <p:blipFill>
-          <a:blip r:embed="rId4"/>
-          <a:stretch>
-            <a:fillRect/>
-          </a:stretch>
-        </p:blipFill>
-        <p:spPr>
-          <a:xfrm>
-            <a:off x="4867674" y="2147003"/>
-            <a:ext cx="4166598" cy="2617070"/>
-          </a:xfrm>
-          <a:prstGeom prst="rect">
-            <a:avLst/>
-          </a:prstGeom>
-        </p:spPr>
-      </p:pic>
       <p:sp>
         <p:nvSpPr>
           <p:cNvPr id="14" name="Content Placeholder 4">
@@ -26300,7 +26601,7 @@
         <p:spPr>
           <a:xfrm>
             <a:off x="4478528" y="2442464"/>
-            <a:ext cx="3833081" cy="0"/>
+            <a:ext cx="3893312" cy="0"/>
           </a:xfrm>
           <a:prstGeom prst="straightConnector1">
             <a:avLst/>
@@ -26344,7 +26645,7 @@
         </p:nvCxnSpPr>
         <p:spPr>
           <a:xfrm>
-            <a:off x="4478528" y="2648170"/>
+            <a:off x="4478528" y="2693670"/>
             <a:ext cx="3833081" cy="0"/>
           </a:xfrm>
           <a:prstGeom prst="straightConnector1">
@@ -26389,8 +26690,8 @@
         </p:nvCxnSpPr>
         <p:spPr>
           <a:xfrm>
-            <a:off x="4478528" y="2882579"/>
-            <a:ext cx="3755172" cy="0"/>
+            <a:off x="4478528" y="2895974"/>
+            <a:ext cx="3833081" cy="0"/>
           </a:xfrm>
           <a:prstGeom prst="straightConnector1">
             <a:avLst/>
@@ -26443,6 +26744,36 @@
           <a:chExt cx="0" cy="0"/>
         </a:xfrm>
       </p:grpSpPr>
+      <p:pic>
+        <p:nvPicPr>
+          <p:cNvPr id="4" name="Picture 3">
+            <a:extLst>
+              <a:ext uri="{FF2B5EF4-FFF2-40B4-BE49-F238E27FC236}">
+                <a16:creationId xmlns:a16="http://schemas.microsoft.com/office/drawing/2014/main" id="{82A6CA32-2F35-6E7B-989D-74406A611B08}"/>
+              </a:ext>
+            </a:extLst>
+          </p:cNvPr>
+          <p:cNvPicPr>
+            <a:picLocks noChangeAspect="1"/>
+          </p:cNvPicPr>
+          <p:nvPr/>
+        </p:nvPicPr>
+        <p:blipFill>
+          <a:blip r:embed="rId2"/>
+          <a:stretch>
+            <a:fillRect/>
+          </a:stretch>
+        </p:blipFill>
+        <p:spPr>
+          <a:xfrm>
+            <a:off x="4867674" y="2117823"/>
+            <a:ext cx="3876498" cy="2654691"/>
+          </a:xfrm>
+          <a:prstGeom prst="rect">
+            <a:avLst/>
+          </a:prstGeom>
+        </p:spPr>
+      </p:pic>
       <p:sp>
         <p:nvSpPr>
           <p:cNvPr id="2" name="Title 1"/>
@@ -26499,7 +26830,7 @@
         </p:spPr>
         <p:txBody>
           <a:bodyPr>
-            <a:normAutofit lnSpcReduction="10000"/>
+            <a:normAutofit fontScale="85000" lnSpcReduction="20000"/>
           </a:bodyPr>
           <a:lstStyle/>
           <a:p>
@@ -26536,41 +26867,17 @@
             </a:r>
             <a:r>
               <a:rPr lang="en-US" sz="2000" dirty="0"/>
-              <a:t> is similar, with a small second order effect</a:t>
+              <a:t> is similar, but different standard error and CI </a:t>
+            </a:r>
+          </a:p>
+          <a:p>
+            <a:r>
+              <a:rPr lang="en-US" sz="2000" dirty="0"/>
+              <a:t>Significant second order effect in complex model</a:t>
             </a:r>
           </a:p>
         </p:txBody>
       </p:sp>
-      <p:pic>
-        <p:nvPicPr>
-          <p:cNvPr id="13" name="Picture 12">
-            <a:extLst>
-              <a:ext uri="{FF2B5EF4-FFF2-40B4-BE49-F238E27FC236}">
-                <a16:creationId xmlns:a16="http://schemas.microsoft.com/office/drawing/2014/main" id="{BB266AC6-FE14-CA7F-356F-26A3463988BA}"/>
-              </a:ext>
-            </a:extLst>
-          </p:cNvPr>
-          <p:cNvPicPr>
-            <a:picLocks noChangeAspect="1"/>
-          </p:cNvPicPr>
-          <p:nvPr/>
-        </p:nvPicPr>
-        <p:blipFill>
-          <a:blip r:embed="rId2"/>
-          <a:stretch>
-            <a:fillRect/>
-          </a:stretch>
-        </p:blipFill>
-        <p:spPr>
-          <a:xfrm>
-            <a:off x="4867674" y="2147003"/>
-            <a:ext cx="4166598" cy="2617070"/>
-          </a:xfrm>
-          <a:prstGeom prst="rect">
-            <a:avLst/>
-          </a:prstGeom>
-        </p:spPr>
-      </p:pic>
       <p:sp>
         <p:nvSpPr>
           <p:cNvPr id="14" name="Content Placeholder 4">
@@ -26968,10 +27275,10 @@
       </p:cxnSp>
       <p:pic>
         <p:nvPicPr>
-          <p:cNvPr id="8" name="Picture 7">
+          <p:cNvPr id="3" name="Picture 2">
             <a:extLst>
               <a:ext uri="{FF2B5EF4-FFF2-40B4-BE49-F238E27FC236}">
-                <a16:creationId xmlns:a16="http://schemas.microsoft.com/office/drawing/2014/main" id="{C5E14DF5-1F8F-F807-B7F2-984768F4CB03}"/>
+                <a16:creationId xmlns:a16="http://schemas.microsoft.com/office/drawing/2014/main" id="{7515EDF9-FAD9-168C-4D3E-00866C103DD5}"/>
               </a:ext>
             </a:extLst>
           </p:cNvPr>
@@ -26988,8 +27295,8 @@
         </p:blipFill>
         <p:spPr>
           <a:xfrm>
-            <a:off x="457200" y="2148214"/>
-            <a:ext cx="4012254" cy="2624525"/>
+            <a:off x="409711" y="2147003"/>
+            <a:ext cx="4049763" cy="2654323"/>
           </a:xfrm>
           <a:prstGeom prst="rect">
             <a:avLst/>
@@ -27026,6 +27333,36 @@
           <a:chExt cx="0" cy="0"/>
         </a:xfrm>
       </p:grpSpPr>
+      <p:pic>
+        <p:nvPicPr>
+          <p:cNvPr id="6" name="Picture 5">
+            <a:extLst>
+              <a:ext uri="{FF2B5EF4-FFF2-40B4-BE49-F238E27FC236}">
+                <a16:creationId xmlns:a16="http://schemas.microsoft.com/office/drawing/2014/main" id="{209CB76E-DC82-0DFD-65F7-6FCBD5F92A84}"/>
+              </a:ext>
+            </a:extLst>
+          </p:cNvPr>
+          <p:cNvPicPr>
+            <a:picLocks noChangeAspect="1"/>
+          </p:cNvPicPr>
+          <p:nvPr/>
+        </p:nvPicPr>
+        <p:blipFill>
+          <a:blip r:embed="rId2"/>
+          <a:stretch>
+            <a:fillRect/>
+          </a:stretch>
+        </p:blipFill>
+        <p:spPr>
+          <a:xfrm>
+            <a:off x="4867674" y="2117823"/>
+            <a:ext cx="3876498" cy="2654691"/>
+          </a:xfrm>
+          <a:prstGeom prst="rect">
+            <a:avLst/>
+          </a:prstGeom>
+        </p:spPr>
+      </p:pic>
       <p:sp>
         <p:nvSpPr>
           <p:cNvPr id="2" name="Title 1"/>
@@ -27082,7 +27419,7 @@
         </p:spPr>
         <p:txBody>
           <a:bodyPr>
-            <a:normAutofit fontScale="85000" lnSpcReduction="10000"/>
+            <a:normAutofit fontScale="92500" lnSpcReduction="10000"/>
           </a:bodyPr>
           <a:lstStyle/>
           <a:p>
@@ -27097,13 +27434,13 @@
           <a:p>
             <a:r>
               <a:rPr lang="en-US" sz="2000" dirty="0"/>
-              <a:t>Decreased Durban-Watson statistic indicates increased serial correlation of residuals</a:t>
+              <a:t>Increased Durban-Watson statistic indicates reduced serial correlation of residuals</a:t>
             </a:r>
           </a:p>
           <a:p>
             <a:r>
               <a:rPr lang="en-US" sz="2000" dirty="0"/>
-              <a:t>Increased Jarque-Bara statistic indicates reduced skewness of residuals</a:t>
+              <a:t>Decreased Jarque-Bara statistic indicates reduced skewness of residuals</a:t>
             </a:r>
           </a:p>
           <a:p>
@@ -27114,36 +27451,6 @@
           </a:p>
         </p:txBody>
       </p:sp>
-      <p:pic>
-        <p:nvPicPr>
-          <p:cNvPr id="13" name="Picture 12">
-            <a:extLst>
-              <a:ext uri="{FF2B5EF4-FFF2-40B4-BE49-F238E27FC236}">
-                <a16:creationId xmlns:a16="http://schemas.microsoft.com/office/drawing/2014/main" id="{BB266AC6-FE14-CA7F-356F-26A3463988BA}"/>
-              </a:ext>
-            </a:extLst>
-          </p:cNvPr>
-          <p:cNvPicPr>
-            <a:picLocks noChangeAspect="1"/>
-          </p:cNvPicPr>
-          <p:nvPr/>
-        </p:nvPicPr>
-        <p:blipFill>
-          <a:blip r:embed="rId2"/>
-          <a:stretch>
-            <a:fillRect/>
-          </a:stretch>
-        </p:blipFill>
-        <p:spPr>
-          <a:xfrm>
-            <a:off x="4867674" y="2147003"/>
-            <a:ext cx="4166598" cy="2617070"/>
-          </a:xfrm>
-          <a:prstGeom prst="rect">
-            <a:avLst/>
-          </a:prstGeom>
-        </p:spPr>
-      </p:pic>
       <p:sp>
         <p:nvSpPr>
           <p:cNvPr id="14" name="Content Placeholder 4">
@@ -27510,7 +27817,7 @@
         </p:nvCxnSpPr>
         <p:spPr>
           <a:xfrm>
-            <a:off x="4478528" y="4197456"/>
+            <a:off x="4478528" y="4246224"/>
             <a:ext cx="3833081" cy="0"/>
           </a:xfrm>
           <a:prstGeom prst="straightConnector1">
@@ -27555,7 +27862,7 @@
         </p:nvCxnSpPr>
         <p:spPr>
           <a:xfrm>
-            <a:off x="4478528" y="4345756"/>
+            <a:off x="4478528" y="4375544"/>
             <a:ext cx="3833081" cy="0"/>
           </a:xfrm>
           <a:prstGeom prst="straightConnector1">
@@ -27600,7 +27907,7 @@
         </p:nvCxnSpPr>
         <p:spPr>
           <a:xfrm>
-            <a:off x="4478528" y="4580165"/>
+            <a:off x="4478528" y="4616741"/>
             <a:ext cx="3935592" cy="0"/>
           </a:xfrm>
           <a:prstGeom prst="straightConnector1">
@@ -27631,10 +27938,10 @@
       </p:cxnSp>
       <p:pic>
         <p:nvPicPr>
-          <p:cNvPr id="4" name="Picture 3">
+          <p:cNvPr id="3" name="Picture 2">
             <a:extLst>
               <a:ext uri="{FF2B5EF4-FFF2-40B4-BE49-F238E27FC236}">
-                <a16:creationId xmlns:a16="http://schemas.microsoft.com/office/drawing/2014/main" id="{5A33167D-773A-5E9F-DC9F-3C81B791674F}"/>
+                <a16:creationId xmlns:a16="http://schemas.microsoft.com/office/drawing/2014/main" id="{455C4E52-DAA7-8AC0-535D-774EB1534D47}"/>
               </a:ext>
             </a:extLst>
           </p:cNvPr>
@@ -27651,8 +27958,8 @@
         </p:blipFill>
         <p:spPr>
           <a:xfrm>
-            <a:off x="457200" y="2148214"/>
-            <a:ext cx="4012254" cy="2624525"/>
+            <a:off x="409711" y="2147003"/>
+            <a:ext cx="4049763" cy="2654323"/>
           </a:xfrm>
           <a:prstGeom prst="rect">
             <a:avLst/>
@@ -27708,7 +28015,7 @@
               <a:buNone/>
             </a:pPr>
             <a:r>
-              <a:t>Linear Model Assumptions</a:t>
+              <a:t>Summary</a:t>
             </a:r>
           </a:p>
         </p:txBody>
@@ -27726,7 +28033,7 @@
         <p:spPr/>
         <p:txBody>
           <a:bodyPr>
-            <a:normAutofit fontScale="62500" lnSpcReduction="20000"/>
+            <a:normAutofit lnSpcReduction="10000"/>
           </a:bodyPr>
           <a:lstStyle/>
           <a:p>
@@ -27735,142 +28042,65 @@
             </a:pPr>
             <a:r>
               <a:rPr dirty="0"/>
-              <a:t>There are a number of assumptions in linear models that you overlook at your peril!</a:t>
+              <a:t>Linear models are a flexible and widely used class of models</a:t>
             </a:r>
           </a:p>
           <a:p>
             <a:pPr lvl="0"/>
             <a:r>
               <a:rPr dirty="0"/>
-              <a:t>The feature or predictor variables should be </a:t>
+              <a:t>Fit model coefficients by </a:t>
             </a:r>
             <a:r>
               <a:rPr b="1" dirty="0"/>
-              <a:t>independent</a:t>
+              <a:t>least squares</a:t>
             </a:r>
             <a:r>
               <a:rPr dirty="0"/>
-              <a:t> of one another</a:t>
+              <a:t> estimation</a:t>
+            </a:r>
+          </a:p>
+          <a:p>
+            <a:pPr lvl="0"/>
+            <a:r>
+              <a:rPr dirty="0"/>
+              <a:t>Can use many types of predictor variables</a:t>
+            </a:r>
+          </a:p>
+          <a:p>
+            <a:pPr lvl="0"/>
+            <a:r>
+              <a:rPr dirty="0"/>
+              <a:t>SGD and L-FBGS algorithms allow massive scaling of linear models</a:t>
+            </a:r>
+          </a:p>
+          <a:p>
+            <a:pPr lvl="0"/>
+            <a:r>
+              <a:rPr dirty="0"/>
+              <a:t>We prefer the simplest model that does a reasonable job</a:t>
             </a:r>
           </a:p>
           <a:p>
             <a:pPr lvl="1"/>
             <a:r>
               <a:rPr dirty="0"/>
-              <a:t>This is rarely true in practice</a:t>
-            </a:r>
-            <a:br>
+              <a:t>The principle of </a:t>
+            </a:r>
+            <a:r>
+              <a:rPr b="1" dirty="0"/>
+              <a:t>Occam’s razor</a:t>
+            </a:r>
+          </a:p>
+          <a:p>
+            <a:pPr lvl="0"/>
+            <a:r>
               <a:rPr dirty="0"/>
-            </a:br>
-            <a:endParaRPr dirty="0"/>
-          </a:p>
-          <a:p>
-            <a:pPr lvl="1"/>
+              <a:t>Must consider the </a:t>
+            </a:r>
             <a:r>
               <a:rPr b="1" dirty="0"/>
-              <a:t>Multi-</a:t>
-            </a:r>
-            <a:r>
-              <a:rPr b="1" dirty="0" err="1"/>
-              <a:t>colinearity</a:t>
-            </a:r>
-            <a:r>
-              <a:rPr dirty="0"/>
-              <a:t> between features makes the model </a:t>
-            </a:r>
-            <a:r>
-              <a:rPr b="1" dirty="0"/>
-              <a:t>under-determined</a:t>
-            </a:r>
-          </a:p>
-          <a:p>
-            <a:pPr lvl="0"/>
-            <a:r>
-              <a:rPr dirty="0"/>
-              <a:t>We assume that numeric features or predictors have zero mean and about the same scale</a:t>
-            </a:r>
-          </a:p>
-          <a:p>
-            <a:pPr lvl="1"/>
-            <a:r>
-              <a:rPr dirty="0"/>
-              <a:t>We do not want to bias the estimation of regression coefficients with predictors that do not have a 0 mean</a:t>
-            </a:r>
-            <a:br>
-              <a:rPr dirty="0"/>
-            </a:br>
-            <a:endParaRPr dirty="0"/>
-          </a:p>
-          <a:p>
-            <a:pPr lvl="1"/>
-            <a:r>
-              <a:rPr dirty="0"/>
-              <a:t>We do not want to have predictors with a large numeric range dominate training</a:t>
-            </a:r>
-            <a:br>
-              <a:rPr dirty="0"/>
-            </a:br>
-            <a:endParaRPr dirty="0"/>
-          </a:p>
-          <a:p>
-            <a:pPr lvl="1"/>
-            <a:r>
-              <a:rPr dirty="0"/>
-              <a:t>Example: income is in the range of 10s or 100s of thousands and age is in the range of 10s, but </a:t>
-            </a:r>
-            <a:r>
-              <a:rPr dirty="0" err="1"/>
-              <a:t>apriori</a:t>
-            </a:r>
-            <a:r>
-              <a:rPr dirty="0"/>
-              <a:t> income is no more important than age as a predictor</a:t>
-            </a:r>
-          </a:p>
-          <a:p>
-            <a:pPr lvl="0"/>
-            <a:r>
-              <a:rPr dirty="0"/>
-              <a:t>Values of each predictor or feature should be </a:t>
-            </a:r>
-            <a:r>
-              <a:rPr dirty="0" err="1"/>
-              <a:t>iid</a:t>
-            </a:r>
-            <a:endParaRPr dirty="0"/>
-          </a:p>
-          <a:p>
-            <a:pPr lvl="1"/>
-            <a:r>
-              <a:rPr dirty="0"/>
-              <a:t>If variance changes with sample, the optimal value of the coefficient could not be constant</a:t>
-            </a:r>
-            <a:br>
-              <a:rPr dirty="0"/>
-            </a:br>
-            <a:endParaRPr dirty="0"/>
-          </a:p>
-          <a:p>
-            <a:pPr lvl="1"/>
-            <a:r>
-              <a:rPr dirty="0"/>
-              <a:t>If there </a:t>
-            </a:r>
-            <a:r>
-              <a:rPr b="1" dirty="0"/>
-              <a:t>serial correlation</a:t>
-            </a:r>
-            <a:r>
-              <a:rPr dirty="0"/>
-              <a:t> in the predictor values, the </a:t>
-            </a:r>
-            <a:r>
-              <a:rPr dirty="0" err="1"/>
-              <a:t>iid</a:t>
-            </a:r>
-            <a:r>
-              <a:rPr dirty="0"/>
-              <a:t> assumption is violated - but can account for this such as in time series models</a:t>
+              <a:t>bias-variance trade-off</a:t>
             </a:r>
           </a:p>
         </p:txBody>
@@ -27910,17 +28140,26 @@
             <p:ph type="title"/>
           </p:nvPr>
         </p:nvSpPr>
-        <p:spPr/>
+        <p:spPr>
+          <a:xfrm>
+            <a:off x="457200" y="205979"/>
+            <a:ext cx="8229600" cy="468645"/>
+          </a:xfrm>
+        </p:spPr>
         <p:txBody>
-          <a:bodyPr/>
+          <a:bodyPr>
+            <a:normAutofit fontScale="90000"/>
+          </a:bodyPr>
           <a:lstStyle/>
           <a:p>
             <a:pPr marL="0" lvl="0" indent="0">
               <a:buNone/>
             </a:pPr>
             <a:r>
+              <a:rPr lang="en-US" dirty="0"/>
               <a:t>Summary</a:t>
             </a:r>
+            <a:endParaRPr dirty="0"/>
           </a:p>
         </p:txBody>
       </p:sp>
@@ -27934,10 +28173,15 @@
             <p:ph idx="1"/>
           </p:nvPr>
         </p:nvSpPr>
-        <p:spPr/>
+        <p:spPr>
+          <a:xfrm>
+            <a:off x="457200" y="804672"/>
+            <a:ext cx="8229600" cy="4238752"/>
+          </a:xfrm>
+        </p:spPr>
         <p:txBody>
           <a:bodyPr>
-            <a:normAutofit fontScale="92500"/>
+            <a:normAutofit fontScale="77500" lnSpcReduction="20000"/>
           </a:bodyPr>
           <a:lstStyle/>
           <a:p>
@@ -27945,64 +28189,127 @@
               <a:buNone/>
             </a:pPr>
             <a:r>
-              <a:t>Linear models are a flexible and widely used class of models</a:t>
+              <a:rPr dirty="0"/>
+              <a:t>There are a number of assumptions in linear models that you overlook at your peril!</a:t>
             </a:r>
           </a:p>
           <a:p>
             <a:pPr lvl="0"/>
             <a:r>
-              <a:t>Fit model coefficients by </a:t>
-            </a:r>
-            <a:r>
-              <a:rPr b="1"/>
-              <a:t>least squares</a:t>
-            </a:r>
-            <a:r>
-              <a:t> estimation</a:t>
+              <a:rPr dirty="0"/>
+              <a:t>The feature or predictor variables should be </a:t>
+            </a:r>
+            <a:r>
+              <a:rPr b="1" dirty="0"/>
+              <a:t>independent</a:t>
+            </a:r>
+            <a:r>
+              <a:rPr dirty="0"/>
+              <a:t> of one another</a:t>
+            </a:r>
+          </a:p>
+          <a:p>
+            <a:pPr lvl="1"/>
+            <a:r>
+              <a:rPr dirty="0"/>
+              <a:t>This is rarely true in practice</a:t>
+            </a:r>
+          </a:p>
+          <a:p>
+            <a:pPr lvl="1"/>
+            <a:r>
+              <a:rPr b="1" dirty="0"/>
+              <a:t>Multi-</a:t>
+            </a:r>
+            <a:r>
+              <a:rPr b="1" dirty="0" err="1"/>
+              <a:t>colinearity</a:t>
+            </a:r>
+            <a:r>
+              <a:rPr dirty="0"/>
+              <a:t> between features makes the model </a:t>
+            </a:r>
+            <a:r>
+              <a:rPr b="1" dirty="0"/>
+              <a:t>under-determined</a:t>
             </a:r>
           </a:p>
           <a:p>
             <a:pPr lvl="0"/>
             <a:r>
-              <a:t>Can use many types of predictor variables</a:t>
+              <a:rPr dirty="0"/>
+              <a:t>We assume that numeric features or predictors have zero mean and about the same scale</a:t>
+            </a:r>
+          </a:p>
+          <a:p>
+            <a:pPr lvl="1"/>
+            <a:r>
+              <a:rPr dirty="0"/>
+              <a:t>We do not want to bias the estimation of regression coefficients with predictors that do not have a 0 mean</a:t>
+            </a:r>
+          </a:p>
+          <a:p>
+            <a:pPr lvl="1"/>
+            <a:r>
+              <a:rPr dirty="0"/>
+              <a:t>We do not want to have predictors with a large numeric range dominate training</a:t>
+            </a:r>
+          </a:p>
+          <a:p>
+            <a:pPr lvl="1"/>
+            <a:r>
+              <a:rPr dirty="0"/>
+              <a:t>Example: income is in the range of 10s or 100s of thousands and age is in the range of 10s, but </a:t>
+            </a:r>
+            <a:r>
+              <a:rPr dirty="0" err="1"/>
+              <a:t>apriori</a:t>
+            </a:r>
+            <a:r>
+              <a:rPr dirty="0"/>
+              <a:t> income is no more important than age as a predictor</a:t>
             </a:r>
           </a:p>
           <a:p>
             <a:pPr lvl="0"/>
             <a:r>
-              <a:t>SGD and L-FBGS algorithms allow massive scaling of linear models</a:t>
-            </a:r>
-          </a:p>
-          <a:p>
-            <a:pPr lvl="0"/>
-            <a:r>
-              <a:t>We prefer the simplest model that does a reasonable job</a:t>
-            </a:r>
+              <a:rPr dirty="0"/>
+              <a:t>Values of each predictor or feature should be </a:t>
+            </a:r>
+            <a:r>
+              <a:rPr dirty="0" err="1"/>
+              <a:t>iid</a:t>
+            </a:r>
+            <a:endParaRPr dirty="0"/>
           </a:p>
           <a:p>
             <a:pPr lvl="1"/>
             <a:r>
-              <a:t>The principle of </a:t>
-            </a:r>
-            <a:r>
-              <a:rPr b="1"/>
-              <a:t>Occam’s razor</a:t>
-            </a:r>
-          </a:p>
-          <a:p>
-            <a:pPr lvl="0"/>
-            <a:r>
-              <a:t>Must consider the </a:t>
-            </a:r>
-            <a:r>
-              <a:rPr b="1"/>
-              <a:t>bias-variance trade-off</a:t>
-            </a:r>
-          </a:p>
-          <a:p>
-            <a:pPr lvl="0"/>
-            <a:r>
-              <a:t>Use robust methods if outliers are present</a:t>
+              <a:rPr dirty="0"/>
+              <a:t>If variance changes with sample, the optimal value of the coefficient could not be constant</a:t>
+            </a:r>
+          </a:p>
+          <a:p>
+            <a:pPr lvl="1"/>
+            <a:r>
+              <a:rPr dirty="0"/>
+              <a:t>If there </a:t>
+            </a:r>
+            <a:r>
+              <a:rPr b="1" dirty="0"/>
+              <a:t>serial correlation</a:t>
+            </a:r>
+            <a:r>
+              <a:rPr dirty="0"/>
+              <a:t> in the predictor values, the </a:t>
+            </a:r>
+            <a:r>
+              <a:rPr dirty="0" err="1"/>
+              <a:t>iid</a:t>
+            </a:r>
+            <a:r>
+              <a:rPr dirty="0"/>
+              <a:t> assumption is violated - but can account for this such as in time series models</a:t>
             </a:r>
           </a:p>
         </p:txBody>
@@ -28056,8 +28363,8 @@
           </a:p>
         </p:txBody>
       </p:sp>
-      <mc:AlternateContent xmlns:mc="http://schemas.openxmlformats.org/markup-compatibility/2006" xmlns:a14="http://schemas.microsoft.com/office/drawing/2010/main">
-        <mc:Choice Requires="a14">
+      <mc:AlternateContent xmlns:mc="http://schemas.openxmlformats.org/markup-compatibility/2006">
+        <mc:Choice xmlns:a14="http://schemas.microsoft.com/office/drawing/2010/main" Requires="a14">
           <p:sp>
             <p:nvSpPr>
               <p:cNvPr id="3" name="Content Placeholder 2"/>
@@ -28071,7 +28378,7 @@
             <p:spPr/>
             <p:txBody>
               <a:bodyPr>
-                <a:normAutofit fontScale="92500" lnSpcReduction="10000"/>
+                <a:normAutofit fontScale="92500"/>
               </a:bodyPr>
               <a:lstStyle/>
               <a:p>
@@ -28079,30 +28386,36 @@
                   <a:buNone/>
                 </a:pPr>
                 <a:r>
+                  <a:rPr dirty="0"/>
                   <a:t>When evaluating any machine learning model consider </a:t>
                 </a:r>
                 <a:r>
-                  <a:rPr b="1"/>
+                  <a:rPr b="1" dirty="0"/>
                   <a:t>all evaluation methods available</a:t>
                 </a:r>
               </a:p>
               <a:p>
                 <a:pPr lvl="0"/>
                 <a:r>
+                  <a:rPr dirty="0"/>
                   <a:t>No one method best all of the time</a:t>
                 </a:r>
               </a:p>
               <a:p>
                 <a:pPr lvl="1"/>
                 <a:r>
-                  <a:t>Homoskedastic Normally distributed residuals</a:t>
-                </a:r>
-                <a:br/>
-                <a:endParaRPr/>
+                  <a:rPr dirty="0" err="1"/>
+                  <a:t>Homoskedastic</a:t>
+                </a:r>
+                <a:r>
+                  <a:rPr dirty="0"/>
+                  <a:t> Normally distributed residuals</a:t>
+                </a:r>
               </a:p>
               <a:p>
                 <a:pPr lvl="1"/>
                 <a:r>
+                  <a:rPr dirty="0"/>
                   <a:t>Reasonable values </a:t>
                 </a:r>
                 <a14:m>
@@ -28135,42 +28448,52 @@
                   </m:oMath>
                 </a14:m>
                 <a:r>
-                  <a:t>, RMSE, etc</a:t>
-                </a:r>
+                  <a:rPr dirty="0"/>
+                  <a:t>, RMSE, </a:t>
+                </a:r>
+                <a:r>
+                  <a:rPr dirty="0" err="1"/>
+                  <a:t>etc</a:t>
+                </a:r>
+                <a:endParaRPr dirty="0"/>
               </a:p>
               <a:p>
                 <a:pPr lvl="1"/>
                 <a:r>
+                  <a:rPr dirty="0"/>
                   <a:t>Are the model coefficients all significant?</a:t>
                 </a:r>
               </a:p>
               <a:p>
                 <a:pPr lvl="0"/>
                 <a:r>
-                  <a:rPr b="1"/>
+                  <a:rPr b="1" dirty="0"/>
                   <a:t>Different methods highlight different problems</a:t>
                 </a:r>
                 <a:r>
+                  <a:rPr dirty="0"/>
                   <a:t> with your model</a:t>
                 </a:r>
               </a:p>
               <a:p>
                 <a:pPr lvl="0"/>
                 <a:r>
+                  <a:rPr dirty="0"/>
                   <a:t>Don’t forget to check that the </a:t>
                 </a:r>
                 <a:r>
-                  <a:rPr b="1"/>
+                  <a:rPr b="1" dirty="0"/>
                   <a:t>model must make sense</a:t>
                 </a:r>
                 <a:r>
+                  <a:rPr dirty="0"/>
                   <a:t> for your application!</a:t>
                 </a:r>
               </a:p>
             </p:txBody>
           </p:sp>
         </mc:Choice>
-        <mc:Fallback xmlns="">
+        <mc:Fallback>
           <p:sp>
             <p:nvSpPr>
               <p:cNvPr id="3" name="Content Placeholder 2"/>
@@ -28185,7 +28508,7 @@
               <a:blipFill>
                 <a:blip r:embed="rId2"/>
                 <a:stretch>
-                  <a:fillRect l="-963" t="-2334" b="-1257"/>
+                  <a:fillRect l="-963" t="-1257" b="-2154"/>
                 </a:stretch>
               </a:blipFill>
             </p:spPr>
@@ -28248,177 +28571,6 @@
               <a:buNone/>
             </a:pPr>
             <a:r>
-              <a:t>Why Linear Models</a:t>
-            </a:r>
-          </a:p>
-        </p:txBody>
-      </p:sp>
-      <p:sp>
-        <p:nvSpPr>
-          <p:cNvPr id="3" name="Content Placeholder 2"/>
-          <p:cNvSpPr>
-            <a:spLocks noGrp="1"/>
-          </p:cNvSpPr>
-          <p:nvPr>
-            <p:ph idx="1"/>
-          </p:nvPr>
-        </p:nvSpPr>
-        <p:spPr>
-          <a:xfrm>
-            <a:off x="457200" y="1200150"/>
-            <a:ext cx="8229600" cy="3798570"/>
-          </a:xfrm>
-        </p:spPr>
-        <p:txBody>
-          <a:bodyPr>
-            <a:normAutofit fontScale="92500" lnSpcReduction="20000"/>
-          </a:bodyPr>
-          <a:lstStyle/>
-          <a:p>
-            <a:pPr marL="0" lvl="0" indent="0">
-              <a:buNone/>
-            </a:pPr>
-            <a:r>
-              <a:rPr dirty="0"/>
-              <a:t>What are the alternatives?</a:t>
-            </a:r>
-          </a:p>
-          <a:p>
-            <a:pPr lvl="0"/>
-            <a:r>
-              <a:rPr dirty="0"/>
-              <a:t>Linear models are saleable and interpretable</a:t>
-            </a:r>
-          </a:p>
-          <a:p>
-            <a:pPr lvl="1"/>
-            <a:r>
-              <a:rPr dirty="0"/>
-              <a:t>Idea if </a:t>
-            </a:r>
-            <a:r>
-              <a:rPr b="1" dirty="0"/>
-              <a:t>goal is inference and exploration</a:t>
-            </a:r>
-            <a:endParaRPr dirty="0"/>
-          </a:p>
-          <a:p>
-            <a:pPr lvl="1"/>
-            <a:r>
-              <a:rPr dirty="0"/>
-              <a:t>Can </a:t>
-            </a:r>
-            <a:r>
-              <a:rPr b="1" dirty="0"/>
-              <a:t>identify data problems</a:t>
-            </a:r>
-            <a:r>
-              <a:rPr dirty="0"/>
-              <a:t> more easily</a:t>
-            </a:r>
-          </a:p>
-          <a:p>
-            <a:pPr lvl="1"/>
-            <a:r>
-              <a:rPr dirty="0"/>
-              <a:t>May have lower prediction accuracy on some problems</a:t>
-            </a:r>
-          </a:p>
-          <a:p>
-            <a:pPr lvl="0"/>
-            <a:r>
-              <a:rPr dirty="0"/>
-              <a:t>AdaBoost algorithms are go-to models for prediction on </a:t>
-            </a:r>
-            <a:r>
-              <a:rPr b="1" dirty="0"/>
-              <a:t>tabular data</a:t>
-            </a:r>
-          </a:p>
-          <a:p>
-            <a:pPr lvl="1"/>
-            <a:r>
-              <a:rPr dirty="0"/>
-              <a:t>Known to give superior predictions, </a:t>
-            </a:r>
-            <a:r>
-              <a:rPr b="1" dirty="0"/>
-              <a:t>but clean data matter more!</a:t>
-            </a:r>
-            <a:endParaRPr dirty="0"/>
-          </a:p>
-          <a:p>
-            <a:pPr lvl="1"/>
-            <a:r>
-              <a:rPr dirty="0"/>
-              <a:t>Interpretability is nearly impossible</a:t>
-            </a:r>
-          </a:p>
-          <a:p>
-            <a:pPr lvl="1"/>
-            <a:r>
-              <a:rPr dirty="0"/>
-              <a:t>Limits inference and exploration opportunities</a:t>
-            </a:r>
-            <a:endParaRPr lang="en-US" dirty="0"/>
-          </a:p>
-          <a:p>
-            <a:r>
-              <a:rPr lang="en-US" dirty="0"/>
-              <a:t>Neural network models give superior performance for </a:t>
-            </a:r>
-            <a:r>
-              <a:rPr lang="en-US" b="1" dirty="0"/>
-              <a:t>unstructured data</a:t>
-            </a:r>
-            <a:endParaRPr b="1" dirty="0"/>
-          </a:p>
-        </p:txBody>
-      </p:sp>
-    </p:spTree>
-  </p:cSld>
-  <p:clrMapOvr>
-    <a:masterClrMapping/>
-  </p:clrMapOvr>
-</p:sld>
-</file>
-
-<file path=ppt/slides/slide7.xml><?xml version="1.0" encoding="utf-8"?>
-<p:sld xmlns:a="http://schemas.openxmlformats.org/drawingml/2006/main" xmlns:r="http://schemas.openxmlformats.org/officeDocument/2006/relationships" xmlns:p="http://schemas.openxmlformats.org/presentationml/2006/main">
-  <p:cSld>
-    <p:spTree>
-      <p:nvGrpSpPr>
-        <p:cNvPr id="1" name=""/>
-        <p:cNvGrpSpPr/>
-        <p:nvPr/>
-      </p:nvGrpSpPr>
-      <p:grpSpPr>
-        <a:xfrm>
-          <a:off x="0" y="0"/>
-          <a:ext cx="0" cy="0"/>
-          <a:chOff x="0" y="0"/>
-          <a:chExt cx="0" cy="0"/>
-        </a:xfrm>
-      </p:grpSpPr>
-      <p:sp>
-        <p:nvSpPr>
-          <p:cNvPr id="2" name="Title 1"/>
-          <p:cNvSpPr>
-            <a:spLocks noGrp="1"/>
-          </p:cNvSpPr>
-          <p:nvPr>
-            <p:ph type="title"/>
-          </p:nvPr>
-        </p:nvSpPr>
-        <p:spPr/>
-        <p:txBody>
-          <a:bodyPr/>
-          <a:lstStyle/>
-          <a:p>
-            <a:pPr marL="0" lvl="0" indent="0">
-              <a:buNone/>
-            </a:pPr>
-            <a:r>
               <a:t>What is regression?</a:t>
             </a:r>
           </a:p>
@@ -28459,7 +28611,15 @@
             </a:r>
             <a:r>
               <a:rPr dirty="0"/>
-              <a:t> refers to a family of model that attempt to predict the value of numeric random variable</a:t>
+              <a:t> refers to a family of model</a:t>
+            </a:r>
+            <a:r>
+              <a:rPr lang="en-US" dirty="0"/>
+              <a:t>s</a:t>
+            </a:r>
+            <a:r>
+              <a:rPr dirty="0"/>
+              <a:t> that attempt to predict the value of numeric random variable</a:t>
             </a:r>
           </a:p>
           <a:p>
@@ -28550,7 +28710,7 @@
 </p:sld>
 </file>
 
-<file path=ppt/slides/slide8.xml><?xml version="1.0" encoding="utf-8"?>
+<file path=ppt/slides/slide7.xml><?xml version="1.0" encoding="utf-8"?>
 <p:sld xmlns:a="http://schemas.openxmlformats.org/drawingml/2006/main" xmlns:r="http://schemas.openxmlformats.org/officeDocument/2006/relationships" xmlns:p="http://schemas.openxmlformats.org/presentationml/2006/main">
   <p:cSld>
     <p:spTree>
@@ -28921,7 +29081,7 @@
 </p:sld>
 </file>
 
-<file path=ppt/slides/slide9.xml><?xml version="1.0" encoding="utf-8"?>
+<file path=ppt/slides/slide8.xml><?xml version="1.0" encoding="utf-8"?>
 <p:sld xmlns:a="http://schemas.openxmlformats.org/drawingml/2006/main" xmlns:r="http://schemas.openxmlformats.org/officeDocument/2006/relationships" xmlns:p="http://schemas.openxmlformats.org/presentationml/2006/main">
   <p:cSld>
     <p:spTree>
@@ -29440,6 +29600,386 @@
           </a:graphicData>
         </a:graphic>
       </p:graphicFrame>
+    </p:spTree>
+  </p:cSld>
+  <p:clrMapOvr>
+    <a:masterClrMapping/>
+  </p:clrMapOvr>
+</p:sld>
+</file>
+
+<file path=ppt/slides/slide9.xml><?xml version="1.0" encoding="utf-8"?>
+<p:sld xmlns:a="http://schemas.openxmlformats.org/drawingml/2006/main" xmlns:r="http://schemas.openxmlformats.org/officeDocument/2006/relationships" xmlns:p="http://schemas.openxmlformats.org/presentationml/2006/main">
+  <p:cSld>
+    <p:spTree>
+      <p:nvGrpSpPr>
+        <p:cNvPr id="1" name=""/>
+        <p:cNvGrpSpPr/>
+        <p:nvPr/>
+      </p:nvGrpSpPr>
+      <p:grpSpPr>
+        <a:xfrm>
+          <a:off x="0" y="0"/>
+          <a:ext cx="0" cy="0"/>
+          <a:chOff x="0" y="0"/>
+          <a:chExt cx="0" cy="0"/>
+        </a:xfrm>
+      </p:grpSpPr>
+      <p:sp>
+        <p:nvSpPr>
+          <p:cNvPr id="2" name="Title 1"/>
+          <p:cNvSpPr>
+            <a:spLocks noGrp="1"/>
+          </p:cNvSpPr>
+          <p:nvPr>
+            <p:ph type="title"/>
+          </p:nvPr>
+        </p:nvSpPr>
+        <p:spPr/>
+        <p:txBody>
+          <a:bodyPr/>
+          <a:lstStyle/>
+          <a:p>
+            <a:pPr marL="0" lvl="0" indent="0">
+              <a:buNone/>
+            </a:pPr>
+            <a:r>
+              <a:t>Formulating the Linear Model</a:t>
+            </a:r>
+          </a:p>
+        </p:txBody>
+      </p:sp>
+      <mc:AlternateContent xmlns:mc="http://schemas.openxmlformats.org/markup-compatibility/2006">
+        <mc:Choice xmlns:a14="http://schemas.microsoft.com/office/drawing/2010/main" Requires="a14">
+          <p:sp>
+            <p:nvSpPr>
+              <p:cNvPr id="3" name="Content Placeholder 2"/>
+              <p:cNvSpPr>
+                <a:spLocks noGrp="1"/>
+              </p:cNvSpPr>
+              <p:nvPr>
+                <p:ph idx="1"/>
+              </p:nvPr>
+            </p:nvSpPr>
+            <p:spPr>
+              <a:xfrm>
+                <a:off x="457200" y="1200150"/>
+                <a:ext cx="8229600" cy="3583177"/>
+              </a:xfrm>
+            </p:spPr>
+            <p:txBody>
+              <a:bodyPr>
+                <a:normAutofit/>
+              </a:bodyPr>
+              <a:lstStyle/>
+              <a:p>
+                <a:pPr marL="0" lvl="0" indent="0">
+                  <a:buNone/>
+                </a:pPr>
+                <a:r>
+                  <a:rPr dirty="0"/>
+                  <a:t>The general formulation of a linear model can be written:</a:t>
+                </a:r>
+              </a:p>
+              <a:p>
+                <a:pPr marL="0" lvl="0" indent="0">
+                  <a:buNone/>
+                </a:pPr>
+                <a14:m>
+                  <m:oMathPara xmlns:m="http://schemas.openxmlformats.org/officeDocument/2006/math">
+                    <m:oMathParaPr>
+                      <m:jc m:val="center"/>
+                    </m:oMathParaPr>
+                    <m:oMath xmlns:m="http://schemas.openxmlformats.org/officeDocument/2006/math">
+                      <m:acc>
+                        <m:accPr>
+                          <m:chr m:val="⃗"/>
+                          <m:ctrlPr>
+                            <a:rPr i="1">
+                              <a:latin typeface="Cambria Math" panose="02040503050406030204" pitchFamily="18" charset="0"/>
+                            </a:rPr>
+                          </m:ctrlPr>
+                        </m:accPr>
+                        <m:e>
+                          <m:r>
+                            <a:rPr>
+                              <a:latin typeface="Cambria Math" panose="02040503050406030204" pitchFamily="18" charset="0"/>
+                            </a:rPr>
+                            <m:t>𝑦</m:t>
+                          </m:r>
+                        </m:e>
+                      </m:acc>
+                      <m:r>
+                        <a:rPr>
+                          <a:latin typeface="Cambria Math" panose="02040503050406030204" pitchFamily="18" charset="0"/>
+                        </a:rPr>
+                        <m:t>=</m:t>
+                      </m:r>
+                      <m:r>
+                        <a:rPr>
+                          <a:latin typeface="Cambria Math" panose="02040503050406030204" pitchFamily="18" charset="0"/>
+                        </a:rPr>
+                        <m:t>𝐴</m:t>
+                      </m:r>
+                      <m:acc>
+                        <m:accPr>
+                          <m:chr m:val="⃗"/>
+                          <m:ctrlPr>
+                            <a:rPr i="1">
+                              <a:latin typeface="Cambria Math" panose="02040503050406030204" pitchFamily="18" charset="0"/>
+                            </a:rPr>
+                          </m:ctrlPr>
+                        </m:accPr>
+                        <m:e>
+                          <m:r>
+                            <a:rPr>
+                              <a:latin typeface="Cambria Math" panose="02040503050406030204" pitchFamily="18" charset="0"/>
+                            </a:rPr>
+                            <m:t>𝑏</m:t>
+                          </m:r>
+                        </m:e>
+                      </m:acc>
+                      <m:r>
+                        <a:rPr>
+                          <a:latin typeface="Cambria Math" panose="02040503050406030204" pitchFamily="18" charset="0"/>
+                        </a:rPr>
+                        <m:t>+</m:t>
+                      </m:r>
+                      <m:acc>
+                        <m:accPr>
+                          <m:chr m:val="⃗"/>
+                          <m:ctrlPr>
+                            <a:rPr i="1">
+                              <a:latin typeface="Cambria Math" panose="02040503050406030204" pitchFamily="18" charset="0"/>
+                            </a:rPr>
+                          </m:ctrlPr>
+                        </m:accPr>
+                        <m:e>
+                          <m:r>
+                            <a:rPr>
+                              <a:latin typeface="Cambria Math" panose="02040503050406030204" pitchFamily="18" charset="0"/>
+                            </a:rPr>
+                            <m:t>𝜖</m:t>
+                          </m:r>
+                        </m:e>
+                      </m:acc>
+                    </m:oMath>
+                  </m:oMathPara>
+                </a14:m>
+                <a:endParaRPr dirty="0"/>
+              </a:p>
+              <a:p>
+                <a:pPr lvl="0"/>
+                <a14:m>
+                  <m:oMath xmlns:m="http://schemas.openxmlformats.org/officeDocument/2006/math">
+                    <m:acc>
+                      <m:accPr>
+                        <m:chr m:val="⃗"/>
+                        <m:ctrlPr>
+                          <a:rPr i="1">
+                            <a:latin typeface="Cambria Math" panose="02040503050406030204" pitchFamily="18" charset="0"/>
+                          </a:rPr>
+                        </m:ctrlPr>
+                      </m:accPr>
+                      <m:e>
+                        <m:r>
+                          <a:rPr>
+                            <a:latin typeface="Cambria Math" panose="02040503050406030204" pitchFamily="18" charset="0"/>
+                          </a:rPr>
+                          <m:t>𝑦</m:t>
+                        </m:r>
+                      </m:e>
+                    </m:acc>
+                  </m:oMath>
+                </a14:m>
+                <a:r>
+                  <a:rPr dirty="0"/>
+                  <a:t> is the </a:t>
+                </a:r>
+                <a:r>
+                  <a:rPr lang="en-US" b="1" dirty="0"/>
+                  <a:t>n </a:t>
+                </a:r>
+                <a:r>
+                  <a:rPr b="1" dirty="0"/>
+                  <a:t>vector</a:t>
+                </a:r>
+                <a:r>
+                  <a:rPr dirty="0"/>
+                  <a:t> </a:t>
+                </a:r>
+                <a:r>
+                  <a:rPr lang="en-US" dirty="0"/>
+                  <a:t>or </a:t>
+                </a:r>
+                <a:r>
+                  <a:rPr b="1" dirty="0"/>
+                  <a:t>dependent variable </a:t>
+                </a:r>
+                <a:r>
+                  <a:rPr dirty="0"/>
+                  <a:t>or label we seek to predict</a:t>
+                </a:r>
+              </a:p>
+              <a:p>
+                <a:pPr lvl="0"/>
+                <a14:m>
+                  <m:oMath xmlns:m="http://schemas.openxmlformats.org/officeDocument/2006/math">
+                    <m:r>
+                      <a:rPr>
+                        <a:latin typeface="Cambria Math" panose="02040503050406030204" pitchFamily="18" charset="0"/>
+                      </a:rPr>
+                      <m:t>𝐴</m:t>
+                    </m:r>
+                  </m:oMath>
+                </a14:m>
+                <a:r>
+                  <a:rPr dirty="0"/>
+                  <a:t> is the </a:t>
+                </a:r>
+                <a14:m>
+                  <m:oMath xmlns:m="http://schemas.openxmlformats.org/officeDocument/2006/math">
+                    <m:r>
+                      <a:rPr>
+                        <a:latin typeface="Cambria Math" panose="02040503050406030204" pitchFamily="18" charset="0"/>
+                      </a:rPr>
+                      <m:t>𝑛</m:t>
+                    </m:r>
+                  </m:oMath>
+                </a14:m>
+                <a:r>
+                  <a:rPr dirty="0"/>
+                  <a:t> x </a:t>
+                </a:r>
+                <a14:m>
+                  <m:oMath xmlns:m="http://schemas.openxmlformats.org/officeDocument/2006/math">
+                    <m:r>
+                      <a:rPr>
+                        <a:latin typeface="Cambria Math" panose="02040503050406030204" pitchFamily="18" charset="0"/>
+                      </a:rPr>
+                      <m:t>𝑝</m:t>
+                    </m:r>
+                  </m:oMath>
+                </a14:m>
+                <a:r>
+                  <a:rPr dirty="0"/>
+                  <a:t> </a:t>
+                </a:r>
+                <a:r>
+                  <a:rPr b="1" dirty="0"/>
+                  <a:t>model matrix</a:t>
+                </a:r>
+                <a:r>
+                  <a:rPr dirty="0"/>
+                  <a:t> or </a:t>
+                </a:r>
+                <a:r>
+                  <a:rPr b="1" dirty="0"/>
+                  <a:t>design matrix</a:t>
+                </a:r>
+              </a:p>
+              <a:p>
+                <a:pPr lvl="1"/>
+                <a:r>
+                  <a:rPr dirty="0"/>
+                  <a:t>Defines the structure of the model</a:t>
+                </a:r>
+              </a:p>
+              <a:p>
+                <a:pPr lvl="1"/>
+                <a14:m>
+                  <m:oMath xmlns:m="http://schemas.openxmlformats.org/officeDocument/2006/math">
+                    <m:r>
+                      <a:rPr>
+                        <a:latin typeface="Cambria Math" panose="02040503050406030204" pitchFamily="18" charset="0"/>
+                      </a:rPr>
+                      <m:t>𝑝</m:t>
+                    </m:r>
+                  </m:oMath>
+                </a14:m>
+                <a:r>
+                  <a:rPr dirty="0"/>
+                  <a:t> columns </a:t>
+                </a:r>
+                <a:r>
+                  <a:rPr lang="en-US" dirty="0"/>
+                  <a:t>of </a:t>
+                </a:r>
+                <a:r>
+                  <a:rPr lang="en-US" b="1" dirty="0"/>
+                  <a:t>independent</a:t>
+                </a:r>
+                <a:r>
+                  <a:rPr b="1" dirty="0"/>
+                  <a:t> variables </a:t>
+                </a:r>
+                <a:r>
+                  <a:rPr dirty="0"/>
+                  <a:t>or features</a:t>
+                </a:r>
+              </a:p>
+              <a:p>
+                <a:pPr lvl="1"/>
+                <a14:m>
+                  <m:oMath xmlns:m="http://schemas.openxmlformats.org/officeDocument/2006/math">
+                    <m:r>
+                      <a:rPr>
+                        <a:latin typeface="Cambria Math" panose="02040503050406030204" pitchFamily="18" charset="0"/>
+                      </a:rPr>
+                      <m:t>𝑛</m:t>
+                    </m:r>
+                  </m:oMath>
+                </a14:m>
+                <a:r>
+                  <a:rPr dirty="0"/>
+                  <a:t> rows of </a:t>
+                </a:r>
+                <a:r>
+                  <a:rPr b="1" dirty="0"/>
+                  <a:t>training cases</a:t>
+                </a:r>
+              </a:p>
+            </p:txBody>
+          </p:sp>
+        </mc:Choice>
+        <mc:Fallback>
+          <p:sp>
+            <p:nvSpPr>
+              <p:cNvPr id="3" name="Content Placeholder 2"/>
+              <p:cNvSpPr>
+                <a:spLocks noGrp="1" noRot="1" noChangeAspect="1" noMove="1" noResize="1" noEditPoints="1" noAdjustHandles="1" noChangeArrowheads="1" noChangeShapeType="1" noTextEdit="1"/>
+              </p:cNvSpPr>
+              <p:nvPr>
+                <p:ph idx="1"/>
+              </p:nvPr>
+            </p:nvSpPr>
+            <p:spPr>
+              <a:xfrm>
+                <a:off x="457200" y="1200150"/>
+                <a:ext cx="8229600" cy="3583177"/>
+              </a:xfrm>
+              <a:blipFill>
+                <a:blip r:embed="rId2"/>
+                <a:stretch>
+                  <a:fillRect l="-1111" t="-1361"/>
+                </a:stretch>
+              </a:blipFill>
+            </p:spPr>
+            <p:txBody>
+              <a:bodyPr/>
+              <a:lstStyle/>
+              <a:p>
+                <a:r>
+                  <a:rPr lang="en-US">
+                    <a:noFill/>
+                  </a:rPr>
+                  <a:t> </a:t>
+                </a:r>
+              </a:p>
+            </p:txBody>
+          </p:sp>
+        </mc:Fallback>
+      </mc:AlternateContent>
     </p:spTree>
   </p:cSld>
   <p:clrMapOvr>

</xml_diff>

<commit_message>
Improvements and corrections to slide deck
</commit_message>
<xml_diff>
--- a/LectureSlides/08_IntroductionToLinearModels.pptx
+++ b/LectureSlides/08_IntroductionToLinearModels.pptx
@@ -35,16 +35,16 @@
     <p:sldId id="363" r:id="rId26"/>
     <p:sldId id="364" r:id="rId27"/>
     <p:sldId id="302" r:id="rId28"/>
-    <p:sldId id="303" r:id="rId29"/>
-    <p:sldId id="301" r:id="rId30"/>
-    <p:sldId id="367" r:id="rId31"/>
-    <p:sldId id="368" r:id="rId32"/>
-    <p:sldId id="370" r:id="rId33"/>
-    <p:sldId id="293" r:id="rId34"/>
-    <p:sldId id="294" r:id="rId35"/>
-    <p:sldId id="295" r:id="rId36"/>
-    <p:sldId id="296" r:id="rId37"/>
-    <p:sldId id="371" r:id="rId38"/>
+    <p:sldId id="382" r:id="rId29"/>
+    <p:sldId id="303" r:id="rId30"/>
+    <p:sldId id="301" r:id="rId31"/>
+    <p:sldId id="367" r:id="rId32"/>
+    <p:sldId id="368" r:id="rId33"/>
+    <p:sldId id="370" r:id="rId34"/>
+    <p:sldId id="293" r:id="rId35"/>
+    <p:sldId id="294" r:id="rId36"/>
+    <p:sldId id="295" r:id="rId37"/>
+    <p:sldId id="296" r:id="rId38"/>
     <p:sldId id="297" r:id="rId39"/>
     <p:sldId id="298" r:id="rId40"/>
     <p:sldId id="372" r:id="rId41"/>
@@ -263,7 +263,7 @@
           <a:p>
             <a:fld id="{19E36D9D-5B1A-4F71-A845-003503DCA96F}" type="datetimeFigureOut">
               <a:rPr lang="en-US" smtClean="0"/>
-              <a:t>9/23/2024</a:t>
+              <a:t>10/8/2024</a:t>
             </a:fld>
             <a:endParaRPr lang="en-US"/>
           </a:p>
@@ -793,7 +793,7 @@
           <a:p>
             <a:fld id="{241EB5C9-1307-BA42-ABA2-0BC069CD8E7F}" type="datetimeFigureOut">
               <a:rPr lang="en-US" smtClean="0"/>
-              <a:t>9/23/2024</a:t>
+              <a:t>10/8/2024</a:t>
             </a:fld>
             <a:endParaRPr lang="en-US"/>
           </a:p>
@@ -961,7 +961,7 @@
           <a:p>
             <a:fld id="{241EB5C9-1307-BA42-ABA2-0BC069CD8E7F}" type="datetimeFigureOut">
               <a:rPr lang="en-US" smtClean="0"/>
-              <a:t>9/23/2024</a:t>
+              <a:t>10/8/2024</a:t>
             </a:fld>
             <a:endParaRPr lang="en-US"/>
           </a:p>
@@ -1139,7 +1139,7 @@
           <a:p>
             <a:fld id="{241EB5C9-1307-BA42-ABA2-0BC069CD8E7F}" type="datetimeFigureOut">
               <a:rPr lang="en-US" smtClean="0"/>
-              <a:t>9/23/2024</a:t>
+              <a:t>10/8/2024</a:t>
             </a:fld>
             <a:endParaRPr lang="en-US"/>
           </a:p>
@@ -1307,7 +1307,7 @@
           <a:p>
             <a:fld id="{241EB5C9-1307-BA42-ABA2-0BC069CD8E7F}" type="datetimeFigureOut">
               <a:rPr lang="en-US" smtClean="0"/>
-              <a:t>9/23/2024</a:t>
+              <a:t>10/8/2024</a:t>
             </a:fld>
             <a:endParaRPr lang="en-US"/>
           </a:p>
@@ -1552,7 +1552,7 @@
           <a:p>
             <a:fld id="{241EB5C9-1307-BA42-ABA2-0BC069CD8E7F}" type="datetimeFigureOut">
               <a:rPr lang="en-US" smtClean="0"/>
-              <a:t>9/23/2024</a:t>
+              <a:t>10/8/2024</a:t>
             </a:fld>
             <a:endParaRPr lang="en-US"/>
           </a:p>
@@ -1837,7 +1837,7 @@
           <a:p>
             <a:fld id="{241EB5C9-1307-BA42-ABA2-0BC069CD8E7F}" type="datetimeFigureOut">
               <a:rPr lang="en-US" smtClean="0"/>
-              <a:t>9/23/2024</a:t>
+              <a:t>10/8/2024</a:t>
             </a:fld>
             <a:endParaRPr lang="en-US"/>
           </a:p>
@@ -2256,7 +2256,7 @@
           <a:p>
             <a:fld id="{241EB5C9-1307-BA42-ABA2-0BC069CD8E7F}" type="datetimeFigureOut">
               <a:rPr lang="en-US" smtClean="0"/>
-              <a:t>9/23/2024</a:t>
+              <a:t>10/8/2024</a:t>
             </a:fld>
             <a:endParaRPr lang="en-US"/>
           </a:p>
@@ -2373,7 +2373,7 @@
           <a:p>
             <a:fld id="{241EB5C9-1307-BA42-ABA2-0BC069CD8E7F}" type="datetimeFigureOut">
               <a:rPr lang="en-US" smtClean="0"/>
-              <a:t>9/23/2024</a:t>
+              <a:t>10/8/2024</a:t>
             </a:fld>
             <a:endParaRPr lang="en-US"/>
           </a:p>
@@ -2468,7 +2468,7 @@
           <a:p>
             <a:fld id="{241EB5C9-1307-BA42-ABA2-0BC069CD8E7F}" type="datetimeFigureOut">
               <a:rPr lang="en-US" smtClean="0"/>
-              <a:t>9/23/2024</a:t>
+              <a:t>10/8/2024</a:t>
             </a:fld>
             <a:endParaRPr lang="en-US"/>
           </a:p>
@@ -2743,7 +2743,7 @@
           <a:p>
             <a:fld id="{241EB5C9-1307-BA42-ABA2-0BC069CD8E7F}" type="datetimeFigureOut">
               <a:rPr lang="en-US" smtClean="0"/>
-              <a:t>9/23/2024</a:t>
+              <a:t>10/8/2024</a:t>
             </a:fld>
             <a:endParaRPr lang="en-US"/>
           </a:p>
@@ -2995,7 +2995,7 @@
           <a:p>
             <a:fld id="{241EB5C9-1307-BA42-ABA2-0BC069CD8E7F}" type="datetimeFigureOut">
               <a:rPr lang="en-US" smtClean="0"/>
-              <a:t>9/23/2024</a:t>
+              <a:t>10/8/2024</a:t>
             </a:fld>
             <a:endParaRPr lang="en-US"/>
           </a:p>
@@ -3206,7 +3206,7 @@
           <a:p>
             <a:fld id="{241EB5C9-1307-BA42-ABA2-0BC069CD8E7F}" type="datetimeFigureOut">
               <a:rPr lang="en-US" smtClean="0"/>
-              <a:t>9/23/2024</a:t>
+              <a:t>10/8/2024</a:t>
             </a:fld>
             <a:endParaRPr lang="en-US"/>
           </a:p>
@@ -3824,13 +3824,13 @@
             </p:nvSpPr>
             <p:spPr>
               <a:xfrm>
-                <a:off x="457200" y="1200150"/>
-                <a:ext cx="8229600" cy="3766057"/>
+                <a:off x="457199" y="1200150"/>
+                <a:ext cx="8613281" cy="3766057"/>
               </a:xfrm>
             </p:spPr>
             <p:txBody>
               <a:bodyPr>
-                <a:normAutofit/>
+                <a:normAutofit lnSpcReduction="10000"/>
               </a:bodyPr>
               <a:lstStyle/>
               <a:p>
@@ -4153,6 +4153,17 @@
               </a:p>
               <a:p>
                 <a:pPr lvl="1"/>
+                <a:r>
+                  <a:rPr lang="en-US" dirty="0"/>
+                  <a:t>Response of model is </a:t>
+                </a:r>
+                <a:r>
+                  <a:rPr lang="en-US" b="1" dirty="0"/>
+                  <a:t>linear WRT these coefficients </a:t>
+                </a:r>
+              </a:p>
+              <a:p>
+                <a:pPr lvl="1"/>
                 <a14:m>
                   <m:oMath xmlns:m="http://schemas.openxmlformats.org/officeDocument/2006/math">
                     <m:r>
@@ -4355,7 +4366,7 @@
                 </a:r>
                 <a:r>
                   <a:rPr lang="en-US" b="1" dirty="0"/>
-                  <a:t> Normally distributed with 0 mean</a:t>
+                  <a:t> Normally distributed homoscedastic with 0 mean</a:t>
                 </a:r>
                 <a:r>
                   <a:rPr lang="en-US" dirty="0"/>
@@ -4485,13 +4496,13 @@
             </p:nvSpPr>
             <p:spPr>
               <a:xfrm>
-                <a:off x="457200" y="1200150"/>
-                <a:ext cx="8229600" cy="3766057"/>
+                <a:off x="457199" y="1200150"/>
+                <a:ext cx="8613281" cy="3766057"/>
               </a:xfrm>
               <a:blipFill>
                 <a:blip r:embed="rId2"/>
                 <a:stretch>
-                  <a:fillRect l="-1111" t="-1294"/>
+                  <a:fillRect l="-1062" t="-2265"/>
                 </a:stretch>
               </a:blipFill>
             </p:spPr>
@@ -4559,8 +4570,8 @@
           </a:p>
         </p:txBody>
       </p:sp>
-      <mc:AlternateContent xmlns:mc="http://schemas.openxmlformats.org/markup-compatibility/2006">
-        <mc:Choice xmlns:a14="http://schemas.microsoft.com/office/drawing/2010/main" Requires="a14">
+      <mc:AlternateContent xmlns:mc="http://schemas.openxmlformats.org/markup-compatibility/2006" xmlns:a14="http://schemas.microsoft.com/office/drawing/2010/main">
+        <mc:Choice Requires="a14">
           <p:sp>
             <p:nvSpPr>
               <p:cNvPr id="3" name="Content Placeholder 2"/>
@@ -4681,7 +4692,7 @@
             </p:txBody>
           </p:sp>
         </mc:Choice>
-        <mc:Fallback>
+        <mc:Fallback xmlns="">
           <p:sp>
             <p:nvSpPr>
               <p:cNvPr id="3" name="Content Placeholder 2"/>
@@ -4776,7 +4787,7 @@
             </p:spPr>
             <p:txBody>
               <a:bodyPr vert="horz" lIns="91440" tIns="45720" rIns="91440" bIns="45720" rtlCol="0">
-                <a:normAutofit/>
+                <a:normAutofit lnSpcReduction="10000"/>
               </a:bodyPr>
               <a:lstStyle>
                 <a:lvl1pPr marL="342900" indent="-342900" algn="l" defTabSz="342900" rtl="0" eaLnBrk="1" latinLnBrk="0" hangingPunct="1">
@@ -4962,7 +4973,7 @@
                 </a:r>
                 <a:r>
                   <a:rPr lang="en-US" b="1" dirty="0"/>
-                  <a:t> in </a:t>
+                  <a:t> and homoscedastic in </a:t>
                 </a:r>
                 <a14:m>
                   <m:oMath xmlns:m="http://schemas.openxmlformats.org/officeDocument/2006/math">
@@ -5023,7 +5034,7 @@
               <a:blipFill>
                 <a:blip r:embed="rId4"/>
                 <a:stretch>
-                  <a:fillRect l="-2834" t="-4190"/>
+                  <a:fillRect l="-2834" t="-5866" b="-4469"/>
                 </a:stretch>
               </a:blipFill>
             </p:spPr>
@@ -5111,7 +5122,7 @@
             <p:spPr>
               <a:xfrm>
                 <a:off x="457200" y="1063229"/>
-                <a:ext cx="8229600" cy="3874292"/>
+                <a:ext cx="8229600" cy="4005028"/>
               </a:xfrm>
             </p:spPr>
             <p:txBody>
@@ -5347,7 +5358,7 @@
               <a:p>
                 <a:r>
                   <a:rPr lang="en-US" dirty="0"/>
-                  <a:t>Need model such that </a:t>
+                  <a:t>Fit model such that </a:t>
                 </a:r>
                 <a14:m>
                   <m:oMath xmlns:m="http://schemas.openxmlformats.org/officeDocument/2006/math">
@@ -5479,6 +5490,13 @@
                 </a:r>
               </a:p>
               <a:p>
+                <a:pPr lvl="1"/>
+                <a:r>
+                  <a:rPr lang="en-US" b="1" dirty="0"/>
+                  <a:t>Minimize sum of squared error</a:t>
+                </a:r>
+              </a:p>
+              <a:p>
                 <a:pPr lvl="0"/>
                 <a14:m>
                   <m:oMath xmlns:m="http://schemas.openxmlformats.org/officeDocument/2006/math">
@@ -5669,7 +5687,14 @@
                     </m:r>
                   </m:oMath>
                 </a14:m>
-                <a:endParaRPr lang="en-US" dirty="0"/>
+                <a:r>
+                  <a:rPr lang="en-US" dirty="0"/>
+                  <a:t> – a </a:t>
+                </a:r>
+                <a:r>
+                  <a:rPr lang="en-US" b="1" dirty="0"/>
+                  <a:t>zero-centered model</a:t>
+                </a:r>
               </a:p>
               <a:p>
                 <a:pPr lvl="0"/>
@@ -5892,12 +5917,12 @@
             <p:spPr>
               <a:xfrm>
                 <a:off x="457200" y="1063229"/>
-                <a:ext cx="8229600" cy="3874292"/>
+                <a:ext cx="8229600" cy="4005028"/>
               </a:xfrm>
               <a:blipFill>
                 <a:blip r:embed="rId2"/>
                 <a:stretch>
-                  <a:fillRect l="-741" t="-2201"/>
+                  <a:fillRect l="-741" t="-2131"/>
                 </a:stretch>
               </a:blipFill>
             </p:spPr>
@@ -5977,9 +6002,16 @@
                 <p:ph idx="1"/>
               </p:nvPr>
             </p:nvSpPr>
-            <p:spPr/>
+            <p:spPr>
+              <a:xfrm>
+                <a:off x="457200" y="1200151"/>
+                <a:ext cx="8229600" cy="3679712"/>
+              </a:xfrm>
+            </p:spPr>
             <p:txBody>
-              <a:bodyPr/>
+              <a:bodyPr>
+                <a:normAutofit/>
+              </a:bodyPr>
               <a:lstStyle/>
               <a:p>
                 <a:pPr marL="0" lvl="0" indent="0">
@@ -6642,6 +6674,17 @@
                   <a:rPr lang="en-US" b="1" dirty="0"/>
                   <a:t>variance of the residuals is stationary</a:t>
                 </a:r>
+              </a:p>
+              <a:p>
+                <a:pPr lvl="1"/>
+                <a:r>
+                  <a:rPr lang="en-US" dirty="0"/>
+                  <a:t>The error or residual is </a:t>
+                </a:r>
+                <a:r>
+                  <a:rPr lang="en-US" b="1" dirty="0"/>
+                  <a:t>homoscedastic </a:t>
+                </a:r>
                 <a:endParaRPr b="1" dirty="0"/>
               </a:p>
             </p:txBody>
@@ -6659,10 +6702,14 @@
               </p:nvPr>
             </p:nvSpPr>
             <p:spPr>
+              <a:xfrm>
+                <a:off x="457200" y="1200151"/>
+                <a:ext cx="8229600" cy="3679712"/>
+              </a:xfrm>
               <a:blipFill>
                 <a:blip r:embed="rId3"/>
                 <a:stretch>
-                  <a:fillRect l="-1111" t="-1436" r="-519" b="-898"/>
+                  <a:fillRect l="-1111" t="-1325" r="-519" b="-2815"/>
                 </a:stretch>
               </a:blipFill>
             </p:spPr>
@@ -7053,8 +7100,8 @@
           </a:p>
         </p:txBody>
       </p:sp>
-      <mc:AlternateContent xmlns:mc="http://schemas.openxmlformats.org/markup-compatibility/2006">
-        <mc:Choice xmlns:a14="http://schemas.microsoft.com/office/drawing/2010/main" Requires="a14">
+      <mc:AlternateContent xmlns:mc="http://schemas.openxmlformats.org/markup-compatibility/2006" xmlns:a14="http://schemas.microsoft.com/office/drawing/2010/main">
+        <mc:Choice Requires="a14">
           <p:sp>
             <p:nvSpPr>
               <p:cNvPr id="3" name="Content Placeholder 2"/>
@@ -7443,7 +7490,7 @@
             </p:txBody>
           </p:sp>
         </mc:Choice>
-        <mc:Fallback>
+        <mc:Fallback xmlns="">
           <p:sp>
             <p:nvSpPr>
               <p:cNvPr id="3" name="Content Placeholder 2"/>
@@ -7530,8 +7577,8 @@
           </a:p>
         </p:txBody>
       </p:sp>
-      <mc:AlternateContent xmlns:mc="http://schemas.openxmlformats.org/markup-compatibility/2006" xmlns:a14="http://schemas.microsoft.com/office/drawing/2010/main">
-        <mc:Choice Requires="a14">
+      <mc:AlternateContent xmlns:mc="http://schemas.openxmlformats.org/markup-compatibility/2006">
+        <mc:Choice xmlns:a14="http://schemas.microsoft.com/office/drawing/2010/main" Requires="a14">
           <p:sp>
             <p:nvSpPr>
               <p:cNvPr id="3" name="Content Placeholder 2"/>
@@ -7560,7 +7607,7 @@
                 </a:r>
                 <a:r>
                   <a:rPr dirty="0"/>
-                  <a:t> for this case, including the intercept term is:</a:t>
+                  <a:t> for this case, including the intercept term:</a:t>
                 </a:r>
               </a:p>
               <a:p>
@@ -7798,7 +7845,7 @@
             </p:txBody>
           </p:sp>
         </mc:Choice>
-        <mc:Fallback xmlns="">
+        <mc:Fallback>
           <p:sp>
             <p:nvSpPr>
               <p:cNvPr id="3" name="Content Placeholder 2"/>
@@ -10257,7 +10304,7 @@
         <p:spPr/>
         <p:txBody>
           <a:bodyPr>
-            <a:normAutofit fontScale="55000" lnSpcReduction="20000"/>
+            <a:normAutofit fontScale="70000" lnSpcReduction="20000"/>
           </a:bodyPr>
           <a:lstStyle/>
           <a:p>
@@ -10265,74 +10312,83 @@
               <a:buNone/>
             </a:pPr>
             <a:r>
+              <a:rPr dirty="0"/>
               <a:t>Bayesian analysis is a contrast to frequentist methods</a:t>
             </a:r>
           </a:p>
           <a:p>
             <a:pPr lvl="0"/>
             <a:r>
+              <a:rPr dirty="0"/>
               <a:t>The objective of Bayesian analysis is to compute a posterior distribution</a:t>
             </a:r>
-            <a:br/>
-            <a:endParaRPr/>
           </a:p>
           <a:p>
             <a:pPr lvl="0"/>
             <a:r>
+              <a:rPr dirty="0"/>
               <a:t>Contrast with frequentist statistics; computing a point estimate and confidence interval from a sample</a:t>
             </a:r>
           </a:p>
           <a:p>
             <a:pPr lvl="0"/>
             <a:r>
+              <a:rPr dirty="0"/>
               <a:t>Bayesian models allows expressing prior information in the form of a prior distribution</a:t>
             </a:r>
-            <a:br/>
-            <a:endParaRPr/>
           </a:p>
           <a:p>
             <a:pPr lvl="0"/>
             <a:r>
+              <a:rPr dirty="0"/>
               <a:t>Selection of prior distributions can be performed in a number of ways</a:t>
             </a:r>
           </a:p>
           <a:p>
             <a:pPr lvl="0"/>
             <a:r>
+              <a:rPr dirty="0"/>
               <a:t>The posterior distribution is said to quantify our current </a:t>
             </a:r>
             <a:r>
-              <a:rPr b="1"/>
+              <a:rPr b="1" dirty="0"/>
               <a:t>belief</a:t>
             </a:r>
-            <a:br/>
-            <a:endParaRPr/>
+            <a:endParaRPr dirty="0"/>
           </a:p>
           <a:p>
             <a:pPr lvl="0"/>
             <a:r>
+              <a:rPr dirty="0"/>
               <a:t>We update beliefs based on additional data or evidence</a:t>
             </a:r>
-            <a:br/>
-            <a:endParaRPr/>
           </a:p>
           <a:p>
             <a:pPr lvl="0"/>
             <a:r>
+              <a:rPr dirty="0"/>
               <a:t>A critical difference with frequentist models which must be computed from a complete sample</a:t>
             </a:r>
-            <a:br/>
-            <a:endParaRPr/>
           </a:p>
           <a:p>
             <a:pPr lvl="0"/>
             <a:r>
-              <a:t>Inference can be performed on the posterior distribution by finding the maximum a postiori (MAP) value and a credible interval</a:t>
+              <a:rPr dirty="0"/>
+              <a:t>Inference can be performed on the posterior distribution by finding the maximum a </a:t>
+            </a:r>
+            <a:r>
+              <a:rPr dirty="0" err="1"/>
+              <a:t>postiori</a:t>
+            </a:r>
+            <a:r>
+              <a:rPr dirty="0"/>
+              <a:t> (MAP) value and a credible interval</a:t>
             </a:r>
           </a:p>
           <a:p>
             <a:pPr lvl="0"/>
             <a:r>
+              <a:rPr dirty="0"/>
               <a:t>Predictions are made by simulating from the posterior distribution a</a:t>
             </a:r>
           </a:p>
@@ -11393,15 +11449,23 @@
             <p:ph type="title"/>
           </p:nvPr>
         </p:nvSpPr>
-        <p:spPr/>
+        <p:spPr>
+          <a:xfrm>
+            <a:off x="457200" y="205979"/>
+            <a:ext cx="8229600" cy="584357"/>
+          </a:xfrm>
+        </p:spPr>
         <p:txBody>
-          <a:bodyPr/>
+          <a:bodyPr>
+            <a:normAutofit fontScale="90000"/>
+          </a:bodyPr>
           <a:lstStyle/>
           <a:p>
             <a:pPr marL="0" lvl="0" indent="0">
               <a:buNone/>
             </a:pPr>
             <a:r>
+              <a:rPr dirty="0"/>
               <a:t>Estimating the Model Parameters</a:t>
             </a:r>
           </a:p>
@@ -11421,8 +11485,8 @@
             </p:nvSpPr>
             <p:spPr>
               <a:xfrm>
-                <a:off x="457200" y="1063230"/>
-                <a:ext cx="8229600" cy="3817634"/>
+                <a:off x="457199" y="1084414"/>
+                <a:ext cx="8378937" cy="4025198"/>
               </a:xfrm>
             </p:spPr>
             <p:txBody>
@@ -11451,7 +11515,15 @@
                 <a:pPr lvl="0"/>
                 <a:r>
                   <a:rPr lang="en-US" sz="1600" dirty="0"/>
-                  <a:t>First consider how the Normal likelihood can be written in terms of </a:t>
+                  <a:t>First consider how the </a:t>
+                </a:r>
+                <a:r>
+                  <a:rPr lang="en-US" sz="1600" b="1" dirty="0"/>
+                  <a:t>Normal likelihood </a:t>
+                </a:r>
+                <a:r>
+                  <a:rPr lang="en-US" sz="1600" dirty="0"/>
+                  <a:t>can be written in terms of </a:t>
                 </a:r>
                 <a14:m>
                   <m:oMath xmlns:m="http://schemas.openxmlformats.org/officeDocument/2006/math">
@@ -11465,7 +11537,7 @@
                 </a14:m>
                 <a:r>
                   <a:rPr lang="en-US" sz="1600" dirty="0"/>
-                  <a:t> length model parameter vector, </a:t>
+                  <a:t> model parameter vector, </a:t>
                 </a:r>
                 <a14:m>
                   <m:oMath xmlns:m="http://schemas.openxmlformats.org/officeDocument/2006/math">
@@ -12694,13 +12766,13 @@
             </p:nvSpPr>
             <p:spPr>
               <a:xfrm>
-                <a:off x="457200" y="1063230"/>
-                <a:ext cx="8229600" cy="3817634"/>
+                <a:off x="457199" y="1084414"/>
+                <a:ext cx="8378937" cy="4025198"/>
               </a:xfrm>
               <a:blipFill>
                 <a:blip r:embed="rId2"/>
                 <a:stretch>
-                  <a:fillRect l="-370" t="-478"/>
+                  <a:fillRect l="-364" t="-455" r="-364"/>
                 </a:stretch>
               </a:blipFill>
             </p:spPr>
@@ -13935,8 +14007,8 @@
           </a:p>
         </p:txBody>
       </p:sp>
-      <mc:AlternateContent xmlns:mc="http://schemas.openxmlformats.org/markup-compatibility/2006" xmlns:a14="http://schemas.microsoft.com/office/drawing/2010/main">
-        <mc:Choice Requires="a14">
+      <mc:AlternateContent xmlns:mc="http://schemas.openxmlformats.org/markup-compatibility/2006">
+        <mc:Choice xmlns:a14="http://schemas.microsoft.com/office/drawing/2010/main" Requires="a14">
           <p:sp>
             <p:nvSpPr>
               <p:cNvPr id="3" name="Content Placeholder 2"/>
@@ -13963,45 +14035,45 @@
                   <a:buNone/>
                 </a:pPr>
                 <a:r>
-                  <a:rPr dirty="0"/>
+                  <a:rPr lang="en-US" dirty="0"/>
                   <a:t>How do we specify the model formula with </a:t>
                 </a:r>
                 <a:r>
-                  <a:rPr dirty="0" err="1"/>
+                  <a:rPr lang="en-US" dirty="0" err="1"/>
                   <a:t>statsmodels</a:t>
                 </a:r>
                 <a:r>
-                  <a:rPr dirty="0"/>
+                  <a:rPr lang="en-US" dirty="0"/>
                   <a:t>?</a:t>
                 </a:r>
               </a:p>
               <a:p>
                 <a:pPr lvl="0"/>
                 <a:r>
-                  <a:rPr dirty="0"/>
+                  <a:rPr lang="en-US" dirty="0"/>
                   <a:t>Use the S/R style model formula developed by </a:t>
                 </a:r>
                 <a:r>
-                  <a:rPr dirty="0">
+                  <a:rPr lang="en-US" dirty="0">
                     <a:hlinkClick r:id="rId2"/>
                   </a:rPr>
                   <a:t>Chambers and Hastie; Statistical Models in S (1992)</a:t>
                 </a:r>
                 <a:r>
-                  <a:rPr dirty="0"/>
+                  <a:rPr lang="en-US" dirty="0"/>
                   <a:t>.</a:t>
                 </a:r>
               </a:p>
               <a:p>
                 <a:pPr lvl="0"/>
                 <a:r>
-                  <a:rPr dirty="0"/>
+                  <a:rPr lang="en-US" dirty="0"/>
                   <a:t>Uses the </a:t>
                 </a:r>
                 <a14:m>
                   <m:oMath xmlns:m="http://schemas.openxmlformats.org/officeDocument/2006/math">
                     <m:r>
-                      <a:rPr>
+                      <a:rPr lang="en-US">
                         <a:latin typeface="Cambria Math" panose="02040503050406030204" pitchFamily="18" charset="0"/>
                       </a:rPr>
                       <m:t>∼</m:t>
@@ -14009,7 +14081,7 @@
                   </m:oMath>
                 </a14:m>
                 <a:r>
-                  <a:rPr dirty="0"/>
+                  <a:rPr lang="en-US" dirty="0"/>
                   <a:t> operator to mean *modeled by**</a:t>
                 </a:r>
               </a:p>
@@ -14024,43 +14096,43 @@
                     </m:oMathParaPr>
                     <m:oMath xmlns:m="http://schemas.openxmlformats.org/officeDocument/2006/math">
                       <m:r>
-                        <a:rPr>
+                        <a:rPr lang="en-US">
                           <a:latin typeface="Cambria Math" panose="02040503050406030204" pitchFamily="18" charset="0"/>
                         </a:rPr>
                         <m:t>𝑑𝑒𝑝𝑒𝑛𝑑𝑒𝑛𝑡</m:t>
                       </m:r>
                       <m:r>
-                        <a:rPr>
+                        <a:rPr lang="en-US">
                           <a:latin typeface="Cambria Math" panose="02040503050406030204" pitchFamily="18" charset="0"/>
                         </a:rPr>
                         <m:t> </m:t>
                       </m:r>
                       <m:r>
-                        <a:rPr>
+                        <a:rPr lang="en-US">
                           <a:latin typeface="Cambria Math" panose="02040503050406030204" pitchFamily="18" charset="0"/>
                         </a:rPr>
                         <m:t>𝑣𝑎𝑟𝑖𝑎𝑏𝑙𝑒</m:t>
                       </m:r>
                       <m:r>
-                        <a:rPr>
+                        <a:rPr lang="en-US">
                           <a:latin typeface="Cambria Math" panose="02040503050406030204" pitchFamily="18" charset="0"/>
                         </a:rPr>
                         <m:t>∼</m:t>
                       </m:r>
                       <m:r>
-                        <a:rPr>
+                        <a:rPr lang="en-US">
                           <a:latin typeface="Cambria Math" panose="02040503050406030204" pitchFamily="18" charset="0"/>
                         </a:rPr>
                         <m:t>𝑖𝑛𝑑𝑒𝑝𝑒𝑛𝑒𝑛𝑡</m:t>
                       </m:r>
                       <m:r>
-                        <a:rPr>
+                        <a:rPr lang="en-US">
                           <a:latin typeface="Cambria Math" panose="02040503050406030204" pitchFamily="18" charset="0"/>
                         </a:rPr>
                         <m:t> </m:t>
                       </m:r>
                       <m:r>
-                        <a:rPr>
+                        <a:rPr lang="en-US">
                           <a:latin typeface="Cambria Math" panose="02040503050406030204" pitchFamily="18" charset="0"/>
                         </a:rPr>
                         <m:t>𝑣𝑎𝑟𝑖𝑎𝑏𝑙𝑒𝑠</m:t>
@@ -14068,12 +14140,12 @@
                     </m:oMath>
                   </m:oMathPara>
                 </a14:m>
-                <a:endParaRPr dirty="0"/>
+                <a:endParaRPr lang="en-US" dirty="0"/>
               </a:p>
               <a:p>
                 <a:pPr lvl="0"/>
                 <a:r>
-                  <a:rPr dirty="0"/>
+                  <a:rPr lang="en-US" dirty="0"/>
                   <a:t>Example; dependent variable (dv) modeled by two independent variables (var1 and var2):</a:t>
                 </a:r>
               </a:p>
@@ -14088,43 +14160,43 @@
                     </m:oMathParaPr>
                     <m:oMath xmlns:m="http://schemas.openxmlformats.org/officeDocument/2006/math">
                       <m:r>
-                        <a:rPr>
+                        <a:rPr lang="en-US">
                           <a:latin typeface="Cambria Math" panose="02040503050406030204" pitchFamily="18" charset="0"/>
                         </a:rPr>
                         <m:t>𝑑𝑣</m:t>
                       </m:r>
                       <m:r>
-                        <a:rPr>
+                        <a:rPr lang="en-US">
                           <a:latin typeface="Cambria Math" panose="02040503050406030204" pitchFamily="18" charset="0"/>
                         </a:rPr>
                         <m:t>∼</m:t>
                       </m:r>
                       <m:r>
-                        <a:rPr>
+                        <a:rPr lang="en-US">
                           <a:latin typeface="Cambria Math" panose="02040503050406030204" pitchFamily="18" charset="0"/>
                         </a:rPr>
                         <m:t>𝑣𝑎𝑟</m:t>
                       </m:r>
                       <m:r>
-                        <a:rPr>
+                        <a:rPr lang="en-US">
                           <a:latin typeface="Cambria Math" panose="02040503050406030204" pitchFamily="18" charset="0"/>
                         </a:rPr>
                         <m:t>1</m:t>
                       </m:r>
                       <m:r>
-                        <a:rPr>
+                        <a:rPr lang="en-US">
                           <a:latin typeface="Cambria Math" panose="02040503050406030204" pitchFamily="18" charset="0"/>
                         </a:rPr>
                         <m:t>+</m:t>
                       </m:r>
                       <m:r>
-                        <a:rPr>
+                        <a:rPr lang="en-US">
                           <a:latin typeface="Cambria Math" panose="02040503050406030204" pitchFamily="18" charset="0"/>
                         </a:rPr>
                         <m:t>𝑣𝑎𝑟</m:t>
                       </m:r>
                       <m:r>
-                        <a:rPr>
+                        <a:rPr lang="en-US">
                           <a:latin typeface="Cambria Math" panose="02040503050406030204" pitchFamily="18" charset="0"/>
                         </a:rPr>
                         <m:t>2</m:t>
@@ -14132,26 +14204,18 @@
                     </m:oMath>
                   </m:oMathPara>
                 </a14:m>
-                <a:endParaRPr dirty="0"/>
+                <a:endParaRPr lang="en-US" dirty="0"/>
               </a:p>
               <a:p>
                 <a:pPr lvl="0"/>
                 <a:r>
-                  <a:rPr dirty="0"/>
-                  <a:t>Example; dependent variable (dv) modeled by independent variables (var1) and its square, uses the</a:t>
-                </a:r>
-                <a:r>
                   <a:rPr lang="en-US" dirty="0"/>
-                  <a:t> ‘literal’,</a:t>
-                </a:r>
-                <a:r>
-                  <a:rPr dirty="0"/>
-                  <a:t> </a:t>
+                  <a:t>Example; dependent variable (dv) modeled by independent variables (var1) and its square, uses the ‘literal’, </a:t>
                 </a:r>
                 <a14:m>
                   <m:oMath xmlns:m="http://schemas.openxmlformats.org/officeDocument/2006/math">
                     <m:r>
-                      <a:rPr>
+                      <a:rPr lang="en-US">
                         <a:latin typeface="Cambria Math" panose="02040503050406030204" pitchFamily="18" charset="0"/>
                       </a:rPr>
                       <m:t>𝐼</m:t>
@@ -14159,22 +14223,29 @@
                     <m:d>
                       <m:dPr>
                         <m:ctrlPr>
-                          <a:rPr i="1">
+                          <a:rPr lang="ar-AE" i="1">
                             <a:latin typeface="Cambria Math" panose="02040503050406030204" pitchFamily="18" charset="0"/>
                           </a:rPr>
                         </m:ctrlPr>
                       </m:dPr>
-                      <m:e/>
+                      <m:e>
+                        <m:r>
+                          <a:rPr lang="ar-AE" b="0" i="1" smtClean="0">
+                            <a:latin typeface="Cambria Math" panose="02040503050406030204" pitchFamily="18" charset="0"/>
+                          </a:rPr>
+                          <m:t> </m:t>
+                        </m:r>
+                      </m:e>
                     </m:d>
                   </m:oMath>
                 </a14:m>
                 <a:r>
+                  <a:rPr lang="ar-AE" dirty="0"/>
+                  <a:t>, </a:t>
+                </a:r>
+                <a:r>
                   <a:rPr lang="en-US" dirty="0"/>
-                  <a:t>,</a:t>
-                </a:r>
-                <a:r>
-                  <a:rPr dirty="0"/>
-                  <a:t> operator to wrap a function:</a:t>
+                  <a:t>operator to wrap a function:</a:t>
                 </a:r>
               </a:p>
               <a:p>
@@ -14188,37 +14259,37 @@
                     </m:oMathParaPr>
                     <m:oMath xmlns:m="http://schemas.openxmlformats.org/officeDocument/2006/math">
                       <m:r>
-                        <a:rPr>
+                        <a:rPr lang="en-US">
                           <a:latin typeface="Cambria Math" panose="02040503050406030204" pitchFamily="18" charset="0"/>
                         </a:rPr>
                         <m:t>𝑑𝑣</m:t>
                       </m:r>
                       <m:r>
-                        <a:rPr>
+                        <a:rPr lang="en-US">
                           <a:latin typeface="Cambria Math" panose="02040503050406030204" pitchFamily="18" charset="0"/>
                         </a:rPr>
                         <m:t>∼</m:t>
                       </m:r>
                       <m:r>
-                        <a:rPr>
+                        <a:rPr lang="en-US">
                           <a:latin typeface="Cambria Math" panose="02040503050406030204" pitchFamily="18" charset="0"/>
                         </a:rPr>
                         <m:t>𝑣𝑎𝑟</m:t>
                       </m:r>
                       <m:r>
-                        <a:rPr>
+                        <a:rPr lang="en-US">
                           <a:latin typeface="Cambria Math" panose="02040503050406030204" pitchFamily="18" charset="0"/>
                         </a:rPr>
                         <m:t>1</m:t>
                       </m:r>
                       <m:r>
-                        <a:rPr>
+                        <a:rPr lang="en-US">
                           <a:latin typeface="Cambria Math" panose="02040503050406030204" pitchFamily="18" charset="0"/>
                         </a:rPr>
                         <m:t>+</m:t>
                       </m:r>
                       <m:r>
-                        <a:rPr>
+                        <a:rPr lang="en-US">
                           <a:latin typeface="Cambria Math" panose="02040503050406030204" pitchFamily="18" charset="0"/>
                         </a:rPr>
                         <m:t>𝐼</m:t>
@@ -14226,32 +14297,32 @@
                       <m:d>
                         <m:dPr>
                           <m:ctrlPr>
-                            <a:rPr i="1">
+                            <a:rPr lang="ar-AE" i="1">
                               <a:latin typeface="Cambria Math" panose="02040503050406030204" pitchFamily="18" charset="0"/>
                             </a:rPr>
                           </m:ctrlPr>
                         </m:dPr>
                         <m:e>
                           <m:r>
-                            <a:rPr>
+                            <a:rPr lang="ar-AE">
                               <a:latin typeface="Cambria Math" panose="02040503050406030204" pitchFamily="18" charset="0"/>
                             </a:rPr>
                             <m:t>𝑣𝑎𝑟</m:t>
                           </m:r>
                           <m:r>
-                            <a:rPr>
+                            <a:rPr lang="ar-AE">
                               <a:latin typeface="Cambria Math" panose="02040503050406030204" pitchFamily="18" charset="0"/>
                             </a:rPr>
                             <m:t>1</m:t>
                           </m:r>
                           <m:r>
-                            <a:rPr>
+                            <a:rPr lang="ar-AE">
                               <a:latin typeface="Cambria Math" panose="02040503050406030204" pitchFamily="18" charset="0"/>
                             </a:rPr>
                             <m:t>∗∗</m:t>
                           </m:r>
                           <m:r>
-                            <a:rPr>
+                            <a:rPr lang="ar-AE">
                               <a:latin typeface="Cambria Math" panose="02040503050406030204" pitchFamily="18" charset="0"/>
                             </a:rPr>
                             <m:t>2</m:t>
@@ -14266,7 +14337,7 @@
             </p:txBody>
           </p:sp>
         </mc:Choice>
-        <mc:Fallback xmlns="">
+        <mc:Fallback>
           <p:sp>
             <p:nvSpPr>
               <p:cNvPr id="3" name="Content Placeholder 2"/>
@@ -14410,7 +14481,15 @@
                 </a:r>
                 <a:r>
                   <a:rPr lang="en-US" sz="2200" dirty="0"/>
-                  <a:t> with no intercept term:</a:t>
+                  <a:t> with </a:t>
+                </a:r>
+                <a:r>
+                  <a:rPr lang="en-US" sz="2200" b="1" dirty="0"/>
+                  <a:t>no intercept </a:t>
+                </a:r>
+                <a:r>
+                  <a:rPr lang="en-US" sz="2200" dirty="0"/>
+                  <a:t>term:</a:t>
                 </a:r>
               </a:p>
               <a:p>
@@ -14710,7 +14789,7 @@
               <a:blipFill>
                 <a:blip r:embed="rId2"/>
                 <a:stretch>
-                  <a:fillRect l="-963" t="-1257" r="-1333"/>
+                  <a:fillRect l="-963" t="-1257"/>
                 </a:stretch>
               </a:blipFill>
             </p:spPr>
@@ -14800,11 +14879,564 @@
           </a:p>
         </p:txBody>
       </p:sp>
-      <mc:AlternateContent xmlns:mc="http://schemas.openxmlformats.org/markup-compatibility/2006" xmlns:a14="http://schemas.microsoft.com/office/drawing/2010/main">
-        <mc:Choice Requires="a14">
+      <p:sp>
+        <p:nvSpPr>
+          <p:cNvPr id="3" name="Content Placeholder 2"/>
+          <p:cNvSpPr>
+            <a:spLocks noGrp="1"/>
+          </p:cNvSpPr>
+          <p:nvPr>
+            <p:ph idx="1"/>
+          </p:nvPr>
+        </p:nvSpPr>
+        <p:spPr>
+          <a:xfrm>
+            <a:off x="457200" y="1089009"/>
+            <a:ext cx="8229600" cy="3952660"/>
+          </a:xfrm>
+        </p:spPr>
+        <p:txBody>
+          <a:bodyPr>
+            <a:normAutofit fontScale="70000" lnSpcReduction="20000"/>
+          </a:bodyPr>
+          <a:lstStyle/>
+          <a:p>
+            <a:pPr marL="0" lvl="0" indent="0">
+              <a:buNone/>
+            </a:pPr>
+            <a:r>
+              <a:rPr dirty="0"/>
+              <a:t>Fit the model using </a:t>
+            </a:r>
+            <a:r>
+              <a:rPr dirty="0" err="1"/>
+              <a:t>statsmodels.formula.api.ols</a:t>
+            </a:r>
+            <a:r>
+              <a:rPr dirty="0"/>
+              <a:t> with </a:t>
+            </a:r>
+            <a:r>
+              <a:rPr b="1" dirty="0"/>
+              <a:t>centered independent variable</a:t>
+            </a:r>
+            <a:r>
+              <a:rPr dirty="0"/>
+              <a:t> to create a linear model object</a:t>
+            </a:r>
+          </a:p>
+          <a:p>
+            <a:pPr lvl="0" indent="0">
+              <a:buNone/>
+            </a:pPr>
+            <a:r>
+              <a:rPr i="1" dirty="0">
+                <a:solidFill>
+                  <a:srgbClr val="60A0B0"/>
+                </a:solidFill>
+                <a:latin typeface="Courier"/>
+              </a:rPr>
+              <a:t>## Center the independent variable   </a:t>
+            </a:r>
+            <a:br>
+              <a:rPr dirty="0"/>
+            </a:br>
+            <a:r>
+              <a:rPr dirty="0" err="1">
+                <a:latin typeface="Courier"/>
+              </a:rPr>
+              <a:t>sim_data.loc</a:t>
+            </a:r>
+            <a:r>
+              <a:rPr dirty="0">
+                <a:latin typeface="Courier"/>
+              </a:rPr>
+              <a:t>[:,</a:t>
+            </a:r>
+            <a:r>
+              <a:rPr dirty="0">
+                <a:solidFill>
+                  <a:srgbClr val="4070A0"/>
+                </a:solidFill>
+                <a:latin typeface="Courier"/>
+              </a:rPr>
+              <a:t>'</a:t>
+            </a:r>
+            <a:r>
+              <a:rPr dirty="0" err="1">
+                <a:solidFill>
+                  <a:srgbClr val="4070A0"/>
+                </a:solidFill>
+                <a:latin typeface="Courier"/>
+              </a:rPr>
+              <a:t>x_centered</a:t>
+            </a:r>
+            <a:r>
+              <a:rPr dirty="0">
+                <a:solidFill>
+                  <a:srgbClr val="4070A0"/>
+                </a:solidFill>
+                <a:latin typeface="Courier"/>
+              </a:rPr>
+              <a:t>'</a:t>
+            </a:r>
+            <a:r>
+              <a:rPr dirty="0">
+                <a:latin typeface="Courier"/>
+              </a:rPr>
+              <a:t>] </a:t>
+            </a:r>
+            <a:r>
+              <a:rPr dirty="0">
+                <a:solidFill>
+                  <a:srgbClr val="666666"/>
+                </a:solidFill>
+                <a:latin typeface="Courier"/>
+              </a:rPr>
+              <a:t>=</a:t>
+            </a:r>
+            <a:r>
+              <a:rPr dirty="0">
+                <a:latin typeface="Courier"/>
+              </a:rPr>
+              <a:t> </a:t>
+            </a:r>
+            <a:r>
+              <a:rPr dirty="0" err="1">
+                <a:latin typeface="Courier"/>
+              </a:rPr>
+              <a:t>np.subtract</a:t>
+            </a:r>
+            <a:r>
+              <a:rPr dirty="0">
+                <a:latin typeface="Courier"/>
+              </a:rPr>
+              <a:t>(</a:t>
+            </a:r>
+            <a:r>
+              <a:rPr dirty="0" err="1">
+                <a:latin typeface="Courier"/>
+              </a:rPr>
+              <a:t>sim_data.x</a:t>
+            </a:r>
+            <a:r>
+              <a:rPr dirty="0">
+                <a:latin typeface="Courier"/>
+              </a:rPr>
+              <a:t>, </a:t>
+            </a:r>
+            <a:r>
+              <a:rPr dirty="0" err="1">
+                <a:latin typeface="Courier"/>
+              </a:rPr>
+              <a:t>np.mean</a:t>
+            </a:r>
+            <a:r>
+              <a:rPr dirty="0">
+                <a:latin typeface="Courier"/>
+              </a:rPr>
+              <a:t>(</a:t>
+            </a:r>
+            <a:r>
+              <a:rPr dirty="0" err="1">
+                <a:latin typeface="Courier"/>
+              </a:rPr>
+              <a:t>sim_data.x</a:t>
+            </a:r>
+            <a:r>
+              <a:rPr dirty="0">
+                <a:latin typeface="Courier"/>
+              </a:rPr>
+              <a:t>))</a:t>
+            </a:r>
+            <a:br>
+              <a:rPr dirty="0"/>
+            </a:br>
+            <a:r>
+              <a:rPr i="1" dirty="0">
+                <a:solidFill>
+                  <a:srgbClr val="60A0B0"/>
+                </a:solidFill>
+                <a:latin typeface="Courier"/>
+              </a:rPr>
+              <a:t>## Define the regression model and fit it to the data</a:t>
+            </a:r>
+            <a:br>
+              <a:rPr dirty="0"/>
+            </a:br>
+            <a:r>
+              <a:rPr dirty="0" err="1">
+                <a:latin typeface="Courier"/>
+              </a:rPr>
+              <a:t>ols_model_centered</a:t>
+            </a:r>
+            <a:r>
+              <a:rPr dirty="0">
+                <a:latin typeface="Courier"/>
+              </a:rPr>
+              <a:t> </a:t>
+            </a:r>
+            <a:r>
+              <a:rPr dirty="0">
+                <a:solidFill>
+                  <a:srgbClr val="666666"/>
+                </a:solidFill>
+                <a:latin typeface="Courier"/>
+              </a:rPr>
+              <a:t>=</a:t>
+            </a:r>
+            <a:r>
+              <a:rPr dirty="0">
+                <a:latin typeface="Courier"/>
+              </a:rPr>
+              <a:t> </a:t>
+            </a:r>
+            <a:r>
+              <a:rPr dirty="0" err="1">
+                <a:latin typeface="Courier"/>
+              </a:rPr>
+              <a:t>smf.ols</a:t>
+            </a:r>
+            <a:r>
+              <a:rPr dirty="0">
+                <a:latin typeface="Courier"/>
+              </a:rPr>
+              <a:t>(formula </a:t>
+            </a:r>
+            <a:r>
+              <a:rPr dirty="0">
+                <a:solidFill>
+                  <a:srgbClr val="666666"/>
+                </a:solidFill>
+                <a:latin typeface="Courier"/>
+              </a:rPr>
+              <a:t>=</a:t>
+            </a:r>
+            <a:r>
+              <a:rPr dirty="0">
+                <a:latin typeface="Courier"/>
+              </a:rPr>
+              <a:t> </a:t>
+            </a:r>
+            <a:r>
+              <a:rPr dirty="0">
+                <a:solidFill>
+                  <a:srgbClr val="4070A0"/>
+                </a:solidFill>
+                <a:latin typeface="Courier"/>
+              </a:rPr>
+              <a:t>'y ~ </a:t>
+            </a:r>
+            <a:r>
+              <a:rPr dirty="0" err="1">
+                <a:solidFill>
+                  <a:srgbClr val="4070A0"/>
+                </a:solidFill>
+                <a:latin typeface="Courier"/>
+              </a:rPr>
+              <a:t>x_centered</a:t>
+            </a:r>
+            <a:r>
+              <a:rPr dirty="0">
+                <a:solidFill>
+                  <a:srgbClr val="4070A0"/>
+                </a:solidFill>
+                <a:latin typeface="Courier"/>
+              </a:rPr>
+              <a:t>'</a:t>
+            </a:r>
+            <a:r>
+              <a:rPr dirty="0">
+                <a:latin typeface="Courier"/>
+              </a:rPr>
+              <a:t>, data</a:t>
+            </a:r>
+            <a:r>
+              <a:rPr dirty="0">
+                <a:solidFill>
+                  <a:srgbClr val="666666"/>
+                </a:solidFill>
+                <a:latin typeface="Courier"/>
+              </a:rPr>
+              <a:t>=</a:t>
+            </a:r>
+            <a:r>
+              <a:rPr dirty="0" err="1">
+                <a:latin typeface="Courier"/>
+              </a:rPr>
+              <a:t>sim_data</a:t>
+            </a:r>
+            <a:r>
+              <a:rPr dirty="0">
+                <a:latin typeface="Courier"/>
+              </a:rPr>
+              <a:t>).fit()</a:t>
+            </a:r>
+            <a:br>
+              <a:rPr dirty="0"/>
+            </a:br>
+            <a:r>
+              <a:rPr i="1" dirty="0">
+                <a:solidFill>
+                  <a:srgbClr val="60A0B0"/>
+                </a:solidFill>
+                <a:latin typeface="Courier"/>
+              </a:rPr>
+              <a:t>## Print the model coefficient</a:t>
+            </a:r>
+            <a:br>
+              <a:rPr dirty="0"/>
+            </a:br>
+            <a:r>
+              <a:rPr dirty="0">
+                <a:solidFill>
+                  <a:srgbClr val="008000"/>
+                </a:solidFill>
+                <a:latin typeface="Courier"/>
+              </a:rPr>
+              <a:t>print</a:t>
+            </a:r>
+            <a:r>
+              <a:rPr dirty="0">
+                <a:latin typeface="Courier"/>
+              </a:rPr>
+              <a:t>(</a:t>
+            </a:r>
+            <a:r>
+              <a:rPr dirty="0">
+                <a:solidFill>
+                  <a:srgbClr val="4070A0"/>
+                </a:solidFill>
+                <a:latin typeface="Courier"/>
+              </a:rPr>
+              <a:t>'Intercept = %4.3f  Slope = %4.3f'</a:t>
+            </a:r>
+            <a:r>
+              <a:rPr dirty="0">
+                <a:latin typeface="Courier"/>
+              </a:rPr>
+              <a:t> </a:t>
+            </a:r>
+            <a:r>
+              <a:rPr dirty="0">
+                <a:solidFill>
+                  <a:srgbClr val="666666"/>
+                </a:solidFill>
+                <a:latin typeface="Courier"/>
+              </a:rPr>
+              <a:t>%</a:t>
+            </a:r>
+            <a:r>
+              <a:rPr dirty="0">
+                <a:latin typeface="Courier"/>
+              </a:rPr>
+              <a:t> (ols_model_centered._</a:t>
+            </a:r>
+            <a:r>
+              <a:rPr dirty="0" err="1">
+                <a:latin typeface="Courier"/>
+              </a:rPr>
+              <a:t>results.params</a:t>
+            </a:r>
+            <a:r>
+              <a:rPr dirty="0">
+                <a:latin typeface="Courier"/>
+              </a:rPr>
+              <a:t>[</a:t>
+            </a:r>
+            <a:r>
+              <a:rPr dirty="0">
+                <a:solidFill>
+                  <a:srgbClr val="40A070"/>
+                </a:solidFill>
+                <a:latin typeface="Courier"/>
+              </a:rPr>
+              <a:t>0</a:t>
+            </a:r>
+            <a:r>
+              <a:rPr dirty="0">
+                <a:latin typeface="Courier"/>
+              </a:rPr>
+              <a:t>], ols_model_centered._</a:t>
+            </a:r>
+            <a:r>
+              <a:rPr dirty="0" err="1">
+                <a:latin typeface="Courier"/>
+              </a:rPr>
+              <a:t>results.params</a:t>
+            </a:r>
+            <a:r>
+              <a:rPr dirty="0">
+                <a:latin typeface="Courier"/>
+              </a:rPr>
+              <a:t>[</a:t>
+            </a:r>
+            <a:r>
+              <a:rPr dirty="0">
+                <a:solidFill>
+                  <a:srgbClr val="40A070"/>
+                </a:solidFill>
+                <a:latin typeface="Courier"/>
+              </a:rPr>
+              <a:t>1</a:t>
+            </a:r>
+            <a:r>
+              <a:rPr dirty="0">
+                <a:latin typeface="Courier"/>
+              </a:rPr>
+              <a:t>]))</a:t>
+            </a:r>
+          </a:p>
+          <a:p>
+            <a:pPr lvl="0" indent="0">
+              <a:buNone/>
+            </a:pPr>
+            <a:r>
+              <a:rPr dirty="0">
+                <a:latin typeface="Courier"/>
+              </a:rPr>
+              <a:t>## Intercept = 6.022  Slope = 0.882</a:t>
+            </a:r>
+          </a:p>
+          <a:p>
+            <a:pPr lvl="0"/>
+            <a:r>
+              <a:rPr dirty="0"/>
+              <a:t>We can now interpret this model</a:t>
+            </a:r>
+            <a:r>
+              <a:rPr lang="en-US" dirty="0"/>
+              <a:t>?</a:t>
+            </a:r>
+            <a:endParaRPr dirty="0"/>
+          </a:p>
+          <a:p>
+            <a:pPr lvl="1"/>
+            <a:r>
+              <a:rPr dirty="0"/>
+              <a:t>Intercept is the mean of the dependent variable</a:t>
+            </a:r>
+          </a:p>
+          <a:p>
+            <a:pPr lvl="1"/>
+            <a:r>
+              <a:rPr dirty="0"/>
+              <a:t>Slope is the rate of change of the dependent variable for unit change in independent variable</a:t>
+            </a:r>
+          </a:p>
+        </p:txBody>
+      </p:sp>
+    </p:spTree>
+    <p:extLst>
+      <p:ext uri="{BB962C8B-B14F-4D97-AF65-F5344CB8AC3E}">
+        <p14:creationId xmlns:p14="http://schemas.microsoft.com/office/powerpoint/2010/main" val="95564234"/>
+      </p:ext>
+    </p:extLst>
+  </p:cSld>
+  <p:clrMapOvr>
+    <a:masterClrMapping/>
+  </p:clrMapOvr>
+</p:sld>
+</file>
+
+<file path=ppt/slides/slide28.xml><?xml version="1.0" encoding="utf-8"?>
+<p:sld xmlns:a="http://schemas.openxmlformats.org/drawingml/2006/main" xmlns:r="http://schemas.openxmlformats.org/officeDocument/2006/relationships" xmlns:p="http://schemas.openxmlformats.org/presentationml/2006/main">
+  <p:cSld>
+    <p:spTree>
+      <p:nvGrpSpPr>
+        <p:cNvPr id="1" name="">
+          <a:extLst>
+            <a:ext uri="{FF2B5EF4-FFF2-40B4-BE49-F238E27FC236}">
+              <a16:creationId xmlns:a16="http://schemas.microsoft.com/office/drawing/2014/main" id="{0203B36A-F15B-AC61-9D6C-37244A60431D}"/>
+            </a:ext>
+          </a:extLst>
+        </p:cNvPr>
+        <p:cNvGrpSpPr/>
+        <p:nvPr/>
+      </p:nvGrpSpPr>
+      <p:grpSpPr>
+        <a:xfrm>
+          <a:off x="0" y="0"/>
+          <a:ext cx="0" cy="0"/>
+          <a:chOff x="0" y="0"/>
+          <a:chExt cx="0" cy="0"/>
+        </a:xfrm>
+      </p:grpSpPr>
+      <p:sp>
+        <p:nvSpPr>
+          <p:cNvPr id="2" name="Title 1">
+            <a:extLst>
+              <a:ext uri="{FF2B5EF4-FFF2-40B4-BE49-F238E27FC236}">
+                <a16:creationId xmlns:a16="http://schemas.microsoft.com/office/drawing/2014/main" id="{E0E135DE-1B74-3151-1C4C-47D99E02CB22}"/>
+              </a:ext>
+            </a:extLst>
+          </p:cNvPr>
+          <p:cNvSpPr>
+            <a:spLocks noGrp="1"/>
+          </p:cNvSpPr>
+          <p:nvPr>
+            <p:ph type="title"/>
+          </p:nvPr>
+        </p:nvSpPr>
+        <p:spPr>
+          <a:xfrm>
+            <a:off x="457200" y="205979"/>
+            <a:ext cx="8229600" cy="704265"/>
+          </a:xfrm>
+        </p:spPr>
+        <p:txBody>
+          <a:bodyPr>
+            <a:normAutofit/>
+          </a:bodyPr>
+          <a:lstStyle/>
+          <a:p>
+            <a:pPr marL="0" lvl="0" indent="0">
+              <a:buNone/>
+            </a:pPr>
+            <a:r>
+              <a:rPr sz="3200" dirty="0">
+                <a:latin typeface="+mn-lt"/>
+              </a:rPr>
+              <a:t>Example - </a:t>
+            </a:r>
+            <a:r>
+              <a:rPr lang="en-US" sz="3200" dirty="0">
+                <a:latin typeface="+mn-lt"/>
+              </a:rPr>
+              <a:t>Interpreting</a:t>
+            </a:r>
+            <a:r>
+              <a:rPr sz="3200" dirty="0">
+                <a:latin typeface="+mn-lt"/>
+              </a:rPr>
+              <a:t> </a:t>
+            </a:r>
+            <a:r>
+              <a:rPr lang="en-US" sz="3200" dirty="0">
+                <a:latin typeface="+mn-lt"/>
+              </a:rPr>
+              <a:t>the</a:t>
+            </a:r>
+            <a:r>
+              <a:rPr sz="3200" dirty="0">
+                <a:latin typeface="+mn-lt"/>
+              </a:rPr>
+              <a:t> Model</a:t>
+            </a:r>
+          </a:p>
+        </p:txBody>
+      </p:sp>
+      <mc:AlternateContent xmlns:mc="http://schemas.openxmlformats.org/markup-compatibility/2006">
+        <mc:Choice xmlns:a14="http://schemas.microsoft.com/office/drawing/2010/main" Requires="a14">
           <p:sp>
             <p:nvSpPr>
-              <p:cNvPr id="3" name="Content Placeholder 2"/>
+              <p:cNvPr id="3" name="Content Placeholder 2">
+                <a:extLst>
+                  <a:ext uri="{FF2B5EF4-FFF2-40B4-BE49-F238E27FC236}">
+                    <a16:creationId xmlns:a16="http://schemas.microsoft.com/office/drawing/2014/main" id="{8E61EAE1-4B0F-0E53-B892-7F7A9D36AD4F}"/>
+                  </a:ext>
+                </a:extLst>
+              </p:cNvPr>
               <p:cNvSpPr>
                 <a:spLocks noGrp="1"/>
               </p:cNvSpPr>
@@ -14820,7 +15452,7 @@
             </p:spPr>
             <p:txBody>
               <a:bodyPr>
-                <a:normAutofit fontScale="62500" lnSpcReduction="20000"/>
+                <a:normAutofit lnSpcReduction="10000"/>
               </a:bodyPr>
               <a:lstStyle/>
               <a:p>
@@ -14828,489 +15460,90 @@
                   <a:buNone/>
                 </a:pPr>
                 <a:r>
-                  <a:rPr dirty="0"/>
-                  <a:t>Fit the model using </a:t>
-                </a:r>
-                <a:r>
-                  <a:rPr dirty="0" err="1"/>
-                  <a:t>statsmodels.formula.api.ols</a:t>
-                </a:r>
-                <a:r>
-                  <a:rPr dirty="0"/>
-                  <a:t> with </a:t>
-                </a:r>
-                <a:r>
-                  <a:rPr b="1" dirty="0"/>
-                  <a:t>centered independent variable</a:t>
-                </a:r>
-                <a:r>
-                  <a:rPr dirty="0"/>
-                  <a:t> to create a linear model object</a:t>
-                </a:r>
-              </a:p>
-              <a:p>
-                <a:pPr lvl="0" indent="0">
-                  <a:buNone/>
-                </a:pPr>
-                <a:r>
-                  <a:rPr i="1" dirty="0">
-                    <a:solidFill>
-                      <a:srgbClr val="60A0B0"/>
-                    </a:solidFill>
-                    <a:latin typeface="Courier"/>
-                  </a:rPr>
-                  <a:t>## Center the independent variable   </a:t>
-                </a:r>
-                <a:br>
-                  <a:rPr dirty="0"/>
-                </a:br>
-                <a:r>
-                  <a:rPr dirty="0" err="1">
-                    <a:latin typeface="Courier"/>
-                  </a:rPr>
-                  <a:t>sim_data.loc</a:t>
-                </a:r>
-                <a:r>
-                  <a:rPr dirty="0">
-                    <a:latin typeface="Courier"/>
-                  </a:rPr>
-                  <a:t>[:,</a:t>
-                </a:r>
-                <a:r>
-                  <a:rPr dirty="0">
-                    <a:solidFill>
-                      <a:srgbClr val="4070A0"/>
-                    </a:solidFill>
-                    <a:latin typeface="Courier"/>
-                  </a:rPr>
-                  <a:t>'</a:t>
-                </a:r>
-                <a:r>
-                  <a:rPr dirty="0" err="1">
-                    <a:solidFill>
-                      <a:srgbClr val="4070A0"/>
-                    </a:solidFill>
-                    <a:latin typeface="Courier"/>
-                  </a:rPr>
-                  <a:t>x_centered</a:t>
-                </a:r>
-                <a:r>
-                  <a:rPr dirty="0">
-                    <a:solidFill>
-                      <a:srgbClr val="4070A0"/>
-                    </a:solidFill>
-                    <a:latin typeface="Courier"/>
-                  </a:rPr>
-                  <a:t>'</a:t>
-                </a:r>
-                <a:r>
-                  <a:rPr dirty="0">
-                    <a:latin typeface="Courier"/>
-                  </a:rPr>
-                  <a:t>] </a:t>
-                </a:r>
-                <a:r>
-                  <a:rPr dirty="0">
-                    <a:solidFill>
-                      <a:srgbClr val="666666"/>
-                    </a:solidFill>
-                    <a:latin typeface="Courier"/>
-                  </a:rPr>
-                  <a:t>=</a:t>
-                </a:r>
-                <a:r>
-                  <a:rPr dirty="0">
-                    <a:latin typeface="Courier"/>
-                  </a:rPr>
-                  <a:t> </a:t>
-                </a:r>
-                <a:r>
-                  <a:rPr dirty="0" err="1">
-                    <a:latin typeface="Courier"/>
-                  </a:rPr>
-                  <a:t>np.subtract</a:t>
-                </a:r>
-                <a:r>
-                  <a:rPr dirty="0">
-                    <a:latin typeface="Courier"/>
-                  </a:rPr>
-                  <a:t>(</a:t>
-                </a:r>
-                <a:r>
-                  <a:rPr dirty="0" err="1">
-                    <a:latin typeface="Courier"/>
-                  </a:rPr>
-                  <a:t>sim_data.x</a:t>
-                </a:r>
-                <a:r>
-                  <a:rPr dirty="0">
-                    <a:latin typeface="Courier"/>
-                  </a:rPr>
-                  <a:t>, </a:t>
-                </a:r>
-                <a:r>
-                  <a:rPr dirty="0" err="1">
-                    <a:latin typeface="Courier"/>
-                  </a:rPr>
-                  <a:t>np.mean</a:t>
-                </a:r>
-                <a:r>
-                  <a:rPr dirty="0">
-                    <a:latin typeface="Courier"/>
-                  </a:rPr>
-                  <a:t>(</a:t>
-                </a:r>
-                <a:r>
-                  <a:rPr dirty="0" err="1">
-                    <a:latin typeface="Courier"/>
-                  </a:rPr>
-                  <a:t>sim_data.x</a:t>
-                </a:r>
-                <a:r>
-                  <a:rPr dirty="0">
-                    <a:latin typeface="Courier"/>
-                  </a:rPr>
-                  <a:t>))</a:t>
-                </a:r>
-                <a:br>
-                  <a:rPr dirty="0"/>
-                </a:br>
-                <a:r>
-                  <a:rPr i="1" dirty="0">
-                    <a:solidFill>
-                      <a:srgbClr val="60A0B0"/>
-                    </a:solidFill>
-                    <a:latin typeface="Courier"/>
-                  </a:rPr>
-                  <a:t>## Define the regression model and fit it to the data</a:t>
-                </a:r>
-                <a:br>
-                  <a:rPr dirty="0"/>
-                </a:br>
-                <a:r>
-                  <a:rPr dirty="0" err="1">
-                    <a:latin typeface="Courier"/>
-                  </a:rPr>
-                  <a:t>ols_model_centered</a:t>
-                </a:r>
-                <a:r>
-                  <a:rPr dirty="0">
-                    <a:latin typeface="Courier"/>
-                  </a:rPr>
-                  <a:t> </a:t>
-                </a:r>
-                <a:r>
-                  <a:rPr dirty="0">
-                    <a:solidFill>
-                      <a:srgbClr val="666666"/>
-                    </a:solidFill>
-                    <a:latin typeface="Courier"/>
-                  </a:rPr>
-                  <a:t>=</a:t>
-                </a:r>
-                <a:r>
-                  <a:rPr dirty="0">
-                    <a:latin typeface="Courier"/>
-                  </a:rPr>
-                  <a:t> </a:t>
-                </a:r>
-                <a:r>
-                  <a:rPr dirty="0" err="1">
-                    <a:latin typeface="Courier"/>
-                  </a:rPr>
-                  <a:t>smf.ols</a:t>
-                </a:r>
-                <a:r>
-                  <a:rPr dirty="0">
-                    <a:latin typeface="Courier"/>
-                  </a:rPr>
-                  <a:t>(formula </a:t>
-                </a:r>
-                <a:r>
-                  <a:rPr dirty="0">
-                    <a:solidFill>
-                      <a:srgbClr val="666666"/>
-                    </a:solidFill>
-                    <a:latin typeface="Courier"/>
-                  </a:rPr>
-                  <a:t>=</a:t>
-                </a:r>
-                <a:r>
-                  <a:rPr dirty="0">
-                    <a:latin typeface="Courier"/>
-                  </a:rPr>
-                  <a:t> </a:t>
-                </a:r>
-                <a:r>
-                  <a:rPr dirty="0">
-                    <a:solidFill>
-                      <a:srgbClr val="4070A0"/>
-                    </a:solidFill>
-                    <a:latin typeface="Courier"/>
-                  </a:rPr>
-                  <a:t>'y ~ </a:t>
-                </a:r>
-                <a:r>
-                  <a:rPr dirty="0" err="1">
-                    <a:solidFill>
-                      <a:srgbClr val="4070A0"/>
-                    </a:solidFill>
-                    <a:latin typeface="Courier"/>
-                  </a:rPr>
-                  <a:t>x_centered</a:t>
-                </a:r>
-                <a:r>
-                  <a:rPr dirty="0">
-                    <a:solidFill>
-                      <a:srgbClr val="4070A0"/>
-                    </a:solidFill>
-                    <a:latin typeface="Courier"/>
-                  </a:rPr>
-                  <a:t>'</a:t>
-                </a:r>
-                <a:r>
-                  <a:rPr dirty="0">
-                    <a:latin typeface="Courier"/>
-                  </a:rPr>
-                  <a:t>, data</a:t>
-                </a:r>
-                <a:r>
-                  <a:rPr dirty="0">
-                    <a:solidFill>
-                      <a:srgbClr val="666666"/>
-                    </a:solidFill>
-                    <a:latin typeface="Courier"/>
-                  </a:rPr>
-                  <a:t>=</a:t>
-                </a:r>
-                <a:r>
-                  <a:rPr dirty="0" err="1">
-                    <a:latin typeface="Courier"/>
-                  </a:rPr>
-                  <a:t>sim_data</a:t>
-                </a:r>
-                <a:r>
-                  <a:rPr dirty="0">
-                    <a:latin typeface="Courier"/>
-                  </a:rPr>
-                  <a:t>).fit()</a:t>
-                </a:r>
-                <a:br>
-                  <a:rPr dirty="0"/>
-                </a:br>
-                <a:br>
-                  <a:rPr dirty="0"/>
-                </a:br>
-                <a:r>
-                  <a:rPr i="1" dirty="0">
-                    <a:solidFill>
-                      <a:srgbClr val="60A0B0"/>
-                    </a:solidFill>
-                    <a:latin typeface="Courier"/>
-                  </a:rPr>
-                  <a:t>## Print the model coefficient</a:t>
-                </a:r>
-                <a:br>
-                  <a:rPr dirty="0"/>
-                </a:br>
-                <a:r>
-                  <a:rPr dirty="0">
-                    <a:solidFill>
-                      <a:srgbClr val="008000"/>
-                    </a:solidFill>
-                    <a:latin typeface="Courier"/>
-                  </a:rPr>
-                  <a:t>print</a:t>
-                </a:r>
-                <a:r>
-                  <a:rPr dirty="0">
-                    <a:latin typeface="Courier"/>
-                  </a:rPr>
-                  <a:t>(</a:t>
-                </a:r>
-                <a:r>
-                  <a:rPr dirty="0">
-                    <a:solidFill>
-                      <a:srgbClr val="4070A0"/>
-                    </a:solidFill>
-                    <a:latin typeface="Courier"/>
-                  </a:rPr>
-                  <a:t>'Intercept = %4.3f  Slope = %4.3f'</a:t>
-                </a:r>
-                <a:r>
-                  <a:rPr dirty="0">
-                    <a:latin typeface="Courier"/>
-                  </a:rPr>
-                  <a:t> </a:t>
-                </a:r>
-                <a:r>
-                  <a:rPr dirty="0">
-                    <a:solidFill>
-                      <a:srgbClr val="666666"/>
-                    </a:solidFill>
-                    <a:latin typeface="Courier"/>
-                  </a:rPr>
-                  <a:t>%</a:t>
-                </a:r>
-                <a:r>
-                  <a:rPr dirty="0">
-                    <a:latin typeface="Courier"/>
-                  </a:rPr>
-                  <a:t> (ols_model_centered._</a:t>
-                </a:r>
-                <a:r>
-                  <a:rPr dirty="0" err="1">
-                    <a:latin typeface="Courier"/>
-                  </a:rPr>
-                  <a:t>results.params</a:t>
-                </a:r>
-                <a:r>
-                  <a:rPr dirty="0">
-                    <a:latin typeface="Courier"/>
-                  </a:rPr>
-                  <a:t>[</a:t>
-                </a:r>
-                <a:r>
-                  <a:rPr dirty="0">
-                    <a:solidFill>
-                      <a:srgbClr val="40A070"/>
-                    </a:solidFill>
-                    <a:latin typeface="Courier"/>
-                  </a:rPr>
-                  <a:t>0</a:t>
-                </a:r>
-                <a:r>
-                  <a:rPr dirty="0">
-                    <a:latin typeface="Courier"/>
-                  </a:rPr>
-                  <a:t>], ols_model_centered._</a:t>
-                </a:r>
-                <a:r>
-                  <a:rPr dirty="0" err="1">
-                    <a:latin typeface="Courier"/>
-                  </a:rPr>
-                  <a:t>results.params</a:t>
-                </a:r>
-                <a:r>
-                  <a:rPr dirty="0">
-                    <a:latin typeface="Courier"/>
-                  </a:rPr>
-                  <a:t>[</a:t>
-                </a:r>
-                <a:r>
-                  <a:rPr dirty="0">
-                    <a:solidFill>
-                      <a:srgbClr val="40A070"/>
-                    </a:solidFill>
-                    <a:latin typeface="Courier"/>
-                  </a:rPr>
-                  <a:t>1</a:t>
-                </a:r>
-                <a:r>
-                  <a:rPr dirty="0">
-                    <a:latin typeface="Courier"/>
-                  </a:rPr>
-                  <a:t>]))</a:t>
-                </a:r>
-              </a:p>
-              <a:p>
-                <a:pPr lvl="0" indent="0">
-                  <a:buNone/>
-                </a:pPr>
-                <a:r>
-                  <a:rPr dirty="0">
-                    <a:latin typeface="Courier"/>
-                  </a:rPr>
-                  <a:t>## Intercept = 6.022  Slope = 0.882</a:t>
+                  <a:rPr lang="en-US" dirty="0"/>
+                  <a:t>Why do we want to zero-center the independent variables? </a:t>
                 </a:r>
               </a:p>
               <a:p>
                 <a:pPr lvl="0"/>
                 <a:r>
-                  <a:rPr dirty="0"/>
-                  <a:t>We can now interpret this model</a:t>
-                </a:r>
-              </a:p>
-              <a:p>
-                <a:pPr lvl="1"/>
-                <a:r>
-                  <a:rPr dirty="0"/>
-                  <a:t>Intercept is the mean of the dependent variable</a:t>
-                </a:r>
-              </a:p>
-              <a:p>
-                <a:pPr lvl="1"/>
-                <a:r>
-                  <a:rPr dirty="0"/>
-                  <a:t>Slope is the rate of change of the dependent variable for unit change in independent variable</a:t>
-                </a:r>
-              </a:p>
-              <a:p>
-                <a:pPr lvl="0"/>
-                <a:r>
-                  <a:rPr dirty="0"/>
-                  <a:t>Intercept is value of independent variable where independent </a:t>
-                </a:r>
-                <a:r>
-                  <a:rPr dirty="0" err="1"/>
-                  <a:t>varaibles</a:t>
-                </a:r>
-                <a:r>
-                  <a:rPr dirty="0"/>
-                  <a:t> all </a:t>
+                  <a:rPr lang="en-US" dirty="0"/>
+                  <a:t>Intercept is value of dependent variable at point independent variable </a:t>
                 </a:r>
                 <a14:m>
                   <m:oMath xmlns:m="http://schemas.openxmlformats.org/officeDocument/2006/math">
                     <m:r>
-                      <a:rPr>
+                      <a:rPr lang="en-US" b="0" i="1" smtClean="0">
                         <a:latin typeface="Cambria Math" panose="02040503050406030204" pitchFamily="18" charset="0"/>
                       </a:rPr>
                       <m:t>=</m:t>
                     </m:r>
                     <m:r>
-                      <a:rPr>
+                      <a:rPr lang="en-US" b="0" i="1" smtClean="0">
                         <a:latin typeface="Cambria Math" panose="02040503050406030204" pitchFamily="18" charset="0"/>
                       </a:rPr>
                       <m:t>0</m:t>
                     </m:r>
                   </m:oMath>
                 </a14:m>
-                <a:endParaRPr dirty="0"/>
+                <a:endParaRPr lang="en-US" dirty="0"/>
+              </a:p>
+              <a:p>
+                <a:pPr lvl="0"/>
+                <a:r>
+                  <a:rPr lang="en-US" dirty="0"/>
+                  <a:t>With zero-centered independent variable can interpret model</a:t>
+                </a:r>
               </a:p>
               <a:p>
                 <a:pPr lvl="1"/>
                 <a:r>
-                  <a:rPr dirty="0"/>
-                  <a:t>May not even be in defined range of independent </a:t>
-                </a:r>
-                <a:r>
-                  <a:rPr dirty="0" err="1"/>
-                  <a:t>varaible</a:t>
-                </a:r>
-                <a:endParaRPr dirty="0"/>
+                  <a:rPr lang="en-US" dirty="0"/>
+                  <a:t>Intercept is the mean of the dependent variable</a:t>
+                </a:r>
               </a:p>
               <a:p>
                 <a:pPr lvl="1"/>
                 <a:r>
-                  <a:rPr dirty="0"/>
-                  <a:t>e.g. How can we interpret a </a:t>
-                </a:r>
-                <a:r>
-                  <a:rPr dirty="0" err="1"/>
-                  <a:t>negaive</a:t>
-                </a:r>
-                <a:r>
-                  <a:rPr dirty="0"/>
-                  <a:t> life expectancy</a:t>
-                </a:r>
+                  <a:rPr lang="en-US" dirty="0"/>
+                  <a:t>Slope is the rate of change of the dependent variable for unit change in independent variable</a:t>
+                </a:r>
+              </a:p>
+              <a:p>
+                <a:pPr lvl="0"/>
+                <a:r>
+                  <a:rPr lang="en-US" dirty="0"/>
+                  <a:t>If independent variable is not zero-centered interpretation is difficult</a:t>
+                </a:r>
+              </a:p>
+              <a:p>
+                <a:pPr lvl="1"/>
+                <a:r>
+                  <a:rPr lang="en-US" dirty="0"/>
+                  <a:t>May not even be in defined range of independent variable</a:t>
+                </a:r>
+              </a:p>
+              <a:p>
+                <a:pPr lvl="1"/>
+                <a:r>
+                  <a:rPr lang="en-US" dirty="0"/>
+                  <a:t>e.g. How can we interpret a negative life expectancy?</a:t>
+                </a:r>
+                <a:endParaRPr dirty="0"/>
               </a:p>
             </p:txBody>
           </p:sp>
         </mc:Choice>
-        <mc:Fallback xmlns="">
+        <mc:Fallback>
           <p:sp>
             <p:nvSpPr>
-              <p:cNvPr id="3" name="Content Placeholder 2"/>
+              <p:cNvPr id="3" name="Content Placeholder 2">
+                <a:extLst>
+                  <a:ext uri="{FF2B5EF4-FFF2-40B4-BE49-F238E27FC236}">
+                    <a16:creationId xmlns:a16="http://schemas.microsoft.com/office/drawing/2014/main" id="{8E61EAE1-4B0F-0E53-B892-7F7A9D36AD4F}"/>
+                  </a:ext>
+                </a:extLst>
+              </p:cNvPr>
               <p:cNvSpPr>
                 <a:spLocks noGrp="1" noRot="1" noChangeAspect="1" noMove="1" noResize="1" noEditPoints="1" noAdjustHandles="1" noChangeArrowheads="1" noChangeShapeType="1" noTextEdit="1"/>
               </p:cNvSpPr>
@@ -15326,7 +15559,7 @@
               <a:blipFill>
                 <a:blip r:embed="rId2"/>
                 <a:stretch>
-                  <a:fillRect l="-296" t="-1180"/>
+                  <a:fillRect l="-1111" t="-2065" r="-741"/>
                 </a:stretch>
               </a:blipFill>
             </p:spPr>
@@ -15348,7 +15581,7 @@
     </p:spTree>
     <p:extLst>
       <p:ext uri="{BB962C8B-B14F-4D97-AF65-F5344CB8AC3E}">
-        <p14:creationId xmlns:p14="http://schemas.microsoft.com/office/powerpoint/2010/main" val="95564234"/>
+        <p14:creationId xmlns:p14="http://schemas.microsoft.com/office/powerpoint/2010/main" val="2104859392"/>
       </p:ext>
     </p:extLst>
   </p:cSld>
@@ -15358,7 +15591,7 @@
 </p:sld>
 </file>
 
-<file path=ppt/slides/slide28.xml><?xml version="1.0" encoding="utf-8"?>
+<file path=ppt/slides/slide29.xml><?xml version="1.0" encoding="utf-8"?>
 <p:sld xmlns:a="http://schemas.openxmlformats.org/drawingml/2006/main" xmlns:r="http://schemas.openxmlformats.org/officeDocument/2006/relationships" xmlns:p="http://schemas.openxmlformats.org/presentationml/2006/main">
   <p:cSld>
     <p:spTree>
@@ -15391,8 +15624,8 @@
         </p:blipFill>
         <p:spPr bwMode="auto">
           <a:xfrm>
-            <a:off x="4038600" y="669867"/>
-            <a:ext cx="5105400" cy="4254500"/>
+            <a:off x="4526050" y="992515"/>
+            <a:ext cx="4617950" cy="3848292"/>
           </a:xfrm>
           <a:prstGeom prst="rect">
             <a:avLst/>
@@ -15405,8 +15638,8 @@
           </a:ln>
         </p:spPr>
       </p:pic>
-      <mc:AlternateContent xmlns:mc="http://schemas.openxmlformats.org/markup-compatibility/2006" xmlns:a14="http://schemas.microsoft.com/office/drawing/2010/main">
-        <mc:Choice Requires="a14">
+      <mc:AlternateContent xmlns:mc="http://schemas.openxmlformats.org/markup-compatibility/2006">
+        <mc:Choice xmlns:a14="http://schemas.microsoft.com/office/drawing/2010/main" Requires="a14">
           <p:sp>
             <p:nvSpPr>
               <p:cNvPr id="5" name="Text Placeholder 3">
@@ -15423,8 +15656,8 @@
             </p:nvSpPr>
             <p:spPr>
               <a:xfrm>
-                <a:off x="428753" y="1355096"/>
-                <a:ext cx="3710985" cy="3204712"/>
+                <a:off x="428753" y="1171719"/>
+                <a:ext cx="4198387" cy="3669087"/>
               </a:xfrm>
               <a:prstGeom prst="rect">
                 <a:avLst/>
@@ -15432,7 +15665,7 @@
             </p:spPr>
             <p:txBody>
               <a:bodyPr vert="horz" lIns="91440" tIns="45720" rIns="91440" bIns="45720" rtlCol="0">
-                <a:normAutofit fontScale="92500" lnSpcReduction="10000"/>
+                <a:normAutofit lnSpcReduction="10000"/>
               </a:bodyPr>
               <a:lstStyle>
                 <a:lvl1pPr marL="0" indent="0" algn="l" defTabSz="342900" rtl="0" eaLnBrk="1" latinLnBrk="0" hangingPunct="1">
@@ -15668,7 +15901,7 @@
             </p:txBody>
           </p:sp>
         </mc:Choice>
-        <mc:Fallback xmlns="">
+        <mc:Fallback>
           <p:sp>
             <p:nvSpPr>
               <p:cNvPr id="5" name="Text Placeholder 3">
@@ -15685,8 +15918,8 @@
             </p:nvSpPr>
             <p:spPr>
               <a:xfrm>
-                <a:off x="428753" y="1355096"/>
-                <a:ext cx="3710985" cy="3204712"/>
+                <a:off x="428753" y="1171719"/>
+                <a:ext cx="4198387" cy="3669087"/>
               </a:xfrm>
               <a:prstGeom prst="rect">
                 <a:avLst/>
@@ -15694,7 +15927,7 @@
               <a:blipFill>
                 <a:blip r:embed="rId3"/>
                 <a:stretch>
-                  <a:fillRect l="-1478" t="-1901" r="-1149" b="-2852"/>
+                  <a:fillRect l="-1451" t="-1661"/>
                 </a:stretch>
               </a:blipFill>
             </p:spPr>
@@ -15732,35 +15965,35 @@
         <p:spPr>
           <a:xfrm>
             <a:off x="457202" y="204787"/>
-            <a:ext cx="3710986" cy="685229"/>
+            <a:ext cx="7450750" cy="685229"/>
           </a:xfrm>
         </p:spPr>
         <p:txBody>
           <a:bodyPr>
-            <a:normAutofit fontScale="90000"/>
+            <a:normAutofit/>
           </a:bodyPr>
           <a:lstStyle/>
           <a:p>
-            <a:pPr marL="0" lvl="0" indent="0">
+            <a:pPr marL="0" lvl="0" indent="0" algn="ctr">
               <a:buNone/>
             </a:pPr>
             <a:r>
-              <a:rPr sz="2400" dirty="0"/>
+              <a:rPr sz="3200" b="0" dirty="0"/>
               <a:t>Example </a:t>
             </a:r>
             <a:r>
-              <a:rPr lang="en-US" sz="2400" dirty="0"/>
+              <a:rPr lang="en-US" sz="3200" b="0" dirty="0"/>
               <a:t>–</a:t>
             </a:r>
             <a:r>
-              <a:rPr sz="2400" dirty="0"/>
+              <a:rPr sz="3200" b="0" dirty="0"/>
               <a:t> </a:t>
             </a:r>
             <a:r>
-              <a:rPr lang="en-US" sz="2400" dirty="0"/>
-              <a:t>Fitting the Model</a:t>
-            </a:r>
-            <a:endParaRPr sz="2400" dirty="0"/>
+              <a:rPr lang="en-US" sz="3200" b="0" dirty="0"/>
+              <a:t>Interpreting the Model</a:t>
+            </a:r>
+            <a:endParaRPr sz="3200" b="0" dirty="0"/>
           </a:p>
         </p:txBody>
       </p:sp>
@@ -15768,117 +16001,6 @@
     <p:extLst>
       <p:ext uri="{BB962C8B-B14F-4D97-AF65-F5344CB8AC3E}">
         <p14:creationId xmlns:p14="http://schemas.microsoft.com/office/powerpoint/2010/main" val="2924359962"/>
-      </p:ext>
-    </p:extLst>
-  </p:cSld>
-  <p:clrMapOvr>
-    <a:masterClrMapping/>
-  </p:clrMapOvr>
-</p:sld>
-</file>
-
-<file path=ppt/slides/slide29.xml><?xml version="1.0" encoding="utf-8"?>
-<p:sld xmlns:a="http://schemas.openxmlformats.org/drawingml/2006/main" xmlns:r="http://schemas.openxmlformats.org/officeDocument/2006/relationships" xmlns:p="http://schemas.openxmlformats.org/presentationml/2006/main">
-  <p:cSld>
-    <p:spTree>
-      <p:nvGrpSpPr>
-        <p:cNvPr id="1" name=""/>
-        <p:cNvGrpSpPr/>
-        <p:nvPr/>
-      </p:nvGrpSpPr>
-      <p:grpSpPr>
-        <a:xfrm>
-          <a:off x="0" y="0"/>
-          <a:ext cx="0" cy="0"/>
-          <a:chOff x="0" y="0"/>
-          <a:chExt cx="0" cy="0"/>
-        </a:xfrm>
-      </p:grpSpPr>
-      <p:sp>
-        <p:nvSpPr>
-          <p:cNvPr id="2" name="Title 1"/>
-          <p:cNvSpPr>
-            <a:spLocks noGrp="1"/>
-          </p:cNvSpPr>
-          <p:nvPr>
-            <p:ph type="title"/>
-          </p:nvPr>
-        </p:nvSpPr>
-        <p:spPr/>
-        <p:txBody>
-          <a:bodyPr/>
-          <a:lstStyle/>
-          <a:p>
-            <a:pPr marL="0" lvl="0" indent="0">
-              <a:buNone/>
-            </a:pPr>
-            <a:r>
-              <a:t>Evaluating Regression Models</a:t>
-            </a:r>
-          </a:p>
-        </p:txBody>
-      </p:sp>
-      <p:sp>
-        <p:nvSpPr>
-          <p:cNvPr id="3" name="Content Placeholder 2"/>
-          <p:cNvSpPr>
-            <a:spLocks noGrp="1"/>
-          </p:cNvSpPr>
-          <p:nvPr>
-            <p:ph idx="1"/>
-          </p:nvPr>
-        </p:nvSpPr>
-        <p:spPr/>
-        <p:txBody>
-          <a:bodyPr/>
-          <a:lstStyle/>
-          <a:p>
-            <a:pPr marL="0" lvl="0" indent="0">
-              <a:buNone/>
-            </a:pPr>
-            <a:r>
-              <a:t>When evaluating any machine learning model consider </a:t>
-            </a:r>
-            <a:r>
-              <a:rPr b="1"/>
-              <a:t>all evaluation methods available</a:t>
-            </a:r>
-          </a:p>
-          <a:p>
-            <a:pPr lvl="0"/>
-            <a:r>
-              <a:t>No one method is most important all of the time</a:t>
-            </a:r>
-          </a:p>
-          <a:p>
-            <a:pPr lvl="0"/>
-            <a:r>
-              <a:rPr b="1"/>
-              <a:t>Different methods highlight different problems</a:t>
-            </a:r>
-            <a:r>
-              <a:t> with your model</a:t>
-            </a:r>
-          </a:p>
-          <a:p>
-            <a:pPr lvl="0"/>
-            <a:r>
-              <a:t>Don’t forget to check that the </a:t>
-            </a:r>
-            <a:r>
-              <a:rPr b="1"/>
-              <a:t>model must make sense</a:t>
-            </a:r>
-            <a:r>
-              <a:t> for your application!</a:t>
-            </a:r>
-          </a:p>
-        </p:txBody>
-      </p:sp>
-    </p:spTree>
-    <p:extLst>
-      <p:ext uri="{BB962C8B-B14F-4D97-AF65-F5344CB8AC3E}">
-        <p14:creationId xmlns:p14="http://schemas.microsoft.com/office/powerpoint/2010/main" val="2913388196"/>
       </p:ext>
     </p:extLst>
   </p:cSld>
@@ -16005,7 +16127,7 @@
             <a:pPr lvl="0"/>
             <a:r>
               <a:rPr dirty="0"/>
-              <a:t>Many non-linear models are at locally linear at convergence</a:t>
+              <a:t>Many non-linear models are locally linear at convergence</a:t>
             </a:r>
           </a:p>
           <a:p>
@@ -16034,7 +16156,7 @@
             <a:pPr lvl="1"/>
             <a:r>
               <a:rPr lang="en-US" dirty="0"/>
-              <a:t>Frequentist view used </a:t>
+              <a:t>Frequentist view uses </a:t>
             </a:r>
             <a:r>
               <a:rPr lang="en-US" b="1" dirty="0"/>
@@ -16045,8 +16167,13 @@
             <a:pPr lvl="1"/>
             <a:r>
               <a:rPr dirty="0"/>
-              <a:t>Bayesian view is also widely used</a:t>
-            </a:r>
+              <a:t>Bayesian view is </a:t>
+            </a:r>
+            <a:r>
+              <a:rPr lang="en-US" dirty="0"/>
+              <a:t>alternative </a:t>
+            </a:r>
+            <a:endParaRPr dirty="0"/>
           </a:p>
         </p:txBody>
       </p:sp>
@@ -16085,6 +16212,148 @@
             <p:ph type="title"/>
           </p:nvPr>
         </p:nvSpPr>
+        <p:spPr/>
+        <p:txBody>
+          <a:bodyPr/>
+          <a:lstStyle/>
+          <a:p>
+            <a:pPr marL="0" lvl="0" indent="0">
+              <a:buNone/>
+            </a:pPr>
+            <a:r>
+              <a:rPr dirty="0"/>
+              <a:t>Evaluating Regression Models</a:t>
+            </a:r>
+          </a:p>
+        </p:txBody>
+      </p:sp>
+      <p:sp>
+        <p:nvSpPr>
+          <p:cNvPr id="3" name="Content Placeholder 2"/>
+          <p:cNvSpPr>
+            <a:spLocks noGrp="1"/>
+          </p:cNvSpPr>
+          <p:nvPr>
+            <p:ph idx="1"/>
+          </p:nvPr>
+        </p:nvSpPr>
+        <p:spPr/>
+        <p:txBody>
+          <a:bodyPr/>
+          <a:lstStyle/>
+          <a:p>
+            <a:pPr marL="0" lvl="0" indent="0">
+              <a:buNone/>
+            </a:pPr>
+            <a:r>
+              <a:rPr dirty="0"/>
+              <a:t>When evaluating any </a:t>
+            </a:r>
+            <a:r>
+              <a:rPr lang="en-US" dirty="0"/>
+              <a:t>statistical or machine learning </a:t>
+            </a:r>
+            <a:r>
+              <a:rPr dirty="0"/>
+              <a:t>model consider </a:t>
+            </a:r>
+            <a:r>
+              <a:rPr b="1" dirty="0"/>
+              <a:t>all evaluation methods available</a:t>
+            </a:r>
+          </a:p>
+          <a:p>
+            <a:pPr lvl="0"/>
+            <a:r>
+              <a:rPr dirty="0"/>
+              <a:t>No one method is most important all of the time</a:t>
+            </a:r>
+          </a:p>
+          <a:p>
+            <a:pPr lvl="0"/>
+            <a:r>
+              <a:rPr b="1" dirty="0"/>
+              <a:t>Different methods highlight different </a:t>
+            </a:r>
+            <a:r>
+              <a:rPr lang="en-US" b="1" dirty="0"/>
+              <a:t>aspects</a:t>
+            </a:r>
+            <a:r>
+              <a:rPr dirty="0"/>
+              <a:t> </a:t>
+            </a:r>
+            <a:r>
+              <a:rPr lang="en-US" dirty="0"/>
+              <a:t>of</a:t>
+            </a:r>
+            <a:r>
+              <a:rPr dirty="0"/>
+              <a:t> model</a:t>
+            </a:r>
+            <a:r>
+              <a:rPr lang="en-US" dirty="0"/>
+              <a:t> performance</a:t>
+            </a:r>
+            <a:endParaRPr dirty="0"/>
+          </a:p>
+          <a:p>
+            <a:pPr lvl="0"/>
+            <a:r>
+              <a:rPr dirty="0"/>
+              <a:t>Don’t forget to check that the </a:t>
+            </a:r>
+            <a:r>
+              <a:rPr b="1" dirty="0"/>
+              <a:t>model must make sense</a:t>
+            </a:r>
+            <a:r>
+              <a:rPr dirty="0"/>
+              <a:t> for your application!</a:t>
+            </a:r>
+          </a:p>
+        </p:txBody>
+      </p:sp>
+    </p:spTree>
+    <p:extLst>
+      <p:ext uri="{BB962C8B-B14F-4D97-AF65-F5344CB8AC3E}">
+        <p14:creationId xmlns:p14="http://schemas.microsoft.com/office/powerpoint/2010/main" val="2913388196"/>
+      </p:ext>
+    </p:extLst>
+  </p:cSld>
+  <p:clrMapOvr>
+    <a:masterClrMapping/>
+  </p:clrMapOvr>
+</p:sld>
+</file>
+
+<file path=ppt/slides/slide31.xml><?xml version="1.0" encoding="utf-8"?>
+<p:sld xmlns:a="http://schemas.openxmlformats.org/drawingml/2006/main" xmlns:r="http://schemas.openxmlformats.org/officeDocument/2006/relationships" xmlns:p="http://schemas.openxmlformats.org/presentationml/2006/main">
+  <p:cSld>
+    <p:spTree>
+      <p:nvGrpSpPr>
+        <p:cNvPr id="1" name=""/>
+        <p:cNvGrpSpPr/>
+        <p:nvPr/>
+      </p:nvGrpSpPr>
+      <p:grpSpPr>
+        <a:xfrm>
+          <a:off x="0" y="0"/>
+          <a:ext cx="0" cy="0"/>
+          <a:chOff x="0" y="0"/>
+          <a:chExt cx="0" cy="0"/>
+        </a:xfrm>
+      </p:grpSpPr>
+      <p:sp>
+        <p:nvSpPr>
+          <p:cNvPr id="2" name="Title 1"/>
+          <p:cNvSpPr>
+            <a:spLocks noGrp="1"/>
+          </p:cNvSpPr>
+          <p:nvPr>
+            <p:ph type="title"/>
+          </p:nvPr>
+        </p:nvSpPr>
         <p:spPr>
           <a:xfrm>
             <a:off x="457200" y="205979"/>
@@ -16439,7 +16708,15 @@
                 <a:pPr lvl="1"/>
                 <a:r>
                   <a:rPr lang="en-US" dirty="0"/>
-                  <a:t>In other words the residuals are stationary WRT the predicted values</a:t>
+                  <a:t>In other words the residuals are </a:t>
+                </a:r>
+                <a:r>
+                  <a:rPr lang="en-US" b="1" dirty="0"/>
+                  <a:t>stationary</a:t>
+                </a:r>
+                <a:r>
+                  <a:rPr lang="en-US" dirty="0"/>
+                  <a:t> WRT the predicted values</a:t>
                 </a:r>
                 <a:endParaRPr dirty="0"/>
               </a:p>
@@ -16458,7 +16735,7 @@
                 </a:r>
                 <a:r>
                   <a:rPr dirty="0"/>
-                  <a:t>variance is not constant and we say </a:t>
+                  <a:t>variance is not constant we say </a:t>
                 </a:r>
                 <a:r>
                   <a:rPr lang="en-US" dirty="0"/>
@@ -16539,7 +16816,7 @@
 </p:sld>
 </file>
 
-<file path=ppt/slides/slide31.xml><?xml version="1.0" encoding="utf-8"?>
+<file path=ppt/slides/slide32.xml><?xml version="1.0" encoding="utf-8"?>
 <p:sld xmlns:a="http://schemas.openxmlformats.org/drawingml/2006/main" xmlns:r="http://schemas.openxmlformats.org/officeDocument/2006/relationships" xmlns:p="http://schemas.openxmlformats.org/presentationml/2006/main">
   <p:cSld>
     <p:spTree>
@@ -16578,11 +16855,11 @@
           </a:bodyPr>
           <a:lstStyle/>
           <a:p>
-            <a:pPr marL="0" lvl="0" indent="0">
+            <a:pPr marL="0" lvl="0" indent="0" algn="ctr">
               <a:buNone/>
             </a:pPr>
             <a:r>
-              <a:rPr sz="3200" dirty="0"/>
+              <a:rPr sz="3200" b="0" dirty="0"/>
               <a:t>Evaluating Regression Models</a:t>
             </a:r>
           </a:p>
@@ -16600,13 +16877,13 @@
         </p:nvSpPr>
         <p:spPr>
           <a:xfrm>
-            <a:off x="457201" y="1076327"/>
-            <a:ext cx="8455151" cy="1004442"/>
+            <a:off x="457201" y="924565"/>
+            <a:ext cx="8455151" cy="1088254"/>
           </a:xfrm>
         </p:spPr>
         <p:txBody>
           <a:bodyPr>
-            <a:normAutofit fontScale="92500" lnSpcReduction="10000"/>
+            <a:normAutofit lnSpcReduction="10000"/>
           </a:bodyPr>
           <a:lstStyle/>
           <a:p>
@@ -16695,7 +16972,7 @@
 </p:sld>
 </file>
 
-<file path=ppt/slides/slide32.xml><?xml version="1.0" encoding="utf-8"?>
+<file path=ppt/slides/slide33.xml><?xml version="1.0" encoding="utf-8"?>
 <p:sld xmlns:a="http://schemas.openxmlformats.org/drawingml/2006/main" xmlns:r="http://schemas.openxmlformats.org/officeDocument/2006/relationships" xmlns:p="http://schemas.openxmlformats.org/presentationml/2006/main">
   <p:cSld>
     <p:spTree>
@@ -16961,7 +17238,7 @@
 </p:sld>
 </file>
 
-<file path=ppt/slides/slide33.xml><?xml version="1.0" encoding="utf-8"?>
+<file path=ppt/slides/slide34.xml><?xml version="1.0" encoding="utf-8"?>
 <p:sld xmlns:a="http://schemas.openxmlformats.org/drawingml/2006/main" xmlns:r="http://schemas.openxmlformats.org/officeDocument/2006/relationships" xmlns:p="http://schemas.openxmlformats.org/presentationml/2006/main">
   <p:cSld>
     <p:spTree>
@@ -17002,8 +17279,8 @@
           </a:p>
         </p:txBody>
       </p:sp>
-      <mc:AlternateContent xmlns:mc="http://schemas.openxmlformats.org/markup-compatibility/2006" xmlns:a14="http://schemas.microsoft.com/office/drawing/2010/main">
-        <mc:Choice Requires="a14">
+      <mc:AlternateContent xmlns:mc="http://schemas.openxmlformats.org/markup-compatibility/2006">
+        <mc:Choice xmlns:a14="http://schemas.microsoft.com/office/drawing/2010/main" Requires="a14">
           <p:sp>
             <p:nvSpPr>
               <p:cNvPr id="3" name="Content Placeholder 2"/>
@@ -17107,46 +17384,46 @@
                     </m:oMathParaPr>
                     <m:oMath xmlns:m="http://schemas.openxmlformats.org/officeDocument/2006/math">
                       <m:r>
-                        <a:rPr lang="en-US" b="0" i="1" smtClean="0">
+                        <a:rPr lang="en-US" b="1" i="1" smtClean="0">
                           <a:latin typeface="Cambria Math" panose="02040503050406030204" pitchFamily="18" charset="0"/>
                         </a:rPr>
-                        <m:t>𝑆𝑢𝑚</m:t>
+                        <m:t>𝑺𝒖𝒎</m:t>
                       </m:r>
                       <m:r>
-                        <a:rPr lang="en-US" b="0" i="1" smtClean="0">
+                        <a:rPr lang="en-US" b="1" i="1" smtClean="0">
                           <a:latin typeface="Cambria Math" panose="02040503050406030204" pitchFamily="18" charset="0"/>
                         </a:rPr>
                         <m:t> </m:t>
                       </m:r>
                       <m:r>
-                        <a:rPr lang="en-US" b="0" i="1" smtClean="0">
+                        <a:rPr lang="en-US" b="1" i="1" smtClean="0">
                           <a:latin typeface="Cambria Math" panose="02040503050406030204" pitchFamily="18" charset="0"/>
                         </a:rPr>
-                        <m:t>𝑜𝑓</m:t>
+                        <m:t>𝒐𝒇</m:t>
                       </m:r>
                       <m:r>
-                        <a:rPr lang="en-US" b="0" i="1" smtClean="0">
+                        <a:rPr lang="en-US" b="1" i="1" smtClean="0">
                           <a:latin typeface="Cambria Math" panose="02040503050406030204" pitchFamily="18" charset="0"/>
                         </a:rPr>
                         <m:t> </m:t>
                       </m:r>
                       <m:r>
-                        <a:rPr lang="en-US" b="0" i="1" smtClean="0">
+                        <a:rPr lang="en-US" b="1" i="1" smtClean="0">
                           <a:latin typeface="Cambria Math" panose="02040503050406030204" pitchFamily="18" charset="0"/>
                         </a:rPr>
-                        <m:t>𝑆𝑞𝑢𝑎𝑟𝑒𝑠</m:t>
+                        <m:t>𝑺𝒒𝒖𝒂𝒓𝒆𝒔</m:t>
                       </m:r>
                       <m:r>
-                        <a:rPr lang="en-US" b="0" i="1" smtClean="0">
+                        <a:rPr lang="en-US" b="1" i="1" smtClean="0">
                           <a:latin typeface="Cambria Math" panose="02040503050406030204" pitchFamily="18" charset="0"/>
                         </a:rPr>
                         <m:t> </m:t>
                       </m:r>
                       <m:r>
-                        <a:rPr lang="en-US" b="0" i="1" smtClean="0">
+                        <a:rPr lang="en-US" b="1" i="1" smtClean="0">
                           <a:latin typeface="Cambria Math" panose="02040503050406030204" pitchFamily="18" charset="0"/>
                         </a:rPr>
-                        <m:t>𝑇𝑜𝑡𝑎𝑙</m:t>
+                        <m:t>𝑻𝒐𝒕𝒂𝒍</m:t>
                       </m:r>
                       <m:r>
                         <a:rPr lang="en-US" b="0" i="1" smtClean="0">
@@ -17155,10 +17432,10 @@
                         <m:t>=</m:t>
                       </m:r>
                       <m:r>
-                        <a:rPr lang="en-US" b="0" i="1" smtClean="0">
+                        <a:rPr lang="en-US" b="1" i="1" smtClean="0">
                           <a:latin typeface="Cambria Math" panose="02040503050406030204" pitchFamily="18" charset="0"/>
                         </a:rPr>
-                        <m:t>𝑆𝑆𝑇</m:t>
+                        <m:t>𝑺𝑺𝑻</m:t>
                       </m:r>
                       <m:r>
                         <a:rPr lang="en-US" b="0" i="1" smtClean="0">
@@ -17286,46 +17563,46 @@
                     </m:oMathParaPr>
                     <m:oMath xmlns:m="http://schemas.openxmlformats.org/officeDocument/2006/math">
                       <m:r>
-                        <a:rPr lang="en-US" i="1">
+                        <a:rPr lang="en-US" b="1" i="1">
                           <a:latin typeface="Cambria Math" panose="02040503050406030204" pitchFamily="18" charset="0"/>
                         </a:rPr>
-                        <m:t>𝑆𝑢𝑚</m:t>
+                        <m:t>𝑺𝒖𝒎</m:t>
                       </m:r>
                       <m:r>
-                        <a:rPr lang="en-US" i="1">
+                        <a:rPr lang="en-US" b="1" i="1">
                           <a:latin typeface="Cambria Math" panose="02040503050406030204" pitchFamily="18" charset="0"/>
                         </a:rPr>
                         <m:t> </m:t>
                       </m:r>
                       <m:r>
-                        <a:rPr lang="en-US" i="1">
+                        <a:rPr lang="en-US" b="1" i="1">
                           <a:latin typeface="Cambria Math" panose="02040503050406030204" pitchFamily="18" charset="0"/>
                         </a:rPr>
-                        <m:t>𝑜𝑓</m:t>
+                        <m:t>𝒐𝒇</m:t>
                       </m:r>
                       <m:r>
-                        <a:rPr lang="en-US" i="1">
+                        <a:rPr lang="en-US" b="1" i="1">
                           <a:latin typeface="Cambria Math" panose="02040503050406030204" pitchFamily="18" charset="0"/>
                         </a:rPr>
                         <m:t> </m:t>
                       </m:r>
                       <m:r>
-                        <a:rPr lang="en-US" i="1">
+                        <a:rPr lang="en-US" b="1" i="1">
                           <a:latin typeface="Cambria Math" panose="02040503050406030204" pitchFamily="18" charset="0"/>
                         </a:rPr>
-                        <m:t>𝑆𝑞𝑢𝑎𝑟𝑒𝑠</m:t>
+                        <m:t>𝑺𝒒𝒖𝒂𝒓𝒆𝒔</m:t>
                       </m:r>
                       <m:r>
-                        <a:rPr lang="en-US" i="1">
+                        <a:rPr lang="en-US" b="1" i="1">
                           <a:latin typeface="Cambria Math" panose="02040503050406030204" pitchFamily="18" charset="0"/>
                         </a:rPr>
                         <m:t> </m:t>
                       </m:r>
                       <m:r>
-                        <a:rPr lang="en-US" b="0" i="1" smtClean="0">
+                        <a:rPr lang="en-US" b="1" i="1" smtClean="0">
                           <a:latin typeface="Cambria Math" panose="02040503050406030204" pitchFamily="18" charset="0"/>
                         </a:rPr>
-                        <m:t>𝐸𝑥𝑝𝑙𝑎𝑖𝑛𝑒𝑑</m:t>
+                        <m:t>𝑬𝒙𝒑𝒍𝒂𝒊𝒏𝒆𝒅</m:t>
                       </m:r>
                       <m:r>
                         <a:rPr lang="en-US" i="1">
@@ -17334,10 +17611,10 @@
                         <m:t>=</m:t>
                       </m:r>
                       <m:r>
-                        <a:rPr lang="en-US" i="1">
+                        <a:rPr lang="en-US" b="1" i="1">
                           <a:latin typeface="Cambria Math" panose="02040503050406030204" pitchFamily="18" charset="0"/>
                         </a:rPr>
-                        <m:t>𝑆𝑆𝐸</m:t>
+                        <m:t>𝑺𝑺𝑬</m:t>
                       </m:r>
                       <m:r>
                         <a:rPr lang="en-US" i="1">
@@ -17477,46 +17754,46 @@
                     </m:oMathParaPr>
                     <m:oMath xmlns:m="http://schemas.openxmlformats.org/officeDocument/2006/math">
                       <m:r>
-                        <a:rPr lang="en-US" i="1" smtClean="0">
+                        <a:rPr lang="en-US" b="1" i="1" smtClean="0">
                           <a:latin typeface="Cambria Math" panose="02040503050406030204" pitchFamily="18" charset="0"/>
                         </a:rPr>
-                        <m:t>𝑆𝑢𝑚</m:t>
+                        <m:t>𝑺𝒖𝒎</m:t>
                       </m:r>
                       <m:r>
-                        <a:rPr lang="en-US" i="1" smtClean="0">
+                        <a:rPr lang="en-US" b="1" i="1" smtClean="0">
                           <a:latin typeface="Cambria Math" panose="02040503050406030204" pitchFamily="18" charset="0"/>
                         </a:rPr>
                         <m:t> </m:t>
                       </m:r>
                       <m:r>
-                        <a:rPr lang="en-US" i="1" smtClean="0">
+                        <a:rPr lang="en-US" b="1" i="1" smtClean="0">
                           <a:latin typeface="Cambria Math" panose="02040503050406030204" pitchFamily="18" charset="0"/>
                         </a:rPr>
-                        <m:t>𝑜𝑓</m:t>
+                        <m:t>𝒐𝒇</m:t>
                       </m:r>
                       <m:r>
-                        <a:rPr lang="en-US" i="1" smtClean="0">
+                        <a:rPr lang="en-US" b="1" i="1" smtClean="0">
                           <a:latin typeface="Cambria Math" panose="02040503050406030204" pitchFamily="18" charset="0"/>
                         </a:rPr>
                         <m:t> </m:t>
                       </m:r>
                       <m:r>
-                        <a:rPr lang="en-US" i="1" smtClean="0">
+                        <a:rPr lang="en-US" b="1" i="1" smtClean="0">
                           <a:latin typeface="Cambria Math" panose="02040503050406030204" pitchFamily="18" charset="0"/>
                         </a:rPr>
-                        <m:t>𝑆𝑞𝑢𝑎𝑟𝑒𝑠</m:t>
+                        <m:t>𝑺𝒒𝒖𝒂𝒓𝒆𝒔</m:t>
                       </m:r>
                       <m:r>
-                        <a:rPr lang="en-US" i="1" smtClean="0">
+                        <a:rPr lang="en-US" b="1" i="1" smtClean="0">
                           <a:latin typeface="Cambria Math" panose="02040503050406030204" pitchFamily="18" charset="0"/>
                         </a:rPr>
                         <m:t> </m:t>
                       </m:r>
                       <m:r>
-                        <a:rPr lang="en-US" b="0" i="1" smtClean="0">
+                        <a:rPr lang="en-US" b="1" i="1" smtClean="0">
                           <a:latin typeface="Cambria Math" panose="02040503050406030204" pitchFamily="18" charset="0"/>
                         </a:rPr>
-                        <m:t>𝑅𝑒𝑠𝑖𝑑𝑢𝑎𝑙</m:t>
+                        <m:t>𝑹𝒆𝒔𝒊𝒅𝒖𝒂𝒍</m:t>
                       </m:r>
                       <m:r>
                         <a:rPr lang="en-US" i="1">
@@ -17525,10 +17802,10 @@
                         <m:t>=</m:t>
                       </m:r>
                       <m:r>
-                        <a:rPr lang="en-US" i="1">
+                        <a:rPr lang="en-US" b="1" i="1">
                           <a:latin typeface="Cambria Math" panose="02040503050406030204" pitchFamily="18" charset="0"/>
                         </a:rPr>
-                        <m:t>𝑆𝑆𝑅</m:t>
+                        <m:t>𝑺𝑺𝑹</m:t>
                       </m:r>
                       <m:r>
                         <a:rPr lang="en-US" i="1">
@@ -17775,7 +18052,7 @@
             </p:txBody>
           </p:sp>
         </mc:Choice>
-        <mc:Fallback xmlns="">
+        <mc:Fallback>
           <p:sp>
             <p:nvSpPr>
               <p:cNvPr id="3" name="Content Placeholder 2"/>
@@ -17821,7 +18098,7 @@
 </p:sld>
 </file>
 
-<file path=ppt/slides/slide34.xml><?xml version="1.0" encoding="utf-8"?>
+<file path=ppt/slides/slide35.xml><?xml version="1.0" encoding="utf-8"?>
 <p:sld xmlns:a="http://schemas.openxmlformats.org/drawingml/2006/main" xmlns:r="http://schemas.openxmlformats.org/officeDocument/2006/relationships" xmlns:p="http://schemas.openxmlformats.org/presentationml/2006/main">
   <p:cSld>
     <p:spTree>
@@ -18485,7 +18762,7 @@
 </p:sld>
 </file>
 
-<file path=ppt/slides/slide35.xml><?xml version="1.0" encoding="utf-8"?>
+<file path=ppt/slides/slide36.xml><?xml version="1.0" encoding="utf-8"?>
 <p:sld xmlns:a="http://schemas.openxmlformats.org/drawingml/2006/main" xmlns:r="http://schemas.openxmlformats.org/officeDocument/2006/relationships" xmlns:p="http://schemas.openxmlformats.org/presentationml/2006/main">
   <p:cSld>
     <p:spTree>
@@ -18647,6 +18924,10 @@
                   <a:rPr lang="ar-AE" dirty="0"/>
                   <a:t>, </a:t>
                 </a:r>
+                <a:r>
+                  <a:rPr lang="en-US" dirty="0"/>
+                  <a:t> </a:t>
+                </a:r>
                 <a14:m>
                   <m:oMath xmlns:m="http://schemas.openxmlformats.org/officeDocument/2006/math">
                     <m:sSup>
@@ -18832,8 +19113,12 @@
               </a:p>
               <a:p>
                 <a:r>
+                  <a:rPr lang="en-US" b="1" dirty="0"/>
+                  <a:t>Perfect model </a:t>
+                </a:r>
+                <a:r>
                   <a:rPr lang="en-US" dirty="0"/>
-                  <a:t>The </a:t>
+                  <a:t>has </a:t>
                 </a:r>
                 <a14:m>
                   <m:oMath xmlns:m="http://schemas.openxmlformats.org/officeDocument/2006/math">
@@ -18865,20 +19150,8 @@
                   </m:oMath>
                 </a14:m>
                 <a:r>
-                  <a:rPr lang="ar-AE" dirty="0"/>
-                  <a:t> </a:t>
-                </a:r>
-                <a:r>
                   <a:rPr lang="en-US" dirty="0"/>
-                  <a:t>for a </a:t>
-                </a:r>
-                <a:r>
-                  <a:rPr lang="en-US" b="1" dirty="0"/>
-                  <a:t>perfect model </a:t>
-                </a:r>
-                <a:r>
-                  <a:rPr lang="en-US" dirty="0"/>
-                  <a:t>would behave as follows:</a:t>
+                  <a:t>:</a:t>
                 </a:r>
               </a:p>
               <a:p>
@@ -18983,7 +19256,7 @@
                 </a:r>
                 <a:r>
                   <a:rPr lang="en-US" dirty="0"/>
-                  <a:t>or </a:t>
+                  <a:t>or a </a:t>
                 </a:r>
                 <a:r>
                   <a:rPr lang="en-US" b="1" dirty="0"/>
@@ -19146,7 +19419,7 @@
 </p:sld>
 </file>
 
-<file path=ppt/slides/slide36.xml><?xml version="1.0" encoding="utf-8"?>
+<file path=ppt/slides/slide37.xml><?xml version="1.0" encoding="utf-8"?>
 <p:sld xmlns:a="http://schemas.openxmlformats.org/drawingml/2006/main" xmlns:r="http://schemas.openxmlformats.org/officeDocument/2006/relationships" xmlns:p="http://schemas.openxmlformats.org/presentationml/2006/main">
   <p:cSld>
     <p:spTree>
@@ -19187,8 +19460,8 @@
           </a:p>
         </p:txBody>
       </p:sp>
-      <mc:AlternateContent xmlns:mc="http://schemas.openxmlformats.org/markup-compatibility/2006" xmlns:a14="http://schemas.microsoft.com/office/drawing/2010/main">
-        <mc:Choice Requires="a14">
+      <mc:AlternateContent xmlns:mc="http://schemas.openxmlformats.org/markup-compatibility/2006">
+        <mc:Choice xmlns:a14="http://schemas.microsoft.com/office/drawing/2010/main" Requires="a14">
           <p:sp>
             <p:nvSpPr>
               <p:cNvPr id="3" name="Content Placeholder 2"/>
@@ -19207,7 +19480,7 @@
             </p:spPr>
             <p:txBody>
               <a:bodyPr>
-                <a:normAutofit fontScale="92500" lnSpcReduction="20000"/>
+                <a:normAutofit fontScale="92500"/>
               </a:bodyPr>
               <a:lstStyle/>
               <a:p>
@@ -19223,7 +19496,7 @@
                 <a:pPr lvl="0"/>
                 <a:r>
                   <a:rPr lang="en-US" dirty="0"/>
-                  <a:t>But, the model will become over-fit as the number of parameters increases</a:t>
+                  <a:t>But, the model will become over-fit as the number of parameters increases, high degree of freedom</a:t>
                 </a:r>
               </a:p>
               <a:p>
@@ -19605,576 +19878,12 @@
                 <a:pPr marL="0" lvl="0" indent="0">
                   <a:buNone/>
                 </a:pPr>
-                <a:r>
-                  <a:rPr lang="en-US" dirty="0"/>
-                  <a:t>This gives </a:t>
-                </a:r>
-                <a14:m>
-                  <m:oMath xmlns:m="http://schemas.openxmlformats.org/officeDocument/2006/math">
-                    <m:sSubSup>
-                      <m:sSubSupPr>
-                        <m:ctrlPr>
-                          <a:rPr lang="ar-AE" i="1">
-                            <a:latin typeface="Cambria Math" panose="02040503050406030204" pitchFamily="18" charset="0"/>
-                          </a:rPr>
-                        </m:ctrlPr>
-                      </m:sSubSupPr>
-                      <m:e>
-                        <m:r>
-                          <a:rPr lang="ar-AE">
-                            <a:latin typeface="Cambria Math" panose="02040503050406030204" pitchFamily="18" charset="0"/>
-                          </a:rPr>
-                          <m:t>𝑅</m:t>
-                        </m:r>
-                      </m:e>
-                      <m:sub>
-                        <m:r>
-                          <a:rPr lang="ar-AE">
-                            <a:latin typeface="Cambria Math" panose="02040503050406030204" pitchFamily="18" charset="0"/>
-                          </a:rPr>
-                          <m:t>𝑎𝑑𝑗</m:t>
-                        </m:r>
-                      </m:sub>
-                      <m:sup>
-                        <m:r>
-                          <a:rPr lang="ar-AE">
-                            <a:latin typeface="Cambria Math" panose="02040503050406030204" pitchFamily="18" charset="0"/>
-                          </a:rPr>
-                          <m:t>2</m:t>
-                        </m:r>
-                      </m:sup>
-                    </m:sSubSup>
-                  </m:oMath>
-                </a14:m>
-                <a:r>
-                  <a:rPr lang="ar-AE" dirty="0"/>
-                  <a:t> </a:t>
-                </a:r>
-                <a:r>
-                  <a:rPr lang="en-US" dirty="0"/>
-                  <a:t>as:</a:t>
-                </a:r>
-              </a:p>
-              <a:p>
-                <a:pPr marL="0" lvl="0" indent="0">
-                  <a:buNone/>
-                </a:pPr>
                 <a:endParaRPr dirty="0"/>
               </a:p>
             </p:txBody>
           </p:sp>
         </mc:Choice>
-        <mc:Fallback xmlns="">
-          <p:sp>
-            <p:nvSpPr>
-              <p:cNvPr id="3" name="Content Placeholder 2"/>
-              <p:cNvSpPr>
-                <a:spLocks noGrp="1" noRot="1" noChangeAspect="1" noMove="1" noResize="1" noEditPoints="1" noAdjustHandles="1" noChangeArrowheads="1" noChangeShapeType="1" noTextEdit="1"/>
-              </p:cNvSpPr>
-              <p:nvPr>
-                <p:ph idx="1"/>
-              </p:nvPr>
-            </p:nvSpPr>
-            <p:spPr>
-              <a:xfrm>
-                <a:off x="457200" y="1117600"/>
-                <a:ext cx="8229600" cy="3856736"/>
-              </a:xfrm>
-              <a:blipFill>
-                <a:blip r:embed="rId2"/>
-                <a:stretch>
-                  <a:fillRect l="-963" t="-2528"/>
-                </a:stretch>
-              </a:blipFill>
-            </p:spPr>
-            <p:txBody>
-              <a:bodyPr/>
-              <a:lstStyle/>
-              <a:p>
-                <a:r>
-                  <a:rPr lang="en-US">
-                    <a:noFill/>
-                  </a:rPr>
-                  <a:t> </a:t>
-                </a:r>
-              </a:p>
-            </p:txBody>
-          </p:sp>
-        </mc:Fallback>
-      </mc:AlternateContent>
-    </p:spTree>
-  </p:cSld>
-  <p:clrMapOvr>
-    <a:masterClrMapping/>
-  </p:clrMapOvr>
-</p:sld>
-</file>
-
-<file path=ppt/slides/slide37.xml><?xml version="1.0" encoding="utf-8"?>
-<p:sld xmlns:a="http://schemas.openxmlformats.org/drawingml/2006/main" xmlns:r="http://schemas.openxmlformats.org/officeDocument/2006/relationships" xmlns:p="http://schemas.openxmlformats.org/presentationml/2006/main">
-  <p:cSld>
-    <p:spTree>
-      <p:nvGrpSpPr>
-        <p:cNvPr id="1" name=""/>
-        <p:cNvGrpSpPr/>
-        <p:nvPr/>
-      </p:nvGrpSpPr>
-      <p:grpSpPr>
-        <a:xfrm>
-          <a:off x="0" y="0"/>
-          <a:ext cx="0" cy="0"/>
-          <a:chOff x="0" y="0"/>
-          <a:chExt cx="0" cy="0"/>
-        </a:xfrm>
-      </p:grpSpPr>
-      <p:sp>
-        <p:nvSpPr>
-          <p:cNvPr id="2" name="Title 1"/>
-          <p:cNvSpPr>
-            <a:spLocks noGrp="1"/>
-          </p:cNvSpPr>
-          <p:nvPr>
-            <p:ph type="title"/>
-          </p:nvPr>
-        </p:nvSpPr>
-        <p:spPr/>
-        <p:txBody>
-          <a:bodyPr/>
-          <a:lstStyle/>
-          <a:p>
-            <a:pPr marL="0" lvl="0" indent="0">
-              <a:buNone/>
-            </a:pPr>
-            <a:r>
-              <a:t>Evaluating Regression Models</a:t>
-            </a:r>
-          </a:p>
-        </p:txBody>
-      </p:sp>
-      <mc:AlternateContent xmlns:mc="http://schemas.openxmlformats.org/markup-compatibility/2006" xmlns:a14="http://schemas.microsoft.com/office/drawing/2010/main">
-        <mc:Choice Requires="a14">
-          <p:sp>
-            <p:nvSpPr>
-              <p:cNvPr id="3" name="Content Placeholder 2"/>
-              <p:cNvSpPr>
-                <a:spLocks noGrp="1"/>
-              </p:cNvSpPr>
-              <p:nvPr>
-                <p:ph idx="1"/>
-              </p:nvPr>
-            </p:nvSpPr>
-            <p:spPr>
-              <a:xfrm>
-                <a:off x="457200" y="1117600"/>
-                <a:ext cx="8229600" cy="3856736"/>
-              </a:xfrm>
-            </p:spPr>
-            <p:txBody>
-              <a:bodyPr>
-                <a:normAutofit fontScale="92500"/>
-              </a:bodyPr>
-              <a:lstStyle/>
-              <a:p>
-                <a:pPr marL="0" lvl="0" indent="0">
-                  <a:buNone/>
-                </a:pPr>
-                <a:r>
-                  <a:rPr lang="en-US" dirty="0"/>
-                  <a:t>As the number of model parameters increases the model will fit the data better</a:t>
-                </a:r>
-              </a:p>
-              <a:p>
-                <a:pPr lvl="0"/>
-                <a:r>
-                  <a:rPr lang="en-US" dirty="0"/>
-                  <a:t>But, the model will become over-fit as the number of parameters increases</a:t>
-                </a:r>
-              </a:p>
-              <a:p>
-                <a:pPr lvl="0"/>
-                <a:r>
-                  <a:rPr lang="en-US" dirty="0"/>
-                  <a:t>Must adjust model performance for degrees of freedom - </a:t>
-                </a:r>
-                <a:r>
-                  <a:rPr lang="en-US" b="1" dirty="0"/>
-                  <a:t>adjusted</a:t>
-                </a:r>
-                <a:r>
-                  <a:rPr lang="en-US" dirty="0"/>
-                  <a:t> </a:t>
-                </a:r>
-                <a14:m>
-                  <m:oMath xmlns:m="http://schemas.openxmlformats.org/officeDocument/2006/math">
-                    <m:sSup>
-                      <m:sSupPr>
-                        <m:ctrlPr>
-                          <a:rPr lang="ar-AE" i="1">
-                            <a:latin typeface="Cambria Math" panose="02040503050406030204" pitchFamily="18" charset="0"/>
-                          </a:rPr>
-                        </m:ctrlPr>
-                      </m:sSupPr>
-                      <m:e>
-                        <m:r>
-                          <a:rPr lang="ar-AE">
-                            <a:latin typeface="Cambria Math" panose="02040503050406030204" pitchFamily="18" charset="0"/>
-                          </a:rPr>
-                          <m:t>𝑅</m:t>
-                        </m:r>
-                      </m:e>
-                      <m:sup>
-                        <m:r>
-                          <a:rPr lang="ar-AE">
-                            <a:latin typeface="Cambria Math" panose="02040503050406030204" pitchFamily="18" charset="0"/>
-                          </a:rPr>
-                          <m:t>2</m:t>
-                        </m:r>
-                      </m:sup>
-                    </m:sSup>
-                  </m:oMath>
-                </a14:m>
-                <a:endParaRPr lang="ar-AE" dirty="0"/>
-              </a:p>
-              <a:p>
-                <a:pPr marL="0" lvl="0" indent="0">
-                  <a:buNone/>
-                </a:pPr>
-                <a14:m>
-                  <m:oMathPara xmlns:m="http://schemas.openxmlformats.org/officeDocument/2006/math">
-                    <m:oMathParaPr>
-                      <m:jc m:val="centerGroup"/>
-                    </m:oMathParaPr>
-                    <m:oMath xmlns:m="http://schemas.openxmlformats.org/officeDocument/2006/math">
-                      <m:sSubSup>
-                        <m:sSubSupPr>
-                          <m:ctrlPr>
-                            <a:rPr lang="ar-AE" i="1" smtClean="0">
-                              <a:latin typeface="Cambria Math" panose="02040503050406030204" pitchFamily="18" charset="0"/>
-                            </a:rPr>
-                          </m:ctrlPr>
-                        </m:sSubSupPr>
-                        <m:e>
-                          <m:r>
-                            <a:rPr lang="ar-AE" b="0" i="1" smtClean="0">
-                              <a:latin typeface="Cambria Math" panose="02040503050406030204" pitchFamily="18" charset="0"/>
-                            </a:rPr>
-                            <m:t>𝑅</m:t>
-                          </m:r>
-                        </m:e>
-                        <m:sub>
-                          <m:r>
-                            <a:rPr lang="en-US" b="0" i="1" smtClean="0">
-                              <a:latin typeface="Cambria Math" panose="02040503050406030204" pitchFamily="18" charset="0"/>
-                            </a:rPr>
-                            <m:t>𝑎𝑑𝑗</m:t>
-                          </m:r>
-                        </m:sub>
-                        <m:sup>
-                          <m:r>
-                            <a:rPr lang="en-US" b="0" i="1" smtClean="0">
-                              <a:latin typeface="Cambria Math" panose="02040503050406030204" pitchFamily="18" charset="0"/>
-                            </a:rPr>
-                            <m:t>2</m:t>
-                          </m:r>
-                        </m:sup>
-                      </m:sSubSup>
-                      <m:r>
-                        <a:rPr lang="en-US" b="0" i="1" smtClean="0">
-                          <a:latin typeface="Cambria Math" panose="02040503050406030204" pitchFamily="18" charset="0"/>
-                        </a:rPr>
-                        <m:t>=</m:t>
-                      </m:r>
-                      <m:r>
-                        <a:rPr lang="en-US" b="0" i="1" smtClean="0">
-                          <a:latin typeface="Cambria Math" panose="02040503050406030204" pitchFamily="18" charset="0"/>
-                        </a:rPr>
-                        <m:t>1</m:t>
-                      </m:r>
-                      <m:r>
-                        <a:rPr lang="en-US" b="0" i="1" smtClean="0">
-                          <a:latin typeface="Cambria Math" panose="02040503050406030204" pitchFamily="18" charset="0"/>
-                        </a:rPr>
-                        <m:t>−</m:t>
-                      </m:r>
-                      <m:f>
-                        <m:fPr>
-                          <m:ctrlPr>
-                            <a:rPr lang="en-US" b="0" i="1" smtClean="0">
-                              <a:latin typeface="Cambria Math" panose="02040503050406030204" pitchFamily="18" charset="0"/>
-                            </a:rPr>
-                          </m:ctrlPr>
-                        </m:fPr>
-                        <m:num>
-                          <m:f>
-                            <m:fPr>
-                              <m:ctrlPr>
-                                <a:rPr lang="en-US" b="0" i="1" smtClean="0">
-                                  <a:latin typeface="Cambria Math" panose="02040503050406030204" pitchFamily="18" charset="0"/>
-                                </a:rPr>
-                              </m:ctrlPr>
-                            </m:fPr>
-                            <m:num>
-                              <m:r>
-                                <a:rPr lang="en-US" b="0" i="1" smtClean="0">
-                                  <a:latin typeface="Cambria Math" panose="02040503050406030204" pitchFamily="18" charset="0"/>
-                                </a:rPr>
-                                <m:t>𝑆𝑆𝑅</m:t>
-                              </m:r>
-                            </m:num>
-                            <m:den>
-                              <m:sSub>
-                                <m:sSubPr>
-                                  <m:ctrlPr>
-                                    <a:rPr lang="en-US" b="0" i="1" smtClean="0">
-                                      <a:latin typeface="Cambria Math" panose="02040503050406030204" pitchFamily="18" charset="0"/>
-                                    </a:rPr>
-                                  </m:ctrlPr>
-                                </m:sSubPr>
-                                <m:e>
-                                  <m:r>
-                                    <a:rPr lang="en-US" b="0" i="1" smtClean="0">
-                                      <a:latin typeface="Cambria Math" panose="02040503050406030204" pitchFamily="18" charset="0"/>
-                                    </a:rPr>
-                                    <m:t>𝑑𝑓</m:t>
-                                  </m:r>
-                                </m:e>
-                                <m:sub>
-                                  <m:r>
-                                    <a:rPr lang="en-US" b="0" i="1" smtClean="0">
-                                      <a:latin typeface="Cambria Math" panose="02040503050406030204" pitchFamily="18" charset="0"/>
-                                    </a:rPr>
-                                    <m:t>𝑆𝑆𝑅</m:t>
-                                  </m:r>
-                                </m:sub>
-                              </m:sSub>
-                            </m:den>
-                          </m:f>
-                        </m:num>
-                        <m:den>
-                          <m:f>
-                            <m:fPr>
-                              <m:ctrlPr>
-                                <a:rPr lang="en-US" b="0" i="1" smtClean="0">
-                                  <a:latin typeface="Cambria Math" panose="02040503050406030204" pitchFamily="18" charset="0"/>
-                                </a:rPr>
-                              </m:ctrlPr>
-                            </m:fPr>
-                            <m:num>
-                              <m:r>
-                                <a:rPr lang="en-US" b="0" i="1" smtClean="0">
-                                  <a:latin typeface="Cambria Math" panose="02040503050406030204" pitchFamily="18" charset="0"/>
-                                </a:rPr>
-                                <m:t>𝑆𝑆𝑇</m:t>
-                              </m:r>
-                            </m:num>
-                            <m:den>
-                              <m:sSub>
-                                <m:sSubPr>
-                                  <m:ctrlPr>
-                                    <a:rPr lang="en-US" b="0" i="1" smtClean="0">
-                                      <a:latin typeface="Cambria Math" panose="02040503050406030204" pitchFamily="18" charset="0"/>
-                                    </a:rPr>
-                                  </m:ctrlPr>
-                                </m:sSubPr>
-                                <m:e>
-                                  <m:r>
-                                    <a:rPr lang="en-US" b="0" i="1" smtClean="0">
-                                      <a:latin typeface="Cambria Math" panose="02040503050406030204" pitchFamily="18" charset="0"/>
-                                    </a:rPr>
-                                    <m:t>𝑑𝑓</m:t>
-                                  </m:r>
-                                </m:e>
-                                <m:sub>
-                                  <m:r>
-                                    <a:rPr lang="en-US" b="0" i="1" smtClean="0">
-                                      <a:latin typeface="Cambria Math" panose="02040503050406030204" pitchFamily="18" charset="0"/>
-                                    </a:rPr>
-                                    <m:t>𝑆𝑆𝑇</m:t>
-                                  </m:r>
-                                </m:sub>
-                              </m:sSub>
-                            </m:den>
-                          </m:f>
-                        </m:den>
-                      </m:f>
-                      <m:r>
-                        <a:rPr lang="en-US" b="0" i="1" smtClean="0">
-                          <a:latin typeface="Cambria Math" panose="02040503050406030204" pitchFamily="18" charset="0"/>
-                        </a:rPr>
-                        <m:t>=</m:t>
-                      </m:r>
-                      <m:r>
-                        <a:rPr lang="en-US" b="0" i="1" smtClean="0">
-                          <a:latin typeface="Cambria Math" panose="02040503050406030204" pitchFamily="18" charset="0"/>
-                        </a:rPr>
-                        <m:t>1</m:t>
-                      </m:r>
-                      <m:r>
-                        <a:rPr lang="en-US" b="0" i="1" smtClean="0">
-                          <a:latin typeface="Cambria Math" panose="02040503050406030204" pitchFamily="18" charset="0"/>
-                        </a:rPr>
-                        <m:t>−</m:t>
-                      </m:r>
-                      <m:f>
-                        <m:fPr>
-                          <m:ctrlPr>
-                            <a:rPr lang="en-US" b="0" i="1" smtClean="0">
-                              <a:latin typeface="Cambria Math" panose="02040503050406030204" pitchFamily="18" charset="0"/>
-                            </a:rPr>
-                          </m:ctrlPr>
-                        </m:fPr>
-                        <m:num>
-                          <m:sSub>
-                            <m:sSubPr>
-                              <m:ctrlPr>
-                                <a:rPr lang="en-US" b="0" i="1" smtClean="0">
-                                  <a:latin typeface="Cambria Math" panose="02040503050406030204" pitchFamily="18" charset="0"/>
-                                </a:rPr>
-                              </m:ctrlPr>
-                            </m:sSubPr>
-                            <m:e>
-                              <m:r>
-                                <a:rPr lang="en-US" b="0" i="1" smtClean="0">
-                                  <a:latin typeface="Cambria Math" panose="02040503050406030204" pitchFamily="18" charset="0"/>
-                                </a:rPr>
-                                <m:t>𝑣𝑎𝑟</m:t>
-                              </m:r>
-                            </m:e>
-                            <m:sub>
-                              <m:r>
-                                <a:rPr lang="en-US" b="0" i="1" smtClean="0">
-                                  <a:latin typeface="Cambria Math" panose="02040503050406030204" pitchFamily="18" charset="0"/>
-                                </a:rPr>
-                                <m:t>𝑟𝑒𝑠𝑖𝑑𝑢𝑎𝑙</m:t>
-                              </m:r>
-                            </m:sub>
-                          </m:sSub>
-                        </m:num>
-                        <m:den>
-                          <m:sSub>
-                            <m:sSubPr>
-                              <m:ctrlPr>
-                                <a:rPr lang="en-US" b="0" i="1" smtClean="0">
-                                  <a:latin typeface="Cambria Math" panose="02040503050406030204" pitchFamily="18" charset="0"/>
-                                </a:rPr>
-                              </m:ctrlPr>
-                            </m:sSubPr>
-                            <m:e>
-                              <m:r>
-                                <a:rPr lang="en-US" b="0" i="1" smtClean="0">
-                                  <a:latin typeface="Cambria Math" panose="02040503050406030204" pitchFamily="18" charset="0"/>
-                                </a:rPr>
-                                <m:t>𝑣𝑎𝑟</m:t>
-                              </m:r>
-                            </m:e>
-                            <m:sub>
-                              <m:r>
-                                <a:rPr lang="en-US" b="0" i="1" smtClean="0">
-                                  <a:latin typeface="Cambria Math" panose="02040503050406030204" pitchFamily="18" charset="0"/>
-                                </a:rPr>
-                                <m:t>𝑡𝑜𝑡𝑎𝑙</m:t>
-                              </m:r>
-                            </m:sub>
-                          </m:sSub>
-                        </m:den>
-                      </m:f>
-                    </m:oMath>
-                  </m:oMathPara>
-                </a14:m>
-                <a:endParaRPr lang="en-US" dirty="0"/>
-              </a:p>
-              <a:p>
-                <a:pPr marL="685800" lvl="2" indent="0">
-                  <a:buNone/>
-                </a:pPr>
-                <a:r>
-                  <a:rPr lang="en-US" dirty="0"/>
-                  <a:t>Where, </a:t>
-                </a:r>
-                <a14:m>
-                  <m:oMath xmlns:m="http://schemas.openxmlformats.org/officeDocument/2006/math">
-                    <m:sSub>
-                      <m:sSubPr>
-                        <m:ctrlPr>
-                          <a:rPr lang="en-US" i="1" smtClean="0">
-                            <a:latin typeface="Cambria Math" panose="02040503050406030204" pitchFamily="18" charset="0"/>
-                          </a:rPr>
-                        </m:ctrlPr>
-                      </m:sSubPr>
-                      <m:e>
-                        <m:r>
-                          <a:rPr lang="en-US" b="0" i="1" smtClean="0">
-                            <a:latin typeface="Cambria Math" panose="02040503050406030204" pitchFamily="18" charset="0"/>
-                          </a:rPr>
-                          <m:t>𝑑𝑓</m:t>
-                        </m:r>
-                      </m:e>
-                      <m:sub>
-                        <m:r>
-                          <a:rPr lang="en-US" b="0" i="1" smtClean="0">
-                            <a:latin typeface="Cambria Math" panose="02040503050406030204" pitchFamily="18" charset="0"/>
-                          </a:rPr>
-                          <m:t>𝑆𝑆𝑅</m:t>
-                        </m:r>
-                      </m:sub>
-                    </m:sSub>
-                  </m:oMath>
-                </a14:m>
-                <a:r>
-                  <a:rPr lang="en-US" dirty="0"/>
-                  <a:t> is degrees of freedom of SSR, </a:t>
-                </a:r>
-                <a14:m>
-                  <m:oMath xmlns:m="http://schemas.openxmlformats.org/officeDocument/2006/math">
-                    <m:sSub>
-                      <m:sSubPr>
-                        <m:ctrlPr>
-                          <a:rPr lang="en-US" i="1">
-                            <a:latin typeface="Cambria Math" panose="02040503050406030204" pitchFamily="18" charset="0"/>
-                          </a:rPr>
-                        </m:ctrlPr>
-                      </m:sSubPr>
-                      <m:e>
-                        <m:r>
-                          <a:rPr lang="en-US" i="1">
-                            <a:latin typeface="Cambria Math" panose="02040503050406030204" pitchFamily="18" charset="0"/>
-                          </a:rPr>
-                          <m:t>𝑑𝑓</m:t>
-                        </m:r>
-                      </m:e>
-                      <m:sub>
-                        <m:r>
-                          <a:rPr lang="en-US" i="1">
-                            <a:latin typeface="Cambria Math" panose="02040503050406030204" pitchFamily="18" charset="0"/>
-                          </a:rPr>
-                          <m:t>𝑆𝑆</m:t>
-                        </m:r>
-                        <m:r>
-                          <a:rPr lang="en-US" b="0" i="1" smtClean="0">
-                            <a:latin typeface="Cambria Math" panose="02040503050406030204" pitchFamily="18" charset="0"/>
-                          </a:rPr>
-                          <m:t>𝑇</m:t>
-                        </m:r>
-                      </m:sub>
-                    </m:sSub>
-                  </m:oMath>
-                </a14:m>
-                <a:r>
-                  <a:rPr lang="en-US" dirty="0"/>
-                  <a:t> is degrees of freedom of SST</a:t>
-                </a:r>
-                <a:endParaRPr lang="ar-AE" dirty="0"/>
-              </a:p>
-              <a:p>
-                <a:pPr marL="0" lvl="0" indent="0">
-                  <a:buNone/>
-                </a:pPr>
-                <a:endParaRPr dirty="0"/>
-              </a:p>
-            </p:txBody>
-          </p:sp>
-        </mc:Choice>
-        <mc:Fallback xmlns="">
+        <mc:Fallback>
           <p:sp>
             <p:nvSpPr>
               <p:cNvPr id="3" name="Content Placeholder 2"/>
@@ -20213,11 +19922,6 @@
         </mc:Fallback>
       </mc:AlternateContent>
     </p:spTree>
-    <p:extLst>
-      <p:ext uri="{BB962C8B-B14F-4D97-AF65-F5344CB8AC3E}">
-        <p14:creationId xmlns:p14="http://schemas.microsoft.com/office/powerpoint/2010/main" val="2508529319"/>
-      </p:ext>
-    </p:extLst>
   </p:cSld>
   <p:clrMapOvr>
     <a:masterClrMapping/>
@@ -21583,7 +21287,15 @@
             </a:r>
             <a:r>
               <a:rPr dirty="0"/>
-              <a:t>is of great importance for models used for critical decisions</a:t>
+              <a:t>is importa</a:t>
+            </a:r>
+            <a:r>
+              <a:rPr lang="en-US" dirty="0"/>
+              <a:t>nt</a:t>
+            </a:r>
+            <a:r>
+              <a:rPr dirty="0"/>
+              <a:t> for models used for critical decisions</a:t>
             </a:r>
           </a:p>
           <a:p>
@@ -21611,7 +21323,15 @@
             <a:pPr lvl="1"/>
             <a:r>
               <a:rPr dirty="0"/>
-              <a:t>Social justice for applications with human impact</a:t>
+              <a:t>Social justice </a:t>
+            </a:r>
+            <a:r>
+              <a:rPr lang="en-US" dirty="0"/>
+              <a:t>and other</a:t>
+            </a:r>
+            <a:r>
+              <a:rPr dirty="0"/>
+              <a:t> applications with human impact</a:t>
             </a:r>
           </a:p>
           <a:p>
@@ -25092,8 +24812,8 @@
           </a:p>
         </p:txBody>
       </p:sp>
-      <mc:AlternateContent xmlns:mc="http://schemas.openxmlformats.org/markup-compatibility/2006">
-        <mc:Choice xmlns:a14="http://schemas.microsoft.com/office/drawing/2010/main" Requires="a14">
+      <mc:AlternateContent xmlns:mc="http://schemas.openxmlformats.org/markup-compatibility/2006" xmlns:a14="http://schemas.microsoft.com/office/drawing/2010/main">
+        <mc:Choice Requires="a14">
           <p:sp>
             <p:nvSpPr>
               <p:cNvPr id="4" name="Text Placeholder 3"/>
@@ -25395,7 +25115,7 @@
             </p:txBody>
           </p:sp>
         </mc:Choice>
-        <mc:Fallback>
+        <mc:Fallback xmlns="">
           <p:sp>
             <p:nvSpPr>
               <p:cNvPr id="4" name="Text Placeholder 3"/>
@@ -25685,7 +25405,7 @@
         </p:spPr>
         <p:txBody>
           <a:bodyPr>
-            <a:normAutofit fontScale="92500" lnSpcReduction="20000"/>
+            <a:normAutofit fontScale="85000" lnSpcReduction="10000"/>
           </a:bodyPr>
           <a:lstStyle/>
           <a:p>
@@ -25775,6 +25495,13 @@
               <a:t>Limits inference and exploration opportunities</a:t>
             </a:r>
             <a:endParaRPr lang="en-US" dirty="0"/>
+          </a:p>
+          <a:p>
+            <a:pPr lvl="1"/>
+            <a:r>
+              <a:rPr lang="en-US" dirty="0"/>
+              <a:t>Can bootstrap! </a:t>
+            </a:r>
           </a:p>
           <a:p>
             <a:r>
@@ -28363,8 +28090,8 @@
           </a:p>
         </p:txBody>
       </p:sp>
-      <mc:AlternateContent xmlns:mc="http://schemas.openxmlformats.org/markup-compatibility/2006">
-        <mc:Choice xmlns:a14="http://schemas.microsoft.com/office/drawing/2010/main" Requires="a14">
+      <mc:AlternateContent xmlns:mc="http://schemas.openxmlformats.org/markup-compatibility/2006" xmlns:a14="http://schemas.microsoft.com/office/drawing/2010/main">
+        <mc:Choice Requires="a14">
           <p:sp>
             <p:nvSpPr>
               <p:cNvPr id="3" name="Content Placeholder 2"/>
@@ -28493,7 +28220,7 @@
             </p:txBody>
           </p:sp>
         </mc:Choice>
-        <mc:Fallback>
+        <mc:Fallback xmlns="">
           <p:sp>
             <p:nvSpPr>
               <p:cNvPr id="3" name="Content Placeholder 2"/>
@@ -28594,7 +28321,7 @@
         </p:spPr>
         <p:txBody>
           <a:bodyPr>
-            <a:normAutofit fontScale="92500" lnSpcReduction="20000"/>
+            <a:normAutofit fontScale="85000" lnSpcReduction="20000"/>
           </a:bodyPr>
           <a:lstStyle/>
           <a:p>
@@ -28619,7 +28346,15 @@
             </a:r>
             <a:r>
               <a:rPr dirty="0"/>
-              <a:t> that attempt to predict the value of numeric random variable</a:t>
+              <a:t> that attempt to predict the value of</a:t>
+            </a:r>
+            <a:r>
+              <a:rPr lang="en-US" dirty="0"/>
+              <a:t> a</a:t>
+            </a:r>
+            <a:r>
+              <a:rPr dirty="0"/>
+              <a:t> numeric random variable</a:t>
             </a:r>
           </a:p>
           <a:p>
@@ -28681,7 +28416,7 @@
             </a:r>
             <a:r>
               <a:rPr lang="en-US" dirty="0"/>
-              <a:t> and other non-Normal response model</a:t>
+              <a:t> and other non-Normal response models</a:t>
             </a:r>
             <a:endParaRPr dirty="0"/>
           </a:p>
@@ -28699,6 +28434,22 @@
               <a:rPr dirty="0"/>
               <a:t> time series models</a:t>
             </a:r>
+            <a:endParaRPr lang="en-US" dirty="0"/>
+          </a:p>
+          <a:p>
+            <a:pPr lvl="1"/>
+            <a:r>
+              <a:rPr lang="en-US" dirty="0"/>
+              <a:t>Survival models</a:t>
+            </a:r>
+          </a:p>
+          <a:p>
+            <a:pPr lvl="1"/>
+            <a:r>
+              <a:rPr lang="en-US" dirty="0"/>
+              <a:t>Etc.</a:t>
+            </a:r>
+            <a:endParaRPr dirty="0"/>
           </a:p>
         </p:txBody>
       </p:sp>
@@ -28799,6 +28550,11 @@
           </p:cNvGraphicFramePr>
           <p:nvPr>
             <p:ph idx="1"/>
+            <p:extLst>
+              <p:ext uri="{D42A27DB-BD31-4B8C-83A1-F6EECF244321}">
+                <p14:modId xmlns:p14="http://schemas.microsoft.com/office/powerpoint/2010/main" val="59230947"/>
+              </p:ext>
+            </p:extLst>
           </p:nvPr>
         </p:nvGraphicFramePr>
         <p:xfrm>
@@ -28900,8 +28656,24 @@
                         <a:buNone/>
                       </a:pPr>
                       <a:r>
-                        <a:rPr sz="2000"/>
-                        <a:t>Continuous numeric vs categorical response</a:t>
+                        <a:rPr lang="en-US" sz="2000" dirty="0" err="1"/>
+                        <a:t>Normsal</a:t>
+                      </a:r>
+                      <a:r>
+                        <a:rPr lang="en-US" sz="2000" dirty="0"/>
+                        <a:t> </a:t>
+                      </a:r>
+                      <a:r>
+                        <a:rPr sz="2000" dirty="0"/>
+                        <a:t>vs </a:t>
+                      </a:r>
+                      <a:r>
+                        <a:rPr lang="en-US" sz="2000" dirty="0"/>
+                        <a:t>non-Normal</a:t>
+                      </a:r>
+                      <a:r>
+                        <a:rPr sz="2000" dirty="0"/>
+                        <a:t> response</a:t>
                       </a:r>
                     </a:p>
                   </a:txBody>
@@ -29649,8 +29421,8 @@
           </a:p>
         </p:txBody>
       </p:sp>
-      <mc:AlternateContent xmlns:mc="http://schemas.openxmlformats.org/markup-compatibility/2006">
-        <mc:Choice xmlns:a14="http://schemas.microsoft.com/office/drawing/2010/main" Requires="a14">
+      <mc:AlternateContent xmlns:mc="http://schemas.openxmlformats.org/markup-compatibility/2006" xmlns:a14="http://schemas.microsoft.com/office/drawing/2010/main">
+        <mc:Choice Requires="a14">
           <p:sp>
             <p:nvSpPr>
               <p:cNvPr id="3" name="Content Placeholder 2"/>
@@ -29942,7 +29714,7 @@
             </p:txBody>
           </p:sp>
         </mc:Choice>
-        <mc:Fallback>
+        <mc:Fallback xmlns="">
           <p:sp>
             <p:nvSpPr>
               <p:cNvPr id="3" name="Content Placeholder 2"/>

</xml_diff>

<commit_message>
Small updates and corrections to slides
</commit_message>
<xml_diff>
--- a/LectureSlides/08_IntroductionToLinearModels.pptx
+++ b/LectureSlides/08_IntroductionToLinearModels.pptx
@@ -3811,8 +3811,8 @@
           </a:p>
         </p:txBody>
       </p:sp>
-      <mc:AlternateContent xmlns:mc="http://schemas.openxmlformats.org/markup-compatibility/2006" xmlns:a14="http://schemas.microsoft.com/office/drawing/2010/main">
-        <mc:Choice Requires="a14">
+      <mc:AlternateContent xmlns:mc="http://schemas.openxmlformats.org/markup-compatibility/2006">
+        <mc:Choice xmlns:a14="http://schemas.microsoft.com/office/drawing/2010/main" Requires="a14">
           <p:sp>
             <p:nvSpPr>
               <p:cNvPr id="3" name="Content Placeholder 2"/>
@@ -3825,13 +3825,13 @@
             </p:nvSpPr>
             <p:spPr>
               <a:xfrm>
-                <a:off x="457199" y="1200150"/>
-                <a:ext cx="8613281" cy="3766057"/>
+                <a:off x="457199" y="1200151"/>
+                <a:ext cx="8613281" cy="3737370"/>
               </a:xfrm>
             </p:spPr>
             <p:txBody>
               <a:bodyPr>
-                <a:normAutofit lnSpcReduction="10000"/>
+                <a:normAutofit fontScale="85000" lnSpcReduction="20000"/>
               </a:bodyPr>
               <a:lstStyle/>
               <a:p>
@@ -4446,10 +4446,13 @@
                 <a:endParaRPr lang="ar-AE" dirty="0"/>
               </a:p>
               <a:p>
-                <a:pPr lvl="1"/>
+                <a:r>
+                  <a:rPr lang="en-US" dirty="0"/>
+                  <a:t>Linear models have </a:t>
+                </a:r>
                 <a:r>
                   <a:rPr lang="en-US" b="1" dirty="0"/>
-                  <a:t>Residuals are only in </a:t>
+                  <a:t>errors are only in </a:t>
                 </a:r>
                 <a14:m>
                   <m:oMath xmlns:m="http://schemas.openxmlformats.org/officeDocument/2006/math">
@@ -4463,28 +4466,85 @@
                 </a14:m>
                 <a:r>
                   <a:rPr lang="en-US" b="1" dirty="0"/>
-                  <a:t> </a:t>
-                </a:r>
-                <a:r>
-                  <a:rPr lang="en-US" dirty="0"/>
-                  <a:t>not </a:t>
+                  <a:t> not </a:t>
                 </a:r>
                 <a14:m>
                   <m:oMath xmlns:m="http://schemas.openxmlformats.org/officeDocument/2006/math">
                     <m:r>
-                      <a:rPr lang="en-US" b="0" i="1" smtClean="0">
+                      <a:rPr lang="en-US" b="1" i="1" smtClean="0">
                         <a:latin typeface="Cambria Math" panose="02040503050406030204" pitchFamily="18" charset="0"/>
                       </a:rPr>
-                      <m:t>𝑥</m:t>
+                      <m:t>𝒙</m:t>
                     </m:r>
                   </m:oMath>
                 </a14:m>
+                <a:endParaRPr lang="en-US" b="1" dirty="0"/>
+              </a:p>
+              <a:p>
+                <a:pPr lvl="1"/>
+                <a:r>
+                  <a:rPr lang="en-US" dirty="0"/>
+                  <a:t>Must use </a:t>
+                </a:r>
+                <a:r>
+                  <a:rPr lang="en-US" dirty="0">
+                    <a:hlinkClick r:id="rId2"/>
+                  </a:rPr>
+                  <a:t>total least squares method </a:t>
+                </a:r>
+                <a:r>
+                  <a:rPr lang="en-US" dirty="0"/>
+                  <a:t>if errors in </a:t>
+                </a:r>
+                <a:r>
+                  <a:rPr lang="en-US" b="1" dirty="0"/>
+                  <a:t>both </a:t>
+                </a:r>
+                <a14:m>
+                  <m:oMath xmlns:m="http://schemas.openxmlformats.org/officeDocument/2006/math">
+                    <m:r>
+                      <a:rPr lang="en-US" b="1" i="1" smtClean="0">
+                        <a:latin typeface="Cambria Math" panose="02040503050406030204" pitchFamily="18" charset="0"/>
+                      </a:rPr>
+                      <m:t>𝒚</m:t>
+                    </m:r>
+                  </m:oMath>
+                </a14:m>
+                <a:r>
+                  <a:rPr lang="en-US" b="1" dirty="0"/>
+                  <a:t> and </a:t>
+                </a:r>
+                <a14:m>
+                  <m:oMath xmlns:m="http://schemas.openxmlformats.org/officeDocument/2006/math">
+                    <m:r>
+                      <a:rPr lang="en-US" b="1" i="1" smtClean="0">
+                        <a:latin typeface="Cambria Math" panose="02040503050406030204" pitchFamily="18" charset="0"/>
+                      </a:rPr>
+                      <m:t>𝒙</m:t>
+                    </m:r>
+                  </m:oMath>
+                </a14:m>
+                <a:endParaRPr lang="en-US" b="1" dirty="0"/>
+              </a:p>
+              <a:p>
+                <a:pPr lvl="1"/>
+                <a:r>
+                  <a:rPr lang="en-US" dirty="0"/>
+                  <a:t>Example: total least squares method commonly used for data with instrumentation or measurement error</a:t>
+                </a:r>
+              </a:p>
+              <a:p>
+                <a:pPr lvl="1"/>
+                <a:endParaRPr lang="en-US" dirty="0"/>
+              </a:p>
+              <a:p>
+                <a:pPr lvl="1"/>
                 <a:endParaRPr dirty="0"/>
               </a:p>
             </p:txBody>
           </p:sp>
         </mc:Choice>
-        <mc:Fallback xmlns="">
+        <mc:Fallback>
           <p:sp>
             <p:nvSpPr>
               <p:cNvPr id="3" name="Content Placeholder 2"/>
@@ -4497,13 +4557,13 @@
             </p:nvSpPr>
             <p:spPr>
               <a:xfrm>
-                <a:off x="457199" y="1200150"/>
-                <a:ext cx="8613281" cy="3766057"/>
+                <a:off x="457199" y="1200151"/>
+                <a:ext cx="8613281" cy="3737370"/>
               </a:xfrm>
               <a:blipFill>
-                <a:blip r:embed="rId2"/>
+                <a:blip r:embed="rId3"/>
                 <a:stretch>
-                  <a:fillRect l="-1062" t="-2265"/>
+                  <a:fillRect l="-708" t="-2447" r="-778" b="-2447"/>
                 </a:stretch>
               </a:blipFill>
             </p:spPr>
@@ -5158,7 +5218,13 @@
                       <a:rPr lang="en-US">
                         <a:latin typeface="Cambria Math" panose="02040503050406030204" pitchFamily="18" charset="0"/>
                       </a:rPr>
-                      <m:t>=2</m:t>
+                      <m:t>=</m:t>
+                    </m:r>
+                    <m:r>
+                      <a:rPr lang="en-US">
+                        <a:latin typeface="Cambria Math" panose="02040503050406030204" pitchFamily="18" charset="0"/>
+                      </a:rPr>
+                      <m:t>2</m:t>
                     </m:r>
                   </m:oMath>
                 </a14:m>
@@ -9911,8 +9977,8 @@
           </a:p>
         </p:txBody>
       </p:sp>
-      <mc:AlternateContent xmlns:mc="http://schemas.openxmlformats.org/markup-compatibility/2006" xmlns:a14="http://schemas.microsoft.com/office/drawing/2010/main">
-        <mc:Choice Requires="a14">
+      <mc:AlternateContent xmlns:mc="http://schemas.openxmlformats.org/markup-compatibility/2006">
+        <mc:Choice xmlns:a14="http://schemas.microsoft.com/office/drawing/2010/main" Requires="a14">
           <p:sp>
             <p:nvSpPr>
               <p:cNvPr id="3" name="Content Placeholder 2"/>
@@ -10085,7 +10151,7 @@
                 <a:pPr lvl="0"/>
                 <a:r>
                   <a:rPr lang="en-US" dirty="0"/>
-                  <a:t>This cannot work</a:t>
+                  <a:t>This cannot work!</a:t>
                 </a:r>
                 <a:endParaRPr b="1" dirty="0"/>
               </a:p>
@@ -10203,7 +10269,7 @@
             </p:txBody>
           </p:sp>
         </mc:Choice>
-        <mc:Fallback xmlns="">
+        <mc:Fallback>
           <p:sp>
             <p:nvSpPr>
               <p:cNvPr id="3" name="Content Placeholder 2"/>
@@ -10486,8 +10552,8 @@
           </a:p>
         </p:txBody>
       </p:sp>
-      <mc:AlternateContent xmlns:mc="http://schemas.openxmlformats.org/markup-compatibility/2006" xmlns:a14="http://schemas.microsoft.com/office/drawing/2010/main">
-        <mc:Choice Requires="a14">
+      <mc:AlternateContent xmlns:mc="http://schemas.openxmlformats.org/markup-compatibility/2006">
+        <mc:Choice xmlns:a14="http://schemas.microsoft.com/office/drawing/2010/main" Requires="a14">
           <p:sp>
             <p:nvSpPr>
               <p:cNvPr id="3" name="Content Placeholder 2"/>
@@ -10507,16 +10573,18 @@
                   <a:buNone/>
                 </a:pPr>
                 <a:r>
+                  <a:rPr lang="en-US" dirty="0"/>
                   <a:t>We can use the </a:t>
                 </a:r>
                 <a:r>
-                  <a:rPr b="1"/>
+                  <a:rPr lang="en-US" b="1" dirty="0"/>
                   <a:t>Normal equations</a:t>
                 </a:r>
               </a:p>
               <a:p>
                 <a:pPr lvl="0"/>
                 <a:r>
+                  <a:rPr lang="en-US" dirty="0"/>
                   <a:t>Start with the problem:</a:t>
                 </a:r>
               </a:p>
@@ -10531,19 +10599,7 @@
                     </m:oMathParaPr>
                     <m:oMath xmlns:m="http://schemas.openxmlformats.org/officeDocument/2006/math">
                       <m:r>
-                        <a:rPr>
-                          <a:latin typeface="Cambria Math" panose="02040503050406030204" pitchFamily="18" charset="0"/>
-                        </a:rPr>
-                        <m:t>𝑦</m:t>
-                      </m:r>
-                      <m:r>
-                        <a:rPr>
-                          <a:latin typeface="Cambria Math" panose="02040503050406030204" pitchFamily="18" charset="0"/>
-                        </a:rPr>
-                        <m:t>−</m:t>
-                      </m:r>
-                      <m:r>
-                        <a:rPr>
+                        <a:rPr lang="en-US">
                           <a:latin typeface="Cambria Math" panose="02040503050406030204" pitchFamily="18" charset="0"/>
                         </a:rPr>
                         <m:t>𝐴</m:t>
@@ -10552,14 +10608,14 @@
                         <m:accPr>
                           <m:chr m:val="⃗"/>
                           <m:ctrlPr>
-                            <a:rPr i="1">
+                            <a:rPr lang="ar-AE" i="1">
                               <a:latin typeface="Cambria Math" panose="02040503050406030204" pitchFamily="18" charset="0"/>
                             </a:rPr>
                           </m:ctrlPr>
                         </m:accPr>
                         <m:e>
                           <m:r>
-                            <a:rPr>
+                            <a:rPr lang="ar-AE">
                               <a:latin typeface="Cambria Math" panose="02040503050406030204" pitchFamily="18" charset="0"/>
                             </a:rPr>
                             <m:t>𝑏</m:t>
@@ -10567,23 +10623,38 @@
                         </m:e>
                       </m:acc>
                       <m:r>
-                        <a:rPr>
+                        <a:rPr lang="ar-AE">
                           <a:latin typeface="Cambria Math" panose="02040503050406030204" pitchFamily="18" charset="0"/>
                         </a:rPr>
                         <m:t>=</m:t>
+                      </m:r>
+                      <m:r>
+                        <m:rPr>
+                          <m:sty m:val="p"/>
+                        </m:rPr>
+                        <a:rPr lang="en-US" b="0" i="0" smtClean="0">
+                          <a:latin typeface="Cambria Math" panose="02040503050406030204" pitchFamily="18" charset="0"/>
+                        </a:rPr>
+                        <m:t>y</m:t>
+                      </m:r>
+                      <m:r>
+                        <a:rPr lang="en-US" b="0" i="0" smtClean="0">
+                          <a:latin typeface="Cambria Math" panose="02040503050406030204" pitchFamily="18" charset="0"/>
+                        </a:rPr>
+                        <m:t>+</m:t>
                       </m:r>
                       <m:acc>
                         <m:accPr>
                           <m:chr m:val="⃗"/>
                           <m:ctrlPr>
-                            <a:rPr i="1">
+                            <a:rPr lang="ar-AE" i="1">
                               <a:latin typeface="Cambria Math" panose="02040503050406030204" pitchFamily="18" charset="0"/>
                             </a:rPr>
                           </m:ctrlPr>
                         </m:accPr>
                         <m:e>
                           <m:r>
-                            <a:rPr>
+                            <a:rPr lang="ar-AE">
                               <a:latin typeface="Cambria Math" panose="02040503050406030204" pitchFamily="18" charset="0"/>
                             </a:rPr>
                             <m:t>𝜖</m:t>
@@ -10591,13 +10662,78 @@
                         </m:e>
                       </m:acc>
                       <m:r>
-                        <a:rPr>
+                        <a:rPr lang="en-US" b="0" i="1" smtClean="0">
                           <a:latin typeface="Cambria Math" panose="02040503050406030204" pitchFamily="18" charset="0"/>
                         </a:rPr>
-                        <m:t>→</m:t>
+                        <m:t>,  </m:t>
                       </m:r>
                       <m:r>
-                        <a:rPr>
+                        <a:rPr lang="en-US" b="0" i="1" smtClean="0">
+                          <a:latin typeface="Cambria Math" panose="02040503050406030204" pitchFamily="18" charset="0"/>
+                        </a:rPr>
+                        <m:t>𝑤</m:t>
+                      </m:r>
+                      <m:r>
+                        <a:rPr lang="en-US" b="0" i="1" smtClean="0">
+                          <a:latin typeface="Cambria Math" panose="02040503050406030204" pitchFamily="18" charset="0"/>
+                        </a:rPr>
+                        <m:t>h</m:t>
+                      </m:r>
+                      <m:r>
+                        <a:rPr lang="en-US" b="0" i="1" smtClean="0">
+                          <a:latin typeface="Cambria Math" panose="02040503050406030204" pitchFamily="18" charset="0"/>
+                        </a:rPr>
+                        <m:t>𝑒𝑟𝑒</m:t>
+                      </m:r>
+                      <m:r>
+                        <a:rPr lang="en-US" b="0" i="1" smtClean="0">
+                          <a:latin typeface="Cambria Math" panose="02040503050406030204" pitchFamily="18" charset="0"/>
+                        </a:rPr>
+                        <m:t>, </m:t>
+                      </m:r>
+                      <m:r>
+                        <a:rPr lang="en-US" b="0" i="1" smtClean="0">
+                          <a:latin typeface="Cambria Math" panose="02040503050406030204" pitchFamily="18" charset="0"/>
+                        </a:rPr>
+                        <m:t>𝐸</m:t>
+                      </m:r>
+                      <m:d>
+                        <m:dPr>
+                          <m:ctrlPr>
+                            <a:rPr lang="en-US" b="0" i="0" smtClean="0">
+                              <a:latin typeface="Cambria Math" panose="02040503050406030204" pitchFamily="18" charset="0"/>
+                            </a:rPr>
+                          </m:ctrlPr>
+                        </m:dPr>
+                        <m:e>
+                          <m:acc>
+                            <m:accPr>
+                              <m:chr m:val="⃗"/>
+                              <m:ctrlPr>
+                                <a:rPr lang="ar-AE" i="1">
+                                  <a:latin typeface="Cambria Math" panose="02040503050406030204" pitchFamily="18" charset="0"/>
+                                </a:rPr>
+                              </m:ctrlPr>
+                            </m:accPr>
+                            <m:e>
+                              <m:r>
+                                <a:rPr lang="ar-AE">
+                                  <a:latin typeface="Cambria Math" panose="02040503050406030204" pitchFamily="18" charset="0"/>
+                                </a:rPr>
+                                <m:t>𝜖</m:t>
+                              </m:r>
+                            </m:e>
+                          </m:acc>
+                        </m:e>
+                      </m:d>
+                      <m:r>
+                        <a:rPr lang="en-US" b="0" i="0" smtClean="0">
+                          <a:latin typeface="Cambria Math" panose="02040503050406030204" pitchFamily="18" charset="0"/>
+                        </a:rPr>
+                        <m:t>=</m:t>
+                      </m:r>
+                      <m:r>
+                        <a:rPr lang="ar-AE">
                           <a:latin typeface="Cambria Math" panose="02040503050406030204" pitchFamily="18" charset="0"/>
                         </a:rPr>
                         <m:t>0</m:t>
@@ -10605,11 +10741,12 @@
                     </m:oMath>
                   </m:oMathPara>
                 </a14:m>
-                <a:endParaRPr/>
+                <a:endParaRPr lang="ar-AE" dirty="0"/>
               </a:p>
               <a:p>
                 <a:pPr lvl="0"/>
                 <a:r>
+                  <a:rPr lang="en-US" dirty="0"/>
                   <a:t>Multiply by </a:t>
                 </a:r>
                 <a14:m>
@@ -10617,14 +10754,14 @@
                     <m:sSup>
                       <m:sSupPr>
                         <m:ctrlPr>
-                          <a:rPr i="1">
+                          <a:rPr lang="ar-AE" i="1">
                             <a:latin typeface="Cambria Math" panose="02040503050406030204" pitchFamily="18" charset="0"/>
                           </a:rPr>
                         </m:ctrlPr>
                       </m:sSupPr>
                       <m:e>
                         <m:r>
-                          <a:rPr>
+                          <a:rPr lang="ar-AE">
                             <a:latin typeface="Cambria Math" panose="02040503050406030204" pitchFamily="18" charset="0"/>
                           </a:rPr>
                           <m:t>𝐴</m:t>
@@ -10632,7 +10769,7 @@
                       </m:e>
                       <m:sup>
                         <m:r>
-                          <a:rPr>
+                          <a:rPr lang="ar-AE">
                             <a:latin typeface="Cambria Math" panose="02040503050406030204" pitchFamily="18" charset="0"/>
                           </a:rPr>
                           <m:t>𝑇</m:t>
@@ -10642,7 +10779,12 @@
                   </m:oMath>
                 </a14:m>
                 <a:r>
-                  <a:t> and set </a:t>
+                  <a:rPr lang="ar-AE" dirty="0"/>
+                  <a:t> </a:t>
+                </a:r>
+                <a:r>
+                  <a:rPr lang="en-US" dirty="0"/>
+                  <a:t>and set </a:t>
                 </a:r>
                 <a14:m>
                   <m:oMath xmlns:m="http://schemas.openxmlformats.org/officeDocument/2006/math">
@@ -10650,14 +10792,14 @@
                       <m:accPr>
                         <m:chr m:val="⃗"/>
                         <m:ctrlPr>
-                          <a:rPr i="1">
+                          <a:rPr lang="ar-AE" i="1">
                             <a:latin typeface="Cambria Math" panose="02040503050406030204" pitchFamily="18" charset="0"/>
                           </a:rPr>
                         </m:ctrlPr>
                       </m:accPr>
                       <m:e>
                         <m:r>
-                          <a:rPr>
+                          <a:rPr lang="ar-AE">
                             <a:latin typeface="Cambria Math" panose="02040503050406030204" pitchFamily="18" charset="0"/>
                           </a:rPr>
                           <m:t>𝜖</m:t>
@@ -10665,20 +10807,20 @@
                       </m:e>
                     </m:acc>
                     <m:r>
-                      <a:rPr>
+                      <a:rPr lang="ar-AE">
                         <a:latin typeface="Cambria Math" panose="02040503050406030204" pitchFamily="18" charset="0"/>
                       </a:rPr>
                       <m:t>=</m:t>
                     </m:r>
                     <m:r>
-                      <a:rPr>
+                      <a:rPr lang="ar-AE">
                         <a:latin typeface="Cambria Math" panose="02040503050406030204" pitchFamily="18" charset="0"/>
                       </a:rPr>
                       <m:t>0</m:t>
                     </m:r>
                   </m:oMath>
                 </a14:m>
-                <a:endParaRPr/>
+                <a:endParaRPr lang="ar-AE" dirty="0"/>
               </a:p>
               <a:p>
                 <a:pPr marL="0" lvl="0" indent="0">
@@ -10693,14 +10835,14 @@
                       <m:sSup>
                         <m:sSupPr>
                           <m:ctrlPr>
-                            <a:rPr i="1">
+                            <a:rPr lang="ar-AE" i="1">
                               <a:latin typeface="Cambria Math" panose="02040503050406030204" pitchFamily="18" charset="0"/>
                             </a:rPr>
                           </m:ctrlPr>
                         </m:sSupPr>
                         <m:e>
                           <m:r>
-                            <a:rPr>
+                            <a:rPr lang="ar-AE">
                               <a:latin typeface="Cambria Math" panose="02040503050406030204" pitchFamily="18" charset="0"/>
                             </a:rPr>
                             <m:t>𝐴</m:t>
@@ -10708,7 +10850,7 @@
                         </m:e>
                         <m:sup>
                           <m:r>
-                            <a:rPr>
+                            <a:rPr lang="ar-AE">
                               <a:latin typeface="Cambria Math" panose="02040503050406030204" pitchFamily="18" charset="0"/>
                             </a:rPr>
                             <m:t>𝑇</m:t>
@@ -10716,7 +10858,7 @@
                         </m:sup>
                       </m:sSup>
                       <m:r>
-                        <a:rPr>
+                        <a:rPr lang="ar-AE">
                           <a:latin typeface="Cambria Math" panose="02040503050406030204" pitchFamily="18" charset="0"/>
                         </a:rPr>
                         <m:t>𝐴</m:t>
@@ -10725,14 +10867,14 @@
                         <m:accPr>
                           <m:chr m:val="⃗"/>
                           <m:ctrlPr>
-                            <a:rPr i="1">
+                            <a:rPr lang="ar-AE" i="1">
                               <a:latin typeface="Cambria Math" panose="02040503050406030204" pitchFamily="18" charset="0"/>
                             </a:rPr>
                           </m:ctrlPr>
                         </m:accPr>
                         <m:e>
                           <m:r>
-                            <a:rPr>
+                            <a:rPr lang="ar-AE">
                               <a:latin typeface="Cambria Math" panose="02040503050406030204" pitchFamily="18" charset="0"/>
                             </a:rPr>
                             <m:t>𝑏</m:t>
@@ -10740,7 +10882,7 @@
                         </m:e>
                       </m:acc>
                       <m:r>
-                        <a:rPr>
+                        <a:rPr lang="ar-AE">
                           <a:latin typeface="Cambria Math" panose="02040503050406030204" pitchFamily="18" charset="0"/>
                         </a:rPr>
                         <m:t>=</m:t>
@@ -10748,14 +10890,14 @@
                       <m:sSup>
                         <m:sSupPr>
                           <m:ctrlPr>
-                            <a:rPr i="1">
+                            <a:rPr lang="ar-AE" i="1">
                               <a:latin typeface="Cambria Math" panose="02040503050406030204" pitchFamily="18" charset="0"/>
                             </a:rPr>
                           </m:ctrlPr>
                         </m:sSupPr>
                         <m:e>
                           <m:r>
-                            <a:rPr>
+                            <a:rPr lang="ar-AE">
                               <a:latin typeface="Cambria Math" panose="02040503050406030204" pitchFamily="18" charset="0"/>
                             </a:rPr>
                             <m:t>𝐴</m:t>
@@ -10763,7 +10905,7 @@
                         </m:e>
                         <m:sup>
                           <m:r>
-                            <a:rPr>
+                            <a:rPr lang="ar-AE">
                               <a:latin typeface="Cambria Math" panose="02040503050406030204" pitchFamily="18" charset="0"/>
                             </a:rPr>
                             <m:t>𝑇</m:t>
@@ -10774,14 +10916,14 @@
                         <m:accPr>
                           <m:chr m:val="̂"/>
                           <m:ctrlPr>
-                            <a:rPr i="1">
+                            <a:rPr lang="ar-AE" i="1">
                               <a:latin typeface="Cambria Math" panose="02040503050406030204" pitchFamily="18" charset="0"/>
                             </a:rPr>
                           </m:ctrlPr>
                         </m:accPr>
                         <m:e>
                           <m:r>
-                            <a:rPr>
+                            <a:rPr lang="ar-AE">
                               <a:latin typeface="Cambria Math" panose="02040503050406030204" pitchFamily="18" charset="0"/>
                             </a:rPr>
                             <m:t>𝑦</m:t>
@@ -10791,11 +10933,12 @@
                     </m:oMath>
                   </m:oMathPara>
                 </a14:m>
-                <a:endParaRPr/>
+                <a:endParaRPr lang="ar-AE" dirty="0"/>
               </a:p>
               <a:p>
                 <a:pPr lvl="0"/>
                 <a:r>
+                  <a:rPr lang="en-US" dirty="0"/>
                   <a:t>Taking the inverse of </a:t>
                 </a:r>
                 <a14:m>
@@ -10803,14 +10946,14 @@
                     <m:sSup>
                       <m:sSupPr>
                         <m:ctrlPr>
-                          <a:rPr i="1">
+                          <a:rPr lang="ar-AE" i="1">
                             <a:latin typeface="Cambria Math" panose="02040503050406030204" pitchFamily="18" charset="0"/>
                           </a:rPr>
                         </m:ctrlPr>
                       </m:sSupPr>
                       <m:e>
                         <m:r>
-                          <a:rPr>
+                          <a:rPr lang="ar-AE">
                             <a:latin typeface="Cambria Math" panose="02040503050406030204" pitchFamily="18" charset="0"/>
                           </a:rPr>
                           <m:t>𝐴</m:t>
@@ -10818,7 +10961,7 @@
                       </m:e>
                       <m:sup>
                         <m:r>
-                          <a:rPr>
+                          <a:rPr lang="ar-AE">
                             <a:latin typeface="Cambria Math" panose="02040503050406030204" pitchFamily="18" charset="0"/>
                           </a:rPr>
                           <m:t>𝑇</m:t>
@@ -10826,7 +10969,7 @@
                       </m:sup>
                     </m:sSup>
                     <m:r>
-                      <a:rPr>
+                      <a:rPr lang="ar-AE">
                         <a:latin typeface="Cambria Math" panose="02040503050406030204" pitchFamily="18" charset="0"/>
                       </a:rPr>
                       <m:t>𝐴</m:t>
@@ -10834,7 +10977,12 @@
                   </m:oMath>
                 </a14:m>
                 <a:r>
-                  <a:t> we arrive at the normal equations</a:t>
+                  <a:rPr lang="ar-AE" dirty="0"/>
+                  <a:t> </a:t>
+                </a:r>
+                <a:r>
+                  <a:rPr lang="en-US" dirty="0"/>
+                  <a:t>we arrive at the normal equations</a:t>
                 </a:r>
               </a:p>
               <a:p>
@@ -10851,14 +10999,14 @@
                         <m:accPr>
                           <m:chr m:val="⃗"/>
                           <m:ctrlPr>
-                            <a:rPr i="1">
+                            <a:rPr lang="ar-AE" i="1">
                               <a:latin typeface="Cambria Math" panose="02040503050406030204" pitchFamily="18" charset="0"/>
                             </a:rPr>
                           </m:ctrlPr>
                         </m:accPr>
                         <m:e>
                           <m:r>
-                            <a:rPr>
+                            <a:rPr lang="ar-AE">
                               <a:latin typeface="Cambria Math" panose="02040503050406030204" pitchFamily="18" charset="0"/>
                             </a:rPr>
                             <m:t>𝑏</m:t>
@@ -10866,7 +11014,7 @@
                         </m:e>
                       </m:acc>
                       <m:r>
-                        <a:rPr>
+                        <a:rPr lang="ar-AE">
                           <a:latin typeface="Cambria Math" panose="02040503050406030204" pitchFamily="18" charset="0"/>
                         </a:rPr>
                         <m:t>=</m:t>
@@ -10874,7 +11022,7 @@
                       <m:sSup>
                         <m:sSupPr>
                           <m:ctrlPr>
-                            <a:rPr i="1">
+                            <a:rPr lang="ar-AE" i="1">
                               <a:latin typeface="Cambria Math" panose="02040503050406030204" pitchFamily="18" charset="0"/>
                             </a:rPr>
                           </m:ctrlPr>
@@ -10883,7 +11031,7 @@
                           <m:d>
                             <m:dPr>
                               <m:ctrlPr>
-                                <a:rPr i="1">
+                                <a:rPr lang="ar-AE" i="1">
                                   <a:latin typeface="Cambria Math" panose="02040503050406030204" pitchFamily="18" charset="0"/>
                                 </a:rPr>
                               </m:ctrlPr>
@@ -10892,14 +11040,14 @@
                               <m:sSup>
                                 <m:sSupPr>
                                   <m:ctrlPr>
-                                    <a:rPr i="1">
+                                    <a:rPr lang="ar-AE" i="1">
                                       <a:latin typeface="Cambria Math" panose="02040503050406030204" pitchFamily="18" charset="0"/>
                                     </a:rPr>
                                   </m:ctrlPr>
                                 </m:sSupPr>
                                 <m:e>
                                   <m:r>
-                                    <a:rPr>
+                                    <a:rPr lang="ar-AE">
                                       <a:latin typeface="Cambria Math" panose="02040503050406030204" pitchFamily="18" charset="0"/>
                                     </a:rPr>
                                     <m:t>𝐴</m:t>
@@ -10907,7 +11055,7 @@
                                 </m:e>
                                 <m:sup>
                                   <m:r>
-                                    <a:rPr>
+                                    <a:rPr lang="ar-AE">
                                       <a:latin typeface="Cambria Math" panose="02040503050406030204" pitchFamily="18" charset="0"/>
                                     </a:rPr>
                                     <m:t>𝑇</m:t>
@@ -10915,7 +11063,7 @@
                                 </m:sup>
                               </m:sSup>
                               <m:r>
-                                <a:rPr>
+                                <a:rPr lang="ar-AE">
                                   <a:latin typeface="Cambria Math" panose="02040503050406030204" pitchFamily="18" charset="0"/>
                                 </a:rPr>
                                 <m:t>𝐴</m:t>
@@ -10925,13 +11073,13 @@
                         </m:e>
                         <m:sup>
                           <m:r>
-                            <a:rPr>
+                            <a:rPr lang="ar-AE">
                               <a:latin typeface="Cambria Math" panose="02040503050406030204" pitchFamily="18" charset="0"/>
                             </a:rPr>
                             <m:t>−</m:t>
                           </m:r>
                           <m:r>
-                            <a:rPr>
+                            <a:rPr lang="ar-AE">
                               <a:latin typeface="Cambria Math" panose="02040503050406030204" pitchFamily="18" charset="0"/>
                             </a:rPr>
                             <m:t>1</m:t>
@@ -10941,14 +11089,14 @@
                       <m:sSup>
                         <m:sSupPr>
                           <m:ctrlPr>
-                            <a:rPr i="1">
+                            <a:rPr lang="ar-AE" i="1">
                               <a:latin typeface="Cambria Math" panose="02040503050406030204" pitchFamily="18" charset="0"/>
                             </a:rPr>
                           </m:ctrlPr>
                         </m:sSupPr>
                         <m:e>
                           <m:r>
-                            <a:rPr>
+                            <a:rPr lang="ar-AE">
                               <a:latin typeface="Cambria Math" panose="02040503050406030204" pitchFamily="18" charset="0"/>
                             </a:rPr>
                             <m:t>𝐴</m:t>
@@ -10956,7 +11104,7 @@
                         </m:e>
                         <m:sup>
                           <m:r>
-                            <a:rPr>
+                            <a:rPr lang="ar-AE">
                               <a:latin typeface="Cambria Math" panose="02040503050406030204" pitchFamily="18" charset="0"/>
                             </a:rPr>
                             <m:t>𝑇</m:t>
@@ -10967,14 +11115,14 @@
                         <m:accPr>
                           <m:chr m:val="̂"/>
                           <m:ctrlPr>
-                            <a:rPr i="1">
+                            <a:rPr lang="ar-AE" i="1">
                               <a:latin typeface="Cambria Math" panose="02040503050406030204" pitchFamily="18" charset="0"/>
                             </a:rPr>
                           </m:ctrlPr>
                         </m:accPr>
                         <m:e>
                           <m:r>
-                            <a:rPr>
+                            <a:rPr lang="ar-AE">
                               <a:latin typeface="Cambria Math" panose="02040503050406030204" pitchFamily="18" charset="0"/>
                             </a:rPr>
                             <m:t>𝑦</m:t>
@@ -10984,12 +11132,12 @@
                     </m:oMath>
                   </m:oMathPara>
                 </a14:m>
-                <a:endParaRPr/>
+                <a:endParaRPr dirty="0"/>
               </a:p>
             </p:txBody>
           </p:sp>
         </mc:Choice>
-        <mc:Fallback xmlns="">
+        <mc:Fallback>
           <p:sp>
             <p:nvSpPr>
               <p:cNvPr id="3" name="Content Placeholder 2"/>
@@ -11514,8 +11662,8 @@
           </a:p>
         </p:txBody>
       </p:sp>
-      <mc:AlternateContent xmlns:mc="http://schemas.openxmlformats.org/markup-compatibility/2006" xmlns:a14="http://schemas.microsoft.com/office/drawing/2010/main">
-        <mc:Choice Requires="a14">
+      <mc:AlternateContent xmlns:mc="http://schemas.openxmlformats.org/markup-compatibility/2006">
+        <mc:Choice xmlns:a14="http://schemas.microsoft.com/office/drawing/2010/main" Requires="a14">
           <p:sp>
             <p:nvSpPr>
               <p:cNvPr id="3" name="Content Placeholder 2"/>
@@ -11695,7 +11843,7 @@
                 </a14:m>
                 <a:r>
                   <a:rPr lang="en-US" sz="1600" dirty="0"/>
-                  <a:t> labels </a:t>
+                  <a:t> responses, </a:t>
                 </a:r>
                 <a14:m>
                   <m:oMath xmlns:m="http://schemas.openxmlformats.org/officeDocument/2006/math">
@@ -12796,7 +12944,7 @@
             </p:txBody>
           </p:sp>
         </mc:Choice>
-        <mc:Fallback xmlns="">
+        <mc:Fallback>
           <p:sp>
             <p:nvSpPr>
               <p:cNvPr id="3" name="Content Placeholder 2"/>
@@ -13019,13 +13167,7 @@
                         <a:rPr>
                           <a:latin typeface="Cambria Math" panose="02040503050406030204" pitchFamily="18" charset="0"/>
                         </a:rPr>
-                        <m:t>=</m:t>
-                      </m:r>
-                      <m:r>
-                        <a:rPr>
-                          <a:latin typeface="Cambria Math" panose="02040503050406030204" pitchFamily="18" charset="0"/>
-                        </a:rPr>
-                        <m:t>2</m:t>
+                        <m:t>=2</m:t>
                       </m:r>
                       <m:nary>
                         <m:naryPr>
@@ -13048,13 +13190,7 @@
                             <a:rPr>
                               <a:latin typeface="Cambria Math" panose="02040503050406030204" pitchFamily="18" charset="0"/>
                             </a:rPr>
-                            <m:t>=</m:t>
-                          </m:r>
-                          <m:r>
-                            <a:rPr>
-                              <a:latin typeface="Cambria Math" panose="02040503050406030204" pitchFamily="18" charset="0"/>
-                            </a:rPr>
-                            <m:t>1</m:t>
+                            <m:t>=1</m:t>
                           </m:r>
                         </m:sub>
                         <m:sup>
@@ -13198,13 +13334,7 @@
                         <a:rPr>
                           <a:latin typeface="Cambria Math" panose="02040503050406030204" pitchFamily="18" charset="0"/>
                         </a:rPr>
-                        <m:t>=</m:t>
-                      </m:r>
-                      <m:r>
-                        <a:rPr>
-                          <a:latin typeface="Cambria Math" panose="02040503050406030204" pitchFamily="18" charset="0"/>
-                        </a:rPr>
-                        <m:t>0</m:t>
+                        <m:t>=0</m:t>
                       </m:r>
                     </m:oMath>
                   </m:oMathPara>
@@ -13317,13 +13447,7 @@
                         <a:rPr>
                           <a:latin typeface="Cambria Math" panose="02040503050406030204" pitchFamily="18" charset="0"/>
                         </a:rPr>
-                        <m:t>=</m:t>
-                      </m:r>
-                      <m:r>
-                        <a:rPr>
-                          <a:latin typeface="Cambria Math" panose="02040503050406030204" pitchFamily="18" charset="0"/>
-                        </a:rPr>
-                        <m:t>0</m:t>
+                        <m:t>=0</m:t>
                       </m:r>
                     </m:oMath>
                   </m:oMathPara>
@@ -13431,13 +13555,7 @@
                             <a:rPr>
                               <a:latin typeface="Cambria Math" panose="02040503050406030204" pitchFamily="18" charset="0"/>
                             </a:rPr>
-                            <m:t>−</m:t>
-                          </m:r>
-                          <m:r>
-                            <a:rPr>
-                              <a:latin typeface="Cambria Math" panose="02040503050406030204" pitchFamily="18" charset="0"/>
-                            </a:rPr>
-                            <m:t>1</m:t>
+                            <m:t>−1</m:t>
                           </m:r>
                         </m:sup>
                       </m:sSup>
@@ -13617,8 +13735,8 @@
           </a:p>
         </p:txBody>
       </p:sp>
-      <mc:AlternateContent xmlns:mc="http://schemas.openxmlformats.org/markup-compatibility/2006" xmlns:a14="http://schemas.microsoft.com/office/drawing/2010/main">
-        <mc:Choice Requires="a14">
+      <mc:AlternateContent xmlns:mc="http://schemas.openxmlformats.org/markup-compatibility/2006">
+        <mc:Choice xmlns:a14="http://schemas.microsoft.com/office/drawing/2010/main" Requires="a14">
           <p:sp>
             <p:nvSpPr>
               <p:cNvPr id="3" name="Content Placeholder 2"/>
@@ -13653,7 +13771,15 @@
                 <a:pPr lvl="0"/>
                 <a:r>
                   <a:rPr dirty="0"/>
-                  <a:t>Inverting the covariance matrix is a big improvement over a naive approach, it still requires taking a large matrix inverse at scale. </a:t>
+                  <a:t>Inverting the covariance matrix is a big improvement over a naive approach, </a:t>
+                </a:r>
+                <a:r>
+                  <a:rPr lang="en-US" dirty="0"/>
+                  <a:t>but requires </a:t>
+                </a:r>
+                <a:r>
+                  <a:rPr dirty="0"/>
+                  <a:t>taking a large matrix inverse at scale. </a:t>
                 </a:r>
                 <a14:m>
                   <m:oMath xmlns:m="http://schemas.openxmlformats.org/officeDocument/2006/math">
@@ -13963,7 +14089,7 @@
             </p:txBody>
           </p:sp>
         </mc:Choice>
-        <mc:Fallback xmlns="">
+        <mc:Fallback>
           <p:sp>
             <p:nvSpPr>
               <p:cNvPr id="3" name="Content Placeholder 2"/>
@@ -14050,8 +14176,8 @@
           </a:p>
         </p:txBody>
       </p:sp>
-      <mc:AlternateContent xmlns:mc="http://schemas.openxmlformats.org/markup-compatibility/2006" xmlns:a14="http://schemas.microsoft.com/office/drawing/2010/main">
-        <mc:Choice Requires="a14">
+      <mc:AlternateContent xmlns:mc="http://schemas.openxmlformats.org/markup-compatibility/2006">
+        <mc:Choice xmlns:a14="http://schemas.microsoft.com/office/drawing/2010/main" Requires="a14">
           <p:sp>
             <p:nvSpPr>
               <p:cNvPr id="3" name="Content Placeholder 2"/>
@@ -14253,7 +14379,7 @@
                 <a:pPr lvl="0"/>
                 <a:r>
                   <a:rPr lang="en-US" dirty="0"/>
-                  <a:t>Example; dependent variable (dv) modeled by independent variables (var1) and its square, uses the ‘literal’, </a:t>
+                  <a:t>Example; dependent variable (dv) modeled by independent variables (var1) and its square, uses the ‘literal’ operator, </a:t>
                 </a:r>
                 <a14:m>
                   <m:oMath xmlns:m="http://schemas.openxmlformats.org/officeDocument/2006/math">
@@ -14288,7 +14414,7 @@
                 </a:r>
                 <a:r>
                   <a:rPr lang="en-US" dirty="0"/>
-                  <a:t>operator to wrap a function:</a:t>
+                  <a:t>to wrap a function:</a:t>
                 </a:r>
               </a:p>
               <a:p>
@@ -14380,7 +14506,7 @@
             </p:txBody>
           </p:sp>
         </mc:Choice>
-        <mc:Fallback xmlns="">
+        <mc:Fallback>
           <p:sp>
             <p:nvSpPr>
               <p:cNvPr id="3" name="Content Placeholder 2"/>
@@ -14472,8 +14598,8 @@
           </a:p>
         </p:txBody>
       </p:sp>
-      <mc:AlternateContent xmlns:mc="http://schemas.openxmlformats.org/markup-compatibility/2006" xmlns:a14="http://schemas.microsoft.com/office/drawing/2010/main">
-        <mc:Choice Requires="a14">
+      <mc:AlternateContent xmlns:mc="http://schemas.openxmlformats.org/markup-compatibility/2006">
+        <mc:Choice xmlns:a14="http://schemas.microsoft.com/office/drawing/2010/main" Requires="a14">
           <p:sp>
             <p:nvSpPr>
               <p:cNvPr id="3" name="Content Placeholder 2"/>
@@ -14726,7 +14852,7 @@
                 </a:r>
                 <a:r>
                   <a:rPr lang="en-US" sz="2000" b="1" dirty="0"/>
-                  <a:t>no intercept term </a:t>
+                  <a:t>removes the intercept term </a:t>
                 </a:r>
               </a:p>
               <a:p>
@@ -14813,7 +14939,7 @@
             </p:txBody>
           </p:sp>
         </mc:Choice>
-        <mc:Fallback xmlns="">
+        <mc:Fallback>
           <p:sp>
             <p:nvSpPr>
               <p:cNvPr id="3" name="Content Placeholder 2"/>
@@ -16348,7 +16474,19 @@
             </a:r>
             <a:r>
               <a:rPr b="1" dirty="0"/>
-              <a:t>model must make sense</a:t>
+              <a:t>model</a:t>
+            </a:r>
+            <a:r>
+              <a:rPr lang="en-US" b="1" dirty="0"/>
+              <a:t> </a:t>
+            </a:r>
+            <a:r>
+              <a:rPr b="1" dirty="0"/>
+              <a:t>make sense</a:t>
+            </a:r>
+            <a:r>
+              <a:rPr lang="en-US" b="1" dirty="0"/>
+              <a:t>s</a:t>
             </a:r>
             <a:r>
               <a:rPr dirty="0"/>
@@ -16951,11 +17089,14 @@
             <a:pPr lvl="1"/>
             <a:r>
               <a:rPr dirty="0"/>
-              <a:t>Heteroskedastic residuals indicate that model has not incorporated all available information</a:t>
-            </a:r>
-            <a:r>
-              <a:rPr lang="en-US" dirty="0"/>
-              <a:t>!</a:t>
+              <a:t>Heteroskedastic residuals indicate that </a:t>
+            </a:r>
+            <a:r>
+              <a:t>model </a:t>
+            </a:r>
+            <a:r>
+              <a:rPr lang="en-US"/>
+              <a:t>is a poor fit!</a:t>
             </a:r>
             <a:endParaRPr dirty="0"/>
           </a:p>
@@ -25468,18 +25609,16 @@
           <a:p>
             <a:pPr lvl="1"/>
             <a:r>
+              <a:rPr dirty="0"/>
               <a:t>Idea</a:t>
             </a:r>
             <a:r>
-              <a:rPr lang="en-US"/>
+              <a:rPr lang="en-US" dirty="0"/>
               <a:t>l</a:t>
             </a:r>
             <a:r>
-              <a:t> </a:t>
-            </a:r>
-            <a:r>
               <a:rPr dirty="0"/>
-              <a:t>if </a:t>
+              <a:t> if </a:t>
             </a:r>
             <a:r>
               <a:rPr b="1" dirty="0"/>
@@ -28770,7 +28909,7 @@
             <p:ph idx="1"/>
             <p:extLst>
               <p:ext uri="{D42A27DB-BD31-4B8C-83A1-F6EECF244321}">
-                <p14:modId xmlns:p14="http://schemas.microsoft.com/office/powerpoint/2010/main" val="59230947"/>
+                <p14:modId xmlns:p14="http://schemas.microsoft.com/office/powerpoint/2010/main" val="3005633347"/>
               </p:ext>
             </p:extLst>
           </p:nvPr>
@@ -28874,12 +29013,8 @@
                         <a:buNone/>
                       </a:pPr>
                       <a:r>
-                        <a:rPr lang="en-US" sz="2000" dirty="0" err="1"/>
-                        <a:t>Normsal</a:t>
-                      </a:r>
-                      <a:r>
                         <a:rPr lang="en-US" sz="2000" dirty="0"/>
-                        <a:t> </a:t>
+                        <a:t>Normal </a:t>
                       </a:r>
                       <a:r>
                         <a:rPr sz="2000" dirty="0"/>

</xml_diff>

<commit_message>
Corrected typo in log likelihood formula
</commit_message>
<xml_diff>
--- a/LectureSlides/08_IntroductionToLinearModels.pptx
+++ b/LectureSlides/08_IntroductionToLinearModels.pptx
@@ -12380,7 +12380,7 @@
                         <a:rPr lang="ar-AE" sz="1600">
                           <a:latin typeface="Cambria Math" panose="02040503050406030204" pitchFamily="18" charset="0"/>
                         </a:rPr>
-                        <m:t>=−</m:t>
+                        <m:t>=</m:t>
                       </m:r>
                       <m:f>
                         <m:fPr>
@@ -13167,7 +13167,13 @@
                         <a:rPr>
                           <a:latin typeface="Cambria Math" panose="02040503050406030204" pitchFamily="18" charset="0"/>
                         </a:rPr>
-                        <m:t>=2</m:t>
+                        <m:t>=</m:t>
+                      </m:r>
+                      <m:r>
+                        <a:rPr>
+                          <a:latin typeface="Cambria Math" panose="02040503050406030204" pitchFamily="18" charset="0"/>
+                        </a:rPr>
+                        <m:t>2</m:t>
                       </m:r>
                       <m:nary>
                         <m:naryPr>
@@ -13190,7 +13196,13 @@
                             <a:rPr>
                               <a:latin typeface="Cambria Math" panose="02040503050406030204" pitchFamily="18" charset="0"/>
                             </a:rPr>
-                            <m:t>=1</m:t>
+                            <m:t>=</m:t>
+                          </m:r>
+                          <m:r>
+                            <a:rPr>
+                              <a:latin typeface="Cambria Math" panose="02040503050406030204" pitchFamily="18" charset="0"/>
+                            </a:rPr>
+                            <m:t>1</m:t>
                           </m:r>
                         </m:sub>
                         <m:sup>
@@ -13334,7 +13346,13 @@
                         <a:rPr>
                           <a:latin typeface="Cambria Math" panose="02040503050406030204" pitchFamily="18" charset="0"/>
                         </a:rPr>
-                        <m:t>=0</m:t>
+                        <m:t>=</m:t>
+                      </m:r>
+                      <m:r>
+                        <a:rPr>
+                          <a:latin typeface="Cambria Math" panose="02040503050406030204" pitchFamily="18" charset="0"/>
+                        </a:rPr>
+                        <m:t>0</m:t>
                       </m:r>
                     </m:oMath>
                   </m:oMathPara>
@@ -13447,7 +13465,13 @@
                         <a:rPr>
                           <a:latin typeface="Cambria Math" panose="02040503050406030204" pitchFamily="18" charset="0"/>
                         </a:rPr>
-                        <m:t>=0</m:t>
+                        <m:t>=</m:t>
+                      </m:r>
+                      <m:r>
+                        <a:rPr>
+                          <a:latin typeface="Cambria Math" panose="02040503050406030204" pitchFamily="18" charset="0"/>
+                        </a:rPr>
+                        <m:t>0</m:t>
                       </m:r>
                     </m:oMath>
                   </m:oMathPara>
@@ -13555,7 +13579,13 @@
                             <a:rPr>
                               <a:latin typeface="Cambria Math" panose="02040503050406030204" pitchFamily="18" charset="0"/>
                             </a:rPr>
-                            <m:t>−1</m:t>
+                            <m:t>−</m:t>
+                          </m:r>
+                          <m:r>
+                            <a:rPr>
+                              <a:latin typeface="Cambria Math" panose="02040503050406030204" pitchFamily="18" charset="0"/>
+                            </a:rPr>
+                            <m:t>1</m:t>
                           </m:r>
                         </m:sup>
                       </m:sSup>
@@ -17089,13 +17119,10 @@
             <a:pPr lvl="1"/>
             <a:r>
               <a:rPr dirty="0"/>
-              <a:t>Heteroskedastic residuals indicate that </a:t>
-            </a:r>
-            <a:r>
-              <a:t>model </a:t>
-            </a:r>
-            <a:r>
-              <a:rPr lang="en-US"/>
+              <a:t>Heteroskedastic residuals indicate that model </a:t>
+            </a:r>
+            <a:r>
+              <a:rPr lang="en-US" dirty="0"/>
               <a:t>is a poor fit!</a:t>
             </a:r>
             <a:endParaRPr dirty="0"/>
@@ -17320,8 +17347,8 @@
           </a:p>
         </p:txBody>
       </p:sp>
-      <mc:AlternateContent xmlns:mc="http://schemas.openxmlformats.org/markup-compatibility/2006" xmlns:a14="http://schemas.microsoft.com/office/drawing/2010/main">
-        <mc:Choice Requires="a14">
+      <mc:AlternateContent xmlns:mc="http://schemas.openxmlformats.org/markup-compatibility/2006">
+        <mc:Choice xmlns:a14="http://schemas.microsoft.com/office/drawing/2010/main" Requires="a14">
           <p:sp>
             <p:nvSpPr>
               <p:cNvPr id="4" name="Text Placeholder 3"/>
@@ -17428,7 +17455,7 @@
                 </a:pPr>
                 <a:r>
                   <a:rPr sz="2000" dirty="0"/>
-                  <a:t>Graphically test that the residuals </a:t>
+                  <a:t>Graphically test the residuals </a:t>
                 </a:r>
                 <a:r>
                   <a:rPr lang="en-US" sz="2000" dirty="0"/>
@@ -17461,7 +17488,7 @@
             </p:txBody>
           </p:sp>
         </mc:Choice>
-        <mc:Fallback xmlns="">
+        <mc:Fallback>
           <p:sp>
             <p:nvSpPr>
               <p:cNvPr id="4" name="Text Placeholder 3"/>

</xml_diff>

<commit_message>
Updated definition of Omnibus statistic in slide to be consistent with use in Statsmodels
</commit_message>
<xml_diff>
--- a/LectureSlides/08_IntroductionToLinearModels.pptx
+++ b/LectureSlides/08_IntroductionToLinearModels.pptx
@@ -264,7 +264,7 @@
           <a:p>
             <a:fld id="{19E36D9D-5B1A-4F71-A845-003503DCA96F}" type="datetimeFigureOut">
               <a:rPr lang="en-US" smtClean="0"/>
-              <a:t>10/9/2024</a:t>
+              <a:t>10/20/2024</a:t>
             </a:fld>
             <a:endParaRPr lang="en-US"/>
           </a:p>
@@ -794,7 +794,7 @@
           <a:p>
             <a:fld id="{241EB5C9-1307-BA42-ABA2-0BC069CD8E7F}" type="datetimeFigureOut">
               <a:rPr lang="en-US" smtClean="0"/>
-              <a:t>10/9/2024</a:t>
+              <a:t>10/20/2024</a:t>
             </a:fld>
             <a:endParaRPr lang="en-US"/>
           </a:p>
@@ -962,7 +962,7 @@
           <a:p>
             <a:fld id="{241EB5C9-1307-BA42-ABA2-0BC069CD8E7F}" type="datetimeFigureOut">
               <a:rPr lang="en-US" smtClean="0"/>
-              <a:t>10/9/2024</a:t>
+              <a:t>10/20/2024</a:t>
             </a:fld>
             <a:endParaRPr lang="en-US"/>
           </a:p>
@@ -1140,7 +1140,7 @@
           <a:p>
             <a:fld id="{241EB5C9-1307-BA42-ABA2-0BC069CD8E7F}" type="datetimeFigureOut">
               <a:rPr lang="en-US" smtClean="0"/>
-              <a:t>10/9/2024</a:t>
+              <a:t>10/20/2024</a:t>
             </a:fld>
             <a:endParaRPr lang="en-US"/>
           </a:p>
@@ -1308,7 +1308,7 @@
           <a:p>
             <a:fld id="{241EB5C9-1307-BA42-ABA2-0BC069CD8E7F}" type="datetimeFigureOut">
               <a:rPr lang="en-US" smtClean="0"/>
-              <a:t>10/9/2024</a:t>
+              <a:t>10/20/2024</a:t>
             </a:fld>
             <a:endParaRPr lang="en-US"/>
           </a:p>
@@ -1553,7 +1553,7 @@
           <a:p>
             <a:fld id="{241EB5C9-1307-BA42-ABA2-0BC069CD8E7F}" type="datetimeFigureOut">
               <a:rPr lang="en-US" smtClean="0"/>
-              <a:t>10/9/2024</a:t>
+              <a:t>10/20/2024</a:t>
             </a:fld>
             <a:endParaRPr lang="en-US"/>
           </a:p>
@@ -1838,7 +1838,7 @@
           <a:p>
             <a:fld id="{241EB5C9-1307-BA42-ABA2-0BC069CD8E7F}" type="datetimeFigureOut">
               <a:rPr lang="en-US" smtClean="0"/>
-              <a:t>10/9/2024</a:t>
+              <a:t>10/20/2024</a:t>
             </a:fld>
             <a:endParaRPr lang="en-US"/>
           </a:p>
@@ -2257,7 +2257,7 @@
           <a:p>
             <a:fld id="{241EB5C9-1307-BA42-ABA2-0BC069CD8E7F}" type="datetimeFigureOut">
               <a:rPr lang="en-US" smtClean="0"/>
-              <a:t>10/9/2024</a:t>
+              <a:t>10/20/2024</a:t>
             </a:fld>
             <a:endParaRPr lang="en-US"/>
           </a:p>
@@ -2374,7 +2374,7 @@
           <a:p>
             <a:fld id="{241EB5C9-1307-BA42-ABA2-0BC069CD8E7F}" type="datetimeFigureOut">
               <a:rPr lang="en-US" smtClean="0"/>
-              <a:t>10/9/2024</a:t>
+              <a:t>10/20/2024</a:t>
             </a:fld>
             <a:endParaRPr lang="en-US"/>
           </a:p>
@@ -2469,7 +2469,7 @@
           <a:p>
             <a:fld id="{241EB5C9-1307-BA42-ABA2-0BC069CD8E7F}" type="datetimeFigureOut">
               <a:rPr lang="en-US" smtClean="0"/>
-              <a:t>10/9/2024</a:t>
+              <a:t>10/20/2024</a:t>
             </a:fld>
             <a:endParaRPr lang="en-US"/>
           </a:p>
@@ -2744,7 +2744,7 @@
           <a:p>
             <a:fld id="{241EB5C9-1307-BA42-ABA2-0BC069CD8E7F}" type="datetimeFigureOut">
               <a:rPr lang="en-US" smtClean="0"/>
-              <a:t>10/9/2024</a:t>
+              <a:t>10/20/2024</a:t>
             </a:fld>
             <a:endParaRPr lang="en-US"/>
           </a:p>
@@ -2996,7 +2996,7 @@
           <a:p>
             <a:fld id="{241EB5C9-1307-BA42-ABA2-0BC069CD8E7F}" type="datetimeFigureOut">
               <a:rPr lang="en-US" smtClean="0"/>
-              <a:t>10/9/2024</a:t>
+              <a:t>10/20/2024</a:t>
             </a:fld>
             <a:endParaRPr lang="en-US"/>
           </a:p>
@@ -3207,7 +3207,7 @@
           <a:p>
             <a:fld id="{241EB5C9-1307-BA42-ABA2-0BC069CD8E7F}" type="datetimeFigureOut">
               <a:rPr lang="en-US" smtClean="0"/>
-              <a:t>10/9/2024</a:t>
+              <a:t>10/20/2024</a:t>
             </a:fld>
             <a:endParaRPr lang="en-US"/>
           </a:p>
@@ -3811,8 +3811,8 @@
           </a:p>
         </p:txBody>
       </p:sp>
-      <mc:AlternateContent xmlns:mc="http://schemas.openxmlformats.org/markup-compatibility/2006">
-        <mc:Choice xmlns:a14="http://schemas.microsoft.com/office/drawing/2010/main" Requires="a14">
+      <mc:AlternateContent xmlns:mc="http://schemas.openxmlformats.org/markup-compatibility/2006" xmlns:a14="http://schemas.microsoft.com/office/drawing/2010/main">
+        <mc:Choice Requires="a14">
           <p:sp>
             <p:nvSpPr>
               <p:cNvPr id="3" name="Content Placeholder 2"/>
@@ -4544,7 +4544,7 @@
             </p:txBody>
           </p:sp>
         </mc:Choice>
-        <mc:Fallback>
+        <mc:Fallback xmlns="">
           <p:sp>
             <p:nvSpPr>
               <p:cNvPr id="3" name="Content Placeholder 2"/>
@@ -9977,8 +9977,8 @@
           </a:p>
         </p:txBody>
       </p:sp>
-      <mc:AlternateContent xmlns:mc="http://schemas.openxmlformats.org/markup-compatibility/2006">
-        <mc:Choice xmlns:a14="http://schemas.microsoft.com/office/drawing/2010/main" Requires="a14">
+      <mc:AlternateContent xmlns:mc="http://schemas.openxmlformats.org/markup-compatibility/2006" xmlns:a14="http://schemas.microsoft.com/office/drawing/2010/main">
+        <mc:Choice Requires="a14">
           <p:sp>
             <p:nvSpPr>
               <p:cNvPr id="3" name="Content Placeholder 2"/>
@@ -10269,7 +10269,7 @@
             </p:txBody>
           </p:sp>
         </mc:Choice>
-        <mc:Fallback>
+        <mc:Fallback xmlns="">
           <p:sp>
             <p:nvSpPr>
               <p:cNvPr id="3" name="Content Placeholder 2"/>
@@ -10552,8 +10552,8 @@
           </a:p>
         </p:txBody>
       </p:sp>
-      <mc:AlternateContent xmlns:mc="http://schemas.openxmlformats.org/markup-compatibility/2006">
-        <mc:Choice xmlns:a14="http://schemas.microsoft.com/office/drawing/2010/main" Requires="a14">
+      <mc:AlternateContent xmlns:mc="http://schemas.openxmlformats.org/markup-compatibility/2006" xmlns:a14="http://schemas.microsoft.com/office/drawing/2010/main">
+        <mc:Choice Requires="a14">
           <p:sp>
             <p:nvSpPr>
               <p:cNvPr id="3" name="Content Placeholder 2"/>
@@ -10700,7 +10700,7 @@
                       <m:d>
                         <m:dPr>
                           <m:ctrlPr>
-                            <a:rPr lang="en-US" b="0" i="0" smtClean="0">
+                            <a:rPr lang="en-US" b="0" i="1" smtClean="0">
                               <a:latin typeface="Cambria Math" panose="02040503050406030204" pitchFamily="18" charset="0"/>
                             </a:rPr>
                           </m:ctrlPr>
@@ -11137,7 +11137,7 @@
             </p:txBody>
           </p:sp>
         </mc:Choice>
-        <mc:Fallback>
+        <mc:Fallback xmlns="">
           <p:sp>
             <p:nvSpPr>
               <p:cNvPr id="3" name="Content Placeholder 2"/>
@@ -11662,8 +11662,8 @@
           </a:p>
         </p:txBody>
       </p:sp>
-      <mc:AlternateContent xmlns:mc="http://schemas.openxmlformats.org/markup-compatibility/2006">
-        <mc:Choice xmlns:a14="http://schemas.microsoft.com/office/drawing/2010/main" Requires="a14">
+      <mc:AlternateContent xmlns:mc="http://schemas.openxmlformats.org/markup-compatibility/2006" xmlns:a14="http://schemas.microsoft.com/office/drawing/2010/main">
+        <mc:Choice Requires="a14">
           <p:sp>
             <p:nvSpPr>
               <p:cNvPr id="3" name="Content Placeholder 2"/>
@@ -12944,7 +12944,7 @@
             </p:txBody>
           </p:sp>
         </mc:Choice>
-        <mc:Fallback>
+        <mc:Fallback xmlns="">
           <p:sp>
             <p:nvSpPr>
               <p:cNvPr id="3" name="Content Placeholder 2"/>
@@ -13765,8 +13765,8 @@
           </a:p>
         </p:txBody>
       </p:sp>
-      <mc:AlternateContent xmlns:mc="http://schemas.openxmlformats.org/markup-compatibility/2006">
-        <mc:Choice xmlns:a14="http://schemas.microsoft.com/office/drawing/2010/main" Requires="a14">
+      <mc:AlternateContent xmlns:mc="http://schemas.openxmlformats.org/markup-compatibility/2006" xmlns:a14="http://schemas.microsoft.com/office/drawing/2010/main">
+        <mc:Choice Requires="a14">
           <p:sp>
             <p:nvSpPr>
               <p:cNvPr id="3" name="Content Placeholder 2"/>
@@ -14119,7 +14119,7 @@
             </p:txBody>
           </p:sp>
         </mc:Choice>
-        <mc:Fallback>
+        <mc:Fallback xmlns="">
           <p:sp>
             <p:nvSpPr>
               <p:cNvPr id="3" name="Content Placeholder 2"/>
@@ -14206,8 +14206,8 @@
           </a:p>
         </p:txBody>
       </p:sp>
-      <mc:AlternateContent xmlns:mc="http://schemas.openxmlformats.org/markup-compatibility/2006">
-        <mc:Choice xmlns:a14="http://schemas.microsoft.com/office/drawing/2010/main" Requires="a14">
+      <mc:AlternateContent xmlns:mc="http://schemas.openxmlformats.org/markup-compatibility/2006" xmlns:a14="http://schemas.microsoft.com/office/drawing/2010/main">
+        <mc:Choice Requires="a14">
           <p:sp>
             <p:nvSpPr>
               <p:cNvPr id="3" name="Content Placeholder 2"/>
@@ -14536,7 +14536,7 @@
             </p:txBody>
           </p:sp>
         </mc:Choice>
-        <mc:Fallback>
+        <mc:Fallback xmlns="">
           <p:sp>
             <p:nvSpPr>
               <p:cNvPr id="3" name="Content Placeholder 2"/>
@@ -14628,8 +14628,8 @@
           </a:p>
         </p:txBody>
       </p:sp>
-      <mc:AlternateContent xmlns:mc="http://schemas.openxmlformats.org/markup-compatibility/2006">
-        <mc:Choice xmlns:a14="http://schemas.microsoft.com/office/drawing/2010/main" Requires="a14">
+      <mc:AlternateContent xmlns:mc="http://schemas.openxmlformats.org/markup-compatibility/2006" xmlns:a14="http://schemas.microsoft.com/office/drawing/2010/main">
+        <mc:Choice Requires="a14">
           <p:sp>
             <p:nvSpPr>
               <p:cNvPr id="3" name="Content Placeholder 2"/>
@@ -14969,7 +14969,7 @@
             </p:txBody>
           </p:sp>
         </mc:Choice>
-        <mc:Fallback>
+        <mc:Fallback xmlns="">
           <p:sp>
             <p:nvSpPr>
               <p:cNvPr id="3" name="Content Placeholder 2"/>
@@ -17347,8 +17347,8 @@
           </a:p>
         </p:txBody>
       </p:sp>
-      <mc:AlternateContent xmlns:mc="http://schemas.openxmlformats.org/markup-compatibility/2006">
-        <mc:Choice xmlns:a14="http://schemas.microsoft.com/office/drawing/2010/main" Requires="a14">
+      <mc:AlternateContent xmlns:mc="http://schemas.openxmlformats.org/markup-compatibility/2006" xmlns:a14="http://schemas.microsoft.com/office/drawing/2010/main">
+        <mc:Choice Requires="a14">
           <p:sp>
             <p:nvSpPr>
               <p:cNvPr id="4" name="Text Placeholder 3"/>
@@ -17488,7 +17488,7 @@
             </p:txBody>
           </p:sp>
         </mc:Choice>
-        <mc:Fallback>
+        <mc:Fallback xmlns="">
           <p:sp>
             <p:nvSpPr>
               <p:cNvPr id="4" name="Text Placeholder 3"/>
@@ -22154,8 +22154,8 @@
           </a:p>
         </p:txBody>
       </p:sp>
-      <mc:AlternateContent xmlns:mc="http://schemas.openxmlformats.org/markup-compatibility/2006" xmlns:a14="http://schemas.microsoft.com/office/drawing/2010/main">
-        <mc:Choice Requires="a14">
+      <mc:AlternateContent xmlns:mc="http://schemas.openxmlformats.org/markup-compatibility/2006">
+        <mc:Choice xmlns:a14="http://schemas.microsoft.com/office/drawing/2010/main" Requires="a14">
           <p:sp>
             <p:nvSpPr>
               <p:cNvPr id="5" name="Content Placeholder 4">
@@ -22180,7 +22180,7 @@
             </p:spPr>
             <p:txBody>
               <a:bodyPr>
-                <a:normAutofit lnSpcReduction="10000"/>
+                <a:normAutofit fontScale="92500" lnSpcReduction="10000"/>
               </a:bodyPr>
               <a:lstStyle/>
               <a:p>
@@ -22214,14 +22214,21 @@
                 </a:r>
                 <a:r>
                   <a:rPr lang="en-US" sz="2000" dirty="0"/>
-                  <a:t>, an hypothesis test on the likelihood ratio between the model and a null model</a:t>
-                </a:r>
+                  <a:t>, </a:t>
+                </a:r>
+                <a:r>
+                  <a:rPr lang="en-US" sz="2000" dirty="0">
+                    <a:hlinkClick r:id="rId4"/>
+                  </a:rPr>
+                  <a:t>an hypothesis test skewness and kurtosis with the null being the Normal distribution</a:t>
+                </a:r>
+                <a:endParaRPr lang="en-US" sz="2000" dirty="0"/>
               </a:p>
               <a:p>
                 <a:pPr lvl="0"/>
                 <a:r>
                   <a:rPr lang="en-US" sz="2000" b="1" dirty="0">
-                    <a:hlinkClick r:id="rId4"/>
+                    <a:hlinkClick r:id="rId5"/>
                   </a:rPr>
                   <a:t>Durbin-Watson</a:t>
                 </a:r>
@@ -22256,14 +22263,14 @@
                   <a:t> indicates serial correlation </a:t>
                 </a:r>
                 <a:endParaRPr lang="en-US" sz="2000" b="1" dirty="0">
-                  <a:hlinkClick r:id="rId5"/>
+                  <a:hlinkClick r:id="rId6"/>
                 </a:endParaRPr>
               </a:p>
               <a:p>
                 <a:pPr lvl="0"/>
                 <a:r>
                   <a:rPr lang="en-US" sz="2000" b="1" dirty="0">
-                    <a:hlinkClick r:id="rId5"/>
+                    <a:hlinkClick r:id="rId6"/>
                   </a:rPr>
                   <a:t>Jarque-Bera</a:t>
                 </a:r>
@@ -22280,13 +22287,13 @@
                 </a:r>
                 <a:r>
                   <a:rPr lang="en-US" sz="2000" b="1" dirty="0">
-                    <a:hlinkClick r:id="rId6"/>
+                    <a:hlinkClick r:id="rId7"/>
                   </a:rPr>
                   <a:t>Condition number</a:t>
                 </a:r>
                 <a:r>
                   <a:rPr lang="en-US" sz="2000" dirty="0">
-                    <a:hlinkClick r:id="rId6"/>
+                    <a:hlinkClick r:id="rId7"/>
                   </a:rPr>
                   <a:t> </a:t>
                 </a:r>
@@ -22301,7 +22308,7 @@
             </p:txBody>
           </p:sp>
         </mc:Choice>
-        <mc:Fallback xmlns="">
+        <mc:Fallback>
           <p:sp>
             <p:nvSpPr>
               <p:cNvPr id="5" name="Content Placeholder 4">
@@ -22324,9 +22331,9 @@
                 <a:ext cx="4823968" cy="4049283"/>
               </a:xfrm>
               <a:blipFill>
-                <a:blip r:embed="rId7"/>
+                <a:blip r:embed="rId8"/>
                 <a:stretch>
-                  <a:fillRect l="-1263" t="-1657" r="-1894"/>
+                  <a:fillRect l="-1136" t="-1506" r="-126"/>
                 </a:stretch>
               </a:blipFill>
             </p:spPr>

</xml_diff>